<commit_message>
Created DB for RIA, small css fixes (Titolo immagine fixed dim)
</commit_message>
<xml_diff>
--- a/Presentazioni Powerpoint/Progetto1_versione_RIA.pptx
+++ b/Presentazioni Powerpoint/Progetto1_versione_RIA.pptx
@@ -8,12 +8,12 @@
     <p:notesMasterId r:id="rId8"/>
   </p:notesMasterIdLst>
   <p:sldIdLst>
-    <p:sldId id="258" r:id="rId2"/>
-    <p:sldId id="265" r:id="rId3"/>
-    <p:sldId id="257" r:id="rId4"/>
-    <p:sldId id="256" r:id="rId5"/>
-    <p:sldId id="283" r:id="rId6"/>
-    <p:sldId id="282" r:id="rId7"/>
+    <p:sldId id="283" r:id="rId2"/>
+    <p:sldId id="258" r:id="rId3"/>
+    <p:sldId id="265" r:id="rId4"/>
+    <p:sldId id="282" r:id="rId5"/>
+    <p:sldId id="257" r:id="rId6"/>
+    <p:sldId id="256" r:id="rId7"/>
   </p:sldIdLst>
   <p:sldSz cx="12192000" cy="6858000"/>
   <p:notesSz cx="6858000" cy="9144000"/>
@@ -112,6 +112,11 @@
       </a:defRPr>
     </a:lvl9pPr>
   </p:defaultTextStyle>
+  <p:extLst>
+    <p:ext uri="{EFAFB233-063F-42B5-8137-9DF3F51BA10A}">
+      <p15:sldGuideLst xmlns:p15="http://schemas.microsoft.com/office/powerpoint/2012/main"/>
+    </p:ext>
+  </p:extLst>
 </p:presentation>
 </file>
 
@@ -197,7 +202,7 @@
           <a:p>
             <a:fld id="{C25F5A86-D4B2-4CFB-9FC8-FAE097577B12}" type="datetimeFigureOut">
               <a:rPr lang="it-IT" smtClean="0"/>
-              <a:t>19/08/2020</a:t>
+              <a:t>21/08/2020</a:t>
             </a:fld>
             <a:endParaRPr lang="it-IT"/>
           </a:p>
@@ -465,6 +470,90 @@
 </file>
 
 <file path=ppt/notesSlides/notesSlide1.xml><?xml version="1.0" encoding="utf-8"?>
+<p:notes xmlns:a="http://schemas.openxmlformats.org/drawingml/2006/main" xmlns:r="http://schemas.openxmlformats.org/officeDocument/2006/relationships" xmlns:p="http://schemas.openxmlformats.org/presentationml/2006/main">
+  <p:cSld>
+    <p:spTree>
+      <p:nvGrpSpPr>
+        <p:cNvPr id="1" name=""/>
+        <p:cNvGrpSpPr/>
+        <p:nvPr/>
+      </p:nvGrpSpPr>
+      <p:grpSpPr>
+        <a:xfrm>
+          <a:off x="0" y="0"/>
+          <a:ext cx="0" cy="0"/>
+          <a:chOff x="0" y="0"/>
+          <a:chExt cx="0" cy="0"/>
+        </a:xfrm>
+      </p:grpSpPr>
+      <p:sp>
+        <p:nvSpPr>
+          <p:cNvPr id="2" name="Segnaposto immagine diapositiva 1"/>
+          <p:cNvSpPr>
+            <a:spLocks noGrp="1" noRot="1" noChangeAspect="1"/>
+          </p:cNvSpPr>
+          <p:nvPr>
+            <p:ph type="sldImg"/>
+          </p:nvPr>
+        </p:nvSpPr>
+        <p:spPr/>
+      </p:sp>
+      <p:sp>
+        <p:nvSpPr>
+          <p:cNvPr id="3" name="Segnaposto note 2"/>
+          <p:cNvSpPr>
+            <a:spLocks noGrp="1"/>
+          </p:cNvSpPr>
+          <p:nvPr>
+            <p:ph type="body" idx="1"/>
+          </p:nvPr>
+        </p:nvSpPr>
+        <p:spPr/>
+        <p:txBody>
+          <a:bodyPr/>
+          <a:lstStyle/>
+          <a:p>
+            <a:endParaRPr lang="en-US" dirty="0"/>
+          </a:p>
+        </p:txBody>
+      </p:sp>
+      <p:sp>
+        <p:nvSpPr>
+          <p:cNvPr id="4" name="Segnaposto numero diapositiva 3"/>
+          <p:cNvSpPr>
+            <a:spLocks noGrp="1"/>
+          </p:cNvSpPr>
+          <p:nvPr>
+            <p:ph type="sldNum" sz="quarter" idx="5"/>
+          </p:nvPr>
+        </p:nvSpPr>
+        <p:spPr/>
+        <p:txBody>
+          <a:bodyPr/>
+          <a:lstStyle/>
+          <a:p>
+            <a:fld id="{7BDF7005-1E7F-4685-8EDF-81C5D2154059}" type="slidenum">
+              <a:rPr lang="it-IT" smtClean="0"/>
+              <a:t>1</a:t>
+            </a:fld>
+            <a:endParaRPr lang="it-IT"/>
+          </a:p>
+        </p:txBody>
+      </p:sp>
+    </p:spTree>
+    <p:extLst>
+      <p:ext uri="{BB962C8B-B14F-4D97-AF65-F5344CB8AC3E}">
+        <p14:creationId xmlns:p14="http://schemas.microsoft.com/office/powerpoint/2010/main" val="2458273286"/>
+      </p:ext>
+    </p:extLst>
+  </p:cSld>
+  <p:clrMapOvr>
+    <a:masterClrMapping/>
+  </p:clrMapOvr>
+</p:notes>
+</file>
+
+<file path=ppt/notesSlides/notesSlide2.xml><?xml version="1.0" encoding="utf-8"?>
 <p:notes xmlns:a="http://schemas.openxmlformats.org/drawingml/2006/main" xmlns:r="http://schemas.openxmlformats.org/officeDocument/2006/relationships" xmlns:p="http://schemas.openxmlformats.org/presentationml/2006/main" showMasterSp="0" showMasterPhAnim="0">
   <p:cSld>
     <p:spTree>
@@ -715,7 +804,7 @@
           <a:p>
             <a:fld id="{FE1EE28F-F736-456D-A3C7-4F5EC37410C2}" type="datetimeFigureOut">
               <a:rPr lang="it-IT" smtClean="0"/>
-              <a:t>19/08/2020</a:t>
+              <a:t>21/08/2020</a:t>
             </a:fld>
             <a:endParaRPr lang="it-IT"/>
           </a:p>
@@ -913,7 +1002,7 @@
           <a:p>
             <a:fld id="{FE1EE28F-F736-456D-A3C7-4F5EC37410C2}" type="datetimeFigureOut">
               <a:rPr lang="it-IT" smtClean="0"/>
-              <a:t>19/08/2020</a:t>
+              <a:t>21/08/2020</a:t>
             </a:fld>
             <a:endParaRPr lang="it-IT"/>
           </a:p>
@@ -1121,7 +1210,7 @@
           <a:p>
             <a:fld id="{FE1EE28F-F736-456D-A3C7-4F5EC37410C2}" type="datetimeFigureOut">
               <a:rPr lang="it-IT" smtClean="0"/>
-              <a:t>19/08/2020</a:t>
+              <a:t>21/08/2020</a:t>
             </a:fld>
             <a:endParaRPr lang="it-IT"/>
           </a:p>
@@ -1319,7 +1408,7 @@
           <a:p>
             <a:fld id="{FE1EE28F-F736-456D-A3C7-4F5EC37410C2}" type="datetimeFigureOut">
               <a:rPr lang="it-IT" smtClean="0"/>
-              <a:t>19/08/2020</a:t>
+              <a:t>21/08/2020</a:t>
             </a:fld>
             <a:endParaRPr lang="it-IT"/>
           </a:p>
@@ -1594,7 +1683,7 @@
           <a:p>
             <a:fld id="{FE1EE28F-F736-456D-A3C7-4F5EC37410C2}" type="datetimeFigureOut">
               <a:rPr lang="it-IT" smtClean="0"/>
-              <a:t>19/08/2020</a:t>
+              <a:t>21/08/2020</a:t>
             </a:fld>
             <a:endParaRPr lang="it-IT"/>
           </a:p>
@@ -1859,7 +1948,7 @@
           <a:p>
             <a:fld id="{FE1EE28F-F736-456D-A3C7-4F5EC37410C2}" type="datetimeFigureOut">
               <a:rPr lang="it-IT" smtClean="0"/>
-              <a:t>19/08/2020</a:t>
+              <a:t>21/08/2020</a:t>
             </a:fld>
             <a:endParaRPr lang="it-IT"/>
           </a:p>
@@ -2271,7 +2360,7 @@
           <a:p>
             <a:fld id="{FE1EE28F-F736-456D-A3C7-4F5EC37410C2}" type="datetimeFigureOut">
               <a:rPr lang="it-IT" smtClean="0"/>
-              <a:t>19/08/2020</a:t>
+              <a:t>21/08/2020</a:t>
             </a:fld>
             <a:endParaRPr lang="it-IT"/>
           </a:p>
@@ -2412,7 +2501,7 @@
           <a:p>
             <a:fld id="{FE1EE28F-F736-456D-A3C7-4F5EC37410C2}" type="datetimeFigureOut">
               <a:rPr lang="it-IT" smtClean="0"/>
-              <a:t>19/08/2020</a:t>
+              <a:t>21/08/2020</a:t>
             </a:fld>
             <a:endParaRPr lang="it-IT"/>
           </a:p>
@@ -2525,7 +2614,7 @@
           <a:p>
             <a:fld id="{FE1EE28F-F736-456D-A3C7-4F5EC37410C2}" type="datetimeFigureOut">
               <a:rPr lang="it-IT" smtClean="0"/>
-              <a:t>19/08/2020</a:t>
+              <a:t>21/08/2020</a:t>
             </a:fld>
             <a:endParaRPr lang="it-IT"/>
           </a:p>
@@ -2836,7 +2925,7 @@
           <a:p>
             <a:fld id="{FE1EE28F-F736-456D-A3C7-4F5EC37410C2}" type="datetimeFigureOut">
               <a:rPr lang="it-IT" smtClean="0"/>
-              <a:t>19/08/2020</a:t>
+              <a:t>21/08/2020</a:t>
             </a:fld>
             <a:endParaRPr lang="it-IT"/>
           </a:p>
@@ -3124,7 +3213,7 @@
           <a:p>
             <a:fld id="{FE1EE28F-F736-456D-A3C7-4F5EC37410C2}" type="datetimeFigureOut">
               <a:rPr lang="it-IT" smtClean="0"/>
-              <a:t>19/08/2020</a:t>
+              <a:t>21/08/2020</a:t>
             </a:fld>
             <a:endParaRPr lang="it-IT"/>
           </a:p>
@@ -3365,7 +3454,7 @@
           <a:p>
             <a:fld id="{FE1EE28F-F736-456D-A3C7-4F5EC37410C2}" type="datetimeFigureOut">
               <a:rPr lang="it-IT" smtClean="0"/>
-              <a:t>19/08/2020</a:t>
+              <a:t>21/08/2020</a:t>
             </a:fld>
             <a:endParaRPr lang="it-IT"/>
           </a:p>
@@ -3784,6 +3873,912 @@
       </p:grpSpPr>
       <p:sp>
         <p:nvSpPr>
+          <p:cNvPr id="2" name="Title 1"/>
+          <p:cNvSpPr>
+            <a:spLocks noGrp="1"/>
+          </p:cNvSpPr>
+          <p:nvPr>
+            <p:ph type="title"/>
+          </p:nvPr>
+        </p:nvSpPr>
+        <p:spPr>
+          <a:xfrm>
+            <a:off x="0" y="1"/>
+            <a:ext cx="12192000" cy="779030"/>
+          </a:xfrm>
+        </p:spPr>
+        <p:txBody>
+          <a:bodyPr/>
+          <a:lstStyle/>
+          <a:p>
+            <a:pPr algn="ctr"/>
+            <a:r>
+              <a:rPr lang="en-US" dirty="0"/>
+              <a:t>Server side: DAO &amp; model objects</a:t>
+            </a:r>
+          </a:p>
+        </p:txBody>
+      </p:sp>
+      <p:sp>
+        <p:nvSpPr>
+          <p:cNvPr id="3" name="Text Placeholder 2"/>
+          <p:cNvSpPr>
+            <a:spLocks noGrp="1"/>
+          </p:cNvSpPr>
+          <p:nvPr>
+            <p:ph type="body" idx="1"/>
+          </p:nvPr>
+        </p:nvSpPr>
+        <p:spPr>
+          <a:xfrm>
+            <a:off x="0" y="2513194"/>
+            <a:ext cx="5382825" cy="3940574"/>
+          </a:xfrm>
+        </p:spPr>
+        <p:txBody>
+          <a:bodyPr>
+            <a:normAutofit fontScale="92500" lnSpcReduction="20000"/>
+          </a:bodyPr>
+          <a:lstStyle/>
+          <a:p>
+            <a:pPr marL="173725" indent="0">
+              <a:lnSpc>
+                <a:spcPct val="80000"/>
+              </a:lnSpc>
+              <a:spcBef>
+                <a:spcPts val="411"/>
+              </a:spcBef>
+              <a:buSzPts val="1750"/>
+              <a:buNone/>
+            </a:pPr>
+            <a:r>
+              <a:rPr lang="en-US" sz="2600" dirty="0"/>
+              <a:t>Data Access Objects (Classes)                             </a:t>
+            </a:r>
+          </a:p>
+          <a:p>
+            <a:pPr marL="822183" lvl="1" indent="-285750">
+              <a:lnSpc>
+                <a:spcPct val="80000"/>
+              </a:lnSpc>
+              <a:spcBef>
+                <a:spcPts val="352"/>
+              </a:spcBef>
+              <a:buSzPts val="1500"/>
+            </a:pPr>
+            <a:r>
+              <a:rPr lang="en-US" sz="1800" dirty="0" err="1"/>
+              <a:t>UserDAO</a:t>
+            </a:r>
+            <a:endParaRPr lang="en-US" sz="1800" dirty="0"/>
+          </a:p>
+          <a:p>
+            <a:pPr marL="1418219" lvl="2" indent="-285750">
+              <a:lnSpc>
+                <a:spcPct val="80000"/>
+              </a:lnSpc>
+              <a:spcBef>
+                <a:spcPts val="352"/>
+              </a:spcBef>
+              <a:buSzPts val="1200"/>
+            </a:pPr>
+            <a:r>
+              <a:rPr lang="en-US" sz="1800" dirty="0" err="1"/>
+              <a:t>checkCredentials</a:t>
+            </a:r>
+            <a:r>
+              <a:rPr lang="en-US" sz="1800" dirty="0"/>
+              <a:t>(username, </a:t>
+            </a:r>
+            <a:r>
+              <a:rPr lang="en-US" sz="1800" dirty="0" err="1"/>
+              <a:t>pwd</a:t>
+            </a:r>
+            <a:r>
+              <a:rPr lang="en-US" sz="1800" dirty="0"/>
+              <a:t>)</a:t>
+            </a:r>
+          </a:p>
+          <a:p>
+            <a:pPr marL="1418219" lvl="2" indent="-285750">
+              <a:lnSpc>
+                <a:spcPct val="80000"/>
+              </a:lnSpc>
+              <a:spcBef>
+                <a:spcPts val="352"/>
+              </a:spcBef>
+              <a:buSzPts val="1200"/>
+            </a:pPr>
+            <a:r>
+              <a:rPr lang="en-US" sz="1800" dirty="0" err="1"/>
+              <a:t>createNewUser</a:t>
+            </a:r>
+            <a:r>
+              <a:rPr lang="en-US" sz="1800" dirty="0"/>
+              <a:t>(username, </a:t>
+            </a:r>
+            <a:r>
+              <a:rPr lang="en-US" sz="1800" dirty="0" err="1"/>
+              <a:t>pwd</a:t>
+            </a:r>
+            <a:r>
+              <a:rPr lang="en-US" sz="1800" dirty="0"/>
+              <a:t>, email)</a:t>
+            </a:r>
+          </a:p>
+          <a:p>
+            <a:pPr marL="889237" lvl="1" indent="-285750">
+              <a:lnSpc>
+                <a:spcPct val="80000"/>
+              </a:lnSpc>
+              <a:spcBef>
+                <a:spcPts val="352"/>
+              </a:spcBef>
+              <a:buSzPts val="1500"/>
+            </a:pPr>
+            <a:r>
+              <a:rPr lang="en-US" sz="1800" dirty="0" err="1"/>
+              <a:t>AlbumDAO</a:t>
+            </a:r>
+            <a:endParaRPr lang="en-US" sz="1800" dirty="0"/>
+          </a:p>
+          <a:p>
+            <a:pPr marL="1418219" lvl="2" indent="-285750">
+              <a:lnSpc>
+                <a:spcPct val="80000"/>
+              </a:lnSpc>
+              <a:spcBef>
+                <a:spcPts val="352"/>
+              </a:spcBef>
+              <a:buSzPts val="1200"/>
+            </a:pPr>
+            <a:r>
+              <a:rPr lang="en-US" sz="1800" dirty="0" err="1"/>
+              <a:t>findAllAlbums</a:t>
+            </a:r>
+            <a:r>
+              <a:rPr lang="en-US" sz="1800" dirty="0"/>
+              <a:t>()</a:t>
+            </a:r>
+          </a:p>
+          <a:p>
+            <a:pPr marL="1418219" lvl="2" indent="-285750">
+              <a:lnSpc>
+                <a:spcPct val="80000"/>
+              </a:lnSpc>
+              <a:spcBef>
+                <a:spcPts val="352"/>
+              </a:spcBef>
+              <a:buSzPts val="1200"/>
+            </a:pPr>
+            <a:r>
+              <a:rPr lang="en-US" sz="1800" dirty="0" err="1"/>
+              <a:t>findInfoOfAlbumById</a:t>
+            </a:r>
+            <a:r>
+              <a:rPr lang="en-US" sz="1800" dirty="0"/>
+              <a:t>(</a:t>
+            </a:r>
+            <a:r>
+              <a:rPr lang="en-US" sz="1800" dirty="0" err="1"/>
+              <a:t>userid</a:t>
+            </a:r>
+            <a:r>
+              <a:rPr lang="en-US" sz="1800" dirty="0"/>
+              <a:t>)</a:t>
+            </a:r>
+          </a:p>
+          <a:p>
+            <a:pPr marL="822183" lvl="1" indent="-285750">
+              <a:lnSpc>
+                <a:spcPct val="80000"/>
+              </a:lnSpc>
+              <a:spcBef>
+                <a:spcPts val="352"/>
+              </a:spcBef>
+              <a:buSzPts val="1500"/>
+            </a:pPr>
+            <a:r>
+              <a:rPr lang="en-US" sz="1800" dirty="0" err="1"/>
+              <a:t>ImageDAO</a:t>
+            </a:r>
+            <a:endParaRPr lang="en-US" sz="1800" dirty="0"/>
+          </a:p>
+          <a:p>
+            <a:pPr marL="1418219" lvl="2" indent="-285750">
+              <a:lnSpc>
+                <a:spcPct val="80000"/>
+              </a:lnSpc>
+              <a:spcBef>
+                <a:spcPts val="352"/>
+              </a:spcBef>
+              <a:buSzPts val="1200"/>
+            </a:pPr>
+            <a:r>
+              <a:rPr lang="en-US" sz="1800" dirty="0" err="1"/>
+              <a:t>findImagesOfAlbum</a:t>
+            </a:r>
+            <a:r>
+              <a:rPr lang="en-US" sz="1800" dirty="0"/>
+              <a:t>(</a:t>
+            </a:r>
+            <a:r>
+              <a:rPr lang="en-US" sz="1800" dirty="0" err="1"/>
+              <a:t>albumId</a:t>
+            </a:r>
+            <a:r>
+              <a:rPr lang="en-US" sz="1800" dirty="0"/>
+              <a:t>)</a:t>
+            </a:r>
+          </a:p>
+          <a:p>
+            <a:pPr marL="1418219" lvl="2" indent="-285750">
+              <a:lnSpc>
+                <a:spcPct val="80000"/>
+              </a:lnSpc>
+              <a:spcBef>
+                <a:spcPts val="352"/>
+              </a:spcBef>
+              <a:buSzPts val="1200"/>
+            </a:pPr>
+            <a:r>
+              <a:rPr lang="en-US" sz="1800" dirty="0" err="1"/>
+              <a:t>findImageById</a:t>
+            </a:r>
+            <a:r>
+              <a:rPr lang="en-US" sz="1800" dirty="0"/>
+              <a:t>(</a:t>
+            </a:r>
+            <a:r>
+              <a:rPr lang="en-US" sz="1800" dirty="0" err="1"/>
+              <a:t>imageId</a:t>
+            </a:r>
+            <a:r>
+              <a:rPr lang="en-US" sz="1800" dirty="0"/>
+              <a:t>)</a:t>
+            </a:r>
+          </a:p>
+          <a:p>
+            <a:pPr marL="822183" lvl="1" indent="-285750">
+              <a:lnSpc>
+                <a:spcPct val="80000"/>
+              </a:lnSpc>
+              <a:spcBef>
+                <a:spcPts val="352"/>
+              </a:spcBef>
+              <a:buSzPts val="1500"/>
+            </a:pPr>
+            <a:r>
+              <a:rPr lang="en-US" sz="1800" dirty="0" err="1"/>
+              <a:t>CommentDAO</a:t>
+            </a:r>
+            <a:endParaRPr lang="en-US" sz="1800" dirty="0"/>
+          </a:p>
+          <a:p>
+            <a:pPr marL="1418219" lvl="2" indent="-285750">
+              <a:lnSpc>
+                <a:spcPct val="80000"/>
+              </a:lnSpc>
+              <a:spcBef>
+                <a:spcPts val="352"/>
+              </a:spcBef>
+              <a:buSzPts val="1200"/>
+            </a:pPr>
+            <a:r>
+              <a:rPr lang="en-US" sz="1800" dirty="0" err="1"/>
+              <a:t>findCommentsOfImage</a:t>
+            </a:r>
+            <a:r>
+              <a:rPr lang="en-US" sz="1800" dirty="0"/>
+              <a:t>(</a:t>
+            </a:r>
+            <a:r>
+              <a:rPr lang="en-US" sz="1800" dirty="0" err="1"/>
+              <a:t>imageId</a:t>
+            </a:r>
+            <a:r>
+              <a:rPr lang="en-US" sz="1800" dirty="0"/>
+              <a:t>)</a:t>
+            </a:r>
+          </a:p>
+          <a:p>
+            <a:pPr marL="1418219" lvl="2" indent="-285750">
+              <a:lnSpc>
+                <a:spcPct val="80000"/>
+              </a:lnSpc>
+              <a:spcBef>
+                <a:spcPts val="352"/>
+              </a:spcBef>
+              <a:buSzPts val="1200"/>
+            </a:pPr>
+            <a:r>
+              <a:rPr lang="en-US" sz="1800" dirty="0" err="1"/>
+              <a:t>createComment</a:t>
+            </a:r>
+            <a:r>
+              <a:rPr lang="en-US" sz="1800" dirty="0"/>
+              <a:t>(text, </a:t>
+            </a:r>
+            <a:r>
+              <a:rPr lang="en-US" sz="1800" dirty="0" err="1"/>
+              <a:t>imageId</a:t>
+            </a:r>
+            <a:r>
+              <a:rPr lang="en-US" sz="1800" dirty="0"/>
+              <a:t>, </a:t>
+            </a:r>
+            <a:r>
+              <a:rPr lang="en-US" sz="1800" dirty="0" err="1"/>
+              <a:t>userId</a:t>
+            </a:r>
+            <a:r>
+              <a:rPr lang="en-US" sz="1800" dirty="0"/>
+              <a:t>, date)</a:t>
+            </a:r>
+          </a:p>
+          <a:p>
+            <a:pPr marL="889237" lvl="1" indent="-285750">
+              <a:lnSpc>
+                <a:spcPct val="80000"/>
+              </a:lnSpc>
+              <a:spcBef>
+                <a:spcPts val="352"/>
+              </a:spcBef>
+              <a:buSzPts val="1500"/>
+            </a:pPr>
+            <a:r>
+              <a:rPr lang="en-US" sz="1800" dirty="0" err="1"/>
+              <a:t>RegistrationDAO</a:t>
+            </a:r>
+            <a:endParaRPr lang="en-US" sz="1800" dirty="0"/>
+          </a:p>
+          <a:p>
+            <a:pPr marL="1418219" lvl="2" indent="-285750">
+              <a:lnSpc>
+                <a:spcPct val="80000"/>
+              </a:lnSpc>
+              <a:spcBef>
+                <a:spcPts val="352"/>
+              </a:spcBef>
+              <a:buSzPts val="1200"/>
+            </a:pPr>
+            <a:r>
+              <a:rPr lang="en-US" sz="1800" dirty="0" err="1"/>
+              <a:t>createRegistrationOfUser</a:t>
+            </a:r>
+            <a:r>
+              <a:rPr lang="en-US" sz="1800" dirty="0"/>
+              <a:t>(</a:t>
+            </a:r>
+            <a:r>
+              <a:rPr lang="en-US" sz="1800" dirty="0" err="1"/>
+              <a:t>username,pwd,email</a:t>
+            </a:r>
+            <a:r>
+              <a:rPr lang="en-US" sz="1800" dirty="0"/>
+              <a:t>)</a:t>
+            </a:r>
+          </a:p>
+          <a:p>
+            <a:pPr marL="1418219" lvl="2" indent="-285750">
+              <a:lnSpc>
+                <a:spcPct val="80000"/>
+              </a:lnSpc>
+              <a:spcBef>
+                <a:spcPts val="352"/>
+              </a:spcBef>
+              <a:buSzPts val="1200"/>
+            </a:pPr>
+            <a:r>
+              <a:rPr lang="en-US" sz="1800" dirty="0" err="1"/>
+              <a:t>controlRegistrationOfUser</a:t>
+            </a:r>
+            <a:r>
+              <a:rPr lang="en-US" sz="1800" dirty="0"/>
+              <a:t>(</a:t>
+            </a:r>
+            <a:r>
+              <a:rPr lang="en-US" sz="1800" dirty="0" err="1"/>
+              <a:t>userid</a:t>
+            </a:r>
+            <a:r>
+              <a:rPr lang="en-US" sz="1800" dirty="0"/>
+              <a:t>)</a:t>
+            </a:r>
+          </a:p>
+          <a:p>
+            <a:pPr marL="1132469" lvl="2" indent="0">
+              <a:lnSpc>
+                <a:spcPct val="80000"/>
+              </a:lnSpc>
+              <a:spcBef>
+                <a:spcPts val="352"/>
+              </a:spcBef>
+              <a:buSzPts val="1200"/>
+              <a:buNone/>
+            </a:pPr>
+            <a:endParaRPr lang="en-US" sz="1400" dirty="0"/>
+          </a:p>
+        </p:txBody>
+      </p:sp>
+      <p:sp>
+        <p:nvSpPr>
+          <p:cNvPr id="6" name="CasellaDiTesto 5">
+            <a:extLst>
+              <a:ext uri="{FF2B5EF4-FFF2-40B4-BE49-F238E27FC236}">
+                <a16:creationId xmlns:a16="http://schemas.microsoft.com/office/drawing/2014/main" id="{D4BEC07E-F77A-4D9E-923B-1C6F01EBEDB9}"/>
+              </a:ext>
+            </a:extLst>
+          </p:cNvPr>
+          <p:cNvSpPr txBox="1"/>
+          <p:nvPr/>
+        </p:nvSpPr>
+        <p:spPr>
+          <a:xfrm>
+            <a:off x="5382825" y="654732"/>
+            <a:ext cx="5162083" cy="2400657"/>
+          </a:xfrm>
+          <a:prstGeom prst="rect">
+            <a:avLst/>
+          </a:prstGeom>
+          <a:noFill/>
+        </p:spPr>
+        <p:txBody>
+          <a:bodyPr wrap="square">
+            <a:spAutoFit/>
+          </a:bodyPr>
+          <a:lstStyle/>
+          <a:p>
+            <a:r>
+              <a:rPr lang="en-US" sz="2400" dirty="0"/>
+              <a:t>Controllers (servlets)</a:t>
+            </a:r>
+          </a:p>
+          <a:p>
+            <a:pPr marL="742950" lvl="1" indent="-285750">
+              <a:buFont typeface="Arial" panose="020B0604020202020204" pitchFamily="34" charset="0"/>
+              <a:buChar char="•"/>
+            </a:pPr>
+            <a:r>
+              <a:rPr lang="en-US" dirty="0" err="1"/>
+              <a:t>CheckLogin</a:t>
+            </a:r>
+            <a:r>
+              <a:rPr lang="en-US" dirty="0"/>
+              <a:t> (</a:t>
+            </a:r>
+            <a:r>
+              <a:rPr lang="en-US" dirty="0" err="1"/>
+              <a:t>LoggedUser</a:t>
+            </a:r>
+            <a:r>
+              <a:rPr lang="en-US" dirty="0"/>
+              <a:t>)</a:t>
+            </a:r>
+          </a:p>
+          <a:p>
+            <a:pPr marL="742950" lvl="1" indent="-285750">
+              <a:buFont typeface="Arial" panose="020B0604020202020204" pitchFamily="34" charset="0"/>
+              <a:buChar char="•"/>
+            </a:pPr>
+            <a:r>
+              <a:rPr lang="en-US" dirty="0" err="1"/>
+              <a:t>CheckGuest</a:t>
+            </a:r>
+            <a:r>
+              <a:rPr lang="en-US" dirty="0"/>
+              <a:t>(Guest)</a:t>
+            </a:r>
+          </a:p>
+          <a:p>
+            <a:pPr marL="742950" lvl="1" indent="-285750">
+              <a:buFont typeface="Arial" panose="020B0604020202020204" pitchFamily="34" charset="0"/>
+              <a:buChar char="•"/>
+            </a:pPr>
+            <a:r>
+              <a:rPr lang="en-US" dirty="0" err="1"/>
+              <a:t>CreateComment</a:t>
+            </a:r>
+            <a:r>
+              <a:rPr lang="en-US" dirty="0"/>
+              <a:t> (</a:t>
+            </a:r>
+            <a:r>
+              <a:rPr lang="en-US" dirty="0" err="1"/>
+              <a:t>LoggedUser</a:t>
+            </a:r>
+            <a:r>
+              <a:rPr lang="en-US" dirty="0"/>
+              <a:t>)</a:t>
+            </a:r>
+          </a:p>
+          <a:p>
+            <a:pPr marL="742950" lvl="1" indent="-285750">
+              <a:buFont typeface="Arial" panose="020B0604020202020204" pitchFamily="34" charset="0"/>
+              <a:buChar char="•"/>
+            </a:pPr>
+            <a:r>
+              <a:rPr lang="en-US" dirty="0" err="1"/>
+              <a:t>GetImagesOfAlbum</a:t>
+            </a:r>
+            <a:r>
+              <a:rPr lang="en-US" dirty="0"/>
+              <a:t> (all)</a:t>
+            </a:r>
+          </a:p>
+          <a:p>
+            <a:pPr marL="742950" lvl="1" indent="-285750">
+              <a:buFont typeface="Arial" panose="020B0604020202020204" pitchFamily="34" charset="0"/>
+              <a:buChar char="•"/>
+            </a:pPr>
+            <a:r>
+              <a:rPr lang="en-US" dirty="0"/>
+              <a:t>Logout (</a:t>
+            </a:r>
+            <a:r>
+              <a:rPr lang="en-US" dirty="0" err="1"/>
+              <a:t>LoggedUser</a:t>
+            </a:r>
+            <a:r>
+              <a:rPr lang="en-US" dirty="0"/>
+              <a:t>)</a:t>
+            </a:r>
+          </a:p>
+          <a:p>
+            <a:pPr marL="742950" lvl="1" indent="-285750">
+              <a:buFont typeface="Arial" panose="020B0604020202020204" pitchFamily="34" charset="0"/>
+              <a:buChar char="•"/>
+            </a:pPr>
+            <a:r>
+              <a:rPr lang="en-US" dirty="0" err="1"/>
+              <a:t>OpenRegistrationForm</a:t>
+            </a:r>
+            <a:r>
+              <a:rPr lang="en-US" dirty="0"/>
+              <a:t> (Guest)</a:t>
+            </a:r>
+          </a:p>
+          <a:p>
+            <a:pPr marL="742950" lvl="1" indent="-285750">
+              <a:buFont typeface="Arial" panose="020B0604020202020204" pitchFamily="34" charset="0"/>
+              <a:buChar char="•"/>
+            </a:pPr>
+            <a:r>
+              <a:rPr lang="en-US" dirty="0"/>
+              <a:t>Registration (Guest)</a:t>
+            </a:r>
+          </a:p>
+        </p:txBody>
+      </p:sp>
+      <p:sp>
+        <p:nvSpPr>
+          <p:cNvPr id="8" name="CasellaDiTesto 7">
+            <a:extLst>
+              <a:ext uri="{FF2B5EF4-FFF2-40B4-BE49-F238E27FC236}">
+                <a16:creationId xmlns:a16="http://schemas.microsoft.com/office/drawing/2014/main" id="{37A508B4-A9E3-4AAE-9946-1396116B7934}"/>
+              </a:ext>
+            </a:extLst>
+          </p:cNvPr>
+          <p:cNvSpPr txBox="1"/>
+          <p:nvPr/>
+        </p:nvSpPr>
+        <p:spPr>
+          <a:xfrm>
+            <a:off x="0" y="727416"/>
+            <a:ext cx="5382825" cy="1288430"/>
+          </a:xfrm>
+          <a:prstGeom prst="rect">
+            <a:avLst/>
+          </a:prstGeom>
+          <a:noFill/>
+        </p:spPr>
+        <p:txBody>
+          <a:bodyPr wrap="square">
+            <a:spAutoFit/>
+          </a:bodyPr>
+          <a:lstStyle/>
+          <a:p>
+            <a:pPr>
+              <a:lnSpc>
+                <a:spcPct val="80000"/>
+              </a:lnSpc>
+              <a:buSzPts val="1750"/>
+            </a:pPr>
+            <a:r>
+              <a:rPr lang="en-US" sz="2800" dirty="0"/>
+              <a:t>Model objects (Beans)</a:t>
+            </a:r>
+            <a:endParaRPr lang="en-US" sz="2400" dirty="0"/>
+          </a:p>
+          <a:p>
+            <a:pPr marL="889237" lvl="1" indent="-285750">
+              <a:lnSpc>
+                <a:spcPct val="60000"/>
+              </a:lnSpc>
+              <a:spcBef>
+                <a:spcPts val="352"/>
+              </a:spcBef>
+              <a:buSzPts val="1500"/>
+              <a:buFont typeface="Arial" panose="020B0604020202020204" pitchFamily="34" charset="0"/>
+              <a:buChar char="•"/>
+            </a:pPr>
+            <a:r>
+              <a:rPr lang="en-US" sz="1700" dirty="0"/>
+              <a:t>User</a:t>
+            </a:r>
+          </a:p>
+          <a:p>
+            <a:pPr marL="889237" lvl="1" indent="-285750">
+              <a:lnSpc>
+                <a:spcPct val="60000"/>
+              </a:lnSpc>
+              <a:spcBef>
+                <a:spcPts val="352"/>
+              </a:spcBef>
+              <a:buSzPts val="1500"/>
+              <a:buFont typeface="Arial" panose="020B0604020202020204" pitchFamily="34" charset="0"/>
+              <a:buChar char="•"/>
+            </a:pPr>
+            <a:r>
+              <a:rPr lang="en-US" sz="1700" dirty="0"/>
+              <a:t>Album</a:t>
+            </a:r>
+          </a:p>
+          <a:p>
+            <a:pPr marL="889237" lvl="1" indent="-285750">
+              <a:lnSpc>
+                <a:spcPct val="60000"/>
+              </a:lnSpc>
+              <a:spcBef>
+                <a:spcPts val="352"/>
+              </a:spcBef>
+              <a:buSzPts val="1500"/>
+              <a:buFont typeface="Arial" panose="020B0604020202020204" pitchFamily="34" charset="0"/>
+              <a:buChar char="•"/>
+            </a:pPr>
+            <a:r>
+              <a:rPr lang="en-US" sz="1700" dirty="0"/>
+              <a:t>Comment</a:t>
+            </a:r>
+          </a:p>
+          <a:p>
+            <a:pPr marL="889237" lvl="1" indent="-285750">
+              <a:lnSpc>
+                <a:spcPct val="60000"/>
+              </a:lnSpc>
+              <a:spcBef>
+                <a:spcPts val="352"/>
+              </a:spcBef>
+              <a:buSzPts val="1500"/>
+              <a:buFont typeface="Arial" panose="020B0604020202020204" pitchFamily="34" charset="0"/>
+              <a:buChar char="•"/>
+            </a:pPr>
+            <a:r>
+              <a:rPr lang="en-US" sz="1700" dirty="0"/>
+              <a:t>Image</a:t>
+            </a:r>
+          </a:p>
+        </p:txBody>
+      </p:sp>
+      <p:sp>
+        <p:nvSpPr>
+          <p:cNvPr id="10" name="CasellaDiTesto 9">
+            <a:extLst>
+              <a:ext uri="{FF2B5EF4-FFF2-40B4-BE49-F238E27FC236}">
+                <a16:creationId xmlns:a16="http://schemas.microsoft.com/office/drawing/2014/main" id="{28B7603A-8362-4896-A57D-3CB551A452EF}"/>
+              </a:ext>
+            </a:extLst>
+          </p:cNvPr>
+          <p:cNvSpPr txBox="1"/>
+          <p:nvPr/>
+        </p:nvSpPr>
+        <p:spPr>
+          <a:xfrm>
+            <a:off x="9482869" y="727416"/>
+            <a:ext cx="2124078" cy="1015663"/>
+          </a:xfrm>
+          <a:prstGeom prst="rect">
+            <a:avLst/>
+          </a:prstGeom>
+          <a:noFill/>
+        </p:spPr>
+        <p:txBody>
+          <a:bodyPr wrap="square">
+            <a:spAutoFit/>
+          </a:bodyPr>
+          <a:lstStyle/>
+          <a:p>
+            <a:r>
+              <a:rPr lang="en-US" sz="2400" dirty="0"/>
+              <a:t>Filter</a:t>
+            </a:r>
+            <a:endParaRPr lang="en-US" dirty="0"/>
+          </a:p>
+          <a:p>
+            <a:pPr marL="742950" lvl="1" indent="-285750">
+              <a:buFont typeface="Arial" panose="020B0604020202020204" pitchFamily="34" charset="0"/>
+              <a:buChar char="•"/>
+            </a:pPr>
+            <a:r>
+              <a:rPr lang="en-US" dirty="0" err="1"/>
+              <a:t>LoggedUser</a:t>
+            </a:r>
+            <a:endParaRPr lang="en-US" dirty="0"/>
+          </a:p>
+          <a:p>
+            <a:pPr marL="742950" lvl="1" indent="-285750">
+              <a:buFont typeface="Arial" panose="020B0604020202020204" pitchFamily="34" charset="0"/>
+              <a:buChar char="•"/>
+            </a:pPr>
+            <a:r>
+              <a:rPr lang="en-US" dirty="0" err="1"/>
+              <a:t>GuestCheck</a:t>
+            </a:r>
+            <a:endParaRPr lang="en-US" dirty="0"/>
+          </a:p>
+        </p:txBody>
+      </p:sp>
+      <p:sp>
+        <p:nvSpPr>
+          <p:cNvPr id="12" name="CasellaDiTesto 11">
+            <a:extLst>
+              <a:ext uri="{FF2B5EF4-FFF2-40B4-BE49-F238E27FC236}">
+                <a16:creationId xmlns:a16="http://schemas.microsoft.com/office/drawing/2014/main" id="{6A57EBFB-18A8-41A0-91BB-72CD6B51F391}"/>
+              </a:ext>
+            </a:extLst>
+          </p:cNvPr>
+          <p:cNvSpPr txBox="1"/>
+          <p:nvPr/>
+        </p:nvSpPr>
+        <p:spPr>
+          <a:xfrm>
+            <a:off x="5382825" y="3499113"/>
+            <a:ext cx="6096000" cy="2954655"/>
+          </a:xfrm>
+          <a:prstGeom prst="rect">
+            <a:avLst/>
+          </a:prstGeom>
+          <a:noFill/>
+        </p:spPr>
+        <p:txBody>
+          <a:bodyPr wrap="square">
+            <a:spAutoFit/>
+          </a:bodyPr>
+          <a:lstStyle/>
+          <a:p>
+            <a:r>
+              <a:rPr lang="en-US" sz="2400" dirty="0"/>
+              <a:t>Views (Templates) &amp; components</a:t>
+            </a:r>
+          </a:p>
+          <a:p>
+            <a:pPr marL="742950" lvl="1" indent="-285750">
+              <a:buFont typeface="Arial" panose="020B0604020202020204" pitchFamily="34" charset="0"/>
+              <a:buChar char="•"/>
+            </a:pPr>
+            <a:r>
+              <a:rPr lang="en-US" dirty="0"/>
+              <a:t>Index (all)</a:t>
+            </a:r>
+          </a:p>
+          <a:p>
+            <a:pPr marL="1200150" lvl="2" indent="-285750">
+              <a:buFont typeface="Arial" panose="020B0604020202020204" pitchFamily="34" charset="0"/>
+              <a:buChar char="•"/>
+            </a:pPr>
+            <a:r>
+              <a:rPr lang="en-US" dirty="0"/>
+              <a:t>Login form</a:t>
+            </a:r>
+          </a:p>
+          <a:p>
+            <a:pPr marL="1200150" lvl="2" indent="-285750">
+              <a:buFont typeface="Arial" panose="020B0604020202020204" pitchFamily="34" charset="0"/>
+              <a:buChar char="•"/>
+            </a:pPr>
+            <a:r>
+              <a:rPr lang="en-US" dirty="0"/>
+              <a:t>Register form</a:t>
+            </a:r>
+          </a:p>
+          <a:p>
+            <a:pPr marL="742950" lvl="1" indent="-285750">
+              <a:buFont typeface="Arial" panose="020B0604020202020204" pitchFamily="34" charset="0"/>
+              <a:buChar char="•"/>
+            </a:pPr>
+            <a:r>
+              <a:rPr lang="en-US" dirty="0" err="1"/>
+              <a:t>HomePage</a:t>
+            </a:r>
+            <a:r>
+              <a:rPr lang="en-US" dirty="0"/>
+              <a:t>  (all)</a:t>
+            </a:r>
+          </a:p>
+          <a:p>
+            <a:pPr marL="1200150" lvl="2" indent="-285750">
+              <a:buFont typeface="Arial" panose="020B0604020202020204" pitchFamily="34" charset="0"/>
+              <a:buChar char="•"/>
+            </a:pPr>
+            <a:r>
+              <a:rPr lang="en-US" dirty="0"/>
+              <a:t>Album list</a:t>
+            </a:r>
+          </a:p>
+          <a:p>
+            <a:pPr marL="1200150" lvl="2" indent="-285750">
+              <a:buFont typeface="Arial" panose="020B0604020202020204" pitchFamily="34" charset="0"/>
+              <a:buChar char="•"/>
+            </a:pPr>
+            <a:r>
+              <a:rPr lang="en-US" dirty="0"/>
+              <a:t>Image list</a:t>
+            </a:r>
+          </a:p>
+          <a:p>
+            <a:pPr marL="1200150" lvl="2" indent="-285750">
+              <a:buFont typeface="Arial" panose="020B0604020202020204" pitchFamily="34" charset="0"/>
+              <a:buChar char="•"/>
+            </a:pPr>
+            <a:r>
+              <a:rPr lang="en-US" dirty="0"/>
+              <a:t>Image Details</a:t>
+            </a:r>
+          </a:p>
+          <a:p>
+            <a:pPr marL="1200150" lvl="2" indent="-285750">
+              <a:buFont typeface="Arial" panose="020B0604020202020204" pitchFamily="34" charset="0"/>
+              <a:buChar char="•"/>
+            </a:pPr>
+            <a:r>
+              <a:rPr lang="en-US" dirty="0"/>
+              <a:t>Comment List</a:t>
+            </a:r>
+          </a:p>
+          <a:p>
+            <a:pPr marL="1200150" lvl="2" indent="-285750">
+              <a:buFont typeface="Arial" panose="020B0604020202020204" pitchFamily="34" charset="0"/>
+              <a:buChar char="•"/>
+            </a:pPr>
+            <a:r>
+              <a:rPr lang="en-US" dirty="0"/>
+              <a:t>Comment Form </a:t>
+            </a:r>
+          </a:p>
+        </p:txBody>
+      </p:sp>
+    </p:spTree>
+    <p:extLst>
+      <p:ext uri="{BB962C8B-B14F-4D97-AF65-F5344CB8AC3E}">
+        <p14:creationId xmlns:p14="http://schemas.microsoft.com/office/powerpoint/2010/main" val="160639521"/>
+      </p:ext>
+    </p:extLst>
+  </p:cSld>
+  <p:clrMapOvr>
+    <a:masterClrMapping/>
+  </p:clrMapOvr>
+</p:sld>
+</file>
+
+<file path=ppt/slides/slide2.xml><?xml version="1.0" encoding="utf-8"?>
+<p:sld xmlns:a="http://schemas.openxmlformats.org/drawingml/2006/main" xmlns:r="http://schemas.openxmlformats.org/officeDocument/2006/relationships" xmlns:p="http://schemas.openxmlformats.org/presentationml/2006/main">
+  <p:cSld>
+    <p:spTree>
+      <p:nvGrpSpPr>
+        <p:cNvPr id="1" name=""/>
+        <p:cNvGrpSpPr/>
+        <p:nvPr/>
+      </p:nvGrpSpPr>
+      <p:grpSpPr>
+        <a:xfrm>
+          <a:off x="0" y="0"/>
+          <a:ext cx="0" cy="0"/>
+          <a:chOff x="0" y="0"/>
+          <a:chExt cx="0" cy="0"/>
+        </a:xfrm>
+      </p:grpSpPr>
+      <p:sp>
+        <p:nvSpPr>
           <p:cNvPr id="4" name="Google Shape;197;p33">
             <a:extLst>
               <a:ext uri="{FF2B5EF4-FFF2-40B4-BE49-F238E27FC236}">
@@ -4723,8 +5718,8 @@
         </p:nvSpPr>
         <p:spPr>
           <a:xfrm>
-            <a:off x="7775476" y="2433516"/>
-            <a:ext cx="1681225" cy="369200"/>
+            <a:off x="7775477" y="2433516"/>
+            <a:ext cx="1025624" cy="369200"/>
           </a:xfrm>
           <a:prstGeom prst="rect">
             <a:avLst/>
@@ -5270,7 +6265,7 @@
 </p:sld>
 </file>
 
-<file path=ppt/slides/slide2.xml><?xml version="1.0" encoding="utf-8"?>
+<file path=ppt/slides/slide3.xml><?xml version="1.0" encoding="utf-8"?>
 <p:sld xmlns:a="http://schemas.openxmlformats.org/drawingml/2006/main" xmlns:r="http://schemas.openxmlformats.org/officeDocument/2006/relationships" xmlns:p="http://schemas.openxmlformats.org/presentationml/2006/main">
   <p:cSld>
     <p:spTree>
@@ -5442,7 +6437,7 @@
         <p:spPr>
           <a:xfrm>
             <a:off x="10496105" y="5125718"/>
-            <a:ext cx="1326325" cy="654400"/>
+            <a:ext cx="1505395" cy="654400"/>
           </a:xfrm>
           <a:prstGeom prst="parallelogram">
             <a:avLst>
@@ -5479,7 +6474,7 @@
                 <a:cs typeface="Calibri"/>
                 <a:sym typeface="Calibri"/>
               </a:rPr>
-              <a:t>Create mission</a:t>
+              <a:t>Create comment</a:t>
             </a:r>
             <a:endParaRPr dirty="0">
               <a:solidFill>
@@ -5504,8 +6499,8 @@
         </p:nvCxnSpPr>
         <p:spPr>
           <a:xfrm rot="5400000">
-            <a:off x="10307435" y="5332151"/>
-            <a:ext cx="403866" cy="1299800"/>
+            <a:off x="10352203" y="5287384"/>
+            <a:ext cx="403867" cy="1389334"/>
           </a:xfrm>
           <a:prstGeom prst="bentConnector2">
             <a:avLst/>
@@ -5710,192 +6705,8 @@
         </p:nvCxnSpPr>
         <p:spPr>
           <a:xfrm flipV="1">
-            <a:off x="3542207" y="2572355"/>
-            <a:ext cx="753770" cy="30114"/>
-          </a:xfrm>
-          <a:prstGeom prst="bentConnector3">
-            <a:avLst>
-              <a:gd name="adj1" fmla="val -8779"/>
-            </a:avLst>
-          </a:prstGeom>
-          <a:noFill/>
-          <a:ln w="25400" cap="flat" cmpd="sng">
-            <a:solidFill>
-              <a:schemeClr val="accent1"/>
-            </a:solidFill>
-            <a:prstDash val="solid"/>
-            <a:round/>
-            <a:headEnd type="none" w="sm" len="sm"/>
-            <a:tailEnd type="stealth" w="med" len="med"/>
-          </a:ln>
-          <a:effectLst>
-            <a:outerShdw blurRad="40000" dist="20000" dir="5400000" rotWithShape="0">
-              <a:srgbClr val="000000">
-                <a:alpha val="37650"/>
-              </a:srgbClr>
-            </a:outerShdw>
-          </a:effectLst>
-        </p:spPr>
-      </p:cxnSp>
-      <p:sp>
-        <p:nvSpPr>
-          <p:cNvPr id="29" name="Google Shape;236;p34"/>
-          <p:cNvSpPr txBox="1"/>
-          <p:nvPr/>
-        </p:nvSpPr>
-        <p:spPr>
-          <a:xfrm>
-            <a:off x="4592235" y="1484220"/>
-            <a:ext cx="1267175" cy="455600"/>
-          </a:xfrm>
-          <a:prstGeom prst="rect">
-            <a:avLst/>
-          </a:prstGeom>
-          <a:solidFill>
-            <a:schemeClr val="lt1"/>
-          </a:solidFill>
-          <a:ln w="25400" cap="flat" cmpd="sng">
-            <a:noFill/>
-            <a:prstDash val="solid"/>
-            <a:round/>
-            <a:headEnd type="none" w="sm" len="sm"/>
-            <a:tailEnd type="none" w="sm" len="sm"/>
-          </a:ln>
-        </p:spPr>
-        <p:txBody>
-          <a:bodyPr spcFirstLastPara="1" wrap="square" lIns="107269" tIns="53620" rIns="107269" bIns="53620" anchor="t" anchorCtr="0">
-            <a:noAutofit/>
-          </a:bodyPr>
-          <a:lstStyle/>
-          <a:p>
-            <a:r>
-              <a:rPr lang="es-419" dirty="0">
-                <a:solidFill>
-                  <a:schemeClr val="dk1"/>
-                </a:solidFill>
-                <a:latin typeface="Calibri"/>
-                <a:ea typeface="Calibri"/>
-                <a:cs typeface="Calibri"/>
-                <a:sym typeface="Calibri"/>
-              </a:rPr>
-              <a:t>album.id</a:t>
-            </a:r>
-            <a:endParaRPr dirty="0">
-              <a:solidFill>
-                <a:schemeClr val="dk1"/>
-              </a:solidFill>
-              <a:latin typeface="Calibri"/>
-              <a:ea typeface="Calibri"/>
-              <a:cs typeface="Calibri"/>
-              <a:sym typeface="Calibri"/>
-            </a:endParaRPr>
-          </a:p>
-        </p:txBody>
-      </p:sp>
-      <p:cxnSp>
-        <p:nvCxnSpPr>
-          <p:cNvPr id="30" name="Google Shape;237;p34"/>
-          <p:cNvCxnSpPr>
-            <a:cxnSpLocks/>
-            <a:stCxn id="29" idx="2"/>
-            <a:endCxn id="31" idx="0"/>
-          </p:cNvCxnSpPr>
-          <p:nvPr/>
-        </p:nvCxnSpPr>
-        <p:spPr>
-          <a:xfrm flipH="1">
-            <a:off x="4961053" y="1939820"/>
-            <a:ext cx="264770" cy="266052"/>
-          </a:xfrm>
-          <a:prstGeom prst="straightConnector1">
-            <a:avLst/>
-          </a:prstGeom>
-          <a:noFill/>
-          <a:ln w="9525" cap="flat" cmpd="sng">
-            <a:solidFill>
-              <a:srgbClr val="4A7DBA"/>
-            </a:solidFill>
-            <a:prstDash val="solid"/>
-            <a:round/>
-            <a:headEnd type="none" w="sm" len="sm"/>
-            <a:tailEnd type="none" w="sm" len="sm"/>
-          </a:ln>
-        </p:spPr>
-      </p:cxnSp>
-      <p:sp>
-        <p:nvSpPr>
-          <p:cNvPr id="31" name="Google Shape;234;p34"/>
-          <p:cNvSpPr/>
-          <p:nvPr/>
-        </p:nvSpPr>
-        <p:spPr>
-          <a:xfrm>
-            <a:off x="4204356" y="2205872"/>
-            <a:ext cx="1513394" cy="732965"/>
-          </a:xfrm>
-          <a:prstGeom prst="parallelogram">
-            <a:avLst>
-              <a:gd name="adj" fmla="val 25000"/>
-            </a:avLst>
-          </a:prstGeom>
-          <a:solidFill>
-            <a:schemeClr val="lt1"/>
-          </a:solidFill>
-          <a:ln w="25400" cap="flat" cmpd="sng">
-            <a:solidFill>
-              <a:schemeClr val="accent2"/>
-            </a:solidFill>
-            <a:prstDash val="solid"/>
-            <a:round/>
-            <a:headEnd type="none" w="sm" len="sm"/>
-            <a:tailEnd type="none" w="sm" len="sm"/>
-          </a:ln>
-        </p:spPr>
-        <p:txBody>
-          <a:bodyPr spcFirstLastPara="1" wrap="square" lIns="107269" tIns="53620" rIns="107269" bIns="53620" anchor="ctr" anchorCtr="0">
-            <a:noAutofit/>
-          </a:bodyPr>
-          <a:lstStyle/>
-          <a:p>
-            <a:pPr algn="ctr"/>
-            <a:r>
-              <a:rPr lang="es-419" dirty="0">
-                <a:solidFill>
-                  <a:schemeClr val="dk1"/>
-                </a:solidFill>
-                <a:latin typeface="Calibri"/>
-                <a:ea typeface="Calibri"/>
-                <a:cs typeface="Calibri"/>
-                <a:sym typeface="Calibri"/>
-              </a:rPr>
-              <a:t>Get Album Data </a:t>
-            </a:r>
-            <a:endParaRPr dirty="0">
-              <a:solidFill>
-                <a:schemeClr val="dk1"/>
-              </a:solidFill>
-              <a:latin typeface="Calibri"/>
-              <a:ea typeface="Calibri"/>
-              <a:cs typeface="Calibri"/>
-              <a:sym typeface="Calibri"/>
-            </a:endParaRPr>
-          </a:p>
-        </p:txBody>
-      </p:sp>
-      <p:cxnSp>
-        <p:nvCxnSpPr>
-          <p:cNvPr id="32" name="Google Shape;238;p34"/>
-          <p:cNvCxnSpPr>
-            <a:cxnSpLocks/>
-            <a:stCxn id="94" idx="2"/>
-            <a:endCxn id="37" idx="1"/>
-          </p:cNvCxnSpPr>
-          <p:nvPr/>
-        </p:nvCxnSpPr>
-        <p:spPr>
-          <a:xfrm flipV="1">
-            <a:off x="5456845" y="3852409"/>
-            <a:ext cx="900340" cy="1561228"/>
+            <a:off x="3542207" y="2601120"/>
+            <a:ext cx="832529" cy="1349"/>
           </a:xfrm>
           <a:prstGeom prst="bentConnector3">
             <a:avLst>
@@ -5923,6 +6734,190 @@
       </p:cxnSp>
       <p:sp>
         <p:nvSpPr>
+          <p:cNvPr id="29" name="Google Shape;236;p34"/>
+          <p:cNvSpPr txBox="1"/>
+          <p:nvPr/>
+        </p:nvSpPr>
+        <p:spPr>
+          <a:xfrm>
+            <a:off x="4592235" y="1484220"/>
+            <a:ext cx="1267175" cy="455600"/>
+          </a:xfrm>
+          <a:prstGeom prst="rect">
+            <a:avLst/>
+          </a:prstGeom>
+          <a:solidFill>
+            <a:schemeClr val="lt1"/>
+          </a:solidFill>
+          <a:ln w="25400" cap="flat" cmpd="sng">
+            <a:noFill/>
+            <a:prstDash val="solid"/>
+            <a:round/>
+            <a:headEnd type="none" w="sm" len="sm"/>
+            <a:tailEnd type="none" w="sm" len="sm"/>
+          </a:ln>
+        </p:spPr>
+        <p:txBody>
+          <a:bodyPr spcFirstLastPara="1" wrap="square" lIns="107269" tIns="53620" rIns="107269" bIns="53620" anchor="t" anchorCtr="0">
+            <a:noAutofit/>
+          </a:bodyPr>
+          <a:lstStyle/>
+          <a:p>
+            <a:r>
+              <a:rPr lang="es-419" dirty="0">
+                <a:solidFill>
+                  <a:schemeClr val="dk1"/>
+                </a:solidFill>
+                <a:latin typeface="Calibri"/>
+                <a:ea typeface="Calibri"/>
+                <a:cs typeface="Calibri"/>
+                <a:sym typeface="Calibri"/>
+              </a:rPr>
+              <a:t>album.id</a:t>
+            </a:r>
+            <a:endParaRPr dirty="0">
+              <a:solidFill>
+                <a:schemeClr val="dk1"/>
+              </a:solidFill>
+              <a:latin typeface="Calibri"/>
+              <a:ea typeface="Calibri"/>
+              <a:cs typeface="Calibri"/>
+              <a:sym typeface="Calibri"/>
+            </a:endParaRPr>
+          </a:p>
+        </p:txBody>
+      </p:sp>
+      <p:cxnSp>
+        <p:nvCxnSpPr>
+          <p:cNvPr id="30" name="Google Shape;237;p34"/>
+          <p:cNvCxnSpPr>
+            <a:cxnSpLocks/>
+            <a:stCxn id="29" idx="2"/>
+            <a:endCxn id="31" idx="0"/>
+          </p:cNvCxnSpPr>
+          <p:nvPr/>
+        </p:nvCxnSpPr>
+        <p:spPr>
+          <a:xfrm flipH="1">
+            <a:off x="5029468" y="1939820"/>
+            <a:ext cx="196355" cy="253441"/>
+          </a:xfrm>
+          <a:prstGeom prst="straightConnector1">
+            <a:avLst/>
+          </a:prstGeom>
+          <a:noFill/>
+          <a:ln w="9525" cap="flat" cmpd="sng">
+            <a:solidFill>
+              <a:srgbClr val="4A7DBA"/>
+            </a:solidFill>
+            <a:prstDash val="solid"/>
+            <a:round/>
+            <a:headEnd type="none" w="sm" len="sm"/>
+            <a:tailEnd type="none" w="sm" len="sm"/>
+          </a:ln>
+        </p:spPr>
+      </p:cxnSp>
+      <p:sp>
+        <p:nvSpPr>
+          <p:cNvPr id="31" name="Google Shape;234;p34"/>
+          <p:cNvSpPr/>
+          <p:nvPr/>
+        </p:nvSpPr>
+        <p:spPr>
+          <a:xfrm>
+            <a:off x="4272771" y="2193261"/>
+            <a:ext cx="1513394" cy="815718"/>
+          </a:xfrm>
+          <a:prstGeom prst="parallelogram">
+            <a:avLst>
+              <a:gd name="adj" fmla="val 25000"/>
+            </a:avLst>
+          </a:prstGeom>
+          <a:solidFill>
+            <a:schemeClr val="lt1"/>
+          </a:solidFill>
+          <a:ln w="25400" cap="flat" cmpd="sng">
+            <a:solidFill>
+              <a:schemeClr val="accent2"/>
+            </a:solidFill>
+            <a:prstDash val="solid"/>
+            <a:round/>
+            <a:headEnd type="none" w="sm" len="sm"/>
+            <a:tailEnd type="none" w="sm" len="sm"/>
+          </a:ln>
+        </p:spPr>
+        <p:txBody>
+          <a:bodyPr spcFirstLastPara="1" wrap="square" lIns="107269" tIns="53620" rIns="107269" bIns="53620" anchor="ctr" anchorCtr="0">
+            <a:noAutofit/>
+          </a:bodyPr>
+          <a:lstStyle/>
+          <a:p>
+            <a:pPr algn="ctr"/>
+            <a:r>
+              <a:rPr lang="es-419" dirty="0">
+                <a:solidFill>
+                  <a:schemeClr val="dk1"/>
+                </a:solidFill>
+                <a:latin typeface="Calibri"/>
+                <a:ea typeface="Calibri"/>
+                <a:cs typeface="Calibri"/>
+                <a:sym typeface="Calibri"/>
+              </a:rPr>
+              <a:t>Get Album Images </a:t>
+            </a:r>
+            <a:endParaRPr dirty="0">
+              <a:solidFill>
+                <a:schemeClr val="dk1"/>
+              </a:solidFill>
+              <a:latin typeface="Calibri"/>
+              <a:ea typeface="Calibri"/>
+              <a:cs typeface="Calibri"/>
+              <a:sym typeface="Calibri"/>
+            </a:endParaRPr>
+          </a:p>
+        </p:txBody>
+      </p:sp>
+      <p:cxnSp>
+        <p:nvCxnSpPr>
+          <p:cNvPr id="32" name="Google Shape;238;p34"/>
+          <p:cNvCxnSpPr>
+            <a:cxnSpLocks/>
+            <a:stCxn id="94" idx="2"/>
+            <a:endCxn id="37" idx="1"/>
+          </p:cNvCxnSpPr>
+          <p:nvPr/>
+        </p:nvCxnSpPr>
+        <p:spPr>
+          <a:xfrm flipV="1">
+            <a:off x="5445842" y="3852409"/>
+            <a:ext cx="911343" cy="1605241"/>
+          </a:xfrm>
+          <a:prstGeom prst="bentConnector3">
+            <a:avLst>
+              <a:gd name="adj1" fmla="val 50000"/>
+            </a:avLst>
+          </a:prstGeom>
+          <a:noFill/>
+          <a:ln w="25400" cap="flat" cmpd="sng">
+            <a:solidFill>
+              <a:schemeClr val="accent1"/>
+            </a:solidFill>
+            <a:prstDash val="solid"/>
+            <a:round/>
+            <a:headEnd type="none" w="sm" len="sm"/>
+            <a:tailEnd type="stealth" w="med" len="med"/>
+          </a:ln>
+          <a:effectLst>
+            <a:outerShdw blurRad="40000" dist="20000" dir="5400000" rotWithShape="0">
+              <a:srgbClr val="000000">
+                <a:alpha val="37650"/>
+              </a:srgbClr>
+            </a:outerShdw>
+          </a:effectLst>
+        </p:spPr>
+      </p:cxnSp>
+      <p:sp>
+        <p:nvSpPr>
           <p:cNvPr id="33" name="Google Shape;225;p34"/>
           <p:cNvSpPr txBox="1"/>
           <p:nvPr/>
@@ -5978,7 +6973,7 @@
         </p:nvSpPr>
         <p:spPr>
           <a:xfrm>
-            <a:off x="6332468" y="4427080"/>
+            <a:off x="6357185" y="4452456"/>
             <a:ext cx="1885882" cy="905256"/>
           </a:xfrm>
           <a:prstGeom prst="roundRect">
@@ -6201,8 +7196,8 @@
         </p:nvCxnSpPr>
         <p:spPr>
           <a:xfrm flipV="1">
-            <a:off x="5456845" y="4879708"/>
-            <a:ext cx="875623" cy="533929"/>
+            <a:off x="5445842" y="4905084"/>
+            <a:ext cx="911343" cy="552566"/>
           </a:xfrm>
           <a:prstGeom prst="bentConnector3">
             <a:avLst>
@@ -6240,8 +7235,8 @@
         </p:nvCxnSpPr>
         <p:spPr>
           <a:xfrm rot="16200000" flipH="1">
-            <a:off x="5448843" y="5123045"/>
-            <a:ext cx="251269" cy="1565416"/>
+            <a:off x="5492856" y="5167059"/>
+            <a:ext cx="163242" cy="1565416"/>
           </a:xfrm>
           <a:prstGeom prst="bentConnector2">
             <a:avLst/>
@@ -6503,7 +7498,7 @@
                 <a:cs typeface="Calibri"/>
                 <a:sym typeface="Calibri"/>
               </a:rPr>
-              <a:t>[databinding: image picture(src path)]</a:t>
+              <a:t>[databinding: image]</a:t>
             </a:r>
           </a:p>
         </p:txBody>
@@ -6526,8 +7521,8 @@
         </p:nvCxnSpPr>
         <p:spPr>
           <a:xfrm flipH="1">
-            <a:off x="2497458" y="3289076"/>
-            <a:ext cx="56421" cy="1480449"/>
+            <a:off x="2543914" y="3289076"/>
+            <a:ext cx="9965" cy="1480449"/>
           </a:xfrm>
           <a:prstGeom prst="straightConnector1">
             <a:avLst/>
@@ -6566,7 +7561,7 @@
         <p:spPr>
           <a:xfrm>
             <a:off x="1579454" y="4769525"/>
-            <a:ext cx="1646899" cy="756432"/>
+            <a:ext cx="1739811" cy="756432"/>
           </a:xfrm>
           <a:prstGeom prst="parallelogram">
             <a:avLst>
@@ -6603,7 +7598,7 @@
                 <a:cs typeface="Calibri"/>
                 <a:sym typeface="Calibri"/>
               </a:rPr>
-              <a:t>Save order album</a:t>
+              <a:t>Save album order</a:t>
             </a:r>
             <a:endParaRPr dirty="0">
               <a:solidFill>
@@ -6819,9 +7814,9 @@
           <p:nvPr/>
         </p:nvCxnSpPr>
         <p:spPr>
-          <a:xfrm>
-            <a:off x="4869432" y="2938837"/>
-            <a:ext cx="15073" cy="557209"/>
+          <a:xfrm flipH="1">
+            <a:off x="4884505" y="3008979"/>
+            <a:ext cx="42998" cy="487067"/>
           </a:xfrm>
           <a:prstGeom prst="straightConnector1">
             <a:avLst/>
@@ -6914,9 +7909,9 @@
           <p:nvPr/>
         </p:nvCxnSpPr>
         <p:spPr>
-          <a:xfrm flipH="1">
-            <a:off x="4883390" y="4317038"/>
-            <a:ext cx="1115" cy="730116"/>
+          <a:xfrm>
+            <a:off x="4884505" y="4317038"/>
+            <a:ext cx="9888" cy="730116"/>
           </a:xfrm>
           <a:prstGeom prst="straightConnector1">
             <a:avLst/>
@@ -6955,7 +7950,7 @@
         <p:spPr>
           <a:xfrm>
             <a:off x="4035072" y="5047154"/>
-            <a:ext cx="1513394" cy="732965"/>
+            <a:ext cx="1513394" cy="820992"/>
           </a:xfrm>
           <a:prstGeom prst="parallelogram">
             <a:avLst>
@@ -6992,7 +7987,7 @@
                 <a:cs typeface="Calibri"/>
                 <a:sym typeface="Calibri"/>
               </a:rPr>
-              <a:t>Get Album Data </a:t>
+              <a:t>Get Image Data </a:t>
             </a:r>
             <a:endParaRPr dirty="0">
               <a:solidFill>
@@ -7058,6 +8053,330 @@
           </a:p>
         </p:txBody>
       </p:sp>
+      <p:sp>
+        <p:nvSpPr>
+          <p:cNvPr id="40" name="Google Shape;225;p34">
+            <a:extLst>
+              <a:ext uri="{FF2B5EF4-FFF2-40B4-BE49-F238E27FC236}">
+                <a16:creationId xmlns:a16="http://schemas.microsoft.com/office/drawing/2014/main" id="{E9ED3C22-FDFF-4B0E-941E-D21430C78155}"/>
+              </a:ext>
+            </a:extLst>
+          </p:cNvPr>
+          <p:cNvSpPr txBox="1"/>
+          <p:nvPr/>
+        </p:nvSpPr>
+        <p:spPr>
+          <a:xfrm>
+            <a:off x="2605390" y="3180909"/>
+            <a:ext cx="901550" cy="675749"/>
+          </a:xfrm>
+          <a:prstGeom prst="rect">
+            <a:avLst/>
+          </a:prstGeom>
+          <a:noFill/>
+          <a:ln>
+            <a:noFill/>
+          </a:ln>
+        </p:spPr>
+        <p:txBody>
+          <a:bodyPr spcFirstLastPara="1" wrap="square" lIns="107269" tIns="53620" rIns="107269" bIns="53620" anchor="t" anchorCtr="0">
+            <a:noAutofit/>
+          </a:bodyPr>
+          <a:lstStyle/>
+          <a:p>
+            <a:r>
+              <a:rPr lang="es-419" dirty="0">
+                <a:solidFill>
+                  <a:schemeClr val="dk1"/>
+                </a:solidFill>
+                <a:latin typeface="Calibri"/>
+                <a:ea typeface="Calibri"/>
+                <a:cs typeface="Calibri"/>
+                <a:sym typeface="Calibri"/>
+              </a:rPr>
+              <a:t>Save order</a:t>
+            </a:r>
+            <a:endParaRPr dirty="0">
+              <a:solidFill>
+                <a:schemeClr val="dk1"/>
+              </a:solidFill>
+              <a:latin typeface="Calibri"/>
+              <a:ea typeface="Calibri"/>
+              <a:cs typeface="Calibri"/>
+              <a:sym typeface="Calibri"/>
+            </a:endParaRPr>
+          </a:p>
+        </p:txBody>
+      </p:sp>
+      <p:sp>
+        <p:nvSpPr>
+          <p:cNvPr id="42" name="Google Shape;225;p34">
+            <a:extLst>
+              <a:ext uri="{FF2B5EF4-FFF2-40B4-BE49-F238E27FC236}">
+                <a16:creationId xmlns:a16="http://schemas.microsoft.com/office/drawing/2014/main" id="{0B908C3F-C057-4F8B-B2D5-6B7C9DCDDEE2}"/>
+              </a:ext>
+            </a:extLst>
+          </p:cNvPr>
+          <p:cNvSpPr txBox="1"/>
+          <p:nvPr/>
+        </p:nvSpPr>
+        <p:spPr>
+          <a:xfrm>
+            <a:off x="4830733" y="4325738"/>
+            <a:ext cx="901550" cy="369200"/>
+          </a:xfrm>
+          <a:prstGeom prst="rect">
+            <a:avLst/>
+          </a:prstGeom>
+          <a:noFill/>
+          <a:ln>
+            <a:noFill/>
+          </a:ln>
+        </p:spPr>
+        <p:txBody>
+          <a:bodyPr spcFirstLastPara="1" wrap="square" lIns="107269" tIns="53620" rIns="107269" bIns="53620" anchor="t" anchorCtr="0">
+            <a:noAutofit/>
+          </a:bodyPr>
+          <a:lstStyle/>
+          <a:p>
+            <a:r>
+              <a:rPr lang="es-419" dirty="0">
+                <a:solidFill>
+                  <a:schemeClr val="dk1"/>
+                </a:solidFill>
+                <a:latin typeface="Calibri"/>
+                <a:ea typeface="Calibri"/>
+                <a:cs typeface="Calibri"/>
+                <a:sym typeface="Calibri"/>
+              </a:rPr>
+              <a:t>select</a:t>
+            </a:r>
+            <a:endParaRPr dirty="0">
+              <a:solidFill>
+                <a:schemeClr val="dk1"/>
+              </a:solidFill>
+              <a:latin typeface="Calibri"/>
+              <a:ea typeface="Calibri"/>
+              <a:cs typeface="Calibri"/>
+              <a:sym typeface="Calibri"/>
+            </a:endParaRPr>
+          </a:p>
+        </p:txBody>
+      </p:sp>
+      <p:sp>
+        <p:nvSpPr>
+          <p:cNvPr id="2" name="Google Shape;232;p34">
+            <a:extLst>
+              <a:ext uri="{FF2B5EF4-FFF2-40B4-BE49-F238E27FC236}">
+                <a16:creationId xmlns:a16="http://schemas.microsoft.com/office/drawing/2014/main" id="{C6A33A15-F65B-44E3-ABC9-977C4E8AD55D}"/>
+              </a:ext>
+            </a:extLst>
+          </p:cNvPr>
+          <p:cNvSpPr/>
+          <p:nvPr/>
+        </p:nvSpPr>
+        <p:spPr>
+          <a:xfrm>
+            <a:off x="5056610" y="3361195"/>
+            <a:ext cx="312000" cy="288000"/>
+          </a:xfrm>
+          <a:prstGeom prst="ellipse">
+            <a:avLst/>
+          </a:prstGeom>
+          <a:solidFill>
+            <a:schemeClr val="accent1"/>
+          </a:solidFill>
+          <a:ln w="25400" cap="flat" cmpd="sng">
+            <a:solidFill>
+              <a:srgbClr val="395E89"/>
+            </a:solidFill>
+            <a:prstDash val="solid"/>
+            <a:round/>
+            <a:headEnd type="none" w="sm" len="sm"/>
+            <a:tailEnd type="none" w="sm" len="sm"/>
+          </a:ln>
+        </p:spPr>
+        <p:txBody>
+          <a:bodyPr spcFirstLastPara="1" wrap="square" lIns="107269" tIns="53620" rIns="107269" bIns="53620" anchor="ctr" anchorCtr="0">
+            <a:noAutofit/>
+          </a:bodyPr>
+          <a:lstStyle/>
+          <a:p>
+            <a:pPr algn="ctr"/>
+            <a:endParaRPr sz="2100" dirty="0">
+              <a:solidFill>
+                <a:schemeClr val="lt1"/>
+              </a:solidFill>
+              <a:latin typeface="Calibri"/>
+              <a:ea typeface="Calibri"/>
+              <a:cs typeface="Calibri"/>
+              <a:sym typeface="Calibri"/>
+            </a:endParaRPr>
+          </a:p>
+        </p:txBody>
+      </p:sp>
+      <p:sp>
+        <p:nvSpPr>
+          <p:cNvPr id="3" name="Google Shape;232;p34">
+            <a:extLst>
+              <a:ext uri="{FF2B5EF4-FFF2-40B4-BE49-F238E27FC236}">
+                <a16:creationId xmlns:a16="http://schemas.microsoft.com/office/drawing/2014/main" id="{5F5BFA89-2C07-433F-B0D5-4B0577D15A62}"/>
+              </a:ext>
+            </a:extLst>
+          </p:cNvPr>
+          <p:cNvSpPr/>
+          <p:nvPr/>
+        </p:nvSpPr>
+        <p:spPr>
+          <a:xfrm>
+            <a:off x="5529613" y="3383700"/>
+            <a:ext cx="312000" cy="288000"/>
+          </a:xfrm>
+          <a:prstGeom prst="ellipse">
+            <a:avLst/>
+          </a:prstGeom>
+          <a:solidFill>
+            <a:schemeClr val="accent1"/>
+          </a:solidFill>
+          <a:ln w="25400" cap="flat" cmpd="sng">
+            <a:solidFill>
+              <a:srgbClr val="395E89"/>
+            </a:solidFill>
+            <a:prstDash val="solid"/>
+            <a:round/>
+            <a:headEnd type="none" w="sm" len="sm"/>
+            <a:tailEnd type="none" w="sm" len="sm"/>
+          </a:ln>
+        </p:spPr>
+        <p:txBody>
+          <a:bodyPr spcFirstLastPara="1" wrap="square" lIns="107269" tIns="53620" rIns="107269" bIns="53620" anchor="ctr" anchorCtr="0">
+            <a:noAutofit/>
+          </a:bodyPr>
+          <a:lstStyle/>
+          <a:p>
+            <a:pPr algn="ctr"/>
+            <a:endParaRPr sz="2100" dirty="0">
+              <a:solidFill>
+                <a:schemeClr val="lt1"/>
+              </a:solidFill>
+              <a:latin typeface="Calibri"/>
+              <a:ea typeface="Calibri"/>
+              <a:cs typeface="Calibri"/>
+              <a:sym typeface="Calibri"/>
+            </a:endParaRPr>
+          </a:p>
+        </p:txBody>
+      </p:sp>
+      <p:sp>
+        <p:nvSpPr>
+          <p:cNvPr id="4" name="Google Shape;225;p34">
+            <a:extLst>
+              <a:ext uri="{FF2B5EF4-FFF2-40B4-BE49-F238E27FC236}">
+                <a16:creationId xmlns:a16="http://schemas.microsoft.com/office/drawing/2014/main" id="{66B2BF12-F686-4430-B869-8394A84F3327}"/>
+              </a:ext>
+            </a:extLst>
+          </p:cNvPr>
+          <p:cNvSpPr txBox="1"/>
+          <p:nvPr/>
+        </p:nvSpPr>
+        <p:spPr>
+          <a:xfrm>
+            <a:off x="4830733" y="3013719"/>
+            <a:ext cx="901550" cy="369200"/>
+          </a:xfrm>
+          <a:prstGeom prst="rect">
+            <a:avLst/>
+          </a:prstGeom>
+          <a:noFill/>
+          <a:ln>
+            <a:noFill/>
+          </a:ln>
+        </p:spPr>
+        <p:txBody>
+          <a:bodyPr spcFirstLastPara="1" wrap="square" lIns="107269" tIns="53620" rIns="107269" bIns="53620" anchor="t" anchorCtr="0">
+            <a:noAutofit/>
+          </a:bodyPr>
+          <a:lstStyle/>
+          <a:p>
+            <a:r>
+              <a:rPr lang="it-IT" dirty="0">
+                <a:solidFill>
+                  <a:schemeClr val="dk1"/>
+                </a:solidFill>
+                <a:latin typeface="Calibri"/>
+                <a:ea typeface="Calibri"/>
+                <a:cs typeface="Calibri"/>
+                <a:sym typeface="Calibri"/>
+              </a:rPr>
+              <a:t>next</a:t>
+            </a:r>
+            <a:endParaRPr dirty="0">
+              <a:solidFill>
+                <a:schemeClr val="dk1"/>
+              </a:solidFill>
+              <a:latin typeface="Calibri"/>
+              <a:ea typeface="Calibri"/>
+              <a:cs typeface="Calibri"/>
+              <a:sym typeface="Calibri"/>
+            </a:endParaRPr>
+          </a:p>
+        </p:txBody>
+      </p:sp>
+      <p:sp>
+        <p:nvSpPr>
+          <p:cNvPr id="5" name="Google Shape;225;p34">
+            <a:extLst>
+              <a:ext uri="{FF2B5EF4-FFF2-40B4-BE49-F238E27FC236}">
+                <a16:creationId xmlns:a16="http://schemas.microsoft.com/office/drawing/2014/main" id="{6242DB1D-8067-4B30-9382-C6F17DEDD936}"/>
+              </a:ext>
+            </a:extLst>
+          </p:cNvPr>
+          <p:cNvSpPr txBox="1"/>
+          <p:nvPr/>
+        </p:nvSpPr>
+        <p:spPr>
+          <a:xfrm>
+            <a:off x="5466614" y="3057931"/>
+            <a:ext cx="1143521" cy="369200"/>
+          </a:xfrm>
+          <a:prstGeom prst="rect">
+            <a:avLst/>
+          </a:prstGeom>
+          <a:noFill/>
+          <a:ln>
+            <a:noFill/>
+          </a:ln>
+        </p:spPr>
+        <p:txBody>
+          <a:bodyPr spcFirstLastPara="1" wrap="square" lIns="107269" tIns="53620" rIns="107269" bIns="53620" anchor="t" anchorCtr="0">
+            <a:noAutofit/>
+          </a:bodyPr>
+          <a:lstStyle/>
+          <a:p>
+            <a:r>
+              <a:rPr lang="es-419" dirty="0">
+                <a:solidFill>
+                  <a:schemeClr val="dk1"/>
+                </a:solidFill>
+                <a:latin typeface="Calibri"/>
+                <a:ea typeface="Calibri"/>
+                <a:cs typeface="Calibri"/>
+                <a:sym typeface="Calibri"/>
+              </a:rPr>
+              <a:t>previous</a:t>
+            </a:r>
+            <a:endParaRPr dirty="0">
+              <a:solidFill>
+                <a:schemeClr val="dk1"/>
+              </a:solidFill>
+              <a:latin typeface="Calibri"/>
+              <a:ea typeface="Calibri"/>
+              <a:cs typeface="Calibri"/>
+              <a:sym typeface="Calibri"/>
+            </a:endParaRPr>
+          </a:p>
+        </p:txBody>
+      </p:sp>
     </p:spTree>
   </p:cSld>
   <p:clrMapOvr>
@@ -7066,7 +8385,394 @@
 </p:sld>
 </file>
 
-<file path=ppt/slides/slide3.xml><?xml version="1.0" encoding="utf-8"?>
+<file path=ppt/slides/slide4.xml><?xml version="1.0" encoding="utf-8"?>
+<p:sld xmlns:a="http://schemas.openxmlformats.org/drawingml/2006/main" xmlns:r="http://schemas.openxmlformats.org/officeDocument/2006/relationships" xmlns:p="http://schemas.openxmlformats.org/presentationml/2006/main">
+  <p:cSld>
+    <p:spTree>
+      <p:nvGrpSpPr>
+        <p:cNvPr id="1" name=""/>
+        <p:cNvGrpSpPr/>
+        <p:nvPr/>
+      </p:nvGrpSpPr>
+      <p:grpSpPr>
+        <a:xfrm>
+          <a:off x="0" y="0"/>
+          <a:ext cx="0" cy="0"/>
+          <a:chOff x="0" y="0"/>
+          <a:chExt cx="0" cy="0"/>
+        </a:xfrm>
+      </p:grpSpPr>
+      <p:sp>
+        <p:nvSpPr>
+          <p:cNvPr id="2" name="Title 1"/>
+          <p:cNvSpPr>
+            <a:spLocks noGrp="1"/>
+          </p:cNvSpPr>
+          <p:nvPr>
+            <p:ph type="title"/>
+          </p:nvPr>
+        </p:nvSpPr>
+        <p:spPr>
+          <a:xfrm>
+            <a:off x="0" y="0"/>
+            <a:ext cx="12192000" cy="695325"/>
+          </a:xfrm>
+        </p:spPr>
+        <p:txBody>
+          <a:bodyPr/>
+          <a:lstStyle/>
+          <a:p>
+            <a:pPr algn="ctr"/>
+            <a:r>
+              <a:rPr lang="en-US" dirty="0"/>
+              <a:t>Client side: view &amp; view component</a:t>
+            </a:r>
+          </a:p>
+        </p:txBody>
+      </p:sp>
+      <p:sp>
+        <p:nvSpPr>
+          <p:cNvPr id="4" name="Text Placeholder 3"/>
+          <p:cNvSpPr>
+            <a:spLocks noGrp="1"/>
+          </p:cNvSpPr>
+          <p:nvPr>
+            <p:ph type="body" idx="2"/>
+          </p:nvPr>
+        </p:nvSpPr>
+        <p:spPr>
+          <a:xfrm>
+            <a:off x="492452" y="2264985"/>
+            <a:ext cx="6439293" cy="4341044"/>
+          </a:xfrm>
+        </p:spPr>
+        <p:txBody>
+          <a:bodyPr>
+            <a:noAutofit/>
+          </a:bodyPr>
+          <a:lstStyle/>
+          <a:p>
+            <a:r>
+              <a:rPr lang="it-IT" sz="1800" dirty="0"/>
+              <a:t>Home</a:t>
+            </a:r>
+          </a:p>
+          <a:p>
+            <a:pPr lvl="1"/>
+            <a:r>
+              <a:rPr lang="it-IT" sz="1400" dirty="0" err="1"/>
+              <a:t>AlbumsList</a:t>
+            </a:r>
+            <a:endParaRPr lang="it-IT" sz="1400" dirty="0"/>
+          </a:p>
+          <a:p>
+            <a:pPr lvl="2"/>
+            <a:r>
+              <a:rPr lang="it-IT" sz="1200" dirty="0"/>
+              <a:t>show(): richiede al server i dati dell'elenco </a:t>
+            </a:r>
+            <a:r>
+              <a:rPr lang="it-IT" sz="1200" dirty="0" err="1"/>
+              <a:t>albums</a:t>
+            </a:r>
+            <a:endParaRPr lang="it-IT" sz="1200" dirty="0"/>
+          </a:p>
+          <a:p>
+            <a:pPr lvl="2"/>
+            <a:r>
+              <a:rPr lang="it-IT" sz="1200" dirty="0"/>
+              <a:t>update(): riceve dati server e aggiorna la lista</a:t>
+            </a:r>
+          </a:p>
+          <a:p>
+            <a:pPr lvl="2"/>
+            <a:r>
+              <a:rPr lang="it-IT" sz="1200" dirty="0" err="1"/>
+              <a:t>autoclick</a:t>
+            </a:r>
+            <a:r>
+              <a:rPr lang="it-IT" sz="1200" dirty="0"/>
+              <a:t>(): seleziona un elemento della lista per mostrare in automatico i dettagli</a:t>
+            </a:r>
+          </a:p>
+          <a:p>
+            <a:pPr lvl="1"/>
+            <a:r>
+              <a:rPr lang="it-IT" sz="1400" dirty="0" err="1"/>
+              <a:t>AlbumDetail</a:t>
+            </a:r>
+            <a:r>
+              <a:rPr lang="it-IT" sz="1400" dirty="0"/>
+              <a:t>(gestisce la lista delle immagini di un album)</a:t>
+            </a:r>
+          </a:p>
+          <a:p>
+            <a:pPr lvl="2"/>
+            <a:r>
+              <a:rPr lang="it-IT" sz="1200" dirty="0" err="1"/>
+              <a:t>registerEvents</a:t>
+            </a:r>
+            <a:r>
+              <a:rPr lang="it-IT" sz="1200" dirty="0"/>
+              <a:t>(): associa al componente le funzioni per gestirne gli eventi</a:t>
+            </a:r>
+          </a:p>
+          <a:p>
+            <a:pPr lvl="2"/>
+            <a:r>
+              <a:rPr lang="it-IT" sz="1200" dirty="0"/>
+              <a:t>show(): richiede al server i  dettagli dell’album(immagini presenti nell’album)</a:t>
+            </a:r>
+          </a:p>
+          <a:p>
+            <a:pPr lvl="2"/>
+            <a:r>
+              <a:rPr lang="it-IT" sz="1200" dirty="0"/>
+              <a:t>update(): riceve dati server e aggiorna  dettagli</a:t>
+            </a:r>
+          </a:p>
+          <a:p>
+            <a:pPr lvl="2"/>
+            <a:r>
+              <a:rPr lang="it-IT" sz="1200" dirty="0"/>
+              <a:t>reset(): imposta le condizioni di iniziali visibilità dei vari sotto-componenti </a:t>
+            </a:r>
+          </a:p>
+          <a:p>
+            <a:pPr lvl="2"/>
+            <a:r>
+              <a:rPr lang="it-IT" sz="1200" dirty="0" err="1"/>
+              <a:t>changeStep</a:t>
+            </a:r>
+            <a:r>
+              <a:rPr lang="it-IT" sz="1200" dirty="0"/>
+              <a:t>(): cambia il blocco di cinque immagini visualizzato</a:t>
+            </a:r>
+          </a:p>
+          <a:p>
+            <a:pPr marL="742950" lvl="1" indent="-285750">
+              <a:buFont typeface="Arial" panose="020B0604020202020204" pitchFamily="34" charset="0"/>
+              <a:buChar char="•"/>
+            </a:pPr>
+            <a:r>
+              <a:rPr lang="it-IT" sz="1400" dirty="0" err="1"/>
+              <a:t>ImageDetail</a:t>
+            </a:r>
+            <a:endParaRPr lang="it-IT" sz="1400" dirty="0"/>
+          </a:p>
+          <a:p>
+            <a:pPr marL="1085850" lvl="2" indent="-171450">
+              <a:buFont typeface="Arial" panose="020B0604020202020204" pitchFamily="34" charset="0"/>
+              <a:buChar char="•"/>
+            </a:pPr>
+            <a:r>
+              <a:rPr lang="it-IT" sz="1200" dirty="0" err="1"/>
+              <a:t>registerEvents</a:t>
+            </a:r>
+            <a:r>
+              <a:rPr lang="it-IT" sz="1200" dirty="0"/>
+              <a:t>(): associa al componente le funzioni per gestirne gli eventi</a:t>
+            </a:r>
+          </a:p>
+          <a:p>
+            <a:pPr marL="1085850" lvl="2" indent="-171450">
+              <a:buFont typeface="Arial" panose="020B0604020202020204" pitchFamily="34" charset="0"/>
+              <a:buChar char="•"/>
+            </a:pPr>
+            <a:r>
+              <a:rPr lang="it-IT" sz="1200" dirty="0"/>
+              <a:t>show(): richiede al server i  dettagli dell’immagine (picture e commenti)</a:t>
+            </a:r>
+          </a:p>
+          <a:p>
+            <a:pPr marL="1085850" lvl="2" indent="-171450">
+              <a:buFont typeface="Arial" panose="020B0604020202020204" pitchFamily="34" charset="0"/>
+              <a:buChar char="•"/>
+            </a:pPr>
+            <a:r>
+              <a:rPr lang="it-IT" sz="1200" dirty="0"/>
+              <a:t>update(): riceve dati server e aggiorna  dettagli</a:t>
+            </a:r>
+          </a:p>
+          <a:p>
+            <a:pPr marL="1085850" lvl="2" indent="-171450">
+              <a:buFont typeface="Arial" panose="020B0604020202020204" pitchFamily="34" charset="0"/>
+              <a:buChar char="•"/>
+            </a:pPr>
+            <a:r>
+              <a:rPr lang="it-IT" sz="1200" dirty="0"/>
+              <a:t>reset(): imposta le condizioni di iniziali visibilità dei vari sotto-componenti </a:t>
+            </a:r>
+          </a:p>
+          <a:p>
+            <a:pPr marL="914400" lvl="2" indent="0">
+              <a:buNone/>
+            </a:pPr>
+            <a:endParaRPr lang="it-IT" sz="1200" dirty="0"/>
+          </a:p>
+        </p:txBody>
+      </p:sp>
+      <p:sp>
+        <p:nvSpPr>
+          <p:cNvPr id="5" name="CasellaDiTesto 4">
+            <a:extLst>
+              <a:ext uri="{FF2B5EF4-FFF2-40B4-BE49-F238E27FC236}">
+                <a16:creationId xmlns:a16="http://schemas.microsoft.com/office/drawing/2014/main" id="{A2D38ACF-5C1F-4E09-9506-269FD5246F4D}"/>
+              </a:ext>
+            </a:extLst>
+          </p:cNvPr>
+          <p:cNvSpPr txBox="1"/>
+          <p:nvPr/>
+        </p:nvSpPr>
+        <p:spPr>
+          <a:xfrm>
+            <a:off x="492452" y="695325"/>
+            <a:ext cx="6439293" cy="1569660"/>
+          </a:xfrm>
+          <a:prstGeom prst="rect">
+            <a:avLst/>
+          </a:prstGeom>
+          <a:noFill/>
+        </p:spPr>
+        <p:txBody>
+          <a:bodyPr wrap="square" rtlCol="0">
+            <a:spAutoFit/>
+          </a:bodyPr>
+          <a:lstStyle/>
+          <a:p>
+            <a:r>
+              <a:rPr lang="it-IT" sz="1800" dirty="0"/>
+              <a:t>Index</a:t>
+            </a:r>
+          </a:p>
+          <a:p>
+            <a:pPr marL="742950" lvl="1" indent="-285750">
+              <a:buFont typeface="Arial" panose="020B0604020202020204" pitchFamily="34" charset="0"/>
+              <a:buChar char="•"/>
+            </a:pPr>
+            <a:r>
+              <a:rPr lang="it-IT" sz="1400" dirty="0"/>
+              <a:t>Login </a:t>
+            </a:r>
+            <a:r>
+              <a:rPr lang="it-IT" sz="1400" dirty="0" err="1"/>
+              <a:t>form</a:t>
+            </a:r>
+            <a:endParaRPr lang="it-IT" sz="1400" dirty="0"/>
+          </a:p>
+          <a:p>
+            <a:pPr marL="1085850" lvl="2" indent="-171450">
+              <a:buFont typeface="Arial" panose="020B0604020202020204" pitchFamily="34" charset="0"/>
+              <a:buChar char="•"/>
+            </a:pPr>
+            <a:r>
+              <a:rPr lang="it-IT" sz="1200" dirty="0"/>
+              <a:t>Gestione del submit ed errori</a:t>
+            </a:r>
+          </a:p>
+          <a:p>
+            <a:pPr marL="742950" lvl="1" indent="-285750">
+              <a:buFont typeface="Arial" panose="020B0604020202020204" pitchFamily="34" charset="0"/>
+              <a:buChar char="•"/>
+            </a:pPr>
+            <a:r>
+              <a:rPr lang="it-IT" sz="1400" dirty="0" err="1"/>
+              <a:t>Registration</a:t>
+            </a:r>
+            <a:r>
+              <a:rPr lang="it-IT" sz="1400" dirty="0"/>
+              <a:t> </a:t>
+            </a:r>
+            <a:r>
+              <a:rPr lang="it-IT" sz="1400" dirty="0" err="1"/>
+              <a:t>form</a:t>
+            </a:r>
+            <a:endParaRPr lang="it-IT" sz="1400" dirty="0"/>
+          </a:p>
+          <a:p>
+            <a:pPr marL="1085850" lvl="2" indent="-171450">
+              <a:buFont typeface="Arial" panose="020B0604020202020204" pitchFamily="34" charset="0"/>
+              <a:buChar char="•"/>
+            </a:pPr>
+            <a:r>
+              <a:rPr lang="it-IT" sz="1200" dirty="0"/>
+              <a:t>Gestione del submit ed errori</a:t>
+            </a:r>
+          </a:p>
+          <a:p>
+            <a:pPr marL="742950" lvl="1" indent="-285750">
+              <a:buFont typeface="Arial" panose="020B0604020202020204" pitchFamily="34" charset="0"/>
+              <a:buChar char="•"/>
+            </a:pPr>
+            <a:r>
+              <a:rPr lang="it-IT" sz="1400" dirty="0"/>
+              <a:t>Guest access</a:t>
+            </a:r>
+          </a:p>
+          <a:p>
+            <a:pPr marL="1085850" lvl="2" indent="-171450">
+              <a:buFont typeface="Arial" panose="020B0604020202020204" pitchFamily="34" charset="0"/>
+              <a:buChar char="•"/>
+            </a:pPr>
+            <a:r>
+              <a:rPr lang="it-IT" sz="1200" dirty="0"/>
+              <a:t>Accesso alla homepage</a:t>
+            </a:r>
+          </a:p>
+        </p:txBody>
+      </p:sp>
+      <p:sp>
+        <p:nvSpPr>
+          <p:cNvPr id="6" name="CasellaDiTesto 5">
+            <a:extLst>
+              <a:ext uri="{FF2B5EF4-FFF2-40B4-BE49-F238E27FC236}">
+                <a16:creationId xmlns:a16="http://schemas.microsoft.com/office/drawing/2014/main" id="{233FFC1C-D50F-4F3A-B9CE-27C582A9FBEA}"/>
+              </a:ext>
+            </a:extLst>
+          </p:cNvPr>
+          <p:cNvSpPr txBox="1"/>
+          <p:nvPr/>
+        </p:nvSpPr>
+        <p:spPr>
+          <a:xfrm>
+            <a:off x="6762947" y="3091992"/>
+            <a:ext cx="5231876" cy="553998"/>
+          </a:xfrm>
+          <a:prstGeom prst="rect">
+            <a:avLst/>
+          </a:prstGeom>
+          <a:noFill/>
+        </p:spPr>
+        <p:txBody>
+          <a:bodyPr wrap="square" rtlCol="0">
+            <a:spAutoFit/>
+          </a:bodyPr>
+          <a:lstStyle/>
+          <a:p>
+            <a:pPr marL="914400" lvl="2" indent="0">
+              <a:buNone/>
+            </a:pPr>
+            <a:endParaRPr lang="it-IT" sz="1200" dirty="0"/>
+          </a:p>
+          <a:p>
+            <a:endParaRPr lang="it-IT" dirty="0"/>
+          </a:p>
+        </p:txBody>
+      </p:sp>
+    </p:spTree>
+    <p:extLst>
+      <p:ext uri="{BB962C8B-B14F-4D97-AF65-F5344CB8AC3E}">
+        <p14:creationId xmlns:p14="http://schemas.microsoft.com/office/powerpoint/2010/main" val="471237171"/>
+      </p:ext>
+    </p:extLst>
+  </p:cSld>
+  <p:clrMapOvr>
+    <a:masterClrMapping/>
+  </p:clrMapOvr>
+</p:sld>
+</file>
+
+<file path=ppt/slides/slide5.xml><?xml version="1.0" encoding="utf-8"?>
 <p:sld xmlns:a="http://schemas.openxmlformats.org/drawingml/2006/main" xmlns:r="http://schemas.openxmlformats.org/officeDocument/2006/relationships" xmlns:p="http://schemas.openxmlformats.org/presentationml/2006/main">
   <p:cSld>
     <p:spTree>
@@ -7098,14 +8804,14 @@
           <p:nvPr>
             <p:extLst>
               <p:ext uri="{D42A27DB-BD31-4B8C-83A1-F6EECF244321}">
-                <p14:modId xmlns:p14="http://schemas.microsoft.com/office/powerpoint/2010/main" val="1305555426"/>
+                <p14:modId xmlns:p14="http://schemas.microsoft.com/office/powerpoint/2010/main" val="4175201611"/>
               </p:ext>
             </p:extLst>
           </p:nvPr>
         </p:nvGraphicFramePr>
         <p:xfrm>
           <a:off x="0" y="-31330"/>
-          <a:ext cx="12094590" cy="6920660"/>
+          <a:ext cx="12192000" cy="6920660"/>
         </p:xfrm>
         <a:graphic>
           <a:graphicData uri="http://schemas.openxmlformats.org/drawingml/2006/table">
@@ -7114,28 +8820,28 @@
                 <a:tableStyleId>{5C22544A-7EE6-4342-B048-85BDC9FD1C3A}</a:tableStyleId>
               </a:tblPr>
               <a:tblGrid>
-                <a:gridCol w="2987331">
+                <a:gridCol w="3011391">
                   <a:extLst>
                     <a:ext uri="{9D8B030D-6E8A-4147-A177-3AD203B41FA5}">
                       <a16:colId xmlns:a16="http://schemas.microsoft.com/office/drawing/2014/main" val="20000"/>
                     </a:ext>
                   </a:extLst>
                 </a:gridCol>
-                <a:gridCol w="3760841">
+                <a:gridCol w="3791131">
                   <a:extLst>
                     <a:ext uri="{9D8B030D-6E8A-4147-A177-3AD203B41FA5}">
                       <a16:colId xmlns:a16="http://schemas.microsoft.com/office/drawing/2014/main" val="20001"/>
                     </a:ext>
                   </a:extLst>
                 </a:gridCol>
-                <a:gridCol w="2365377">
+                <a:gridCol w="2384428">
                   <a:extLst>
                     <a:ext uri="{9D8B030D-6E8A-4147-A177-3AD203B41FA5}">
                       <a16:colId xmlns:a16="http://schemas.microsoft.com/office/drawing/2014/main" val="20002"/>
                     </a:ext>
                   </a:extLst>
                 </a:gridCol>
-                <a:gridCol w="2981041">
+                <a:gridCol w="3005050">
                   <a:extLst>
                     <a:ext uri="{9D8B030D-6E8A-4147-A177-3AD203B41FA5}">
                       <a16:colId xmlns:a16="http://schemas.microsoft.com/office/drawing/2014/main" val="20003"/>
@@ -8550,7 +10256,7 @@
 </p:sld>
 </file>
 
-<file path=ppt/slides/slide4.xml><?xml version="1.0" encoding="utf-8"?>
+<file path=ppt/slides/slide6.xml><?xml version="1.0" encoding="utf-8"?>
 <p:sld xmlns:a="http://schemas.openxmlformats.org/drawingml/2006/main" xmlns:r="http://schemas.openxmlformats.org/officeDocument/2006/relationships" xmlns:p="http://schemas.openxmlformats.org/presentationml/2006/main">
   <p:cSld>
     <p:spTree>
@@ -8582,14 +10288,14 @@
           <p:nvPr>
             <p:extLst>
               <p:ext uri="{D42A27DB-BD31-4B8C-83A1-F6EECF244321}">
-                <p14:modId xmlns:p14="http://schemas.microsoft.com/office/powerpoint/2010/main" val="3971265616"/>
+                <p14:modId xmlns:p14="http://schemas.microsoft.com/office/powerpoint/2010/main" val="2217533753"/>
               </p:ext>
             </p:extLst>
           </p:nvPr>
         </p:nvGraphicFramePr>
         <p:xfrm>
-          <a:off x="293802" y="101563"/>
-          <a:ext cx="11604395" cy="6654874"/>
+          <a:off x="0" y="-2"/>
+          <a:ext cx="12192000" cy="6857999"/>
         </p:xfrm>
         <a:graphic>
           <a:graphicData uri="http://schemas.openxmlformats.org/drawingml/2006/table">
@@ -8598,28 +10304,28 @@
                 <a:tableStyleId>{5C22544A-7EE6-4342-B048-85BDC9FD1C3A}</a:tableStyleId>
               </a:tblPr>
               <a:tblGrid>
-                <a:gridCol w="2866255">
+                <a:gridCol w="3011392">
                   <a:extLst>
                     <a:ext uri="{9D8B030D-6E8A-4147-A177-3AD203B41FA5}">
                       <a16:colId xmlns:a16="http://schemas.microsoft.com/office/drawing/2014/main" val="20000"/>
                     </a:ext>
                   </a:extLst>
                 </a:gridCol>
-                <a:gridCol w="3608413">
+                <a:gridCol w="3791130">
                   <a:extLst>
                     <a:ext uri="{9D8B030D-6E8A-4147-A177-3AD203B41FA5}">
                       <a16:colId xmlns:a16="http://schemas.microsoft.com/office/drawing/2014/main" val="20001"/>
                     </a:ext>
                   </a:extLst>
                 </a:gridCol>
-                <a:gridCol w="2269508">
+                <a:gridCol w="2384428">
                   <a:extLst>
                     <a:ext uri="{9D8B030D-6E8A-4147-A177-3AD203B41FA5}">
                       <a16:colId xmlns:a16="http://schemas.microsoft.com/office/drawing/2014/main" val="20002"/>
                     </a:ext>
                   </a:extLst>
                 </a:gridCol>
-                <a:gridCol w="2860219">
+                <a:gridCol w="3005050">
                   <a:extLst>
                     <a:ext uri="{9D8B030D-6E8A-4147-A177-3AD203B41FA5}">
                       <a16:colId xmlns:a16="http://schemas.microsoft.com/office/drawing/2014/main" val="20003"/>
@@ -8627,7 +10333,7 @@
                   </a:extLst>
                 </a:gridCol>
               </a:tblGrid>
-              <a:tr h="406141">
+              <a:tr h="530216">
                 <a:tc gridSpan="2">
                   <a:txBody>
                     <a:bodyPr/>
@@ -8686,7 +10392,7 @@
                   </a:ext>
                 </a:extLst>
               </a:tr>
-              <a:tr h="327547">
+              <a:tr h="359834">
                 <a:tc>
                   <a:txBody>
                     <a:bodyPr/>
@@ -8749,7 +10455,7 @@
                   </a:ext>
                 </a:extLst>
               </a:tr>
-              <a:tr h="419042">
+              <a:tr h="429564">
                 <a:tc>
                   <a:txBody>
                     <a:bodyPr/>
@@ -8897,7 +10603,7 @@
                   </a:ext>
                 </a:extLst>
               </a:tr>
-              <a:tr h="591762">
+              <a:tr h="606621">
                 <a:tc>
                   <a:txBody>
                     <a:bodyPr/>
@@ -9116,7 +10822,7 @@
                   </a:ext>
                 </a:extLst>
               </a:tr>
-              <a:tr h="310938">
+              <a:tr h="500639">
                 <a:tc>
                   <a:txBody>
                     <a:bodyPr/>
@@ -9326,7 +11032,7 @@
                   </a:ext>
                 </a:extLst>
               </a:tr>
-              <a:tr h="455660">
+              <a:tr h="500639">
                 <a:tc>
                   <a:txBody>
                     <a:bodyPr/>
@@ -9485,7 +11191,7 @@
                   </a:ext>
                 </a:extLst>
               </a:tr>
-              <a:tr h="568960">
+              <a:tr h="688378">
                 <a:tc>
                   <a:txBody>
                     <a:bodyPr/>
@@ -9609,7 +11315,7 @@
                   </a:ext>
                 </a:extLst>
               </a:tr>
-              <a:tr h="568960">
+              <a:tr h="583247">
                 <a:tc>
                   <a:txBody>
                     <a:bodyPr/>
@@ -9696,7 +11402,7 @@
                   </a:ext>
                 </a:extLst>
               </a:tr>
-              <a:tr h="568960">
+              <a:tr h="583247">
                 <a:tc>
                   <a:txBody>
                     <a:bodyPr/>
@@ -9785,7 +11491,7 @@
                   </a:ext>
                 </a:extLst>
               </a:tr>
-              <a:tr h="494453">
+              <a:tr h="506869">
                 <a:tc>
                   <a:txBody>
                     <a:bodyPr/>
@@ -9883,7 +11589,7 @@
                   </a:ext>
                 </a:extLst>
               </a:tr>
-              <a:tr h="541412">
+              <a:tr h="555007">
                 <a:tc>
                   <a:txBody>
                     <a:bodyPr/>
@@ -9978,7 +11684,7 @@
                   </a:ext>
                 </a:extLst>
               </a:tr>
-              <a:tr h="494453">
+              <a:tr h="506869">
                 <a:tc>
                   <a:txBody>
                     <a:bodyPr/>
@@ -10073,7 +11779,7 @@
                   </a:ext>
                 </a:extLst>
               </a:tr>
-              <a:tr h="494453">
+              <a:tr h="506869">
                 <a:tc>
                   <a:txBody>
                     <a:bodyPr/>
@@ -10156,1077 +11862,6 @@
     <p:extLst>
       <p:ext uri="{BB962C8B-B14F-4D97-AF65-F5344CB8AC3E}">
         <p14:creationId xmlns:p14="http://schemas.microsoft.com/office/powerpoint/2010/main" val="577903789"/>
-      </p:ext>
-    </p:extLst>
-  </p:cSld>
-  <p:clrMapOvr>
-    <a:masterClrMapping/>
-  </p:clrMapOvr>
-</p:sld>
-</file>
-
-<file path=ppt/slides/slide5.xml><?xml version="1.0" encoding="utf-8"?>
-<p:sld xmlns:a="http://schemas.openxmlformats.org/drawingml/2006/main" xmlns:r="http://schemas.openxmlformats.org/officeDocument/2006/relationships" xmlns:p="http://schemas.openxmlformats.org/presentationml/2006/main">
-  <p:cSld>
-    <p:spTree>
-      <p:nvGrpSpPr>
-        <p:cNvPr id="1" name=""/>
-        <p:cNvGrpSpPr/>
-        <p:nvPr/>
-      </p:nvGrpSpPr>
-      <p:grpSpPr>
-        <a:xfrm>
-          <a:off x="0" y="0"/>
-          <a:ext cx="0" cy="0"/>
-          <a:chOff x="0" y="0"/>
-          <a:chExt cx="0" cy="0"/>
-        </a:xfrm>
-      </p:grpSpPr>
-      <p:sp>
-        <p:nvSpPr>
-          <p:cNvPr id="2" name="Title 1"/>
-          <p:cNvSpPr>
-            <a:spLocks noGrp="1"/>
-          </p:cNvSpPr>
-          <p:nvPr>
-            <p:ph type="title"/>
-          </p:nvPr>
-        </p:nvSpPr>
-        <p:spPr/>
-        <p:txBody>
-          <a:bodyPr/>
-          <a:lstStyle/>
-          <a:p>
-            <a:r>
-              <a:rPr lang="en-US" dirty="0"/>
-              <a:t>Server side: DAO &amp; model objects</a:t>
-            </a:r>
-          </a:p>
-        </p:txBody>
-      </p:sp>
-      <p:sp>
-        <p:nvSpPr>
-          <p:cNvPr id="3" name="Text Placeholder 2"/>
-          <p:cNvSpPr>
-            <a:spLocks noGrp="1"/>
-          </p:cNvSpPr>
-          <p:nvPr>
-            <p:ph type="body" idx="1"/>
-          </p:nvPr>
-        </p:nvSpPr>
-        <p:spPr>
-          <a:xfrm>
-            <a:off x="838200" y="1825625"/>
-            <a:ext cx="5392918" cy="4351338"/>
-          </a:xfrm>
-        </p:spPr>
-        <p:txBody>
-          <a:bodyPr>
-            <a:normAutofit/>
-          </a:bodyPr>
-          <a:lstStyle/>
-          <a:p>
-            <a:pPr marL="402325">
-              <a:lnSpc>
-                <a:spcPct val="80000"/>
-              </a:lnSpc>
-              <a:spcBef>
-                <a:spcPts val="0"/>
-              </a:spcBef>
-              <a:buSzPts val="1750"/>
-            </a:pPr>
-            <a:r>
-              <a:rPr lang="en-US" sz="2100"/>
-              <a:t>Model objects (Beans)</a:t>
-            </a:r>
-            <a:endParaRPr lang="en-US"/>
-          </a:p>
-          <a:p>
-            <a:pPr marL="871703" lvl="1" indent="-335270">
-              <a:lnSpc>
-                <a:spcPct val="80000"/>
-              </a:lnSpc>
-              <a:spcBef>
-                <a:spcPts val="352"/>
-              </a:spcBef>
-              <a:buSzPts val="1500"/>
-            </a:pPr>
-            <a:r>
-              <a:rPr lang="en-US" sz="1800"/>
-              <a:t>User</a:t>
-            </a:r>
-            <a:endParaRPr lang="en-US"/>
-          </a:p>
-          <a:p>
-            <a:pPr marL="871703" lvl="1" indent="-335270">
-              <a:lnSpc>
-                <a:spcPct val="80000"/>
-              </a:lnSpc>
-              <a:spcBef>
-                <a:spcPts val="352"/>
-              </a:spcBef>
-              <a:buSzPts val="1500"/>
-            </a:pPr>
-            <a:r>
-              <a:rPr lang="en-US" sz="1800"/>
-              <a:t>Album</a:t>
-            </a:r>
-            <a:endParaRPr lang="en-US"/>
-          </a:p>
-          <a:p>
-            <a:pPr marL="871703" lvl="1" indent="-335270">
-              <a:lnSpc>
-                <a:spcPct val="80000"/>
-              </a:lnSpc>
-              <a:spcBef>
-                <a:spcPts val="352"/>
-              </a:spcBef>
-              <a:buSzPts val="1500"/>
-            </a:pPr>
-            <a:r>
-              <a:rPr lang="en-US" sz="1800"/>
-              <a:t>Comment</a:t>
-            </a:r>
-          </a:p>
-          <a:p>
-            <a:pPr marL="871703" lvl="1" indent="-335270">
-              <a:lnSpc>
-                <a:spcPct val="80000"/>
-              </a:lnSpc>
-              <a:spcBef>
-                <a:spcPts val="352"/>
-              </a:spcBef>
-              <a:buSzPts val="1500"/>
-            </a:pPr>
-            <a:r>
-              <a:rPr lang="en-US" sz="1800"/>
-              <a:t>Image</a:t>
-            </a:r>
-            <a:endParaRPr lang="en-US"/>
-          </a:p>
-          <a:p>
-            <a:pPr marL="402325">
-              <a:lnSpc>
-                <a:spcPct val="80000"/>
-              </a:lnSpc>
-              <a:spcBef>
-                <a:spcPts val="411"/>
-              </a:spcBef>
-              <a:buSzPts val="1750"/>
-            </a:pPr>
-            <a:r>
-              <a:rPr lang="en-US" sz="2100"/>
-              <a:t>Data Access Objects (Classes)                             </a:t>
-            </a:r>
-            <a:endParaRPr lang="en-US"/>
-          </a:p>
-          <a:p>
-            <a:pPr marL="871703" lvl="1" indent="-335270">
-              <a:lnSpc>
-                <a:spcPct val="80000"/>
-              </a:lnSpc>
-              <a:spcBef>
-                <a:spcPts val="352"/>
-              </a:spcBef>
-              <a:buSzPts val="1500"/>
-            </a:pPr>
-            <a:r>
-              <a:rPr lang="en-US" sz="1800"/>
-              <a:t>UserDAO</a:t>
-            </a:r>
-          </a:p>
-          <a:p>
-            <a:pPr marL="1341082" lvl="2" indent="-208613">
-              <a:lnSpc>
-                <a:spcPct val="80000"/>
-              </a:lnSpc>
-              <a:spcBef>
-                <a:spcPts val="352"/>
-              </a:spcBef>
-              <a:buSzPts val="1200"/>
-            </a:pPr>
-            <a:r>
-              <a:rPr lang="en-US" sz="1800"/>
-              <a:t>checkCredentials(username, pwd)</a:t>
-            </a:r>
-          </a:p>
-          <a:p>
-            <a:pPr marL="1341082" lvl="2" indent="-208613">
-              <a:lnSpc>
-                <a:spcPct val="80000"/>
-              </a:lnSpc>
-              <a:spcBef>
-                <a:spcPts val="352"/>
-              </a:spcBef>
-              <a:buSzPts val="1200"/>
-            </a:pPr>
-            <a:r>
-              <a:rPr lang="en-US" sz="1800"/>
-              <a:t>createNewUser(username, pwd, email)</a:t>
-            </a:r>
-          </a:p>
-          <a:p>
-            <a:pPr marL="871703" lvl="1" indent="-268216">
-              <a:lnSpc>
-                <a:spcPct val="80000"/>
-              </a:lnSpc>
-              <a:spcBef>
-                <a:spcPts val="352"/>
-              </a:spcBef>
-              <a:buSzPts val="1500"/>
-            </a:pPr>
-            <a:r>
-              <a:rPr lang="en-US" sz="1800"/>
-              <a:t>AlbumDAO</a:t>
-            </a:r>
-            <a:endParaRPr lang="en-US" sz="1400"/>
-          </a:p>
-          <a:p>
-            <a:pPr marL="1341082" lvl="2" indent="-208613">
-              <a:lnSpc>
-                <a:spcPct val="80000"/>
-              </a:lnSpc>
-              <a:spcBef>
-                <a:spcPts val="352"/>
-              </a:spcBef>
-              <a:buSzPts val="1200"/>
-            </a:pPr>
-            <a:r>
-              <a:rPr lang="en-US" sz="1400"/>
-              <a:t>findAllAlbums()</a:t>
-            </a:r>
-            <a:endParaRPr lang="en-US" sz="1800"/>
-          </a:p>
-          <a:p>
-            <a:pPr marL="1341082" lvl="2" indent="-208613">
-              <a:lnSpc>
-                <a:spcPct val="80000"/>
-              </a:lnSpc>
-              <a:spcBef>
-                <a:spcPts val="352"/>
-              </a:spcBef>
-              <a:buSzPts val="1200"/>
-            </a:pPr>
-            <a:r>
-              <a:rPr lang="en-US" sz="1400"/>
-              <a:t>findInfoOfAlbumById(userid)</a:t>
-            </a:r>
-          </a:p>
-          <a:p>
-            <a:pPr marL="871703" lvl="1" indent="-335270">
-              <a:lnSpc>
-                <a:spcPct val="80000"/>
-              </a:lnSpc>
-              <a:spcBef>
-                <a:spcPts val="352"/>
-              </a:spcBef>
-              <a:buSzPts val="1500"/>
-            </a:pPr>
-            <a:r>
-              <a:rPr lang="en-US" sz="1800"/>
-              <a:t>ImageDAO</a:t>
-            </a:r>
-          </a:p>
-          <a:p>
-            <a:pPr marL="1341082" lvl="2" indent="-208613">
-              <a:lnSpc>
-                <a:spcPct val="80000"/>
-              </a:lnSpc>
-              <a:spcBef>
-                <a:spcPts val="352"/>
-              </a:spcBef>
-              <a:buSzPts val="1200"/>
-            </a:pPr>
-            <a:r>
-              <a:rPr lang="en-US" sz="1400"/>
-              <a:t>findImagesOfAlbum(albumId)</a:t>
-            </a:r>
-          </a:p>
-          <a:p>
-            <a:pPr marL="1341082" lvl="2" indent="-208613">
-              <a:lnSpc>
-                <a:spcPct val="80000"/>
-              </a:lnSpc>
-              <a:spcBef>
-                <a:spcPts val="352"/>
-              </a:spcBef>
-              <a:buSzPts val="1200"/>
-            </a:pPr>
-            <a:r>
-              <a:rPr lang="en-US" sz="1400"/>
-              <a:t>findImageById(imageId)</a:t>
-            </a:r>
-          </a:p>
-          <a:p>
-            <a:pPr marL="1132469" lvl="2" indent="0">
-              <a:lnSpc>
-                <a:spcPct val="80000"/>
-              </a:lnSpc>
-              <a:spcBef>
-                <a:spcPts val="352"/>
-              </a:spcBef>
-              <a:buSzPts val="1200"/>
-              <a:buNone/>
-            </a:pPr>
-            <a:endParaRPr lang="en-US" sz="1400" dirty="0"/>
-          </a:p>
-        </p:txBody>
-      </p:sp>
-      <p:sp>
-        <p:nvSpPr>
-          <p:cNvPr id="4" name="Text Placeholder 2">
-            <a:extLst>
-              <a:ext uri="{FF2B5EF4-FFF2-40B4-BE49-F238E27FC236}">
-                <a16:creationId xmlns:a16="http://schemas.microsoft.com/office/drawing/2014/main" id="{F90DAFA4-16A8-4264-A7D2-4B7F85EF4708}"/>
-              </a:ext>
-            </a:extLst>
-          </p:cNvPr>
-          <p:cNvSpPr txBox="1">
-            <a:spLocks/>
-          </p:cNvSpPr>
-          <p:nvPr/>
-        </p:nvSpPr>
-        <p:spPr>
-          <a:xfrm>
-            <a:off x="6316744" y="3497344"/>
-            <a:ext cx="5392918" cy="2544682"/>
-          </a:xfrm>
-          <a:prstGeom prst="rect">
-            <a:avLst/>
-          </a:prstGeom>
-        </p:spPr>
-        <p:txBody>
-          <a:bodyPr vert="horz" lIns="91440" tIns="45720" rIns="91440" bIns="45720" rtlCol="0">
-            <a:normAutofit/>
-          </a:bodyPr>
-          <a:lstStyle>
-            <a:lvl1pPr marL="228600" indent="-228600" algn="l" defTabSz="914400" rtl="0" eaLnBrk="1" latinLnBrk="0" hangingPunct="1">
-              <a:lnSpc>
-                <a:spcPct val="90000"/>
-              </a:lnSpc>
-              <a:spcBef>
-                <a:spcPts val="1000"/>
-              </a:spcBef>
-              <a:buFont typeface="Arial" panose="020B0604020202020204" pitchFamily="34" charset="0"/>
-              <a:buChar char="•"/>
-              <a:defRPr sz="2800" kern="1200">
-                <a:solidFill>
-                  <a:schemeClr val="tx1"/>
-                </a:solidFill>
-                <a:latin typeface="+mn-lt"/>
-                <a:ea typeface="+mn-ea"/>
-                <a:cs typeface="+mn-cs"/>
-              </a:defRPr>
-            </a:lvl1pPr>
-            <a:lvl2pPr marL="685800" indent="-228600" algn="l" defTabSz="914400" rtl="0" eaLnBrk="1" latinLnBrk="0" hangingPunct="1">
-              <a:lnSpc>
-                <a:spcPct val="90000"/>
-              </a:lnSpc>
-              <a:spcBef>
-                <a:spcPts val="500"/>
-              </a:spcBef>
-              <a:buFont typeface="Arial" panose="020B0604020202020204" pitchFamily="34" charset="0"/>
-              <a:buChar char="•"/>
-              <a:defRPr sz="2400" kern="1200">
-                <a:solidFill>
-                  <a:schemeClr val="tx1"/>
-                </a:solidFill>
-                <a:latin typeface="+mn-lt"/>
-                <a:ea typeface="+mn-ea"/>
-                <a:cs typeface="+mn-cs"/>
-              </a:defRPr>
-            </a:lvl2pPr>
-            <a:lvl3pPr marL="1143000" indent="-228600" algn="l" defTabSz="914400" rtl="0" eaLnBrk="1" latinLnBrk="0" hangingPunct="1">
-              <a:lnSpc>
-                <a:spcPct val="90000"/>
-              </a:lnSpc>
-              <a:spcBef>
-                <a:spcPts val="500"/>
-              </a:spcBef>
-              <a:buFont typeface="Arial" panose="020B0604020202020204" pitchFamily="34" charset="0"/>
-              <a:buChar char="•"/>
-              <a:defRPr sz="2000" kern="1200">
-                <a:solidFill>
-                  <a:schemeClr val="tx1"/>
-                </a:solidFill>
-                <a:latin typeface="+mn-lt"/>
-                <a:ea typeface="+mn-ea"/>
-                <a:cs typeface="+mn-cs"/>
-              </a:defRPr>
-            </a:lvl3pPr>
-            <a:lvl4pPr marL="1600200" indent="-228600" algn="l" defTabSz="914400" rtl="0" eaLnBrk="1" latinLnBrk="0" hangingPunct="1">
-              <a:lnSpc>
-                <a:spcPct val="90000"/>
-              </a:lnSpc>
-              <a:spcBef>
-                <a:spcPts val="500"/>
-              </a:spcBef>
-              <a:buFont typeface="Arial" panose="020B0604020202020204" pitchFamily="34" charset="0"/>
-              <a:buChar char="•"/>
-              <a:defRPr sz="1800" kern="1200">
-                <a:solidFill>
-                  <a:schemeClr val="tx1"/>
-                </a:solidFill>
-                <a:latin typeface="+mn-lt"/>
-                <a:ea typeface="+mn-ea"/>
-                <a:cs typeface="+mn-cs"/>
-              </a:defRPr>
-            </a:lvl4pPr>
-            <a:lvl5pPr marL="2057400" indent="-228600" algn="l" defTabSz="914400" rtl="0" eaLnBrk="1" latinLnBrk="0" hangingPunct="1">
-              <a:lnSpc>
-                <a:spcPct val="90000"/>
-              </a:lnSpc>
-              <a:spcBef>
-                <a:spcPts val="500"/>
-              </a:spcBef>
-              <a:buFont typeface="Arial" panose="020B0604020202020204" pitchFamily="34" charset="0"/>
-              <a:buChar char="•"/>
-              <a:defRPr sz="1800" kern="1200">
-                <a:solidFill>
-                  <a:schemeClr val="tx1"/>
-                </a:solidFill>
-                <a:latin typeface="+mn-lt"/>
-                <a:ea typeface="+mn-ea"/>
-                <a:cs typeface="+mn-cs"/>
-              </a:defRPr>
-            </a:lvl5pPr>
-            <a:lvl6pPr marL="2514600" indent="-228600" algn="l" defTabSz="914400" rtl="0" eaLnBrk="1" latinLnBrk="0" hangingPunct="1">
-              <a:lnSpc>
-                <a:spcPct val="90000"/>
-              </a:lnSpc>
-              <a:spcBef>
-                <a:spcPts val="500"/>
-              </a:spcBef>
-              <a:buFont typeface="Arial" panose="020B0604020202020204" pitchFamily="34" charset="0"/>
-              <a:buChar char="•"/>
-              <a:defRPr sz="1800" kern="1200">
-                <a:solidFill>
-                  <a:schemeClr val="tx1"/>
-                </a:solidFill>
-                <a:latin typeface="+mn-lt"/>
-                <a:ea typeface="+mn-ea"/>
-                <a:cs typeface="+mn-cs"/>
-              </a:defRPr>
-            </a:lvl6pPr>
-            <a:lvl7pPr marL="2971800" indent="-228600" algn="l" defTabSz="914400" rtl="0" eaLnBrk="1" latinLnBrk="0" hangingPunct="1">
-              <a:lnSpc>
-                <a:spcPct val="90000"/>
-              </a:lnSpc>
-              <a:spcBef>
-                <a:spcPts val="500"/>
-              </a:spcBef>
-              <a:buFont typeface="Arial" panose="020B0604020202020204" pitchFamily="34" charset="0"/>
-              <a:buChar char="•"/>
-              <a:defRPr sz="1800" kern="1200">
-                <a:solidFill>
-                  <a:schemeClr val="tx1"/>
-                </a:solidFill>
-                <a:latin typeface="+mn-lt"/>
-                <a:ea typeface="+mn-ea"/>
-                <a:cs typeface="+mn-cs"/>
-              </a:defRPr>
-            </a:lvl7pPr>
-            <a:lvl8pPr marL="3429000" indent="-228600" algn="l" defTabSz="914400" rtl="0" eaLnBrk="1" latinLnBrk="0" hangingPunct="1">
-              <a:lnSpc>
-                <a:spcPct val="90000"/>
-              </a:lnSpc>
-              <a:spcBef>
-                <a:spcPts val="500"/>
-              </a:spcBef>
-              <a:buFont typeface="Arial" panose="020B0604020202020204" pitchFamily="34" charset="0"/>
-              <a:buChar char="•"/>
-              <a:defRPr sz="1800" kern="1200">
-                <a:solidFill>
-                  <a:schemeClr val="tx1"/>
-                </a:solidFill>
-                <a:latin typeface="+mn-lt"/>
-                <a:ea typeface="+mn-ea"/>
-                <a:cs typeface="+mn-cs"/>
-              </a:defRPr>
-            </a:lvl8pPr>
-            <a:lvl9pPr marL="3886200" indent="-228600" algn="l" defTabSz="914400" rtl="0" eaLnBrk="1" latinLnBrk="0" hangingPunct="1">
-              <a:lnSpc>
-                <a:spcPct val="90000"/>
-              </a:lnSpc>
-              <a:spcBef>
-                <a:spcPts val="500"/>
-              </a:spcBef>
-              <a:buFont typeface="Arial" panose="020B0604020202020204" pitchFamily="34" charset="0"/>
-              <a:buChar char="•"/>
-              <a:defRPr sz="1800" kern="1200">
-                <a:solidFill>
-                  <a:schemeClr val="tx1"/>
-                </a:solidFill>
-                <a:latin typeface="+mn-lt"/>
-                <a:ea typeface="+mn-ea"/>
-                <a:cs typeface="+mn-cs"/>
-              </a:defRPr>
-            </a:lvl9pPr>
-          </a:lstStyle>
-          <a:p>
-            <a:pPr marL="871703" lvl="1" indent="-335270">
-              <a:lnSpc>
-                <a:spcPct val="80000"/>
-              </a:lnSpc>
-              <a:spcBef>
-                <a:spcPts val="352"/>
-              </a:spcBef>
-              <a:buSzPts val="1500"/>
-            </a:pPr>
-            <a:r>
-              <a:rPr lang="en-US" sz="1800" dirty="0" err="1"/>
-              <a:t>CommentDAO</a:t>
-            </a:r>
-            <a:endParaRPr lang="en-US" sz="1800" dirty="0"/>
-          </a:p>
-          <a:p>
-            <a:pPr marL="1341082" lvl="2" indent="-208613">
-              <a:lnSpc>
-                <a:spcPct val="80000"/>
-              </a:lnSpc>
-              <a:spcBef>
-                <a:spcPts val="352"/>
-              </a:spcBef>
-              <a:buSzPts val="1200"/>
-            </a:pPr>
-            <a:r>
-              <a:rPr lang="en-US" sz="1800" dirty="0" err="1"/>
-              <a:t>findCommentsOfImage</a:t>
-            </a:r>
-            <a:r>
-              <a:rPr lang="en-US" sz="1800" dirty="0"/>
-              <a:t>(</a:t>
-            </a:r>
-            <a:r>
-              <a:rPr lang="en-US" sz="1800" dirty="0" err="1"/>
-              <a:t>imageId</a:t>
-            </a:r>
-            <a:r>
-              <a:rPr lang="en-US" sz="1800" dirty="0"/>
-              <a:t>)</a:t>
-            </a:r>
-          </a:p>
-          <a:p>
-            <a:pPr marL="1341082" lvl="2" indent="-208613">
-              <a:lnSpc>
-                <a:spcPct val="80000"/>
-              </a:lnSpc>
-              <a:spcBef>
-                <a:spcPts val="352"/>
-              </a:spcBef>
-              <a:buSzPts val="1200"/>
-            </a:pPr>
-            <a:r>
-              <a:rPr lang="en-US" sz="1800" dirty="0" err="1"/>
-              <a:t>createComment</a:t>
-            </a:r>
-            <a:r>
-              <a:rPr lang="en-US" sz="1800" dirty="0"/>
-              <a:t>(text, </a:t>
-            </a:r>
-            <a:r>
-              <a:rPr lang="en-US" sz="1800" dirty="0" err="1"/>
-              <a:t>imageId</a:t>
-            </a:r>
-            <a:r>
-              <a:rPr lang="en-US" sz="1800" dirty="0"/>
-              <a:t>, </a:t>
-            </a:r>
-            <a:r>
-              <a:rPr lang="en-US" sz="1800" dirty="0" err="1"/>
-              <a:t>userId</a:t>
-            </a:r>
-            <a:r>
-              <a:rPr lang="en-US" sz="1800" dirty="0"/>
-              <a:t>, date)</a:t>
-            </a:r>
-          </a:p>
-          <a:p>
-            <a:pPr marL="871703" lvl="1" indent="-268216">
-              <a:lnSpc>
-                <a:spcPct val="80000"/>
-              </a:lnSpc>
-              <a:spcBef>
-                <a:spcPts val="352"/>
-              </a:spcBef>
-              <a:buSzPts val="1500"/>
-            </a:pPr>
-            <a:r>
-              <a:rPr lang="en-US" sz="1800" dirty="0" err="1"/>
-              <a:t>RegistrationDAO</a:t>
-            </a:r>
-            <a:endParaRPr lang="en-US" sz="1400" dirty="0"/>
-          </a:p>
-          <a:p>
-            <a:pPr marL="1341082" lvl="2" indent="-208613">
-              <a:lnSpc>
-                <a:spcPct val="80000"/>
-              </a:lnSpc>
-              <a:spcBef>
-                <a:spcPts val="352"/>
-              </a:spcBef>
-              <a:buSzPts val="1200"/>
-            </a:pPr>
-            <a:r>
-              <a:rPr lang="en-US" sz="1400" dirty="0" err="1"/>
-              <a:t>createRegistrationOfUser</a:t>
-            </a:r>
-            <a:r>
-              <a:rPr lang="en-US" sz="1400" dirty="0"/>
-              <a:t>(</a:t>
-            </a:r>
-            <a:r>
-              <a:rPr lang="en-US" sz="1400" dirty="0" err="1"/>
-              <a:t>username,pwd,email</a:t>
-            </a:r>
-            <a:r>
-              <a:rPr lang="en-US" sz="1400" dirty="0"/>
-              <a:t>)</a:t>
-            </a:r>
-            <a:endParaRPr lang="en-US" sz="1800" dirty="0"/>
-          </a:p>
-          <a:p>
-            <a:pPr marL="1341082" lvl="2" indent="-208613">
-              <a:lnSpc>
-                <a:spcPct val="80000"/>
-              </a:lnSpc>
-              <a:spcBef>
-                <a:spcPts val="352"/>
-              </a:spcBef>
-              <a:buSzPts val="1200"/>
-            </a:pPr>
-            <a:r>
-              <a:rPr lang="en-US" sz="1400" dirty="0" err="1"/>
-              <a:t>controlRegistrationOfUser</a:t>
-            </a:r>
-            <a:r>
-              <a:rPr lang="en-US" sz="1400" dirty="0"/>
-              <a:t>(</a:t>
-            </a:r>
-            <a:r>
-              <a:rPr lang="en-US" sz="1400" dirty="0" err="1"/>
-              <a:t>userid</a:t>
-            </a:r>
-            <a:r>
-              <a:rPr lang="en-US" sz="1400" dirty="0"/>
-              <a:t>)</a:t>
-            </a:r>
-          </a:p>
-          <a:p>
-            <a:pPr marL="1132469" lvl="2" indent="0">
-              <a:lnSpc>
-                <a:spcPct val="80000"/>
-              </a:lnSpc>
-              <a:spcBef>
-                <a:spcPts val="352"/>
-              </a:spcBef>
-              <a:buSzPts val="1200"/>
-              <a:buFont typeface="Arial" panose="020B0604020202020204" pitchFamily="34" charset="0"/>
-              <a:buNone/>
-            </a:pPr>
-            <a:endParaRPr lang="en-US" sz="1400" dirty="0"/>
-          </a:p>
-        </p:txBody>
-      </p:sp>
-    </p:spTree>
-    <p:extLst>
-      <p:ext uri="{BB962C8B-B14F-4D97-AF65-F5344CB8AC3E}">
-        <p14:creationId xmlns:p14="http://schemas.microsoft.com/office/powerpoint/2010/main" val="160639521"/>
-      </p:ext>
-    </p:extLst>
-  </p:cSld>
-  <p:clrMapOvr>
-    <a:masterClrMapping/>
-  </p:clrMapOvr>
-</p:sld>
-</file>
-
-<file path=ppt/slides/slide6.xml><?xml version="1.0" encoding="utf-8"?>
-<p:sld xmlns:a="http://schemas.openxmlformats.org/drawingml/2006/main" xmlns:r="http://schemas.openxmlformats.org/officeDocument/2006/relationships" xmlns:p="http://schemas.openxmlformats.org/presentationml/2006/main">
-  <p:cSld>
-    <p:spTree>
-      <p:nvGrpSpPr>
-        <p:cNvPr id="1" name=""/>
-        <p:cNvGrpSpPr/>
-        <p:nvPr/>
-      </p:nvGrpSpPr>
-      <p:grpSpPr>
-        <a:xfrm>
-          <a:off x="0" y="0"/>
-          <a:ext cx="0" cy="0"/>
-          <a:chOff x="0" y="0"/>
-          <a:chExt cx="0" cy="0"/>
-        </a:xfrm>
-      </p:grpSpPr>
-      <p:sp>
-        <p:nvSpPr>
-          <p:cNvPr id="2" name="Title 1"/>
-          <p:cNvSpPr>
-            <a:spLocks noGrp="1"/>
-          </p:cNvSpPr>
-          <p:nvPr>
-            <p:ph type="title"/>
-          </p:nvPr>
-        </p:nvSpPr>
-        <p:spPr>
-          <a:xfrm>
-            <a:off x="838200" y="-32526"/>
-            <a:ext cx="10515600" cy="1325563"/>
-          </a:xfrm>
-        </p:spPr>
-        <p:txBody>
-          <a:bodyPr/>
-          <a:lstStyle/>
-          <a:p>
-            <a:r>
-              <a:rPr lang="en-US" dirty="0"/>
-              <a:t>Client side: view &amp; view component</a:t>
-            </a:r>
-          </a:p>
-        </p:txBody>
-      </p:sp>
-      <p:sp>
-        <p:nvSpPr>
-          <p:cNvPr id="4" name="Text Placeholder 3"/>
-          <p:cNvSpPr>
-            <a:spLocks noGrp="1"/>
-          </p:cNvSpPr>
-          <p:nvPr>
-            <p:ph type="body" idx="2"/>
-          </p:nvPr>
-        </p:nvSpPr>
-        <p:spPr>
-          <a:xfrm>
-            <a:off x="197177" y="2516956"/>
-            <a:ext cx="6439293" cy="4341044"/>
-          </a:xfrm>
-        </p:spPr>
-        <p:txBody>
-          <a:bodyPr>
-            <a:noAutofit/>
-          </a:bodyPr>
-          <a:lstStyle/>
-          <a:p>
-            <a:pPr marL="914400" lvl="2" indent="0">
-              <a:buNone/>
-            </a:pPr>
-            <a:endParaRPr lang="it-IT" sz="1200" dirty="0"/>
-          </a:p>
-          <a:p>
-            <a:r>
-              <a:rPr lang="it-IT" sz="1800" dirty="0"/>
-              <a:t>Home</a:t>
-            </a:r>
-          </a:p>
-          <a:p>
-            <a:pPr lvl="1"/>
-            <a:r>
-              <a:rPr lang="it-IT" sz="1400" dirty="0" err="1"/>
-              <a:t>AlbumsList</a:t>
-            </a:r>
-            <a:endParaRPr lang="it-IT" sz="1400" dirty="0"/>
-          </a:p>
-          <a:p>
-            <a:pPr lvl="2"/>
-            <a:r>
-              <a:rPr lang="it-IT" sz="1200" dirty="0"/>
-              <a:t>show(): richiede al server i dati dell'elenco </a:t>
-            </a:r>
-            <a:r>
-              <a:rPr lang="it-IT" sz="1200" dirty="0" err="1"/>
-              <a:t>albums</a:t>
-            </a:r>
-            <a:endParaRPr lang="it-IT" sz="1200" dirty="0"/>
-          </a:p>
-          <a:p>
-            <a:pPr lvl="2"/>
-            <a:r>
-              <a:rPr lang="it-IT" sz="1200" dirty="0"/>
-              <a:t>update(): riceve dati server e aggiorna la lista</a:t>
-            </a:r>
-          </a:p>
-          <a:p>
-            <a:pPr lvl="2"/>
-            <a:r>
-              <a:rPr lang="it-IT" sz="1200" dirty="0" err="1"/>
-              <a:t>autoclick</a:t>
-            </a:r>
-            <a:r>
-              <a:rPr lang="it-IT" sz="1200" dirty="0"/>
-              <a:t>(): seleziona un elemento della lista per mostrare in automatico i dettagli</a:t>
-            </a:r>
-          </a:p>
-          <a:p>
-            <a:pPr lvl="1"/>
-            <a:r>
-              <a:rPr lang="it-IT" sz="1400" dirty="0" err="1"/>
-              <a:t>AlbumDetail</a:t>
-            </a:r>
-            <a:r>
-              <a:rPr lang="it-IT" sz="1400" dirty="0"/>
-              <a:t>(gestisce la lista delle immagini di un album)</a:t>
-            </a:r>
-          </a:p>
-          <a:p>
-            <a:pPr lvl="2"/>
-            <a:r>
-              <a:rPr lang="it-IT" sz="1200" dirty="0" err="1"/>
-              <a:t>registerEvents</a:t>
-            </a:r>
-            <a:r>
-              <a:rPr lang="it-IT" sz="1200" dirty="0"/>
-              <a:t>(): associa al componente le funzioni per gestirne gli eventi</a:t>
-            </a:r>
-          </a:p>
-          <a:p>
-            <a:pPr lvl="2"/>
-            <a:r>
-              <a:rPr lang="it-IT" sz="1200" dirty="0"/>
-              <a:t>show(): richiede al server i  dettagli dell’album(immagini presenti nell’album)</a:t>
-            </a:r>
-          </a:p>
-          <a:p>
-            <a:pPr lvl="2"/>
-            <a:r>
-              <a:rPr lang="it-IT" sz="1200" dirty="0"/>
-              <a:t>update(): riceve dati server e aggiorna  dettagli</a:t>
-            </a:r>
-          </a:p>
-          <a:p>
-            <a:pPr lvl="2"/>
-            <a:r>
-              <a:rPr lang="it-IT" sz="1200" dirty="0"/>
-              <a:t>reset(): imposta le condizioni di iniziali visibilità dei vari sotto-componenti </a:t>
-            </a:r>
-          </a:p>
-          <a:p>
-            <a:pPr lvl="2"/>
-            <a:r>
-              <a:rPr lang="it-IT" sz="1200" dirty="0" err="1"/>
-              <a:t>changeStep</a:t>
-            </a:r>
-            <a:r>
-              <a:rPr lang="it-IT" sz="1200" dirty="0"/>
-              <a:t>(): cambia il blocco di cinque immagini visualizzato</a:t>
-            </a:r>
-          </a:p>
-          <a:p>
-            <a:pPr marL="742950" lvl="1" indent="-285750">
-              <a:buFont typeface="Arial" panose="020B0604020202020204" pitchFamily="34" charset="0"/>
-              <a:buChar char="•"/>
-            </a:pPr>
-            <a:r>
-              <a:rPr lang="it-IT" sz="1400" dirty="0" err="1"/>
-              <a:t>ImageDetail</a:t>
-            </a:r>
-            <a:endParaRPr lang="it-IT" sz="1400" dirty="0"/>
-          </a:p>
-          <a:p>
-            <a:pPr marL="1085850" lvl="2" indent="-171450">
-              <a:buFont typeface="Arial" panose="020B0604020202020204" pitchFamily="34" charset="0"/>
-              <a:buChar char="•"/>
-            </a:pPr>
-            <a:r>
-              <a:rPr lang="it-IT" sz="1200" dirty="0" err="1"/>
-              <a:t>registerEvents</a:t>
-            </a:r>
-            <a:r>
-              <a:rPr lang="it-IT" sz="1200" dirty="0"/>
-              <a:t>(): associa al componente le funzioni per gestirne gli eventi</a:t>
-            </a:r>
-          </a:p>
-          <a:p>
-            <a:pPr marL="1085850" lvl="2" indent="-171450">
-              <a:buFont typeface="Arial" panose="020B0604020202020204" pitchFamily="34" charset="0"/>
-              <a:buChar char="•"/>
-            </a:pPr>
-            <a:r>
-              <a:rPr lang="it-IT" sz="1200" dirty="0"/>
-              <a:t>show(): richiede al server i  dettagli dell’immagine (picture e commenti)</a:t>
-            </a:r>
-          </a:p>
-          <a:p>
-            <a:pPr marL="1085850" lvl="2" indent="-171450">
-              <a:buFont typeface="Arial" panose="020B0604020202020204" pitchFamily="34" charset="0"/>
-              <a:buChar char="•"/>
-            </a:pPr>
-            <a:r>
-              <a:rPr lang="it-IT" sz="1200" dirty="0"/>
-              <a:t>update(): riceve dati server e aggiorna  dettagli</a:t>
-            </a:r>
-          </a:p>
-          <a:p>
-            <a:pPr marL="1085850" lvl="2" indent="-171450">
-              <a:buFont typeface="Arial" panose="020B0604020202020204" pitchFamily="34" charset="0"/>
-              <a:buChar char="•"/>
-            </a:pPr>
-            <a:r>
-              <a:rPr lang="it-IT" sz="1200" dirty="0"/>
-              <a:t>reset(): imposta le condizioni di iniziali visibilità dei vari sotto-componenti </a:t>
-            </a:r>
-          </a:p>
-          <a:p>
-            <a:pPr marL="914400" lvl="2" indent="0">
-              <a:buNone/>
-            </a:pPr>
-            <a:endParaRPr lang="it-IT" sz="1200" dirty="0"/>
-          </a:p>
-        </p:txBody>
-      </p:sp>
-      <p:sp>
-        <p:nvSpPr>
-          <p:cNvPr id="5" name="CasellaDiTesto 4">
-            <a:extLst>
-              <a:ext uri="{FF2B5EF4-FFF2-40B4-BE49-F238E27FC236}">
-                <a16:creationId xmlns:a16="http://schemas.microsoft.com/office/drawing/2014/main" id="{A2D38ACF-5C1F-4E09-9506-269FD5246F4D}"/>
-              </a:ext>
-            </a:extLst>
-          </p:cNvPr>
-          <p:cNvSpPr txBox="1"/>
-          <p:nvPr/>
-        </p:nvSpPr>
-        <p:spPr>
-          <a:xfrm>
-            <a:off x="310299" y="981668"/>
-            <a:ext cx="8173825" cy="1846659"/>
-          </a:xfrm>
-          <a:prstGeom prst="rect">
-            <a:avLst/>
-          </a:prstGeom>
-          <a:noFill/>
-        </p:spPr>
-        <p:txBody>
-          <a:bodyPr wrap="square" rtlCol="0">
-            <a:spAutoFit/>
-          </a:bodyPr>
-          <a:lstStyle/>
-          <a:p>
-            <a:r>
-              <a:rPr lang="it-IT" sz="1800" dirty="0"/>
-              <a:t>Index</a:t>
-            </a:r>
-          </a:p>
-          <a:p>
-            <a:pPr marL="742950" lvl="1" indent="-285750">
-              <a:buFont typeface="Arial" panose="020B0604020202020204" pitchFamily="34" charset="0"/>
-              <a:buChar char="•"/>
-            </a:pPr>
-            <a:r>
-              <a:rPr lang="it-IT" sz="1400" dirty="0"/>
-              <a:t>Login </a:t>
-            </a:r>
-            <a:r>
-              <a:rPr lang="it-IT" sz="1400" dirty="0" err="1"/>
-              <a:t>form</a:t>
-            </a:r>
-            <a:endParaRPr lang="it-IT" sz="1400" dirty="0"/>
-          </a:p>
-          <a:p>
-            <a:pPr marL="1085850" lvl="2" indent="-171450">
-              <a:buFont typeface="Arial" panose="020B0604020202020204" pitchFamily="34" charset="0"/>
-              <a:buChar char="•"/>
-            </a:pPr>
-            <a:r>
-              <a:rPr lang="it-IT" sz="1200" dirty="0"/>
-              <a:t>Gestione del submit ed errori</a:t>
-            </a:r>
-          </a:p>
-          <a:p>
-            <a:pPr marL="742950" lvl="1" indent="-285750">
-              <a:buFont typeface="Arial" panose="020B0604020202020204" pitchFamily="34" charset="0"/>
-              <a:buChar char="•"/>
-            </a:pPr>
-            <a:r>
-              <a:rPr lang="it-IT" sz="1400" dirty="0" err="1"/>
-              <a:t>Registration</a:t>
-            </a:r>
-            <a:r>
-              <a:rPr lang="it-IT" sz="1400" dirty="0"/>
-              <a:t> </a:t>
-            </a:r>
-            <a:r>
-              <a:rPr lang="it-IT" sz="1400" dirty="0" err="1"/>
-              <a:t>form</a:t>
-            </a:r>
-            <a:endParaRPr lang="it-IT" sz="1400" dirty="0"/>
-          </a:p>
-          <a:p>
-            <a:pPr marL="1085850" lvl="2" indent="-171450">
-              <a:buFont typeface="Arial" panose="020B0604020202020204" pitchFamily="34" charset="0"/>
-              <a:buChar char="•"/>
-            </a:pPr>
-            <a:r>
-              <a:rPr lang="it-IT" sz="1200" dirty="0"/>
-              <a:t>Gestione del submit ed errori</a:t>
-            </a:r>
-          </a:p>
-          <a:p>
-            <a:pPr marL="742950" lvl="1" indent="-285750">
-              <a:buFont typeface="Arial" panose="020B0604020202020204" pitchFamily="34" charset="0"/>
-              <a:buChar char="•"/>
-            </a:pPr>
-            <a:r>
-              <a:rPr lang="it-IT" sz="1400" dirty="0"/>
-              <a:t>Guest access</a:t>
-            </a:r>
-          </a:p>
-          <a:p>
-            <a:pPr marL="1085850" lvl="2" indent="-171450">
-              <a:buFont typeface="Arial" panose="020B0604020202020204" pitchFamily="34" charset="0"/>
-              <a:buChar char="•"/>
-            </a:pPr>
-            <a:r>
-              <a:rPr lang="it-IT" sz="1200" dirty="0"/>
-              <a:t>Accesso alla homepage</a:t>
-            </a:r>
-          </a:p>
-          <a:p>
-            <a:endParaRPr lang="it-IT" dirty="0"/>
-          </a:p>
-        </p:txBody>
-      </p:sp>
-      <p:sp>
-        <p:nvSpPr>
-          <p:cNvPr id="6" name="CasellaDiTesto 5">
-            <a:extLst>
-              <a:ext uri="{FF2B5EF4-FFF2-40B4-BE49-F238E27FC236}">
-                <a16:creationId xmlns:a16="http://schemas.microsoft.com/office/drawing/2014/main" id="{233FFC1C-D50F-4F3A-B9CE-27C582A9FBEA}"/>
-              </a:ext>
-            </a:extLst>
-          </p:cNvPr>
-          <p:cNvSpPr txBox="1"/>
-          <p:nvPr/>
-        </p:nvSpPr>
-        <p:spPr>
-          <a:xfrm>
-            <a:off x="6762947" y="3091992"/>
-            <a:ext cx="5231876" cy="553998"/>
-          </a:xfrm>
-          <a:prstGeom prst="rect">
-            <a:avLst/>
-          </a:prstGeom>
-          <a:noFill/>
-        </p:spPr>
-        <p:txBody>
-          <a:bodyPr wrap="square" rtlCol="0">
-            <a:spAutoFit/>
-          </a:bodyPr>
-          <a:lstStyle/>
-          <a:p>
-            <a:pPr marL="914400" lvl="2" indent="0">
-              <a:buNone/>
-            </a:pPr>
-            <a:endParaRPr lang="it-IT" sz="1200" dirty="0"/>
-          </a:p>
-          <a:p>
-            <a:endParaRPr lang="it-IT" dirty="0"/>
-          </a:p>
-        </p:txBody>
-      </p:sp>
-    </p:spTree>
-    <p:extLst>
-      <p:ext uri="{BB962C8B-B14F-4D97-AF65-F5344CB8AC3E}">
-        <p14:creationId xmlns:p14="http://schemas.microsoft.com/office/powerpoint/2010/main" val="471237171"/>
       </p:ext>
     </p:extLst>
   </p:cSld>

</xml_diff>

<commit_message>
aggiornamento power point ria
</commit_message>
<xml_diff>
--- a/Presentazioni Powerpoint/Progetto1_versione_RIA.pptx
+++ b/Presentazioni Powerpoint/Progetto1_versione_RIA.pptx
@@ -5,7 +5,7 @@
     <p:sldMasterId id="2147483648" r:id="rId1"/>
   </p:sldMasterIdLst>
   <p:notesMasterIdLst>
-    <p:notesMasterId r:id="rId10"/>
+    <p:notesMasterId r:id="rId11"/>
   </p:notesMasterIdLst>
   <p:sldIdLst>
     <p:sldId id="283" r:id="rId2"/>
@@ -14,8 +14,9 @@
     <p:sldId id="265" r:id="rId5"/>
     <p:sldId id="282" r:id="rId6"/>
     <p:sldId id="285" r:id="rId7"/>
-    <p:sldId id="257" r:id="rId8"/>
-    <p:sldId id="256" r:id="rId9"/>
+    <p:sldId id="286" r:id="rId8"/>
+    <p:sldId id="257" r:id="rId9"/>
+    <p:sldId id="256" r:id="rId10"/>
   </p:sldIdLst>
   <p:sldSz cx="12192000" cy="6858000"/>
   <p:notesSz cx="6858000" cy="9144000"/>
@@ -204,7 +205,7 @@
           <a:p>
             <a:fld id="{C25F5A86-D4B2-4CFB-9FC8-FAE097577B12}" type="datetimeFigureOut">
               <a:rPr lang="it-IT" smtClean="0"/>
-              <a:t>04/09/2020</a:t>
+              <a:t>05/09/2020</a:t>
             </a:fld>
             <a:endParaRPr lang="it-IT" dirty="0"/>
           </a:p>
@@ -806,7 +807,7 @@
           <a:p>
             <a:fld id="{FE1EE28F-F736-456D-A3C7-4F5EC37410C2}" type="datetimeFigureOut">
               <a:rPr lang="it-IT" smtClean="0"/>
-              <a:t>04/09/2020</a:t>
+              <a:t>05/09/2020</a:t>
             </a:fld>
             <a:endParaRPr lang="it-IT" dirty="0"/>
           </a:p>
@@ -1004,7 +1005,7 @@
           <a:p>
             <a:fld id="{FE1EE28F-F736-456D-A3C7-4F5EC37410C2}" type="datetimeFigureOut">
               <a:rPr lang="it-IT" smtClean="0"/>
-              <a:t>04/09/2020</a:t>
+              <a:t>05/09/2020</a:t>
             </a:fld>
             <a:endParaRPr lang="it-IT" dirty="0"/>
           </a:p>
@@ -1212,7 +1213,7 @@
           <a:p>
             <a:fld id="{FE1EE28F-F736-456D-A3C7-4F5EC37410C2}" type="datetimeFigureOut">
               <a:rPr lang="it-IT" smtClean="0"/>
-              <a:t>04/09/2020</a:t>
+              <a:t>05/09/2020</a:t>
             </a:fld>
             <a:endParaRPr lang="it-IT" dirty="0"/>
           </a:p>
@@ -1410,7 +1411,7 @@
           <a:p>
             <a:fld id="{FE1EE28F-F736-456D-A3C7-4F5EC37410C2}" type="datetimeFigureOut">
               <a:rPr lang="it-IT" smtClean="0"/>
-              <a:t>04/09/2020</a:t>
+              <a:t>05/09/2020</a:t>
             </a:fld>
             <a:endParaRPr lang="it-IT" dirty="0"/>
           </a:p>
@@ -1685,7 +1686,7 @@
           <a:p>
             <a:fld id="{FE1EE28F-F736-456D-A3C7-4F5EC37410C2}" type="datetimeFigureOut">
               <a:rPr lang="it-IT" smtClean="0"/>
-              <a:t>04/09/2020</a:t>
+              <a:t>05/09/2020</a:t>
             </a:fld>
             <a:endParaRPr lang="it-IT" dirty="0"/>
           </a:p>
@@ -1950,7 +1951,7 @@
           <a:p>
             <a:fld id="{FE1EE28F-F736-456D-A3C7-4F5EC37410C2}" type="datetimeFigureOut">
               <a:rPr lang="it-IT" smtClean="0"/>
-              <a:t>04/09/2020</a:t>
+              <a:t>05/09/2020</a:t>
             </a:fld>
             <a:endParaRPr lang="it-IT" dirty="0"/>
           </a:p>
@@ -2362,7 +2363,7 @@
           <a:p>
             <a:fld id="{FE1EE28F-F736-456D-A3C7-4F5EC37410C2}" type="datetimeFigureOut">
               <a:rPr lang="it-IT" smtClean="0"/>
-              <a:t>04/09/2020</a:t>
+              <a:t>05/09/2020</a:t>
             </a:fld>
             <a:endParaRPr lang="it-IT" dirty="0"/>
           </a:p>
@@ -2503,7 +2504,7 @@
           <a:p>
             <a:fld id="{FE1EE28F-F736-456D-A3C7-4F5EC37410C2}" type="datetimeFigureOut">
               <a:rPr lang="it-IT" smtClean="0"/>
-              <a:t>04/09/2020</a:t>
+              <a:t>05/09/2020</a:t>
             </a:fld>
             <a:endParaRPr lang="it-IT" dirty="0"/>
           </a:p>
@@ -2616,7 +2617,7 @@
           <a:p>
             <a:fld id="{FE1EE28F-F736-456D-A3C7-4F5EC37410C2}" type="datetimeFigureOut">
               <a:rPr lang="it-IT" smtClean="0"/>
-              <a:t>04/09/2020</a:t>
+              <a:t>05/09/2020</a:t>
             </a:fld>
             <a:endParaRPr lang="it-IT" dirty="0"/>
           </a:p>
@@ -2927,7 +2928,7 @@
           <a:p>
             <a:fld id="{FE1EE28F-F736-456D-A3C7-4F5EC37410C2}" type="datetimeFigureOut">
               <a:rPr lang="it-IT" smtClean="0"/>
-              <a:t>04/09/2020</a:t>
+              <a:t>05/09/2020</a:t>
             </a:fld>
             <a:endParaRPr lang="it-IT" dirty="0"/>
           </a:p>
@@ -3215,7 +3216,7 @@
           <a:p>
             <a:fld id="{FE1EE28F-F736-456D-A3C7-4F5EC37410C2}" type="datetimeFigureOut">
               <a:rPr lang="it-IT" smtClean="0"/>
-              <a:t>04/09/2020</a:t>
+              <a:t>05/09/2020</a:t>
             </a:fld>
             <a:endParaRPr lang="it-IT" dirty="0"/>
           </a:p>
@@ -3456,7 +3457,7 @@
           <a:p>
             <a:fld id="{FE1EE28F-F736-456D-A3C7-4F5EC37410C2}" type="datetimeFigureOut">
               <a:rPr lang="it-IT" smtClean="0"/>
-              <a:t>04/09/2020</a:t>
+              <a:t>05/09/2020</a:t>
             </a:fld>
             <a:endParaRPr lang="it-IT" dirty="0"/>
           </a:p>
@@ -10923,7 +10924,7 @@
         </p:nvSpPr>
         <p:spPr>
           <a:xfrm>
-            <a:off x="228600" y="274575"/>
+            <a:off x="960120" y="-99894"/>
             <a:ext cx="6496050" cy="6308849"/>
           </a:xfrm>
           <a:prstGeom prst="rect">
@@ -11324,67 +11325,88 @@
           <a:p>
             <a:pPr marL="742950" lvl="1" indent="-285750"/>
             <a:r>
-              <a:rPr lang="it-IT" sz="1400" dirty="0" err="1"/>
+              <a:rPr lang="it-IT" sz="1400" b="1" dirty="0" err="1"/>
               <a:t>ImageDetails</a:t>
             </a:r>
-            <a:endParaRPr lang="it-IT" sz="1400" dirty="0"/>
+            <a:endParaRPr lang="it-IT" sz="1400" b="1" dirty="0"/>
           </a:p>
           <a:p>
             <a:pPr marL="1085850" lvl="2" indent="-171450"/>
             <a:r>
+              <a:rPr lang="it-IT" sz="1200" b="1" dirty="0"/>
+              <a:t>Show</a:t>
+            </a:r>
+            <a:r>
               <a:rPr lang="it-IT" sz="1200" dirty="0"/>
-              <a:t>registerEvents(): associa al componente le funzioni per gestirne gli eventi</a:t>
+              <a:t>(): richiede al server i  dettagli dell’immagine (picture e commenti) e invoca l’update();</a:t>
             </a:r>
           </a:p>
           <a:p>
             <a:pPr marL="1085850" lvl="2" indent="-171450"/>
             <a:r>
+              <a:rPr lang="it-IT" sz="1200" b="1" dirty="0"/>
+              <a:t>update</a:t>
+            </a:r>
+            <a:r>
               <a:rPr lang="it-IT" sz="1200" dirty="0"/>
-              <a:t>show(): richiede al server i  dettagli dell’immagine (picture e commenti)</a:t>
+              <a:t>(</a:t>
+            </a:r>
+            <a:r>
+              <a:rPr lang="it-IT" sz="1200" dirty="0" err="1"/>
+              <a:t>imageAndComments</a:t>
+            </a:r>
+            <a:r>
+              <a:rPr lang="it-IT" sz="1200" dirty="0"/>
+              <a:t>): riceve dati server e aggiorna i dettagli dell’immagine</a:t>
             </a:r>
           </a:p>
           <a:p>
             <a:pPr marL="1085850" lvl="2" indent="-171450"/>
             <a:r>
+              <a:rPr lang="it-IT" sz="1200" b="1" dirty="0" err="1"/>
+              <a:t>showComments</a:t>
+            </a:r>
+            <a:r>
               <a:rPr lang="it-IT" sz="1200" dirty="0"/>
-              <a:t>update(): riceve dati server e aggiorna  dettagli</a:t>
+              <a:t>(): mostra tutta la lista dei commenti di un’immagine</a:t>
             </a:r>
           </a:p>
           <a:p>
             <a:pPr marL="1085850" lvl="2" indent="-171450"/>
             <a:r>
+              <a:rPr lang="it-IT" sz="1200" b="1" dirty="0" err="1"/>
+              <a:t>addNewComment</a:t>
+            </a:r>
+            <a:r>
               <a:rPr lang="it-IT" sz="1200" dirty="0"/>
-              <a:t>reset(): imposta le condizioni di iniziali visibilità dei vari sotto-componenti </a:t>
-            </a:r>
-          </a:p>
-          <a:p>
-            <a:pPr marL="742950" lvl="1" indent="-285750"/>
-            <a:r>
-              <a:rPr lang="it-IT" sz="1400" dirty="0" err="1"/>
-              <a:t>AlertModal</a:t>
-            </a:r>
-            <a:endParaRPr lang="it-IT" sz="1400" dirty="0"/>
+              <a:t>(</a:t>
+            </a:r>
+            <a:r>
+              <a:rPr lang="it-IT" sz="1200" dirty="0" err="1"/>
+              <a:t>comment</a:t>
+            </a:r>
+            <a:r>
+              <a:rPr lang="it-IT" sz="1200" dirty="0"/>
+              <a:t>): aggiunge un nuovo commento da </a:t>
+            </a:r>
+            <a:r>
+              <a:rPr lang="it-IT" sz="1200" dirty="0" err="1"/>
+              <a:t>visuallizzare</a:t>
+            </a:r>
+            <a:r>
+              <a:rPr lang="it-IT" sz="1200" dirty="0"/>
+              <a:t> </a:t>
+            </a:r>
           </a:p>
           <a:p>
             <a:pPr marL="1085850" lvl="2" indent="-171450"/>
             <a:r>
+              <a:rPr lang="it-IT" sz="1200" b="1" dirty="0"/>
+              <a:t>reset</a:t>
+            </a:r>
+            <a:r>
               <a:rPr lang="it-IT" sz="1200" dirty="0"/>
-              <a:t>registerEvents():</a:t>
-            </a:r>
-          </a:p>
-          <a:p>
-            <a:pPr marL="742950" lvl="1" indent="-285750"/>
-            <a:r>
-              <a:rPr lang="it-IT" sz="1400" dirty="0" err="1"/>
-              <a:t>CloseModalWindow</a:t>
-            </a:r>
-            <a:endParaRPr lang="it-IT" sz="1400" dirty="0"/>
-          </a:p>
-          <a:p>
-            <a:pPr marL="1085850" lvl="2" indent="-171450"/>
-            <a:r>
-              <a:rPr lang="it-IT" sz="1200" dirty="0"/>
-              <a:t>registerEvents():</a:t>
+              <a:t>(): imposta le condizioni di iniziali visibilità dei vari sotto-componenti </a:t>
             </a:r>
           </a:p>
           <a:p>
@@ -11407,8 +11429,8 @@
         </p:nvSpPr>
         <p:spPr>
           <a:xfrm>
-            <a:off x="6981372" y="925308"/>
-            <a:ext cx="4086678" cy="3447098"/>
+            <a:off x="6929121" y="290048"/>
+            <a:ext cx="5062582" cy="4978799"/>
           </a:xfrm>
           <a:prstGeom prst="rect">
             <a:avLst/>
@@ -11421,120 +11443,348 @@
           </a:bodyPr>
           <a:lstStyle/>
           <a:p>
-            <a:pPr marL="742950" lvl="1" indent="-285750"/>
-            <a:r>
-              <a:rPr lang="it-IT" sz="1400" dirty="0" err="1"/>
+            <a:pPr marL="742950" lvl="1" indent="-285750">
+              <a:lnSpc>
+                <a:spcPct val="90000"/>
+              </a:lnSpc>
+              <a:spcBef>
+                <a:spcPts val="500"/>
+              </a:spcBef>
+              <a:buFont typeface="Arial" panose="020B0604020202020204" pitchFamily="34" charset="0"/>
+              <a:buChar char="•"/>
+            </a:pPr>
+            <a:r>
+              <a:rPr lang="it-IT" sz="1200" b="1" dirty="0" err="1"/>
+              <a:t>AlertModal</a:t>
+            </a:r>
+            <a:endParaRPr lang="it-IT" sz="1200" b="1" dirty="0"/>
+          </a:p>
+          <a:p>
+            <a:pPr marL="1085850" lvl="2" indent="-171450">
+              <a:lnSpc>
+                <a:spcPct val="90000"/>
+              </a:lnSpc>
+              <a:spcBef>
+                <a:spcPts val="500"/>
+              </a:spcBef>
+              <a:buFont typeface="Arial" panose="020B0604020202020204" pitchFamily="34" charset="0"/>
+              <a:buChar char="•"/>
+            </a:pPr>
+            <a:r>
+              <a:rPr lang="it-IT" sz="1200" b="1" dirty="0" err="1"/>
+              <a:t>registerEvents</a:t>
+            </a:r>
+            <a:r>
+              <a:rPr lang="it-IT" sz="1200" dirty="0"/>
+              <a:t>(): associa all’evento «click» la funzione che chiude la finestra modale dell’</a:t>
+            </a:r>
+            <a:r>
+              <a:rPr lang="it-IT" sz="1200" dirty="0" err="1"/>
+              <a:t>alert</a:t>
+            </a:r>
+            <a:r>
+              <a:rPr lang="it-IT" sz="1200" dirty="0"/>
+              <a:t>.</a:t>
+            </a:r>
+          </a:p>
+          <a:p>
+            <a:pPr marL="1085850" lvl="2" indent="-171450">
+              <a:lnSpc>
+                <a:spcPct val="90000"/>
+              </a:lnSpc>
+              <a:spcBef>
+                <a:spcPts val="500"/>
+              </a:spcBef>
+              <a:buFont typeface="Arial" panose="020B0604020202020204" pitchFamily="34" charset="0"/>
+              <a:buChar char="•"/>
+            </a:pPr>
+            <a:r>
+              <a:rPr lang="it-IT" sz="1200" b="1" dirty="0"/>
+              <a:t>Show</a:t>
+            </a:r>
+            <a:r>
+              <a:rPr lang="it-IT" sz="1200" dirty="0"/>
+              <a:t>(</a:t>
+            </a:r>
+            <a:r>
+              <a:rPr lang="it-IT" sz="1200" dirty="0" err="1"/>
+              <a:t>message</a:t>
+            </a:r>
+            <a:r>
+              <a:rPr lang="it-IT" sz="1200" dirty="0"/>
+              <a:t>): resetta l’</a:t>
+            </a:r>
+            <a:r>
+              <a:rPr lang="it-IT" sz="1200" dirty="0" err="1"/>
+              <a:t>alert</a:t>
+            </a:r>
+            <a:r>
+              <a:rPr lang="it-IT" sz="1200" dirty="0"/>
+              <a:t>, inserisce un nuovo messaggio e poi lo mostra.</a:t>
+            </a:r>
+          </a:p>
+          <a:p>
+            <a:pPr marL="1085850" lvl="2" indent="-171450">
+              <a:lnSpc>
+                <a:spcPct val="90000"/>
+              </a:lnSpc>
+              <a:spcBef>
+                <a:spcPts val="500"/>
+              </a:spcBef>
+              <a:buFont typeface="Arial" panose="020B0604020202020204" pitchFamily="34" charset="0"/>
+              <a:buChar char="•"/>
+            </a:pPr>
+            <a:r>
+              <a:rPr lang="it-IT" sz="1200" b="1" dirty="0"/>
+              <a:t>Update</a:t>
+            </a:r>
+            <a:r>
+              <a:rPr lang="it-IT" sz="1200" dirty="0"/>
+              <a:t>(</a:t>
+            </a:r>
+            <a:r>
+              <a:rPr lang="it-IT" sz="1200" dirty="0" err="1"/>
+              <a:t>message</a:t>
+            </a:r>
+            <a:r>
+              <a:rPr lang="it-IT" sz="1200" dirty="0"/>
+              <a:t>): inserisco un nuovo messaggio nell’</a:t>
+            </a:r>
+            <a:r>
+              <a:rPr lang="it-IT" sz="1200" dirty="0" err="1"/>
+              <a:t>alert</a:t>
+            </a:r>
+            <a:r>
+              <a:rPr lang="it-IT" sz="1200" dirty="0"/>
+              <a:t>.</a:t>
+            </a:r>
+          </a:p>
+          <a:p>
+            <a:pPr marL="1085850" lvl="2" indent="-171450">
+              <a:lnSpc>
+                <a:spcPct val="90000"/>
+              </a:lnSpc>
+              <a:spcBef>
+                <a:spcPts val="500"/>
+              </a:spcBef>
+              <a:buFont typeface="Arial" panose="020B0604020202020204" pitchFamily="34" charset="0"/>
+              <a:buChar char="•"/>
+            </a:pPr>
+            <a:r>
+              <a:rPr lang="it-IT" sz="1200" b="1" dirty="0"/>
+              <a:t>Reset</a:t>
+            </a:r>
+            <a:r>
+              <a:rPr lang="it-IT" sz="1200" dirty="0"/>
+              <a:t>(): svuota il contenuto html dell’</a:t>
+            </a:r>
+            <a:r>
+              <a:rPr lang="it-IT" sz="1200" dirty="0" err="1"/>
+              <a:t>alert</a:t>
+            </a:r>
+            <a:r>
+              <a:rPr lang="it-IT" sz="1200" dirty="0"/>
+              <a:t>; quindi reimposta le condizioni iniziali.</a:t>
+            </a:r>
+          </a:p>
+          <a:p>
+            <a:pPr marL="742950" lvl="1" indent="-285750">
+              <a:lnSpc>
+                <a:spcPct val="90000"/>
+              </a:lnSpc>
+              <a:spcBef>
+                <a:spcPts val="500"/>
+              </a:spcBef>
+              <a:buFont typeface="Arial" panose="020B0604020202020204" pitchFamily="34" charset="0"/>
+              <a:buChar char="•"/>
+            </a:pPr>
+            <a:r>
+              <a:rPr lang="it-IT" sz="1200" b="1" dirty="0" err="1"/>
+              <a:t>CloseModalWindow</a:t>
+            </a:r>
+            <a:endParaRPr lang="it-IT" sz="1200" b="1" dirty="0"/>
+          </a:p>
+          <a:p>
+            <a:pPr marL="1085850" lvl="2" indent="-171450">
+              <a:lnSpc>
+                <a:spcPct val="90000"/>
+              </a:lnSpc>
+              <a:spcBef>
+                <a:spcPts val="500"/>
+              </a:spcBef>
+              <a:buFont typeface="Arial" panose="020B0604020202020204" pitchFamily="34" charset="0"/>
+              <a:buChar char="•"/>
+            </a:pPr>
+            <a:r>
+              <a:rPr lang="it-IT" sz="1200" b="1" dirty="0" err="1"/>
+              <a:t>registerEvents</a:t>
+            </a:r>
+            <a:r>
+              <a:rPr lang="it-IT" sz="1200" dirty="0"/>
+              <a:t>(): associa all’evento «click» la funzione che chiude la finestra modale dell’immagine.</a:t>
+            </a:r>
+          </a:p>
+          <a:p>
+            <a:pPr marL="742950" lvl="1" indent="-285750">
+              <a:lnSpc>
+                <a:spcPct val="90000"/>
+              </a:lnSpc>
+              <a:spcBef>
+                <a:spcPts val="500"/>
+              </a:spcBef>
+              <a:buFont typeface="Arial" panose="020B0604020202020204" pitchFamily="34" charset="0"/>
+              <a:buChar char="•"/>
+            </a:pPr>
+            <a:r>
+              <a:rPr lang="it-IT" sz="1200" b="1" dirty="0" err="1"/>
               <a:t>CommentForm</a:t>
             </a:r>
-            <a:endParaRPr lang="it-IT" sz="1400" dirty="0"/>
-          </a:p>
-          <a:p>
-            <a:pPr marL="1085850" lvl="2" indent="-171450"/>
+            <a:endParaRPr lang="it-IT" sz="1200" b="1" dirty="0"/>
+          </a:p>
+          <a:p>
+            <a:pPr marL="1085850" lvl="2" indent="-171450">
+              <a:lnSpc>
+                <a:spcPct val="90000"/>
+              </a:lnSpc>
+              <a:spcBef>
+                <a:spcPts val="500"/>
+              </a:spcBef>
+              <a:buFont typeface="Arial" panose="020B0604020202020204" pitchFamily="34" charset="0"/>
+              <a:buChar char="•"/>
+            </a:pPr>
+            <a:r>
+              <a:rPr lang="it-IT" sz="1200" b="1" dirty="0" err="1"/>
+              <a:t>registerEvents</a:t>
+            </a:r>
+            <a:r>
+              <a:rPr lang="it-IT" sz="1200" dirty="0"/>
+              <a:t>(): associa all’evento «click» la funzione che richiede al server di creare un nuovo commento nel database con i dovuti controlli.</a:t>
+            </a:r>
+          </a:p>
+          <a:p>
+            <a:pPr marL="1085850" lvl="2" indent="-171450">
+              <a:lnSpc>
+                <a:spcPct val="90000"/>
+              </a:lnSpc>
+              <a:spcBef>
+                <a:spcPts val="500"/>
+              </a:spcBef>
+              <a:buFont typeface="Arial" panose="020B0604020202020204" pitchFamily="34" charset="0"/>
+              <a:buChar char="•"/>
+            </a:pPr>
+            <a:r>
+              <a:rPr lang="it-IT" sz="1200" b="1" dirty="0"/>
+              <a:t>Reset</a:t>
+            </a:r>
+            <a:r>
+              <a:rPr lang="it-IT" sz="1200" dirty="0"/>
+              <a:t>(): svuota il contenuto html della </a:t>
+            </a:r>
+            <a:r>
+              <a:rPr lang="it-IT" sz="1200" dirty="0" err="1"/>
+              <a:t>form</a:t>
+            </a:r>
+            <a:r>
+              <a:rPr lang="it-IT" sz="1200" dirty="0"/>
+              <a:t> e imposta le condizioni iniziali di visibilità dei vari sotto-componenti. </a:t>
+            </a:r>
+          </a:p>
+          <a:p>
+            <a:pPr marL="1085850" lvl="2" indent="-171450">
+              <a:lnSpc>
+                <a:spcPct val="90000"/>
+              </a:lnSpc>
+              <a:spcBef>
+                <a:spcPts val="500"/>
+              </a:spcBef>
+              <a:buFont typeface="Arial" panose="020B0604020202020204" pitchFamily="34" charset="0"/>
+              <a:buChar char="•"/>
+            </a:pPr>
+            <a:r>
+              <a:rPr lang="it-IT" sz="1200" b="1" dirty="0"/>
+              <a:t>Show</a:t>
+            </a:r>
+            <a:r>
+              <a:rPr lang="it-IT" sz="1200" dirty="0"/>
+              <a:t>(): se l’utente è loggato mostra la </a:t>
+            </a:r>
+            <a:r>
+              <a:rPr lang="it-IT" sz="1200" dirty="0" err="1"/>
+              <a:t>form</a:t>
+            </a:r>
+            <a:r>
+              <a:rPr lang="it-IT" sz="1200" dirty="0"/>
+              <a:t> per inserire un nuovo commento in caso contrario il bottone per loggarsi prima di commentare.</a:t>
+            </a:r>
+          </a:p>
+          <a:p>
+            <a:pPr marL="742950" lvl="1" indent="-285750">
+              <a:lnSpc>
+                <a:spcPct val="90000"/>
+              </a:lnSpc>
+              <a:spcBef>
+                <a:spcPts val="500"/>
+              </a:spcBef>
+              <a:buFont typeface="Arial" panose="020B0604020202020204" pitchFamily="34" charset="0"/>
+              <a:buChar char="•"/>
+            </a:pPr>
+            <a:r>
+              <a:rPr lang="it-IT" sz="1200" b="1" dirty="0" err="1"/>
+              <a:t>LoginButton</a:t>
+            </a:r>
+            <a:endParaRPr lang="it-IT" sz="1200" b="1" dirty="0"/>
+          </a:p>
+          <a:p>
+            <a:pPr marL="1085850" lvl="2" indent="-171450">
+              <a:lnSpc>
+                <a:spcPct val="90000"/>
+              </a:lnSpc>
+              <a:spcBef>
+                <a:spcPts val="500"/>
+              </a:spcBef>
+              <a:buFont typeface="Arial" panose="020B0604020202020204" pitchFamily="34" charset="0"/>
+              <a:buChar char="•"/>
+            </a:pPr>
             <a:r>
               <a:rPr lang="it-IT" sz="1200" dirty="0"/>
               <a:t>registerEvents():</a:t>
             </a:r>
           </a:p>
           <a:p>
-            <a:pPr marL="742950" lvl="1" indent="-285750"/>
-            <a:r>
-              <a:rPr lang="it-IT" sz="1400" dirty="0" err="1"/>
-              <a:t>LoginButton</a:t>
-            </a:r>
-            <a:endParaRPr lang="it-IT" sz="1400" dirty="0"/>
-          </a:p>
-          <a:p>
-            <a:pPr marL="1085850" lvl="2" indent="-171450"/>
+            <a:pPr marL="742950" lvl="1" indent="-285750">
+              <a:lnSpc>
+                <a:spcPct val="90000"/>
+              </a:lnSpc>
+              <a:spcBef>
+                <a:spcPts val="500"/>
+              </a:spcBef>
+              <a:buFont typeface="Arial" panose="020B0604020202020204" pitchFamily="34" charset="0"/>
+              <a:buChar char="•"/>
+            </a:pPr>
+            <a:r>
+              <a:rPr lang="it-IT" sz="1200" b="1" dirty="0" err="1"/>
+              <a:t>LogoutButton</a:t>
+            </a:r>
+            <a:endParaRPr lang="it-IT" sz="1200" b="1" dirty="0"/>
+          </a:p>
+          <a:p>
+            <a:pPr marL="1085850" lvl="2" indent="-171450">
+              <a:lnSpc>
+                <a:spcPct val="90000"/>
+              </a:lnSpc>
+              <a:spcBef>
+                <a:spcPts val="500"/>
+              </a:spcBef>
+              <a:buFont typeface="Arial" panose="020B0604020202020204" pitchFamily="34" charset="0"/>
+              <a:buChar char="•"/>
+            </a:pPr>
+            <a:r>
+              <a:rPr lang="it-IT" sz="1200" dirty="0" err="1"/>
+              <a:t>registerEvents</a:t>
+            </a:r>
             <a:r>
               <a:rPr lang="it-IT" sz="1200" dirty="0"/>
-              <a:t>registerEvents():</a:t>
-            </a:r>
-          </a:p>
-          <a:p>
-            <a:pPr marL="742950" lvl="1" indent="-285750"/>
-            <a:r>
-              <a:rPr lang="it-IT" sz="1400" dirty="0" err="1"/>
-              <a:t>LogoutButton</a:t>
-            </a:r>
-            <a:endParaRPr lang="it-IT" sz="1400" dirty="0"/>
-          </a:p>
-          <a:p>
-            <a:pPr marL="1085850" lvl="2" indent="-171450"/>
-            <a:r>
-              <a:rPr lang="it-IT" sz="1200" dirty="0"/>
-              <a:t>registerEvents():</a:t>
-            </a:r>
-          </a:p>
-          <a:p>
-            <a:pPr marL="742950" lvl="1" indent="-285750"/>
-            <a:r>
-              <a:rPr lang="it-IT" sz="1400" dirty="0" err="1"/>
-              <a:t>NextButton</a:t>
-            </a:r>
-            <a:endParaRPr lang="it-IT" sz="1400" dirty="0"/>
-          </a:p>
-          <a:p>
-            <a:pPr marL="1085850" lvl="2" indent="-171450"/>
-            <a:r>
-              <a:rPr lang="it-IT" sz="1200" dirty="0"/>
-              <a:t>registerEvents():</a:t>
-            </a:r>
-          </a:p>
-          <a:p>
-            <a:pPr marL="1085850" lvl="2" indent="-171450"/>
-            <a:endParaRPr lang="it-IT" sz="1200" dirty="0"/>
-          </a:p>
-          <a:p>
-            <a:pPr marL="742950" lvl="1" indent="-285750"/>
-            <a:r>
-              <a:rPr lang="it-IT" sz="1400" dirty="0" err="1"/>
-              <a:t>PreviousButton</a:t>
-            </a:r>
-            <a:endParaRPr lang="it-IT" sz="1400" dirty="0"/>
-          </a:p>
-          <a:p>
-            <a:pPr marL="1085850" lvl="2" indent="-171450"/>
-            <a:r>
-              <a:rPr lang="it-IT" sz="1200" dirty="0"/>
-              <a:t>registerEvents():</a:t>
-            </a:r>
-          </a:p>
-          <a:p>
-            <a:pPr marL="1085850" lvl="2" indent="-171450"/>
-            <a:endParaRPr lang="it-IT" sz="1200" dirty="0"/>
-          </a:p>
-          <a:p>
-            <a:pPr marL="742950" lvl="1" indent="-285750"/>
-            <a:r>
-              <a:rPr lang="it-IT" sz="1400" dirty="0" err="1"/>
-              <a:t>RedirectToIndex</a:t>
-            </a:r>
-            <a:endParaRPr lang="it-IT" sz="1400" dirty="0"/>
-          </a:p>
-          <a:p>
-            <a:pPr marL="1085850" lvl="2" indent="-171450"/>
-            <a:r>
-              <a:rPr lang="it-IT" sz="1200" dirty="0"/>
-              <a:t>registerEvents():</a:t>
-            </a:r>
-          </a:p>
-          <a:p>
-            <a:pPr marL="1085850" lvl="2" indent="-171450"/>
-            <a:endParaRPr lang="it-IT" sz="1200" dirty="0"/>
-          </a:p>
-          <a:p>
-            <a:pPr marL="742950" lvl="1" indent="-285750"/>
-            <a:r>
-              <a:rPr lang="it-IT" sz="1400" dirty="0" err="1"/>
-              <a:t>SaveOrderButton</a:t>
-            </a:r>
-            <a:endParaRPr lang="it-IT" sz="1400" dirty="0"/>
-          </a:p>
-          <a:p>
-            <a:pPr marL="1085850" lvl="2" indent="-171450"/>
-            <a:r>
-              <a:rPr lang="it-IT" sz="1200" dirty="0"/>
-              <a:t>registerEvents():</a:t>
+              <a:t>():</a:t>
             </a:r>
           </a:p>
         </p:txBody>
@@ -11553,6 +11803,320 @@
 </file>
 
 <file path=ppt/slides/slide7.xml><?xml version="1.0" encoding="utf-8"?>
+<p:sld xmlns:a="http://schemas.openxmlformats.org/drawingml/2006/main" xmlns:r="http://schemas.openxmlformats.org/officeDocument/2006/relationships" xmlns:p="http://schemas.openxmlformats.org/presentationml/2006/main">
+  <p:cSld>
+    <p:spTree>
+      <p:nvGrpSpPr>
+        <p:cNvPr id="1" name=""/>
+        <p:cNvGrpSpPr/>
+        <p:nvPr/>
+      </p:nvGrpSpPr>
+      <p:grpSpPr>
+        <a:xfrm>
+          <a:off x="0" y="0"/>
+          <a:ext cx="0" cy="0"/>
+          <a:chOff x="0" y="0"/>
+          <a:chExt cx="0" cy="0"/>
+        </a:xfrm>
+      </p:grpSpPr>
+      <p:sp>
+        <p:nvSpPr>
+          <p:cNvPr id="6" name="CasellaDiTesto 5">
+            <a:extLst>
+              <a:ext uri="{FF2B5EF4-FFF2-40B4-BE49-F238E27FC236}">
+                <a16:creationId xmlns:a16="http://schemas.microsoft.com/office/drawing/2014/main" id="{DCAD7AFC-16ED-4FBA-9117-28CE46A3366E}"/>
+              </a:ext>
+            </a:extLst>
+          </p:cNvPr>
+          <p:cNvSpPr txBox="1"/>
+          <p:nvPr/>
+        </p:nvSpPr>
+        <p:spPr>
+          <a:xfrm>
+            <a:off x="121920" y="323641"/>
+            <a:ext cx="6096000" cy="3585084"/>
+          </a:xfrm>
+          <a:prstGeom prst="rect">
+            <a:avLst/>
+          </a:prstGeom>
+          <a:noFill/>
+        </p:spPr>
+        <p:txBody>
+          <a:bodyPr wrap="square">
+            <a:spAutoFit/>
+          </a:bodyPr>
+          <a:lstStyle/>
+          <a:p>
+            <a:pPr marL="742950" lvl="1" indent="-285750">
+              <a:lnSpc>
+                <a:spcPct val="90000"/>
+              </a:lnSpc>
+              <a:spcBef>
+                <a:spcPts val="500"/>
+              </a:spcBef>
+              <a:buFont typeface="Arial" panose="020B0604020202020204" pitchFamily="34" charset="0"/>
+              <a:buChar char="•"/>
+            </a:pPr>
+            <a:r>
+              <a:rPr lang="it-IT" sz="1200" b="1" dirty="0" err="1"/>
+              <a:t>NextButton</a:t>
+            </a:r>
+            <a:endParaRPr lang="it-IT" sz="1200" b="1" dirty="0"/>
+          </a:p>
+          <a:p>
+            <a:pPr marL="1085850" lvl="2" indent="-171450">
+              <a:lnSpc>
+                <a:spcPct val="90000"/>
+              </a:lnSpc>
+              <a:spcBef>
+                <a:spcPts val="500"/>
+              </a:spcBef>
+              <a:buFont typeface="Arial" panose="020B0604020202020204" pitchFamily="34" charset="0"/>
+              <a:buChar char="•"/>
+            </a:pPr>
+            <a:r>
+              <a:rPr lang="it-IT" sz="1200" dirty="0" err="1"/>
+              <a:t>registerEvents</a:t>
+            </a:r>
+            <a:r>
+              <a:rPr lang="it-IT" sz="1200" dirty="0"/>
+              <a:t>():</a:t>
+            </a:r>
+          </a:p>
+          <a:p>
+            <a:pPr marL="1085850" lvl="2" indent="-171450">
+              <a:lnSpc>
+                <a:spcPct val="90000"/>
+              </a:lnSpc>
+              <a:spcBef>
+                <a:spcPts val="500"/>
+              </a:spcBef>
+              <a:buFont typeface="Arial" panose="020B0604020202020204" pitchFamily="34" charset="0"/>
+              <a:buChar char="•"/>
+            </a:pPr>
+            <a:endParaRPr lang="it-IT" sz="1200" dirty="0"/>
+          </a:p>
+          <a:p>
+            <a:pPr marL="742950" lvl="1" indent="-285750">
+              <a:lnSpc>
+                <a:spcPct val="90000"/>
+              </a:lnSpc>
+              <a:spcBef>
+                <a:spcPts val="500"/>
+              </a:spcBef>
+              <a:buFont typeface="Arial" panose="020B0604020202020204" pitchFamily="34" charset="0"/>
+              <a:buChar char="•"/>
+            </a:pPr>
+            <a:r>
+              <a:rPr lang="it-IT" sz="1200" b="1" dirty="0" err="1"/>
+              <a:t>PreviousButton</a:t>
+            </a:r>
+            <a:endParaRPr lang="it-IT" sz="1200" b="1" dirty="0"/>
+          </a:p>
+          <a:p>
+            <a:pPr marL="1085850" lvl="2" indent="-171450">
+              <a:lnSpc>
+                <a:spcPct val="90000"/>
+              </a:lnSpc>
+              <a:spcBef>
+                <a:spcPts val="500"/>
+              </a:spcBef>
+              <a:buFont typeface="Arial" panose="020B0604020202020204" pitchFamily="34" charset="0"/>
+              <a:buChar char="•"/>
+            </a:pPr>
+            <a:r>
+              <a:rPr lang="it-IT" sz="1200" dirty="0" err="1"/>
+              <a:t>registerEvents</a:t>
+            </a:r>
+            <a:r>
+              <a:rPr lang="it-IT" sz="1200" dirty="0"/>
+              <a:t>():</a:t>
+            </a:r>
+          </a:p>
+          <a:p>
+            <a:pPr marL="1085850" lvl="2" indent="-171450">
+              <a:lnSpc>
+                <a:spcPct val="90000"/>
+              </a:lnSpc>
+              <a:spcBef>
+                <a:spcPts val="500"/>
+              </a:spcBef>
+              <a:buFont typeface="Arial" panose="020B0604020202020204" pitchFamily="34" charset="0"/>
+              <a:buChar char="•"/>
+            </a:pPr>
+            <a:endParaRPr lang="it-IT" sz="1200" dirty="0"/>
+          </a:p>
+          <a:p>
+            <a:pPr marL="742950" lvl="1" indent="-285750">
+              <a:lnSpc>
+                <a:spcPct val="90000"/>
+              </a:lnSpc>
+              <a:spcBef>
+                <a:spcPts val="500"/>
+              </a:spcBef>
+              <a:buFont typeface="Arial" panose="020B0604020202020204" pitchFamily="34" charset="0"/>
+              <a:buChar char="•"/>
+            </a:pPr>
+            <a:r>
+              <a:rPr lang="it-IT" sz="1200" b="1" dirty="0" err="1"/>
+              <a:t>RedirectToIndex</a:t>
+            </a:r>
+            <a:endParaRPr lang="it-IT" sz="1200" b="1" dirty="0"/>
+          </a:p>
+          <a:p>
+            <a:pPr marL="1085850" lvl="2" indent="-171450">
+              <a:lnSpc>
+                <a:spcPct val="90000"/>
+              </a:lnSpc>
+              <a:spcBef>
+                <a:spcPts val="500"/>
+              </a:spcBef>
+              <a:buFont typeface="Arial" panose="020B0604020202020204" pitchFamily="34" charset="0"/>
+              <a:buChar char="•"/>
+            </a:pPr>
+            <a:r>
+              <a:rPr lang="it-IT" sz="1200" b="1" dirty="0" err="1"/>
+              <a:t>registerEvents</a:t>
+            </a:r>
+            <a:r>
+              <a:rPr lang="it-IT" sz="1200" dirty="0"/>
+              <a:t>(): associa all’evento «click» la funzione che ti reindirizza alla pagina: «index.html».</a:t>
+            </a:r>
+          </a:p>
+          <a:p>
+            <a:pPr marL="1085850" lvl="2" indent="-171450">
+              <a:lnSpc>
+                <a:spcPct val="90000"/>
+              </a:lnSpc>
+              <a:spcBef>
+                <a:spcPts val="500"/>
+              </a:spcBef>
+              <a:buFont typeface="Arial" panose="020B0604020202020204" pitchFamily="34" charset="0"/>
+              <a:buChar char="•"/>
+            </a:pPr>
+            <a:endParaRPr lang="it-IT" sz="1200" dirty="0"/>
+          </a:p>
+          <a:p>
+            <a:pPr marL="742950" lvl="1" indent="-285750">
+              <a:lnSpc>
+                <a:spcPct val="90000"/>
+              </a:lnSpc>
+              <a:spcBef>
+                <a:spcPts val="500"/>
+              </a:spcBef>
+              <a:buFont typeface="Arial" panose="020B0604020202020204" pitchFamily="34" charset="0"/>
+              <a:buChar char="•"/>
+            </a:pPr>
+            <a:r>
+              <a:rPr lang="it-IT" sz="1200" b="1" dirty="0" err="1"/>
+              <a:t>SaveOrderButton</a:t>
+            </a:r>
+            <a:endParaRPr lang="it-IT" sz="1200" b="1" dirty="0"/>
+          </a:p>
+          <a:p>
+            <a:pPr marL="1085850" lvl="2" indent="-171450">
+              <a:lnSpc>
+                <a:spcPct val="90000"/>
+              </a:lnSpc>
+              <a:spcBef>
+                <a:spcPts val="500"/>
+              </a:spcBef>
+              <a:buFont typeface="Arial" panose="020B0604020202020204" pitchFamily="34" charset="0"/>
+              <a:buChar char="•"/>
+            </a:pPr>
+            <a:r>
+              <a:rPr lang="it-IT" sz="1200" b="1" dirty="0" err="1"/>
+              <a:t>registerEvents</a:t>
+            </a:r>
+            <a:r>
+              <a:rPr lang="it-IT" sz="1200" dirty="0"/>
+              <a:t>(): associa all’evento «click» la funzione che invoca </a:t>
+            </a:r>
+            <a:r>
+              <a:rPr lang="it-IT" sz="1200" dirty="0" err="1"/>
+              <a:t>saveOrder</a:t>
+            </a:r>
+            <a:r>
+              <a:rPr lang="it-IT" sz="1200" dirty="0"/>
+              <a:t>().</a:t>
+            </a:r>
+          </a:p>
+          <a:p>
+            <a:pPr marL="1085850" lvl="2" indent="-171450">
+              <a:lnSpc>
+                <a:spcPct val="90000"/>
+              </a:lnSpc>
+              <a:spcBef>
+                <a:spcPts val="500"/>
+              </a:spcBef>
+              <a:buFont typeface="Arial" panose="020B0604020202020204" pitchFamily="34" charset="0"/>
+              <a:buChar char="•"/>
+            </a:pPr>
+            <a:r>
+              <a:rPr lang="it-IT" sz="1200" b="1" dirty="0"/>
+              <a:t>Show</a:t>
+            </a:r>
+            <a:r>
+              <a:rPr lang="it-IT" sz="1200" dirty="0"/>
+              <a:t>(): mostra il bottone</a:t>
+            </a:r>
+          </a:p>
+          <a:p>
+            <a:pPr marL="1085850" lvl="2" indent="-171450">
+              <a:lnSpc>
+                <a:spcPct val="90000"/>
+              </a:lnSpc>
+              <a:spcBef>
+                <a:spcPts val="500"/>
+              </a:spcBef>
+              <a:buFont typeface="Arial" panose="020B0604020202020204" pitchFamily="34" charset="0"/>
+              <a:buChar char="•"/>
+            </a:pPr>
+            <a:r>
+              <a:rPr lang="it-IT" sz="1200" b="1" dirty="0"/>
+              <a:t>Reset</a:t>
+            </a:r>
+            <a:r>
+              <a:rPr lang="it-IT" sz="1200" dirty="0"/>
+              <a:t>(): nasconde il bottone</a:t>
+            </a:r>
+          </a:p>
+          <a:p>
+            <a:pPr marL="1085850" lvl="2" indent="-171450">
+              <a:lnSpc>
+                <a:spcPct val="90000"/>
+              </a:lnSpc>
+              <a:spcBef>
+                <a:spcPts val="500"/>
+              </a:spcBef>
+              <a:buFont typeface="Arial" panose="020B0604020202020204" pitchFamily="34" charset="0"/>
+              <a:buChar char="•"/>
+            </a:pPr>
+            <a:r>
+              <a:rPr lang="it-IT" sz="1200" b="1" dirty="0" err="1"/>
+              <a:t>saveOrder</a:t>
+            </a:r>
+            <a:r>
+              <a:rPr lang="it-IT" sz="1200" dirty="0"/>
+              <a:t>(): richiede al server di salvare la nuova preferenza di album dell’utente.</a:t>
+            </a:r>
+          </a:p>
+        </p:txBody>
+      </p:sp>
+    </p:spTree>
+    <p:extLst>
+      <p:ext uri="{BB962C8B-B14F-4D97-AF65-F5344CB8AC3E}">
+        <p14:creationId xmlns:p14="http://schemas.microsoft.com/office/powerpoint/2010/main" val="4086008659"/>
+      </p:ext>
+    </p:extLst>
+  </p:cSld>
+  <p:clrMapOvr>
+    <a:masterClrMapping/>
+  </p:clrMapOvr>
+</p:sld>
+</file>
+
+<file path=ppt/slides/slide8.xml><?xml version="1.0" encoding="utf-8"?>
 <p:sld xmlns:a="http://schemas.openxmlformats.org/drawingml/2006/main" xmlns:r="http://schemas.openxmlformats.org/officeDocument/2006/relationships" xmlns:p="http://schemas.openxmlformats.org/presentationml/2006/main">
   <p:cSld>
     <p:spTree>
@@ -12906,7 +13470,7 @@
 </p:sld>
 </file>
 
-<file path=ppt/slides/slide8.xml><?xml version="1.0" encoding="utf-8"?>
+<file path=ppt/slides/slide9.xml><?xml version="1.0" encoding="utf-8"?>
 <p:sld xmlns:a="http://schemas.openxmlformats.org/drawingml/2006/main" xmlns:r="http://schemas.openxmlformats.org/officeDocument/2006/relationships" xmlns:p="http://schemas.openxmlformats.org/presentationml/2006/main">
   <p:cSld>
     <p:spTree>

</xml_diff>

<commit_message>
Delay on "mouse Enter/Leave" re-added control on session client side and pptx ria
</commit_message>
<xml_diff>
--- a/Presentazioni Powerpoint/Progetto1_versione_RIA.pptx
+++ b/Presentazioni Powerpoint/Progetto1_versione_RIA.pptx
@@ -212,7 +212,7 @@
           <a:p>
             <a:fld id="{C25F5A86-D4B2-4CFB-9FC8-FAE097577B12}" type="datetimeFigureOut">
               <a:rPr lang="it-IT" smtClean="0"/>
-              <a:t>05/09/2020</a:t>
+              <a:t>06/09/2020</a:t>
             </a:fld>
             <a:endParaRPr lang="it-IT" dirty="0"/>
           </a:p>
@@ -1114,7 +1114,7 @@
               </a:spcAft>
               <a:buNone/>
             </a:pPr>
-            <a:endParaRPr/>
+            <a:endParaRPr dirty="0"/>
           </a:p>
         </p:txBody>
       </p:sp>
@@ -1314,7 +1314,7 @@
           <a:p>
             <a:fld id="{FE1EE28F-F736-456D-A3C7-4F5EC37410C2}" type="datetimeFigureOut">
               <a:rPr lang="it-IT" smtClean="0"/>
-              <a:t>05/09/2020</a:t>
+              <a:t>06/09/2020</a:t>
             </a:fld>
             <a:endParaRPr lang="it-IT" dirty="0"/>
           </a:p>
@@ -1512,7 +1512,7 @@
           <a:p>
             <a:fld id="{FE1EE28F-F736-456D-A3C7-4F5EC37410C2}" type="datetimeFigureOut">
               <a:rPr lang="it-IT" smtClean="0"/>
-              <a:t>05/09/2020</a:t>
+              <a:t>06/09/2020</a:t>
             </a:fld>
             <a:endParaRPr lang="it-IT" dirty="0"/>
           </a:p>
@@ -1720,7 +1720,7 @@
           <a:p>
             <a:fld id="{FE1EE28F-F736-456D-A3C7-4F5EC37410C2}" type="datetimeFigureOut">
               <a:rPr lang="it-IT" smtClean="0"/>
-              <a:t>05/09/2020</a:t>
+              <a:t>06/09/2020</a:t>
             </a:fld>
             <a:endParaRPr lang="it-IT" dirty="0"/>
           </a:p>
@@ -1918,7 +1918,7 @@
           <a:p>
             <a:fld id="{FE1EE28F-F736-456D-A3C7-4F5EC37410C2}" type="datetimeFigureOut">
               <a:rPr lang="it-IT" smtClean="0"/>
-              <a:t>05/09/2020</a:t>
+              <a:t>06/09/2020</a:t>
             </a:fld>
             <a:endParaRPr lang="it-IT" dirty="0"/>
           </a:p>
@@ -2193,7 +2193,7 @@
           <a:p>
             <a:fld id="{FE1EE28F-F736-456D-A3C7-4F5EC37410C2}" type="datetimeFigureOut">
               <a:rPr lang="it-IT" smtClean="0"/>
-              <a:t>05/09/2020</a:t>
+              <a:t>06/09/2020</a:t>
             </a:fld>
             <a:endParaRPr lang="it-IT" dirty="0"/>
           </a:p>
@@ -2458,7 +2458,7 @@
           <a:p>
             <a:fld id="{FE1EE28F-F736-456D-A3C7-4F5EC37410C2}" type="datetimeFigureOut">
               <a:rPr lang="it-IT" smtClean="0"/>
-              <a:t>05/09/2020</a:t>
+              <a:t>06/09/2020</a:t>
             </a:fld>
             <a:endParaRPr lang="it-IT" dirty="0"/>
           </a:p>
@@ -2870,7 +2870,7 @@
           <a:p>
             <a:fld id="{FE1EE28F-F736-456D-A3C7-4F5EC37410C2}" type="datetimeFigureOut">
               <a:rPr lang="it-IT" smtClean="0"/>
-              <a:t>05/09/2020</a:t>
+              <a:t>06/09/2020</a:t>
             </a:fld>
             <a:endParaRPr lang="it-IT" dirty="0"/>
           </a:p>
@@ -3011,7 +3011,7 @@
           <a:p>
             <a:fld id="{FE1EE28F-F736-456D-A3C7-4F5EC37410C2}" type="datetimeFigureOut">
               <a:rPr lang="it-IT" smtClean="0"/>
-              <a:t>05/09/2020</a:t>
+              <a:t>06/09/2020</a:t>
             </a:fld>
             <a:endParaRPr lang="it-IT" dirty="0"/>
           </a:p>
@@ -3124,7 +3124,7 @@
           <a:p>
             <a:fld id="{FE1EE28F-F736-456D-A3C7-4F5EC37410C2}" type="datetimeFigureOut">
               <a:rPr lang="it-IT" smtClean="0"/>
-              <a:t>05/09/2020</a:t>
+              <a:t>06/09/2020</a:t>
             </a:fld>
             <a:endParaRPr lang="it-IT" dirty="0"/>
           </a:p>
@@ -3435,7 +3435,7 @@
           <a:p>
             <a:fld id="{FE1EE28F-F736-456D-A3C7-4F5EC37410C2}" type="datetimeFigureOut">
               <a:rPr lang="it-IT" smtClean="0"/>
-              <a:t>05/09/2020</a:t>
+              <a:t>06/09/2020</a:t>
             </a:fld>
             <a:endParaRPr lang="it-IT" dirty="0"/>
           </a:p>
@@ -3723,7 +3723,7 @@
           <a:p>
             <a:fld id="{FE1EE28F-F736-456D-A3C7-4F5EC37410C2}" type="datetimeFigureOut">
               <a:rPr lang="it-IT" smtClean="0"/>
-              <a:t>05/09/2020</a:t>
+              <a:t>06/09/2020</a:t>
             </a:fld>
             <a:endParaRPr lang="it-IT" dirty="0"/>
           </a:p>
@@ -3964,7 +3964,7 @@
           <a:p>
             <a:fld id="{FE1EE28F-F736-456D-A3C7-4F5EC37410C2}" type="datetimeFigureOut">
               <a:rPr lang="it-IT" smtClean="0"/>
-              <a:t>05/09/2020</a:t>
+              <a:t>06/09/2020</a:t>
             </a:fld>
             <a:endParaRPr lang="it-IT" dirty="0"/>
           </a:p>
@@ -7189,7 +7189,7 @@
           <a:p>
             <a:pPr algn="ctr"/>
             <a:r>
-              <a:rPr lang="es-419" sz="1200" dirty="0">
+              <a:rPr lang="es-419" sz="1400" dirty="0">
                 <a:solidFill>
                   <a:schemeClr val="dk1"/>
                 </a:solidFill>
@@ -7200,7 +7200,7 @@
               </a:rPr>
               <a:t>CheckLogin</a:t>
             </a:r>
-            <a:endParaRPr sz="1200" dirty="0">
+            <a:endParaRPr sz="1400" dirty="0">
               <a:solidFill>
                 <a:schemeClr val="dk1"/>
               </a:solidFill>
@@ -7365,7 +7365,7 @@
           <a:p>
             <a:pPr algn="ctr"/>
             <a:r>
-              <a:rPr lang="es-419" sz="1200" dirty="0">
+              <a:rPr lang="es-419" sz="1400" dirty="0">
                 <a:solidFill>
                   <a:schemeClr val="dk1"/>
                 </a:solidFill>
@@ -7376,7 +7376,7 @@
               </a:rPr>
               <a:t>UserDAO</a:t>
             </a:r>
-            <a:endParaRPr sz="1200" dirty="0">
+            <a:endParaRPr sz="1400" dirty="0">
               <a:solidFill>
                 <a:schemeClr val="dk1"/>
               </a:solidFill>
@@ -7557,7 +7557,7 @@
           <a:p>
             <a:pPr algn="ctr"/>
             <a:r>
-              <a:rPr lang="es-419" sz="1200" dirty="0">
+              <a:rPr lang="es-419" sz="1400" dirty="0">
                 <a:solidFill>
                   <a:schemeClr val="dk1"/>
                 </a:solidFill>
@@ -7568,7 +7568,7 @@
               </a:rPr>
               <a:t>Session</a:t>
             </a:r>
-            <a:endParaRPr sz="1200" dirty="0">
+            <a:endParaRPr sz="1400" dirty="0">
               <a:solidFill>
                 <a:schemeClr val="dk1"/>
               </a:solidFill>
@@ -8263,7 +8263,7 @@
         <p:spPr>
           <a:xfrm>
             <a:off x="8660396" y="1136084"/>
-            <a:ext cx="808868" cy="369200"/>
+            <a:ext cx="898232" cy="369200"/>
           </a:xfrm>
           <a:prstGeom prst="rect">
             <a:avLst/>
@@ -8289,7 +8289,7 @@
           <a:p>
             <a:pPr algn="ctr"/>
             <a:r>
-              <a:rPr lang="es-419" sz="1200" dirty="0">
+              <a:rPr lang="es-419" sz="1400" dirty="0">
                 <a:solidFill>
                   <a:schemeClr val="dk1"/>
                 </a:solidFill>
@@ -8300,7 +8300,7 @@
               </a:rPr>
               <a:t>Window</a:t>
             </a:r>
-            <a:endParaRPr sz="1200" dirty="0">
+            <a:endParaRPr sz="1400" dirty="0">
               <a:solidFill>
                 <a:schemeClr val="dk1"/>
               </a:solidFill>
@@ -8320,8 +8320,8 @@
         </p:nvSpPr>
         <p:spPr>
           <a:xfrm>
-            <a:off x="657693" y="994996"/>
-            <a:ext cx="1675536" cy="651379"/>
+            <a:off x="657692" y="994996"/>
+            <a:ext cx="1789951" cy="651379"/>
           </a:xfrm>
           <a:prstGeom prst="rect">
             <a:avLst/>
@@ -8347,7 +8347,7 @@
           <a:p>
             <a:pPr algn="ctr"/>
             <a:r>
-              <a:rPr lang="es-419" sz="1200" dirty="0">
+              <a:rPr lang="es-419" sz="1400" dirty="0">
                 <a:solidFill>
                   <a:schemeClr val="dk1"/>
                 </a:solidFill>
@@ -8358,7 +8358,7 @@
               </a:rPr>
               <a:t>index.html + indexManagement.js</a:t>
             </a:r>
-            <a:endParaRPr sz="1200" dirty="0">
+            <a:endParaRPr sz="1400" dirty="0">
               <a:solidFill>
                 <a:schemeClr val="dk1"/>
               </a:solidFill>
@@ -9274,7 +9274,7 @@
           <a:p>
             <a:pPr algn="ctr"/>
             <a:r>
-              <a:rPr lang="es-419" sz="1200" dirty="0">
+              <a:rPr lang="es-419" sz="1400" dirty="0">
                 <a:solidFill>
                   <a:schemeClr val="dk1"/>
                 </a:solidFill>
@@ -9285,7 +9285,7 @@
               </a:rPr>
               <a:t>Session storage</a:t>
             </a:r>
-            <a:endParaRPr sz="1200" dirty="0">
+            <a:endParaRPr sz="1400" dirty="0">
               <a:solidFill>
                 <a:schemeClr val="dk1"/>
               </a:solidFill>
@@ -9688,8 +9688,8 @@
         </p:nvSpPr>
         <p:spPr>
           <a:xfrm>
-            <a:off x="3812570" y="750916"/>
-            <a:ext cx="965456" cy="558842"/>
+            <a:off x="3727272" y="672535"/>
+            <a:ext cx="1129135" cy="558842"/>
           </a:xfrm>
           <a:prstGeom prst="rect">
             <a:avLst/>
@@ -9718,7 +9718,7 @@
           <a:p>
             <a:pPr algn="ctr"/>
             <a:r>
-              <a:rPr lang="es-419" sz="1200" dirty="0">
+              <a:rPr lang="es-419" sz="1400" dirty="0">
                 <a:solidFill>
                   <a:schemeClr val="dk1"/>
                 </a:solidFill>
@@ -9729,7 +9729,7 @@
               </a:rPr>
               <a:t>Registration</a:t>
             </a:r>
-            <a:endParaRPr sz="1200" dirty="0">
+            <a:endParaRPr sz="1400" dirty="0">
               <a:solidFill>
                 <a:schemeClr val="dk1"/>
               </a:solidFill>
@@ -9752,8 +9752,8 @@
         </p:nvCxnSpPr>
         <p:spPr>
           <a:xfrm flipH="1">
-            <a:off x="4271252" y="1309758"/>
-            <a:ext cx="24046" cy="4254510"/>
+            <a:off x="4274964" y="1231377"/>
+            <a:ext cx="16876" cy="5433942"/>
           </a:xfrm>
           <a:prstGeom prst="straightConnector1">
             <a:avLst/>
@@ -9964,8 +9964,8 @@
         </p:nvSpPr>
         <p:spPr>
           <a:xfrm>
-            <a:off x="7199829" y="782587"/>
-            <a:ext cx="1319500" cy="381200"/>
+            <a:off x="7191120" y="704649"/>
+            <a:ext cx="1319500" cy="563390"/>
           </a:xfrm>
           <a:prstGeom prst="rect">
             <a:avLst/>
@@ -9994,7 +9994,7 @@
           <a:p>
             <a:pPr algn="ctr"/>
             <a:r>
-              <a:rPr lang="es-419" sz="1200" dirty="0">
+              <a:rPr lang="es-419" sz="1400" dirty="0">
                 <a:solidFill>
                   <a:schemeClr val="dk1"/>
                 </a:solidFill>
@@ -10005,7 +10005,7 @@
               </a:rPr>
               <a:t>UserDAO</a:t>
             </a:r>
-            <a:endParaRPr sz="1200" dirty="0">
+            <a:endParaRPr sz="1400" dirty="0">
               <a:solidFill>
                 <a:schemeClr val="dk1"/>
               </a:solidFill>
@@ -10193,8 +10193,8 @@
         </p:nvSpPr>
         <p:spPr>
           <a:xfrm>
-            <a:off x="8824724" y="726785"/>
-            <a:ext cx="1319500" cy="634400"/>
+            <a:off x="8824723" y="674531"/>
+            <a:ext cx="1555893" cy="634400"/>
           </a:xfrm>
           <a:prstGeom prst="rect">
             <a:avLst/>
@@ -10224,7 +10224,7 @@
               </a:buClr>
             </a:pPr>
             <a:r>
-              <a:rPr lang="es-419" sz="1200" dirty="0">
+              <a:rPr lang="es-419" sz="1400" dirty="0">
                 <a:solidFill>
                   <a:schemeClr val="dk1"/>
                 </a:solidFill>
@@ -10248,7 +10248,7 @@
         </p:nvCxnSpPr>
         <p:spPr>
           <a:xfrm>
-            <a:off x="9515006" y="1383321"/>
+            <a:off x="9619512" y="1383321"/>
             <a:ext cx="19226" cy="5360379"/>
           </a:xfrm>
           <a:prstGeom prst="straightConnector1">
@@ -10281,7 +10281,7 @@
         </p:nvSpPr>
         <p:spPr>
           <a:xfrm>
-            <a:off x="9359519" y="5229608"/>
+            <a:off x="9481443" y="5229608"/>
             <a:ext cx="330200" cy="1161688"/>
           </a:xfrm>
           <a:prstGeom prst="rect">
@@ -10389,7 +10389,7 @@
           <a:p>
             <a:pPr algn="ctr"/>
             <a:r>
-              <a:rPr lang="es-419" sz="1200" dirty="0">
+              <a:rPr lang="es-419" sz="1400" dirty="0">
                 <a:solidFill>
                   <a:schemeClr val="dk1"/>
                 </a:solidFill>
@@ -10400,7 +10400,7 @@
               </a:rPr>
               <a:t>Index.html</a:t>
             </a:r>
-            <a:endParaRPr sz="1200" dirty="0">
+            <a:endParaRPr sz="1400" dirty="0">
               <a:solidFill>
                 <a:schemeClr val="dk1"/>
               </a:solidFill>
@@ -11666,8 +11666,8 @@
         </p:nvCxnSpPr>
         <p:spPr>
           <a:xfrm flipV="1">
-            <a:off x="1511017" y="6172190"/>
-            <a:ext cx="7766333" cy="48128"/>
+            <a:off x="1511017" y="6172191"/>
+            <a:ext cx="7868114" cy="48127"/>
           </a:xfrm>
           <a:prstGeom prst="straightConnector1">
             <a:avLst/>
@@ -15572,8 +15572,8 @@
         </p:nvSpPr>
         <p:spPr>
           <a:xfrm>
-            <a:off x="1726767" y="731371"/>
-            <a:ext cx="650933" cy="651379"/>
+            <a:off x="1639453" y="731371"/>
+            <a:ext cx="860173" cy="651379"/>
           </a:xfrm>
           <a:prstGeom prst="rect">
             <a:avLst/>
@@ -15599,7 +15599,7 @@
           <a:p>
             <a:pPr algn="ctr"/>
             <a:r>
-              <a:rPr lang="es-419" sz="1200" dirty="0">
+              <a:rPr lang="es-419" sz="1400" dirty="0">
                 <a:solidFill>
                   <a:schemeClr val="dk1"/>
                 </a:solidFill>
@@ -15610,7 +15610,7 @@
               </a:rPr>
               <a:t>Album List</a:t>
             </a:r>
-            <a:endParaRPr sz="1200" dirty="0">
+            <a:endParaRPr sz="1400" dirty="0">
               <a:solidFill>
                 <a:schemeClr val="dk1"/>
               </a:solidFill>
@@ -15963,8 +15963,8 @@
         </p:nvSpPr>
         <p:spPr>
           <a:xfrm>
-            <a:off x="3248937" y="731371"/>
-            <a:ext cx="887105" cy="624557"/>
+            <a:off x="3161850" y="731371"/>
+            <a:ext cx="1160138" cy="624557"/>
           </a:xfrm>
           <a:prstGeom prst="rect">
             <a:avLst/>
@@ -16283,7 +16283,7 @@
         </p:nvSpPr>
         <p:spPr>
           <a:xfrm>
-            <a:off x="5893579" y="696417"/>
+            <a:off x="5867452" y="696417"/>
             <a:ext cx="887105" cy="624557"/>
           </a:xfrm>
           <a:prstGeom prst="rect">
@@ -16900,7 +16900,7 @@
         </p:nvSpPr>
         <p:spPr>
           <a:xfrm>
-            <a:off x="5727622" y="3549491"/>
+            <a:off x="5553448" y="3584325"/>
             <a:ext cx="839843" cy="308000"/>
           </a:xfrm>
           <a:prstGeom prst="rect">
@@ -17191,7 +17191,7 @@
         </p:nvSpPr>
         <p:spPr>
           <a:xfrm>
-            <a:off x="5757743" y="5092158"/>
+            <a:off x="5592277" y="5144412"/>
             <a:ext cx="839843" cy="308000"/>
           </a:xfrm>
           <a:prstGeom prst="rect">
@@ -17566,8 +17566,8 @@
         </p:nvSpPr>
         <p:spPr>
           <a:xfrm>
-            <a:off x="5755686" y="2126521"/>
-            <a:ext cx="1077300" cy="959569"/>
+            <a:off x="5512004" y="3415781"/>
+            <a:ext cx="1260689" cy="993087"/>
           </a:xfrm>
           <a:prstGeom prst="rect">
             <a:avLst/>
@@ -17584,7 +17584,7 @@
           <a:lstStyle/>
           <a:p>
             <a:r>
-              <a:rPr lang="es-419" sz="1200" dirty="0">
+              <a:rPr lang="es-419" sz="1400" dirty="0">
                 <a:solidFill>
                   <a:schemeClr val="dk1"/>
                 </a:solidFill>
@@ -17597,7 +17597,7 @@
             </a:r>
           </a:p>
           <a:p>
-            <a:endParaRPr lang="es-419" sz="1200" dirty="0">
+            <a:endParaRPr lang="es-419" sz="1400" dirty="0">
               <a:solidFill>
                 <a:schemeClr val="dk1"/>
               </a:solidFill>
@@ -17609,7 +17609,7 @@
           </a:p>
           <a:p>
             <a:r>
-              <a:rPr lang="es-419" sz="1200" dirty="0">
+              <a:rPr lang="es-419" sz="1400" dirty="0">
                 <a:solidFill>
                   <a:schemeClr val="dk1"/>
                 </a:solidFill>
@@ -17618,32 +17618,11 @@
                 <a:cs typeface="Calibri"/>
                 <a:sym typeface="Calibri"/>
               </a:rPr>
-              <a:t>/GetMission</a:t>
-            </a:r>
-            <a:br>
-              <a:rPr lang="es-419" sz="1200" dirty="0">
-                <a:solidFill>
-                  <a:schemeClr val="dk1"/>
-                </a:solidFill>
-                <a:latin typeface="Calibri"/>
-                <a:ea typeface="Calibri"/>
-                <a:cs typeface="Calibri"/>
-                <a:sym typeface="Calibri"/>
-              </a:rPr>
-            </a:br>
-            <a:r>
-              <a:rPr lang="es-419" sz="1200" dirty="0">
-                <a:solidFill>
-                  <a:schemeClr val="dk1"/>
-                </a:solidFill>
-                <a:latin typeface="Calibri"/>
-                <a:ea typeface="Calibri"/>
-                <a:cs typeface="Calibri"/>
-                <a:sym typeface="Calibri"/>
-              </a:rPr>
-              <a:t>Details</a:t>
-            </a:r>
-            <a:endParaRPr sz="1200" dirty="0">
+              <a:t>/GetImagesOfAlbum?albumId=“albumId</a:t>
+            </a:r>
+          </a:p>
+          <a:p>
+            <a:endParaRPr sz="1400" dirty="0">
               <a:solidFill>
                 <a:schemeClr val="dk1"/>
               </a:solidFill>
@@ -17667,8 +17646,8 @@
         </p:nvSpPr>
         <p:spPr>
           <a:xfrm>
-            <a:off x="644312" y="129486"/>
-            <a:ext cx="7306524" cy="993088"/>
+            <a:off x="568685" y="25766"/>
+            <a:ext cx="7306524" cy="555655"/>
           </a:xfrm>
           <a:prstGeom prst="rect">
             <a:avLst/>
@@ -17703,8 +17682,8 @@
         </p:nvSpPr>
         <p:spPr>
           <a:xfrm>
-            <a:off x="6458144" y="1079287"/>
-            <a:ext cx="914400" cy="662124"/>
+            <a:off x="6590493" y="636781"/>
+            <a:ext cx="1055625" cy="662124"/>
           </a:xfrm>
           <a:prstGeom prst="rect">
             <a:avLst/>
@@ -17733,7 +17712,7 @@
           <a:p>
             <a:pPr algn="ctr"/>
             <a:r>
-              <a:rPr lang="es-419" sz="1200" dirty="0">
+              <a:rPr lang="es-419" sz="1400" dirty="0">
                 <a:solidFill>
                   <a:schemeClr val="dk1"/>
                 </a:solidFill>
@@ -17742,9 +17721,9 @@
                 <a:cs typeface="Calibri"/>
                 <a:sym typeface="Calibri"/>
               </a:rPr>
-              <a:t>GetMissionsData</a:t>
-            </a:r>
-            <a:endParaRPr dirty="0">
+              <a:t>GetImagesOfAlbum</a:t>
+            </a:r>
+            <a:endParaRPr sz="2000" dirty="0">
               <a:solidFill>
                 <a:schemeClr val="dk1"/>
               </a:solidFill>
@@ -17759,13 +17738,15 @@
       <p:cxnSp>
         <p:nvCxnSpPr>
           <p:cNvPr id="311" name="Google Shape;311;p38"/>
-          <p:cNvCxnSpPr/>
+          <p:cNvCxnSpPr>
+            <a:cxnSpLocks/>
+          </p:cNvCxnSpPr>
           <p:nvPr/>
         </p:nvCxnSpPr>
         <p:spPr>
-          <a:xfrm flipH="1">
-            <a:off x="6914172" y="1804742"/>
-            <a:ext cx="1172" cy="4343600"/>
+          <a:xfrm>
+            <a:off x="7109355" y="1367383"/>
+            <a:ext cx="0" cy="5268548"/>
           </a:xfrm>
           <a:prstGeom prst="straightConnector1">
             <a:avLst/>
@@ -17792,13 +17773,15 @@
       <p:cxnSp>
         <p:nvCxnSpPr>
           <p:cNvPr id="312" name="Google Shape;312;p38"/>
-          <p:cNvCxnSpPr/>
+          <p:cNvCxnSpPr>
+            <a:cxnSpLocks/>
+          </p:cNvCxnSpPr>
           <p:nvPr/>
         </p:nvCxnSpPr>
         <p:spPr>
           <a:xfrm>
-            <a:off x="5814707" y="2458466"/>
-            <a:ext cx="949325" cy="0"/>
+            <a:off x="5425440" y="3867991"/>
+            <a:ext cx="1523803" cy="0"/>
           </a:xfrm>
           <a:prstGeom prst="straightConnector1">
             <a:avLst/>
@@ -17830,8 +17813,8 @@
         </p:nvSpPr>
         <p:spPr>
           <a:xfrm>
-            <a:off x="6764876" y="2292980"/>
-            <a:ext cx="352002" cy="2636925"/>
+            <a:off x="6966897" y="1850473"/>
+            <a:ext cx="352002" cy="4370737"/>
           </a:xfrm>
           <a:prstGeom prst="rect">
             <a:avLst/>
@@ -17879,7 +17862,7 @@
         </p:nvSpPr>
         <p:spPr>
           <a:xfrm>
-            <a:off x="7986698" y="1079288"/>
+            <a:off x="9050865" y="636782"/>
             <a:ext cx="887105" cy="624557"/>
           </a:xfrm>
           <a:prstGeom prst="rect">
@@ -17918,7 +17901,7 @@
                 <a:cs typeface="Calibri"/>
                 <a:sym typeface="Calibri"/>
               </a:rPr>
-              <a:t>Mission</a:t>
+              <a:t>Image</a:t>
             </a:r>
           </a:p>
           <a:p>
@@ -17950,13 +17933,15 @@
       <p:cxnSp>
         <p:nvCxnSpPr>
           <p:cNvPr id="316" name="Google Shape;316;p38"/>
-          <p:cNvCxnSpPr/>
+          <p:cNvCxnSpPr>
+            <a:cxnSpLocks/>
+          </p:cNvCxnSpPr>
           <p:nvPr/>
         </p:nvCxnSpPr>
         <p:spPr>
           <a:xfrm flipH="1">
-            <a:off x="8401476" y="1804742"/>
-            <a:ext cx="28774" cy="4343600"/>
+            <a:off x="9460094" y="1324689"/>
+            <a:ext cx="34666" cy="5232865"/>
           </a:xfrm>
           <a:prstGeom prst="straightConnector1">
             <a:avLst/>
@@ -17980,88 +17965,6 @@
           </a:effectLst>
         </p:spPr>
       </p:cxnSp>
-      <p:cxnSp>
-        <p:nvCxnSpPr>
-          <p:cNvPr id="317" name="Google Shape;317;p38"/>
-          <p:cNvCxnSpPr/>
-          <p:nvPr/>
-        </p:nvCxnSpPr>
-        <p:spPr>
-          <a:xfrm flipH="1" flipV="1">
-            <a:off x="7141901" y="3473669"/>
-            <a:ext cx="1209201" cy="1"/>
-          </a:xfrm>
-          <a:prstGeom prst="straightConnector1">
-            <a:avLst/>
-          </a:prstGeom>
-          <a:noFill/>
-          <a:ln w="25400" cap="flat" cmpd="sng">
-            <a:solidFill>
-              <a:schemeClr val="accent1"/>
-            </a:solidFill>
-            <a:prstDash val="solid"/>
-            <a:round/>
-            <a:headEnd type="none" w="sm" len="sm"/>
-            <a:tailEnd type="stealth" w="med" len="med"/>
-          </a:ln>
-          <a:effectLst>
-            <a:outerShdw blurRad="40000" dist="20000" dir="5400000" rotWithShape="0">
-              <a:srgbClr val="000000">
-                <a:alpha val="37650"/>
-              </a:srgbClr>
-            </a:outerShdw>
-          </a:effectLst>
-        </p:spPr>
-      </p:cxnSp>
-      <p:sp>
-        <p:nvSpPr>
-          <p:cNvPr id="318" name="Google Shape;318;p38"/>
-          <p:cNvSpPr txBox="1"/>
-          <p:nvPr/>
-        </p:nvSpPr>
-        <p:spPr>
-          <a:xfrm>
-            <a:off x="7259122" y="3492881"/>
-            <a:ext cx="991900" cy="308000"/>
-          </a:xfrm>
-          <a:prstGeom prst="rect">
-            <a:avLst/>
-          </a:prstGeom>
-          <a:noFill/>
-          <a:ln>
-            <a:noFill/>
-          </a:ln>
-        </p:spPr>
-        <p:txBody>
-          <a:bodyPr spcFirstLastPara="1" wrap="square" lIns="107269" tIns="53620" rIns="107269" bIns="53620" anchor="t" anchorCtr="0">
-            <a:noAutofit/>
-          </a:bodyPr>
-          <a:lstStyle/>
-          <a:p>
-            <a:r>
-              <a:rPr lang="es-419" sz="1400" dirty="0">
-                <a:solidFill>
-                  <a:schemeClr val="dk1"/>
-                </a:solidFill>
-                <a:latin typeface="Calibri"/>
-                <a:ea typeface="Calibri"/>
-                <a:cs typeface="Calibri"/>
-                <a:sym typeface="Calibri"/>
-              </a:rPr>
-              <a:t>mission</a:t>
-            </a:r>
-            <a:endParaRPr sz="1400" dirty="0">
-              <a:solidFill>
-                <a:schemeClr val="dk1"/>
-              </a:solidFill>
-              <a:latin typeface="Calibri"/>
-              <a:ea typeface="Calibri"/>
-              <a:cs typeface="Calibri"/>
-              <a:sym typeface="Calibri"/>
-            </a:endParaRPr>
-          </a:p>
-        </p:txBody>
-      </p:sp>
       <p:sp>
         <p:nvSpPr>
           <p:cNvPr id="319" name="Google Shape;319;p38"/>
@@ -18070,7 +17973,7 @@
         </p:nvSpPr>
         <p:spPr>
           <a:xfrm>
-            <a:off x="8269213" y="2458467"/>
+            <a:off x="9313751" y="4840924"/>
             <a:ext cx="330200" cy="1422099"/>
           </a:xfrm>
           <a:prstGeom prst="rect">
@@ -18114,13 +18017,15 @@
       <p:cxnSp>
         <p:nvCxnSpPr>
           <p:cNvPr id="320" name="Google Shape;320;p38"/>
-          <p:cNvCxnSpPr/>
+          <p:cNvCxnSpPr>
+            <a:cxnSpLocks/>
+          </p:cNvCxnSpPr>
           <p:nvPr/>
         </p:nvCxnSpPr>
         <p:spPr>
           <a:xfrm>
-            <a:off x="7075934" y="2632098"/>
-            <a:ext cx="1175088" cy="0"/>
+            <a:off x="7378034" y="5364167"/>
+            <a:ext cx="1861760" cy="0"/>
           </a:xfrm>
           <a:prstGeom prst="straightConnector1">
             <a:avLst/>
@@ -18146,130 +18051,13 @@
       </p:cxnSp>
       <p:sp>
         <p:nvSpPr>
-          <p:cNvPr id="333" name="Google Shape;333;p38"/>
-          <p:cNvSpPr txBox="1"/>
-          <p:nvPr/>
-        </p:nvSpPr>
-        <p:spPr>
-          <a:xfrm>
-            <a:off x="7141900" y="2761379"/>
-            <a:ext cx="1209201" cy="590236"/>
-          </a:xfrm>
-          <a:prstGeom prst="rect">
-            <a:avLst/>
-          </a:prstGeom>
-          <a:noFill/>
-          <a:ln>
-            <a:noFill/>
-          </a:ln>
-        </p:spPr>
-        <p:txBody>
-          <a:bodyPr spcFirstLastPara="1" wrap="square" lIns="107269" tIns="53620" rIns="107269" bIns="53620" anchor="t" anchorCtr="0">
-            <a:noAutofit/>
-          </a:bodyPr>
-          <a:lstStyle/>
-          <a:p>
-            <a:r>
-              <a:rPr lang="es-419" sz="1200" dirty="0">
-                <a:solidFill>
-                  <a:schemeClr val="dk1"/>
-                </a:solidFill>
-                <a:latin typeface="Calibri"/>
-                <a:ea typeface="Calibri"/>
-                <a:cs typeface="Calibri"/>
-                <a:sym typeface="Calibri"/>
-              </a:rPr>
-              <a:t>findMissionsBy</a:t>
-            </a:r>
-            <a:br>
-              <a:rPr lang="es-419" sz="1200" dirty="0">
-                <a:solidFill>
-                  <a:schemeClr val="dk1"/>
-                </a:solidFill>
-                <a:latin typeface="Calibri"/>
-                <a:ea typeface="Calibri"/>
-                <a:cs typeface="Calibri"/>
-                <a:sym typeface="Calibri"/>
-              </a:rPr>
-            </a:br>
-            <a:r>
-              <a:rPr lang="es-419" sz="1200" dirty="0">
-                <a:solidFill>
-                  <a:schemeClr val="dk1"/>
-                </a:solidFill>
-                <a:latin typeface="Calibri"/>
-                <a:ea typeface="Calibri"/>
-                <a:cs typeface="Calibri"/>
-                <a:sym typeface="Calibri"/>
-              </a:rPr>
-              <a:t>Id(missionid</a:t>
-            </a:r>
-            <a:r>
-              <a:rPr lang="es-419" sz="1400" dirty="0">
-                <a:solidFill>
-                  <a:schemeClr val="dk1"/>
-                </a:solidFill>
-                <a:latin typeface="Calibri"/>
-                <a:ea typeface="Calibri"/>
-                <a:cs typeface="Calibri"/>
-                <a:sym typeface="Calibri"/>
-              </a:rPr>
-              <a:t>)</a:t>
-            </a:r>
-            <a:endParaRPr sz="1400" dirty="0">
-              <a:solidFill>
-                <a:schemeClr val="dk1"/>
-              </a:solidFill>
-              <a:latin typeface="Calibri"/>
-              <a:ea typeface="Calibri"/>
-              <a:cs typeface="Calibri"/>
-              <a:sym typeface="Calibri"/>
-            </a:endParaRPr>
-          </a:p>
-        </p:txBody>
-      </p:sp>
-      <p:cxnSp>
-        <p:nvCxnSpPr>
-          <p:cNvPr id="53" name="Straight Connector 52"/>
-          <p:cNvCxnSpPr/>
-          <p:nvPr/>
-        </p:nvCxnSpPr>
-        <p:spPr>
-          <a:xfrm flipH="1">
-            <a:off x="5612012" y="1742706"/>
-            <a:ext cx="10587" cy="4405636"/>
-          </a:xfrm>
-          <a:prstGeom prst="line">
-            <a:avLst/>
-          </a:prstGeom>
-          <a:noFill/>
-          <a:ln w="38100" cap="flat" cmpd="sng">
-            <a:solidFill>
-              <a:schemeClr val="accent1"/>
-            </a:solidFill>
-            <a:prstDash val="dot"/>
-            <a:round/>
-            <a:headEnd type="none" w="sm" len="sm"/>
-            <a:tailEnd type="none" w="sm" len="sm"/>
-          </a:ln>
-          <a:effectLst>
-            <a:outerShdw blurRad="40000" dist="23000" dir="5400000" rotWithShape="0">
-              <a:srgbClr val="000000">
-                <a:alpha val="34901"/>
-              </a:srgbClr>
-            </a:outerShdw>
-          </a:effectLst>
-        </p:spPr>
-      </p:cxnSp>
-      <p:sp>
-        <p:nvSpPr>
           <p:cNvPr id="54" name="Google Shape;290;p37"/>
           <p:cNvSpPr/>
           <p:nvPr/>
         </p:nvSpPr>
         <p:spPr>
           <a:xfrm>
-            <a:off x="2806575" y="1052466"/>
+            <a:off x="2806575" y="634449"/>
             <a:ext cx="1201264" cy="651379"/>
           </a:xfrm>
           <a:prstGeom prst="rect">
@@ -18296,7 +18084,7 @@
           <a:p>
             <a:pPr algn="ctr"/>
             <a:r>
-              <a:rPr lang="es-419" sz="1200" dirty="0">
+              <a:rPr lang="es-419" sz="1400" dirty="0">
                 <a:solidFill>
                   <a:schemeClr val="dk1"/>
                 </a:solidFill>
@@ -18307,7 +18095,7 @@
               </a:rPr>
               <a:t>Orchestrator</a:t>
             </a:r>
-            <a:endParaRPr sz="1200" dirty="0">
+            <a:endParaRPr sz="1400" dirty="0">
               <a:solidFill>
                 <a:schemeClr val="dk1"/>
               </a:solidFill>
@@ -18322,13 +18110,15 @@
       <p:cxnSp>
         <p:nvCxnSpPr>
           <p:cNvPr id="65" name="Google Shape;275;p37"/>
-          <p:cNvCxnSpPr/>
+          <p:cNvCxnSpPr>
+            <a:cxnSpLocks/>
+          </p:cNvCxnSpPr>
           <p:nvPr/>
         </p:nvCxnSpPr>
         <p:spPr>
           <a:xfrm>
-            <a:off x="1402231" y="2292980"/>
-            <a:ext cx="1802265" cy="0"/>
+            <a:off x="1568072" y="2057846"/>
+            <a:ext cx="1636424" cy="0"/>
           </a:xfrm>
           <a:prstGeom prst="straightConnector1">
             <a:avLst/>
@@ -18360,8 +18150,8 @@
         </p:nvSpPr>
         <p:spPr>
           <a:xfrm>
-            <a:off x="1632665" y="1938738"/>
-            <a:ext cx="1622203" cy="399458"/>
+            <a:off x="1568072" y="1349942"/>
+            <a:ext cx="1648995" cy="671166"/>
           </a:xfrm>
           <a:prstGeom prst="rect">
             <a:avLst/>
@@ -18387,7 +18177,7 @@
                 <a:cs typeface="Calibri"/>
                 <a:sym typeface="Calibri"/>
               </a:rPr>
-              <a:t>AfterClick</a:t>
+              <a:t>afterClickAlbum</a:t>
             </a:r>
             <a:r>
               <a:rPr lang="it-IT" sz="1400" dirty="0">
@@ -18399,12 +18189,51 @@
                 <a:cs typeface="Calibri"/>
                 <a:sym typeface="Calibri"/>
               </a:rPr>
-              <a:t> Album()</a:t>
-            </a:r>
-            <a:endParaRPr sz="1400" dirty="0">
-              <a:solidFill>
-                <a:schemeClr val="dk1"/>
-              </a:solidFill>
+              <a:t> </a:t>
+            </a:r>
+            <a:r>
+              <a:rPr lang="it-IT" sz="1200" dirty="0">
+                <a:latin typeface="Calibri"/>
+                <a:ea typeface="Calibri"/>
+                <a:cs typeface="Calibri"/>
+                <a:sym typeface="Calibri"/>
+              </a:rPr>
+              <a:t>(e.</a:t>
+            </a:r>
+            <a:r>
+              <a:rPr lang="en-US" sz="1200" dirty="0" err="1">
+                <a:latin typeface="Consolas" panose="020B0609020204030204" pitchFamily="49" charset="0"/>
+              </a:rPr>
+              <a:t>target.getAttribute</a:t>
+            </a:r>
+            <a:r>
+              <a:rPr lang="en-US" sz="1200" dirty="0">
+                <a:latin typeface="Consolas" panose="020B0609020204030204" pitchFamily="49" charset="0"/>
+              </a:rPr>
+              <a:t>("</a:t>
+            </a:r>
+            <a:r>
+              <a:rPr lang="en-US" sz="1200" dirty="0" err="1">
+                <a:latin typeface="Consolas" panose="020B0609020204030204" pitchFamily="49" charset="0"/>
+              </a:rPr>
+              <a:t>albumId</a:t>
+            </a:r>
+            <a:r>
+              <a:rPr lang="en-US" sz="1200" dirty="0">
+                <a:latin typeface="Consolas" panose="020B0609020204030204" pitchFamily="49" charset="0"/>
+              </a:rPr>
+              <a:t>")</a:t>
+            </a:r>
+            <a:r>
+              <a:rPr lang="it-IT" sz="1200" dirty="0">
+                <a:latin typeface="Calibri"/>
+                <a:ea typeface="Calibri"/>
+                <a:cs typeface="Calibri"/>
+                <a:sym typeface="Calibri"/>
+              </a:rPr>
+              <a:t>)</a:t>
+            </a:r>
+            <a:endParaRPr sz="1200" dirty="0">
               <a:latin typeface="Calibri"/>
               <a:ea typeface="Calibri"/>
               <a:cs typeface="Calibri"/>
@@ -18415,32 +18244,34 @@
       </p:sp>
       <p:cxnSp>
         <p:nvCxnSpPr>
-          <p:cNvPr id="83" name="Google Shape;317;p38"/>
-          <p:cNvCxnSpPr/>
+          <p:cNvPr id="73" name="Straight Connector 72"/>
+          <p:cNvCxnSpPr>
+            <a:cxnSpLocks/>
+          </p:cNvCxnSpPr>
           <p:nvPr/>
         </p:nvCxnSpPr>
         <p:spPr>
-          <a:xfrm flipH="1">
-            <a:off x="5814707" y="4775904"/>
-            <a:ext cx="920347" cy="0"/>
-          </a:xfrm>
-          <a:prstGeom prst="straightConnector1">
+          <a:xfrm>
+            <a:off x="1375230" y="1370247"/>
+            <a:ext cx="0" cy="5091513"/>
+          </a:xfrm>
+          <a:prstGeom prst="line">
             <a:avLst/>
           </a:prstGeom>
           <a:noFill/>
-          <a:ln w="25400" cap="flat" cmpd="sng">
+          <a:ln w="38100" cap="flat" cmpd="sng">
             <a:solidFill>
               <a:schemeClr val="accent1"/>
             </a:solidFill>
-            <a:prstDash val="dash"/>
+            <a:prstDash val="dot"/>
             <a:round/>
             <a:headEnd type="none" w="sm" len="sm"/>
-            <a:tailEnd type="stealth" w="med" len="med"/>
+            <a:tailEnd type="none" w="sm" len="sm"/>
           </a:ln>
           <a:effectLst>
-            <a:outerShdw blurRad="40000" dist="20000" dir="5400000" rotWithShape="0">
+            <a:outerShdw blurRad="40000" dist="23000" dir="5400000" rotWithShape="0">
               <a:srgbClr val="000000">
-                <a:alpha val="37650"/>
+                <a:alpha val="34901"/>
               </a:srgbClr>
             </a:outerShdw>
           </a:effectLst>
@@ -18448,75 +18279,14 @@
       </p:cxnSp>
       <p:sp>
         <p:nvSpPr>
-          <p:cNvPr id="84" name="Google Shape;318;p38"/>
-          <p:cNvSpPr txBox="1"/>
-          <p:nvPr/>
-        </p:nvSpPr>
-        <p:spPr>
-          <a:xfrm>
-            <a:off x="5791418" y="4221603"/>
-            <a:ext cx="957222" cy="715912"/>
-          </a:xfrm>
-          <a:prstGeom prst="rect">
-            <a:avLst/>
-          </a:prstGeom>
-          <a:noFill/>
-          <a:ln>
-            <a:noFill/>
-          </a:ln>
-        </p:spPr>
-        <p:txBody>
-          <a:bodyPr spcFirstLastPara="1" wrap="square" lIns="107269" tIns="53620" rIns="107269" bIns="53620" anchor="t" anchorCtr="0">
-            <a:noAutofit/>
-          </a:bodyPr>
-          <a:lstStyle/>
-          <a:p>
-            <a:r>
-              <a:rPr lang="en-US" sz="1400" dirty="0">
-                <a:solidFill>
-                  <a:schemeClr val="dk1"/>
-                </a:solidFill>
-                <a:latin typeface="Calibri"/>
-                <a:ea typeface="Calibri"/>
-                <a:cs typeface="Calibri"/>
-                <a:sym typeface="Calibri"/>
-              </a:rPr>
-              <a:t>m</a:t>
-            </a:r>
-            <a:r>
-              <a:rPr lang="es-419" sz="1400" dirty="0">
-                <a:solidFill>
-                  <a:schemeClr val="dk1"/>
-                </a:solidFill>
-                <a:latin typeface="Calibri"/>
-                <a:ea typeface="Calibri"/>
-                <a:cs typeface="Calibri"/>
-                <a:sym typeface="Calibri"/>
-              </a:rPr>
-              <a:t>ission &amp; expenses</a:t>
-            </a:r>
-            <a:endParaRPr sz="1400" dirty="0">
-              <a:solidFill>
-                <a:schemeClr val="dk1"/>
-              </a:solidFill>
-              <a:latin typeface="Calibri"/>
-              <a:ea typeface="Calibri"/>
-              <a:cs typeface="Calibri"/>
-              <a:sym typeface="Calibri"/>
-            </a:endParaRPr>
-          </a:p>
-        </p:txBody>
-      </p:sp>
-      <p:sp>
-        <p:nvSpPr>
-          <p:cNvPr id="55" name="Google Shape;292;p37"/>
+          <p:cNvPr id="74" name="Google Shape;290;p37"/>
           <p:cNvSpPr/>
           <p:nvPr/>
         </p:nvSpPr>
         <p:spPr>
           <a:xfrm>
-            <a:off x="5451540" y="1967976"/>
-            <a:ext cx="342116" cy="3444478"/>
+            <a:off x="952921" y="704557"/>
+            <a:ext cx="818867" cy="651379"/>
           </a:xfrm>
           <a:prstGeom prst="rect">
             <a:avLst/>
@@ -18541,7 +18311,19 @@
           <a:lstStyle/>
           <a:p>
             <a:pPr algn="ctr"/>
-            <a:endParaRPr sz="2100">
+            <a:r>
+              <a:rPr lang="es-419" sz="1400" dirty="0">
+                <a:solidFill>
+                  <a:schemeClr val="dk1"/>
+                </a:solidFill>
+                <a:latin typeface="Calibri"/>
+                <a:ea typeface="Calibri"/>
+                <a:cs typeface="Calibri"/>
+                <a:sym typeface="Calibri"/>
+              </a:rPr>
+              <a:t>Album List</a:t>
+            </a:r>
+            <a:endParaRPr sz="1400" dirty="0">
               <a:solidFill>
                 <a:schemeClr val="dk1"/>
               </a:solidFill>
@@ -18553,49 +18335,16 @@
           </a:p>
         </p:txBody>
       </p:sp>
-      <p:cxnSp>
-        <p:nvCxnSpPr>
-          <p:cNvPr id="73" name="Straight Connector 72"/>
-          <p:cNvCxnSpPr/>
-          <p:nvPr/>
-        </p:nvCxnSpPr>
-        <p:spPr>
-          <a:xfrm>
-            <a:off x="1375230" y="1788264"/>
-            <a:ext cx="0" cy="4426116"/>
-          </a:xfrm>
-          <a:prstGeom prst="line">
-            <a:avLst/>
-          </a:prstGeom>
-          <a:noFill/>
-          <a:ln w="38100" cap="flat" cmpd="sng">
-            <a:solidFill>
-              <a:schemeClr val="accent1"/>
-            </a:solidFill>
-            <a:prstDash val="dot"/>
-            <a:round/>
-            <a:headEnd type="none" w="sm" len="sm"/>
-            <a:tailEnd type="none" w="sm" len="sm"/>
-          </a:ln>
-          <a:effectLst>
-            <a:outerShdw blurRad="40000" dist="23000" dir="5400000" rotWithShape="0">
-              <a:srgbClr val="000000">
-                <a:alpha val="34901"/>
-              </a:srgbClr>
-            </a:outerShdw>
-          </a:effectLst>
-        </p:spPr>
-      </p:cxnSp>
-      <p:sp>
-        <p:nvSpPr>
-          <p:cNvPr id="74" name="Google Shape;290;p37"/>
+      <p:sp>
+        <p:nvSpPr>
+          <p:cNvPr id="75" name="Google Shape;292;p37"/>
           <p:cNvSpPr/>
           <p:nvPr/>
         </p:nvSpPr>
         <p:spPr>
           <a:xfrm>
-            <a:off x="952921" y="1122574"/>
-            <a:ext cx="818867" cy="651379"/>
+            <a:off x="1204172" y="1595255"/>
+            <a:ext cx="342116" cy="3707859"/>
           </a:xfrm>
           <a:prstGeom prst="rect">
             <a:avLst/>
@@ -18620,8 +18369,45 @@
           <a:lstStyle/>
           <a:p>
             <a:pPr algn="ctr"/>
-            <a:r>
-              <a:rPr lang="es-419" sz="1200" dirty="0">
+            <a:endParaRPr sz="2100">
+              <a:solidFill>
+                <a:schemeClr val="dk1"/>
+              </a:solidFill>
+              <a:latin typeface="Calibri"/>
+              <a:ea typeface="Calibri"/>
+              <a:cs typeface="Calibri"/>
+              <a:sym typeface="Calibri"/>
+            </a:endParaRPr>
+          </a:p>
+        </p:txBody>
+      </p:sp>
+      <p:sp>
+        <p:nvSpPr>
+          <p:cNvPr id="88" name="Google Shape;294;p37"/>
+          <p:cNvSpPr txBox="1"/>
+          <p:nvPr/>
+        </p:nvSpPr>
+        <p:spPr>
+          <a:xfrm>
+            <a:off x="20255" y="1549959"/>
+            <a:ext cx="1102732" cy="449165"/>
+          </a:xfrm>
+          <a:prstGeom prst="rect">
+            <a:avLst/>
+          </a:prstGeom>
+          <a:noFill/>
+          <a:ln>
+            <a:noFill/>
+          </a:ln>
+        </p:spPr>
+        <p:txBody>
+          <a:bodyPr spcFirstLastPara="1" wrap="square" lIns="107269" tIns="53620" rIns="107269" bIns="53620" anchor="t" anchorCtr="0">
+            <a:noAutofit/>
+          </a:bodyPr>
+          <a:lstStyle/>
+          <a:p>
+            <a:r>
+              <a:rPr lang="it-IT" sz="1400" dirty="0">
                 <a:solidFill>
                   <a:schemeClr val="dk1"/>
                 </a:solidFill>
@@ -18630,9 +18416,9 @@
                 <a:cs typeface="Calibri"/>
                 <a:sym typeface="Calibri"/>
               </a:rPr>
-              <a:t>Album List</a:t>
-            </a:r>
-            <a:endParaRPr sz="1200" dirty="0">
+              <a:t>Click album</a:t>
+            </a:r>
+            <a:endParaRPr dirty="0">
               <a:solidFill>
                 <a:schemeClr val="dk1"/>
               </a:solidFill>
@@ -18644,16 +18430,96 @@
           </a:p>
         </p:txBody>
       </p:sp>
-      <p:sp>
-        <p:nvSpPr>
-          <p:cNvPr id="75" name="Google Shape;292;p37"/>
+      <p:cxnSp>
+        <p:nvCxnSpPr>
+          <p:cNvPr id="89" name="Straight Arrow Connector 88"/>
+          <p:cNvCxnSpPr/>
+          <p:nvPr/>
+        </p:nvCxnSpPr>
+        <p:spPr>
+          <a:xfrm>
+            <a:off x="870184" y="1823475"/>
+            <a:ext cx="336277" cy="0"/>
+          </a:xfrm>
+          <a:prstGeom prst="straightConnector1">
+            <a:avLst/>
+          </a:prstGeom>
+          <a:noFill/>
+          <a:ln w="25400" cap="flat" cmpd="sng">
+            <a:solidFill>
+              <a:schemeClr val="accent1"/>
+            </a:solidFill>
+            <a:prstDash val="solid"/>
+            <a:round/>
+            <a:headEnd type="none" w="sm" len="sm"/>
+            <a:tailEnd type="stealth" w="med" len="med"/>
+          </a:ln>
+          <a:effectLst>
+            <a:outerShdw blurRad="40000" dist="20000" dir="5400000" rotWithShape="0">
+              <a:srgbClr val="000000">
+                <a:alpha val="37647"/>
+              </a:srgbClr>
+            </a:outerShdw>
+          </a:effectLst>
+        </p:spPr>
+      </p:cxnSp>
+      <p:cxnSp>
+        <p:nvCxnSpPr>
+          <p:cNvPr id="41" name="Straight Connector 52">
+            <a:extLst>
+              <a:ext uri="{FF2B5EF4-FFF2-40B4-BE49-F238E27FC236}">
+                <a16:creationId xmlns:a16="http://schemas.microsoft.com/office/drawing/2014/main" id="{928D1D6F-9098-47DF-8289-194D299E0C5F}"/>
+              </a:ext>
+            </a:extLst>
+          </p:cNvPr>
+          <p:cNvCxnSpPr>
+            <a:cxnSpLocks/>
+          </p:cNvCxnSpPr>
+          <p:nvPr/>
+        </p:nvCxnSpPr>
+        <p:spPr>
+          <a:xfrm flipH="1">
+            <a:off x="3375555" y="1324689"/>
+            <a:ext cx="1" cy="5232865"/>
+          </a:xfrm>
+          <a:prstGeom prst="line">
+            <a:avLst/>
+          </a:prstGeom>
+          <a:noFill/>
+          <a:ln w="38100" cap="flat" cmpd="sng">
+            <a:solidFill>
+              <a:schemeClr val="accent1"/>
+            </a:solidFill>
+            <a:prstDash val="dot"/>
+            <a:round/>
+            <a:headEnd type="none" w="sm" len="sm"/>
+            <a:tailEnd type="none" w="sm" len="sm"/>
+          </a:ln>
+          <a:effectLst>
+            <a:outerShdw blurRad="40000" dist="23000" dir="5400000" rotWithShape="0">
+              <a:srgbClr val="000000">
+                <a:alpha val="34901"/>
+              </a:srgbClr>
+            </a:outerShdw>
+          </a:effectLst>
+        </p:spPr>
+      </p:cxnSp>
+      <p:sp>
+        <p:nvSpPr>
+          <p:cNvPr id="42" name="Google Shape;292;p37">
+            <a:extLst>
+              <a:ext uri="{FF2B5EF4-FFF2-40B4-BE49-F238E27FC236}">
+                <a16:creationId xmlns:a16="http://schemas.microsoft.com/office/drawing/2014/main" id="{EC2375AF-7438-4CBB-8A8B-3AE68559F82D}"/>
+              </a:ext>
+            </a:extLst>
+          </p:cNvPr>
           <p:cNvSpPr/>
           <p:nvPr/>
         </p:nvSpPr>
         <p:spPr>
           <a:xfrm>
-            <a:off x="1204172" y="2013273"/>
-            <a:ext cx="342116" cy="2851074"/>
+            <a:off x="3204496" y="1549959"/>
+            <a:ext cx="342116" cy="2396400"/>
           </a:xfrm>
           <a:prstGeom prst="rect">
             <a:avLst/>
@@ -18690,16 +18556,220 @@
           </a:p>
         </p:txBody>
       </p:sp>
-      <p:sp>
-        <p:nvSpPr>
-          <p:cNvPr id="88" name="Google Shape;294;p37"/>
+      <p:cxnSp>
+        <p:nvCxnSpPr>
+          <p:cNvPr id="43" name="Straight Connector 52">
+            <a:extLst>
+              <a:ext uri="{FF2B5EF4-FFF2-40B4-BE49-F238E27FC236}">
+                <a16:creationId xmlns:a16="http://schemas.microsoft.com/office/drawing/2014/main" id="{F7A1ECA8-2323-49DC-9198-EACC74AA5269}"/>
+              </a:ext>
+            </a:extLst>
+          </p:cNvPr>
+          <p:cNvCxnSpPr>
+            <a:cxnSpLocks/>
+          </p:cNvCxnSpPr>
+          <p:nvPr/>
+        </p:nvCxnSpPr>
+        <p:spPr>
+          <a:xfrm>
+            <a:off x="5201413" y="1196859"/>
+            <a:ext cx="0" cy="5661141"/>
+          </a:xfrm>
+          <a:prstGeom prst="line">
+            <a:avLst/>
+          </a:prstGeom>
+          <a:noFill/>
+          <a:ln w="38100" cap="flat" cmpd="sng">
+            <a:solidFill>
+              <a:schemeClr val="accent1"/>
+            </a:solidFill>
+            <a:prstDash val="dot"/>
+            <a:round/>
+            <a:headEnd type="none" w="sm" len="sm"/>
+            <a:tailEnd type="none" w="sm" len="sm"/>
+          </a:ln>
+          <a:effectLst>
+            <a:outerShdw blurRad="40000" dist="23000" dir="5400000" rotWithShape="0">
+              <a:srgbClr val="000000">
+                <a:alpha val="34901"/>
+              </a:srgbClr>
+            </a:outerShdw>
+          </a:effectLst>
+        </p:spPr>
+      </p:cxnSp>
+      <p:sp>
+        <p:nvSpPr>
+          <p:cNvPr id="44" name="Google Shape;290;p37">
+            <a:extLst>
+              <a:ext uri="{FF2B5EF4-FFF2-40B4-BE49-F238E27FC236}">
+                <a16:creationId xmlns:a16="http://schemas.microsoft.com/office/drawing/2014/main" id="{47C34395-4DFA-44DE-8C89-5EEF352EEDEF}"/>
+              </a:ext>
+            </a:extLst>
+          </p:cNvPr>
+          <p:cNvSpPr/>
+          <p:nvPr/>
+        </p:nvSpPr>
+        <p:spPr>
+          <a:xfrm>
+            <a:off x="4799100" y="654146"/>
+            <a:ext cx="760417" cy="542713"/>
+          </a:xfrm>
+          <a:prstGeom prst="rect">
+            <a:avLst/>
+          </a:prstGeom>
+          <a:solidFill>
+            <a:schemeClr val="lt1"/>
+          </a:solidFill>
+          <a:ln w="25400" cap="flat" cmpd="sng">
+            <a:solidFill>
+              <a:schemeClr val="accent1"/>
+            </a:solidFill>
+            <a:prstDash val="solid"/>
+            <a:round/>
+            <a:headEnd type="none" w="sm" len="sm"/>
+            <a:tailEnd type="none" w="sm" len="sm"/>
+          </a:ln>
+        </p:spPr>
+        <p:txBody>
+          <a:bodyPr spcFirstLastPara="1" wrap="square" lIns="107269" tIns="53620" rIns="107269" bIns="53620" anchor="ctr" anchorCtr="0">
+            <a:noAutofit/>
+          </a:bodyPr>
+          <a:lstStyle/>
+          <a:p>
+            <a:pPr algn="ctr"/>
+            <a:r>
+              <a:rPr lang="es-419" sz="1400" dirty="0">
+                <a:solidFill>
+                  <a:schemeClr val="dk1"/>
+                </a:solidFill>
+                <a:latin typeface="Calibri"/>
+                <a:ea typeface="Calibri"/>
+                <a:cs typeface="Calibri"/>
+                <a:sym typeface="Calibri"/>
+              </a:rPr>
+              <a:t>Image List</a:t>
+            </a:r>
+            <a:endParaRPr sz="1400" dirty="0">
+              <a:solidFill>
+                <a:schemeClr val="dk1"/>
+              </a:solidFill>
+              <a:latin typeface="Calibri"/>
+              <a:ea typeface="Calibri"/>
+              <a:cs typeface="Calibri"/>
+              <a:sym typeface="Calibri"/>
+            </a:endParaRPr>
+          </a:p>
+        </p:txBody>
+      </p:sp>
+      <p:sp>
+        <p:nvSpPr>
+          <p:cNvPr id="45" name="Google Shape;292;p37">
+            <a:extLst>
+              <a:ext uri="{FF2B5EF4-FFF2-40B4-BE49-F238E27FC236}">
+                <a16:creationId xmlns:a16="http://schemas.microsoft.com/office/drawing/2014/main" id="{204CE6C8-D808-4272-A44B-096D244FAD07}"/>
+              </a:ext>
+            </a:extLst>
+          </p:cNvPr>
+          <p:cNvSpPr/>
+          <p:nvPr/>
+        </p:nvSpPr>
+        <p:spPr>
+          <a:xfrm>
+            <a:off x="5008251" y="1420292"/>
+            <a:ext cx="342116" cy="5041465"/>
+          </a:xfrm>
+          <a:prstGeom prst="rect">
+            <a:avLst/>
+          </a:prstGeom>
+          <a:solidFill>
+            <a:schemeClr val="lt1"/>
+          </a:solidFill>
+          <a:ln w="25400" cap="flat" cmpd="sng">
+            <a:solidFill>
+              <a:schemeClr val="accent1"/>
+            </a:solidFill>
+            <a:prstDash val="solid"/>
+            <a:round/>
+            <a:headEnd type="none" w="sm" len="sm"/>
+            <a:tailEnd type="none" w="sm" len="sm"/>
+          </a:ln>
+        </p:spPr>
+        <p:txBody>
+          <a:bodyPr spcFirstLastPara="1" wrap="square" lIns="107269" tIns="53620" rIns="107269" bIns="53620" anchor="ctr" anchorCtr="0">
+            <a:noAutofit/>
+          </a:bodyPr>
+          <a:lstStyle/>
+          <a:p>
+            <a:pPr algn="ctr"/>
+            <a:endParaRPr sz="2100">
+              <a:solidFill>
+                <a:schemeClr val="dk1"/>
+              </a:solidFill>
+              <a:latin typeface="Calibri"/>
+              <a:ea typeface="Calibri"/>
+              <a:cs typeface="Calibri"/>
+              <a:sym typeface="Calibri"/>
+            </a:endParaRPr>
+          </a:p>
+        </p:txBody>
+      </p:sp>
+      <p:cxnSp>
+        <p:nvCxnSpPr>
+          <p:cNvPr id="46" name="Google Shape;275;p37">
+            <a:extLst>
+              <a:ext uri="{FF2B5EF4-FFF2-40B4-BE49-F238E27FC236}">
+                <a16:creationId xmlns:a16="http://schemas.microsoft.com/office/drawing/2014/main" id="{334676E5-B578-4DEF-8E96-5DD79E7BEB30}"/>
+              </a:ext>
+            </a:extLst>
+          </p:cNvPr>
+          <p:cNvCxnSpPr>
+            <a:cxnSpLocks/>
+          </p:cNvCxnSpPr>
+          <p:nvPr/>
+        </p:nvCxnSpPr>
+        <p:spPr>
+          <a:xfrm>
+            <a:off x="3573612" y="2218838"/>
+            <a:ext cx="1359156" cy="0"/>
+          </a:xfrm>
+          <a:prstGeom prst="straightConnector1">
+            <a:avLst/>
+          </a:prstGeom>
+          <a:noFill/>
+          <a:ln w="25400" cap="flat" cmpd="sng">
+            <a:solidFill>
+              <a:schemeClr val="accent1"/>
+            </a:solidFill>
+            <a:prstDash val="solid"/>
+            <a:round/>
+            <a:headEnd type="none" w="sm" len="sm"/>
+            <a:tailEnd type="stealth" w="med" len="med"/>
+          </a:ln>
+          <a:effectLst>
+            <a:outerShdw blurRad="40000" dist="20000" dir="5400000" rotWithShape="0">
+              <a:srgbClr val="000000">
+                <a:alpha val="37647"/>
+              </a:srgbClr>
+            </a:outerShdw>
+          </a:effectLst>
+        </p:spPr>
+      </p:cxnSp>
+      <p:sp>
+        <p:nvSpPr>
+          <p:cNvPr id="47" name="Google Shape;294;p37">
+            <a:extLst>
+              <a:ext uri="{FF2B5EF4-FFF2-40B4-BE49-F238E27FC236}">
+                <a16:creationId xmlns:a16="http://schemas.microsoft.com/office/drawing/2014/main" id="{893F9895-A85C-4155-B720-B20A55D835E6}"/>
+              </a:ext>
+            </a:extLst>
+          </p:cNvPr>
           <p:cNvSpPr txBox="1"/>
           <p:nvPr/>
         </p:nvSpPr>
         <p:spPr>
           <a:xfrm>
-            <a:off x="20255" y="1967976"/>
-            <a:ext cx="1102732" cy="449165"/>
+            <a:off x="3568096" y="1654561"/>
+            <a:ext cx="1426102" cy="469291"/>
           </a:xfrm>
           <a:prstGeom prst="rect">
             <a:avLst/>
@@ -18715,6 +18785,18 @@
           </a:bodyPr>
           <a:lstStyle/>
           <a:p>
+            <a:r>
+              <a:rPr lang="it-IT" sz="1400" dirty="0" err="1">
+                <a:solidFill>
+                  <a:schemeClr val="dk1"/>
+                </a:solidFill>
+                <a:latin typeface="Calibri"/>
+                <a:ea typeface="Calibri"/>
+                <a:cs typeface="Calibri"/>
+                <a:sym typeface="Calibri"/>
+              </a:rPr>
+              <a:t>resetButtonNext&amp;Previous</a:t>
+            </a:r>
             <a:r>
               <a:rPr lang="it-IT" sz="1400" dirty="0">
                 <a:solidFill>
@@ -18725,9 +18807,9 @@
                 <a:cs typeface="Calibri"/>
                 <a:sym typeface="Calibri"/>
               </a:rPr>
-              <a:t>Click album</a:t>
-            </a:r>
-            <a:endParaRPr dirty="0">
+              <a:t>()</a:t>
+            </a:r>
+            <a:endParaRPr sz="1400" dirty="0">
               <a:solidFill>
                 <a:schemeClr val="dk1"/>
               </a:solidFill>
@@ -18741,14 +18823,22 @@
       </p:sp>
       <p:cxnSp>
         <p:nvCxnSpPr>
-          <p:cNvPr id="89" name="Straight Arrow Connector 88"/>
-          <p:cNvCxnSpPr/>
+          <p:cNvPr id="48" name="Google Shape;275;p37">
+            <a:extLst>
+              <a:ext uri="{FF2B5EF4-FFF2-40B4-BE49-F238E27FC236}">
+                <a16:creationId xmlns:a16="http://schemas.microsoft.com/office/drawing/2014/main" id="{21F9333F-2C6A-4F45-859A-AD405DBAF00B}"/>
+              </a:ext>
+            </a:extLst>
+          </p:cNvPr>
+          <p:cNvCxnSpPr>
+            <a:cxnSpLocks/>
+          </p:cNvCxnSpPr>
           <p:nvPr/>
         </p:nvCxnSpPr>
         <p:spPr>
           <a:xfrm>
-            <a:off x="870184" y="2241492"/>
-            <a:ext cx="336277" cy="0"/>
+            <a:off x="3563520" y="2718938"/>
+            <a:ext cx="1369248" cy="0"/>
           </a:xfrm>
           <a:prstGeom prst="straightConnector1">
             <a:avLst/>
@@ -18772,15 +18862,304 @@
           </a:effectLst>
         </p:spPr>
       </p:cxnSp>
+      <p:sp>
+        <p:nvSpPr>
+          <p:cNvPr id="49" name="Google Shape;294;p37">
+            <a:extLst>
+              <a:ext uri="{FF2B5EF4-FFF2-40B4-BE49-F238E27FC236}">
+                <a16:creationId xmlns:a16="http://schemas.microsoft.com/office/drawing/2014/main" id="{7CAD38D1-3830-4823-A48C-2241865A5687}"/>
+              </a:ext>
+            </a:extLst>
+          </p:cNvPr>
+          <p:cNvSpPr txBox="1"/>
+          <p:nvPr/>
+        </p:nvSpPr>
+        <p:spPr>
+          <a:xfrm>
+            <a:off x="3640139" y="2366193"/>
+            <a:ext cx="1261304" cy="284114"/>
+          </a:xfrm>
+          <a:prstGeom prst="rect">
+            <a:avLst/>
+          </a:prstGeom>
+          <a:noFill/>
+          <a:ln>
+            <a:noFill/>
+          </a:ln>
+        </p:spPr>
+        <p:txBody>
+          <a:bodyPr spcFirstLastPara="1" wrap="square" lIns="107269" tIns="53620" rIns="107269" bIns="53620" anchor="t" anchorCtr="0">
+            <a:noAutofit/>
+          </a:bodyPr>
+          <a:lstStyle/>
+          <a:p>
+            <a:r>
+              <a:rPr lang="it-IT" sz="1400" dirty="0" err="1">
+                <a:solidFill>
+                  <a:schemeClr val="dk1"/>
+                </a:solidFill>
+                <a:latin typeface="Calibri"/>
+                <a:ea typeface="Calibri"/>
+                <a:cs typeface="Calibri"/>
+                <a:sym typeface="Calibri"/>
+              </a:rPr>
+              <a:t>resetImages</a:t>
+            </a:r>
+            <a:r>
+              <a:rPr lang="it-IT" sz="1400" dirty="0">
+                <a:solidFill>
+                  <a:schemeClr val="dk1"/>
+                </a:solidFill>
+                <a:latin typeface="Calibri"/>
+                <a:ea typeface="Calibri"/>
+                <a:cs typeface="Calibri"/>
+                <a:sym typeface="Calibri"/>
+              </a:rPr>
+              <a:t>()</a:t>
+            </a:r>
+            <a:endParaRPr sz="1400" dirty="0">
+              <a:solidFill>
+                <a:schemeClr val="dk1"/>
+              </a:solidFill>
+              <a:latin typeface="Calibri"/>
+              <a:ea typeface="Calibri"/>
+              <a:cs typeface="Calibri"/>
+              <a:sym typeface="Calibri"/>
+            </a:endParaRPr>
+          </a:p>
+        </p:txBody>
+      </p:sp>
+      <p:cxnSp>
+        <p:nvCxnSpPr>
+          <p:cNvPr id="51" name="Google Shape;275;p37">
+            <a:extLst>
+              <a:ext uri="{FF2B5EF4-FFF2-40B4-BE49-F238E27FC236}">
+                <a16:creationId xmlns:a16="http://schemas.microsoft.com/office/drawing/2014/main" id="{55E90C84-3FC7-4C81-8E52-DC697977938A}"/>
+              </a:ext>
+            </a:extLst>
+          </p:cNvPr>
+          <p:cNvCxnSpPr>
+            <a:cxnSpLocks/>
+          </p:cNvCxnSpPr>
+          <p:nvPr/>
+        </p:nvCxnSpPr>
+        <p:spPr>
+          <a:xfrm>
+            <a:off x="3595799" y="3209680"/>
+            <a:ext cx="1369248" cy="0"/>
+          </a:xfrm>
+          <a:prstGeom prst="straightConnector1">
+            <a:avLst/>
+          </a:prstGeom>
+          <a:noFill/>
+          <a:ln w="25400" cap="flat" cmpd="sng">
+            <a:solidFill>
+              <a:schemeClr val="accent1"/>
+            </a:solidFill>
+            <a:prstDash val="solid"/>
+            <a:round/>
+            <a:headEnd type="none" w="sm" len="sm"/>
+            <a:tailEnd type="stealth" w="med" len="med"/>
+          </a:ln>
+          <a:effectLst>
+            <a:outerShdw blurRad="40000" dist="20000" dir="5400000" rotWithShape="0">
+              <a:srgbClr val="000000">
+                <a:alpha val="37647"/>
+              </a:srgbClr>
+            </a:outerShdw>
+          </a:effectLst>
+        </p:spPr>
+      </p:cxnSp>
+      <p:sp>
+        <p:nvSpPr>
+          <p:cNvPr id="52" name="Google Shape;294;p37">
+            <a:extLst>
+              <a:ext uri="{FF2B5EF4-FFF2-40B4-BE49-F238E27FC236}">
+                <a16:creationId xmlns:a16="http://schemas.microsoft.com/office/drawing/2014/main" id="{88D1922F-741D-489B-BC3D-6FD352B39066}"/>
+              </a:ext>
+            </a:extLst>
+          </p:cNvPr>
+          <p:cNvSpPr txBox="1"/>
+          <p:nvPr/>
+        </p:nvSpPr>
+        <p:spPr>
+          <a:xfrm>
+            <a:off x="3872984" y="2872257"/>
+            <a:ext cx="795614" cy="284114"/>
+          </a:xfrm>
+          <a:prstGeom prst="rect">
+            <a:avLst/>
+          </a:prstGeom>
+          <a:noFill/>
+          <a:ln>
+            <a:noFill/>
+          </a:ln>
+        </p:spPr>
+        <p:txBody>
+          <a:bodyPr spcFirstLastPara="1" wrap="square" lIns="107269" tIns="53620" rIns="107269" bIns="53620" anchor="t" anchorCtr="0">
+            <a:noAutofit/>
+          </a:bodyPr>
+          <a:lstStyle/>
+          <a:p>
+            <a:r>
+              <a:rPr lang="it-IT" sz="1400" dirty="0">
+                <a:solidFill>
+                  <a:schemeClr val="dk1"/>
+                </a:solidFill>
+                <a:latin typeface="Calibri"/>
+                <a:ea typeface="Calibri"/>
+                <a:cs typeface="Calibri"/>
+                <a:sym typeface="Calibri"/>
+              </a:rPr>
+              <a:t>reset()</a:t>
+            </a:r>
+            <a:endParaRPr sz="1400" dirty="0">
+              <a:solidFill>
+                <a:schemeClr val="dk1"/>
+              </a:solidFill>
+              <a:latin typeface="Calibri"/>
+              <a:ea typeface="Calibri"/>
+              <a:cs typeface="Calibri"/>
+              <a:sym typeface="Calibri"/>
+            </a:endParaRPr>
+          </a:p>
+        </p:txBody>
+      </p:sp>
+      <p:cxnSp>
+        <p:nvCxnSpPr>
+          <p:cNvPr id="56" name="Google Shape;275;p37">
+            <a:extLst>
+              <a:ext uri="{FF2B5EF4-FFF2-40B4-BE49-F238E27FC236}">
+                <a16:creationId xmlns:a16="http://schemas.microsoft.com/office/drawing/2014/main" id="{7734DFEC-EC0A-4C1C-B030-9C301B7C2266}"/>
+              </a:ext>
+            </a:extLst>
+          </p:cNvPr>
+          <p:cNvCxnSpPr>
+            <a:cxnSpLocks/>
+          </p:cNvCxnSpPr>
+          <p:nvPr/>
+        </p:nvCxnSpPr>
+        <p:spPr>
+          <a:xfrm>
+            <a:off x="3583494" y="3676963"/>
+            <a:ext cx="1369248" cy="0"/>
+          </a:xfrm>
+          <a:prstGeom prst="straightConnector1">
+            <a:avLst/>
+          </a:prstGeom>
+          <a:noFill/>
+          <a:ln w="25400" cap="flat" cmpd="sng">
+            <a:solidFill>
+              <a:schemeClr val="accent1"/>
+            </a:solidFill>
+            <a:prstDash val="solid"/>
+            <a:round/>
+            <a:headEnd type="none" w="sm" len="sm"/>
+            <a:tailEnd type="stealth" w="med" len="med"/>
+          </a:ln>
+          <a:effectLst>
+            <a:outerShdw blurRad="40000" dist="20000" dir="5400000" rotWithShape="0">
+              <a:srgbClr val="000000">
+                <a:alpha val="37647"/>
+              </a:srgbClr>
+            </a:outerShdw>
+          </a:effectLst>
+        </p:spPr>
+      </p:cxnSp>
+      <p:sp>
+        <p:nvSpPr>
+          <p:cNvPr id="57" name="Google Shape;294;p37">
+            <a:extLst>
+              <a:ext uri="{FF2B5EF4-FFF2-40B4-BE49-F238E27FC236}">
+                <a16:creationId xmlns:a16="http://schemas.microsoft.com/office/drawing/2014/main" id="{DA204D40-A98E-4531-A15C-448B0A01EACE}"/>
+              </a:ext>
+            </a:extLst>
+          </p:cNvPr>
+          <p:cNvSpPr txBox="1"/>
+          <p:nvPr/>
+        </p:nvSpPr>
+        <p:spPr>
+          <a:xfrm>
+            <a:off x="3642694" y="3350342"/>
+            <a:ext cx="1337305" cy="284114"/>
+          </a:xfrm>
+          <a:prstGeom prst="rect">
+            <a:avLst/>
+          </a:prstGeom>
+          <a:noFill/>
+          <a:ln>
+            <a:noFill/>
+          </a:ln>
+        </p:spPr>
+        <p:txBody>
+          <a:bodyPr spcFirstLastPara="1" wrap="square" lIns="107269" tIns="53620" rIns="107269" bIns="53620" anchor="t" anchorCtr="0">
+            <a:noAutofit/>
+          </a:bodyPr>
+          <a:lstStyle/>
+          <a:p>
+            <a:r>
+              <a:rPr lang="it-IT" sz="1400" dirty="0">
+                <a:solidFill>
+                  <a:schemeClr val="dk1"/>
+                </a:solidFill>
+                <a:latin typeface="Calibri"/>
+                <a:ea typeface="Calibri"/>
+                <a:cs typeface="Calibri"/>
+                <a:sym typeface="Calibri"/>
+              </a:rPr>
+              <a:t>show(</a:t>
+            </a:r>
+            <a:r>
+              <a:rPr lang="it-IT" sz="1400" dirty="0" err="1">
+                <a:solidFill>
+                  <a:schemeClr val="dk1"/>
+                </a:solidFill>
+                <a:latin typeface="Calibri"/>
+                <a:ea typeface="Calibri"/>
+                <a:cs typeface="Calibri"/>
+                <a:sym typeface="Calibri"/>
+              </a:rPr>
+              <a:t>albumId</a:t>
+            </a:r>
+            <a:r>
+              <a:rPr lang="it-IT" sz="1400" dirty="0">
+                <a:solidFill>
+                  <a:schemeClr val="dk1"/>
+                </a:solidFill>
+                <a:latin typeface="Calibri"/>
+                <a:ea typeface="Calibri"/>
+                <a:cs typeface="Calibri"/>
+                <a:sym typeface="Calibri"/>
+              </a:rPr>
+              <a:t>)</a:t>
+            </a:r>
+            <a:endParaRPr sz="1400" dirty="0">
+              <a:solidFill>
+                <a:schemeClr val="dk1"/>
+              </a:solidFill>
+              <a:latin typeface="Calibri"/>
+              <a:ea typeface="Calibri"/>
+              <a:cs typeface="Calibri"/>
+              <a:sym typeface="Calibri"/>
+            </a:endParaRPr>
+          </a:p>
+        </p:txBody>
+      </p:sp>
       <p:grpSp>
         <p:nvGrpSpPr>
-          <p:cNvPr id="95" name="Group 94"/>
+          <p:cNvPr id="58" name="Group 94">
+            <a:extLst>
+              <a:ext uri="{FF2B5EF4-FFF2-40B4-BE49-F238E27FC236}">
+                <a16:creationId xmlns:a16="http://schemas.microsoft.com/office/drawing/2014/main" id="{89455872-A121-40C4-BE3E-68E92300D413}"/>
+              </a:ext>
+            </a:extLst>
+          </p:cNvPr>
           <p:cNvGrpSpPr/>
           <p:nvPr/>
         </p:nvGrpSpPr>
         <p:grpSpPr>
           <a:xfrm>
-            <a:off x="4925904" y="5004252"/>
+            <a:off x="6417818" y="4907866"/>
             <a:ext cx="484693" cy="265456"/>
             <a:chOff x="614149" y="4401223"/>
             <a:chExt cx="484693" cy="507248"/>
@@ -18788,7 +19167,13 @@
         </p:grpSpPr>
         <p:cxnSp>
           <p:nvCxnSpPr>
-            <p:cNvPr id="100" name="Straight Connector 99"/>
+            <p:cNvPr id="59" name="Straight Connector 99">
+              <a:extLst>
+                <a:ext uri="{FF2B5EF4-FFF2-40B4-BE49-F238E27FC236}">
+                  <a16:creationId xmlns:a16="http://schemas.microsoft.com/office/drawing/2014/main" id="{58CD338C-79A6-4399-B442-FC5CCC9B80B2}"/>
+                </a:ext>
+              </a:extLst>
+            </p:cNvPr>
             <p:cNvCxnSpPr/>
             <p:nvPr/>
           </p:nvCxnSpPr>
@@ -18823,7 +19208,13 @@
         </p:cxnSp>
         <p:cxnSp>
           <p:nvCxnSpPr>
-            <p:cNvPr id="101" name="Straight Connector 100"/>
+            <p:cNvPr id="60" name="Straight Connector 100">
+              <a:extLst>
+                <a:ext uri="{FF2B5EF4-FFF2-40B4-BE49-F238E27FC236}">
+                  <a16:creationId xmlns:a16="http://schemas.microsoft.com/office/drawing/2014/main" id="{08DB2AFE-88FF-47E9-93F3-91963EA06836}"/>
+                </a:ext>
+              </a:extLst>
+            </p:cNvPr>
             <p:cNvCxnSpPr/>
             <p:nvPr/>
           </p:nvCxnSpPr>
@@ -18858,7 +19249,13 @@
         </p:cxnSp>
         <p:cxnSp>
           <p:nvCxnSpPr>
-            <p:cNvPr id="102" name="Straight Arrow Connector 101"/>
+            <p:cNvPr id="61" name="Straight Arrow Connector 101">
+              <a:extLst>
+                <a:ext uri="{FF2B5EF4-FFF2-40B4-BE49-F238E27FC236}">
+                  <a16:creationId xmlns:a16="http://schemas.microsoft.com/office/drawing/2014/main" id="{C2AA394E-B060-4DA8-99E5-18E6EBEDA82E}"/>
+                </a:ext>
+              </a:extLst>
+            </p:cNvPr>
             <p:cNvCxnSpPr/>
             <p:nvPr/>
           </p:nvCxnSpPr>
@@ -18895,14 +19292,20 @@
       </p:grpSp>
       <p:sp>
         <p:nvSpPr>
-          <p:cNvPr id="103" name="Google Shape;318;p38"/>
+          <p:cNvPr id="62" name="Google Shape;318;p38">
+            <a:extLst>
+              <a:ext uri="{FF2B5EF4-FFF2-40B4-BE49-F238E27FC236}">
+                <a16:creationId xmlns:a16="http://schemas.microsoft.com/office/drawing/2014/main" id="{B013099F-E67B-4119-98A9-174BCFF13439}"/>
+              </a:ext>
+            </a:extLst>
+          </p:cNvPr>
           <p:cNvSpPr txBox="1"/>
           <p:nvPr/>
         </p:nvSpPr>
         <p:spPr>
           <a:xfrm>
-            <a:off x="4737764" y="4692620"/>
-            <a:ext cx="771106" cy="311632"/>
+            <a:off x="5674804" y="4602470"/>
+            <a:ext cx="1389624" cy="311632"/>
           </a:xfrm>
           <a:prstGeom prst="rect">
             <a:avLst/>
@@ -18928,7 +19331,97 @@
                 <a:cs typeface="Calibri"/>
                 <a:sym typeface="Calibri"/>
               </a:rPr>
-              <a:t>update</a:t>
+              <a:t>CheckAlbumId</a:t>
+            </a:r>
+            <a:r>
+              <a:rPr lang="es-419" sz="1200" dirty="0">
+                <a:solidFill>
+                  <a:schemeClr val="dk1"/>
+                </a:solidFill>
+                <a:latin typeface="Calibri"/>
+                <a:ea typeface="Calibri"/>
+                <a:cs typeface="Calibri"/>
+                <a:sym typeface="Calibri"/>
+              </a:rPr>
+              <a:t>()</a:t>
+            </a:r>
+            <a:endParaRPr sz="1200" dirty="0">
+              <a:solidFill>
+                <a:schemeClr val="dk1"/>
+              </a:solidFill>
+              <a:latin typeface="Calibri"/>
+              <a:ea typeface="Calibri"/>
+              <a:cs typeface="Calibri"/>
+              <a:sym typeface="Calibri"/>
+            </a:endParaRPr>
+          </a:p>
+        </p:txBody>
+      </p:sp>
+      <p:sp>
+        <p:nvSpPr>
+          <p:cNvPr id="15" name="Google Shape;333;p38">
+            <a:extLst>
+              <a:ext uri="{FF2B5EF4-FFF2-40B4-BE49-F238E27FC236}">
+                <a16:creationId xmlns:a16="http://schemas.microsoft.com/office/drawing/2014/main" id="{3EE7DE62-B7E2-4260-A4AB-3A3A447571E2}"/>
+              </a:ext>
+            </a:extLst>
+          </p:cNvPr>
+          <p:cNvSpPr txBox="1"/>
+          <p:nvPr/>
+        </p:nvSpPr>
+        <p:spPr>
+          <a:xfrm>
+            <a:off x="7270154" y="4807547"/>
+            <a:ext cx="1859740" cy="504365"/>
+          </a:xfrm>
+          <a:prstGeom prst="rect">
+            <a:avLst/>
+          </a:prstGeom>
+          <a:noFill/>
+          <a:ln>
+            <a:noFill/>
+          </a:ln>
+        </p:spPr>
+        <p:txBody>
+          <a:bodyPr spcFirstLastPara="1" wrap="square" lIns="107269" tIns="53620" rIns="107269" bIns="53620" anchor="t" anchorCtr="0">
+            <a:noAutofit/>
+          </a:bodyPr>
+          <a:lstStyle/>
+          <a:p>
+            <a:r>
+              <a:rPr lang="es-419" sz="1400" dirty="0">
+                <a:solidFill>
+                  <a:schemeClr val="dk1"/>
+                </a:solidFill>
+                <a:latin typeface="Calibri"/>
+                <a:ea typeface="Calibri"/>
+                <a:cs typeface="Calibri"/>
+                <a:sym typeface="Calibri"/>
+              </a:rPr>
+              <a:t>findImagesByAlbum</a:t>
+            </a:r>
+            <a:br>
+              <a:rPr lang="es-419" sz="1400" dirty="0">
+                <a:solidFill>
+                  <a:schemeClr val="dk1"/>
+                </a:solidFill>
+                <a:latin typeface="Calibri"/>
+                <a:ea typeface="Calibri"/>
+                <a:cs typeface="Calibri"/>
+                <a:sym typeface="Calibri"/>
+              </a:rPr>
+            </a:br>
+            <a:r>
+              <a:rPr lang="es-419" sz="1400" dirty="0">
+                <a:solidFill>
+                  <a:schemeClr val="dk1"/>
+                </a:solidFill>
+                <a:latin typeface="Calibri"/>
+                <a:ea typeface="Calibri"/>
+                <a:cs typeface="Calibri"/>
+                <a:sym typeface="Calibri"/>
+              </a:rPr>
+              <a:t> (albumId)</a:t>
             </a:r>
             <a:endParaRPr sz="1400" dirty="0">
               <a:solidFill>
@@ -18942,43 +19435,78 @@
           </a:p>
         </p:txBody>
       </p:sp>
-      <p:sp>
-        <p:nvSpPr>
-          <p:cNvPr id="111" name="Google Shape;315;p38"/>
-          <p:cNvSpPr/>
-          <p:nvPr/>
-        </p:nvSpPr>
-        <p:spPr>
-          <a:xfrm>
-            <a:off x="9531194" y="1067912"/>
-            <a:ext cx="887105" cy="624557"/>
-          </a:xfrm>
-          <a:prstGeom prst="rect">
-            <a:avLst/>
-          </a:prstGeom>
-          <a:solidFill>
-            <a:schemeClr val="tx2">
-              <a:lumMod val="20000"/>
-              <a:lumOff val="80000"/>
-            </a:schemeClr>
-          </a:solidFill>
+      <p:cxnSp>
+        <p:nvCxnSpPr>
+          <p:cNvPr id="76" name="Google Shape;382;p40">
+            <a:extLst>
+              <a:ext uri="{FF2B5EF4-FFF2-40B4-BE49-F238E27FC236}">
+                <a16:creationId xmlns:a16="http://schemas.microsoft.com/office/drawing/2014/main" id="{474C4AC2-E1C7-4565-ACAA-AF9FC8398B77}"/>
+              </a:ext>
+            </a:extLst>
+          </p:cNvPr>
+          <p:cNvCxnSpPr>
+            <a:cxnSpLocks/>
+          </p:cNvCxnSpPr>
+          <p:nvPr/>
+        </p:nvCxnSpPr>
+        <p:spPr>
+          <a:xfrm>
+            <a:off x="7378034" y="5807713"/>
+            <a:ext cx="1861760" cy="0"/>
+          </a:xfrm>
+          <a:prstGeom prst="straightConnector1">
+            <a:avLst/>
+          </a:prstGeom>
+          <a:noFill/>
           <a:ln w="25400" cap="flat" cmpd="sng">
             <a:solidFill>
               <a:schemeClr val="accent1"/>
             </a:solidFill>
-            <a:prstDash val="solid"/>
+            <a:prstDash val="dash"/>
             <a:round/>
-            <a:headEnd type="none" w="sm" len="sm"/>
-            <a:tailEnd type="none" w="sm" len="sm"/>
+            <a:headEnd type="arrow" w="med" len="med"/>
+            <a:tailEnd type="none" w="med" len="med"/>
+          </a:ln>
+          <a:effectLst>
+            <a:outerShdw blurRad="40000" dist="20000" dir="5400000" rotWithShape="0">
+              <a:srgbClr val="000000">
+                <a:alpha val="37650"/>
+              </a:srgbClr>
+            </a:outerShdw>
+          </a:effectLst>
+        </p:spPr>
+      </p:cxnSp>
+      <p:sp>
+        <p:nvSpPr>
+          <p:cNvPr id="17" name="Google Shape;318;p38">
+            <a:extLst>
+              <a:ext uri="{FF2B5EF4-FFF2-40B4-BE49-F238E27FC236}">
+                <a16:creationId xmlns:a16="http://schemas.microsoft.com/office/drawing/2014/main" id="{7774BD78-C356-441E-8F9C-34CD399EC210}"/>
+              </a:ext>
+            </a:extLst>
+          </p:cNvPr>
+          <p:cNvSpPr txBox="1"/>
+          <p:nvPr/>
+        </p:nvSpPr>
+        <p:spPr>
+          <a:xfrm>
+            <a:off x="7966178" y="5513583"/>
+            <a:ext cx="991900" cy="308000"/>
+          </a:xfrm>
+          <a:prstGeom prst="rect">
+            <a:avLst/>
+          </a:prstGeom>
+          <a:noFill/>
+          <a:ln>
+            <a:noFill/>
           </a:ln>
         </p:spPr>
         <p:txBody>
-          <a:bodyPr spcFirstLastPara="1" wrap="square" lIns="107269" tIns="53620" rIns="107269" bIns="53620" anchor="ctr" anchorCtr="0">
+          <a:bodyPr spcFirstLastPara="1" wrap="square" lIns="107269" tIns="53620" rIns="107269" bIns="53620" anchor="t" anchorCtr="0">
             <a:noAutofit/>
           </a:bodyPr>
           <a:lstStyle/>
           <a:p>
-            <a:pPr algn="ctr"/>
             <a:r>
               <a:rPr lang="es-419" sz="1400" dirty="0">
                 <a:solidFill>
@@ -18989,11 +19517,92 @@
                 <a:cs typeface="Calibri"/>
                 <a:sym typeface="Calibri"/>
               </a:rPr>
-              <a:t>Expenses</a:t>
-            </a:r>
-          </a:p>
-          <a:p>
-            <a:pPr algn="ctr"/>
+              <a:t>images</a:t>
+            </a:r>
+            <a:endParaRPr sz="1400" dirty="0">
+              <a:solidFill>
+                <a:schemeClr val="dk1"/>
+              </a:solidFill>
+              <a:latin typeface="Calibri"/>
+              <a:ea typeface="Calibri"/>
+              <a:cs typeface="Calibri"/>
+              <a:sym typeface="Calibri"/>
+            </a:endParaRPr>
+          </a:p>
+        </p:txBody>
+      </p:sp>
+      <p:cxnSp>
+        <p:nvCxnSpPr>
+          <p:cNvPr id="79" name="Google Shape;382;p40">
+            <a:extLst>
+              <a:ext uri="{FF2B5EF4-FFF2-40B4-BE49-F238E27FC236}">
+                <a16:creationId xmlns:a16="http://schemas.microsoft.com/office/drawing/2014/main" id="{3ECAD428-63F5-4268-9176-BFFAD322D85A}"/>
+              </a:ext>
+            </a:extLst>
+          </p:cNvPr>
+          <p:cNvCxnSpPr>
+            <a:cxnSpLocks/>
+          </p:cNvCxnSpPr>
+          <p:nvPr/>
+        </p:nvCxnSpPr>
+        <p:spPr>
+          <a:xfrm>
+            <a:off x="5411897" y="5983251"/>
+            <a:ext cx="1515990" cy="0"/>
+          </a:xfrm>
+          <a:prstGeom prst="straightConnector1">
+            <a:avLst/>
+          </a:prstGeom>
+          <a:noFill/>
+          <a:ln w="25400" cap="flat" cmpd="sng">
+            <a:solidFill>
+              <a:schemeClr val="accent1"/>
+            </a:solidFill>
+            <a:prstDash val="dash"/>
+            <a:round/>
+            <a:headEnd type="arrow" w="med" len="med"/>
+            <a:tailEnd type="none" w="med" len="med"/>
+          </a:ln>
+          <a:effectLst>
+            <a:outerShdw blurRad="40000" dist="20000" dir="5400000" rotWithShape="0">
+              <a:srgbClr val="000000">
+                <a:alpha val="37650"/>
+              </a:srgbClr>
+            </a:outerShdw>
+          </a:effectLst>
+        </p:spPr>
+      </p:cxnSp>
+      <p:sp>
+        <p:nvSpPr>
+          <p:cNvPr id="80" name="Google Shape;318;p38">
+            <a:extLst>
+              <a:ext uri="{FF2B5EF4-FFF2-40B4-BE49-F238E27FC236}">
+                <a16:creationId xmlns:a16="http://schemas.microsoft.com/office/drawing/2014/main" id="{A8A5C05A-E88A-4194-8663-69B8F2DC380C}"/>
+              </a:ext>
+            </a:extLst>
+          </p:cNvPr>
+          <p:cNvSpPr txBox="1"/>
+          <p:nvPr/>
+        </p:nvSpPr>
+        <p:spPr>
+          <a:xfrm>
+            <a:off x="5913467" y="5675250"/>
+            <a:ext cx="991900" cy="308000"/>
+          </a:xfrm>
+          <a:prstGeom prst="rect">
+            <a:avLst/>
+          </a:prstGeom>
+          <a:noFill/>
+          <a:ln>
+            <a:noFill/>
+          </a:ln>
+        </p:spPr>
+        <p:txBody>
+          <a:bodyPr spcFirstLastPara="1" wrap="square" lIns="107269" tIns="53620" rIns="107269" bIns="53620" anchor="t" anchorCtr="0">
+            <a:noAutofit/>
+          </a:bodyPr>
+          <a:lstStyle/>
+          <a:p>
             <a:r>
               <a:rPr lang="es-419" sz="1400" dirty="0">
                 <a:solidFill>
@@ -19004,7 +19613,7 @@
                 <a:cs typeface="Calibri"/>
                 <a:sym typeface="Calibri"/>
               </a:rPr>
-              <a:t>DAO</a:t>
+              <a:t>images</a:t>
             </a:r>
             <a:endParaRPr sz="1400" dirty="0">
               <a:solidFill>
@@ -19018,131 +19627,167 @@
           </a:p>
         </p:txBody>
       </p:sp>
-      <p:cxnSp>
-        <p:nvCxnSpPr>
-          <p:cNvPr id="112" name="Google Shape;316;p38"/>
-          <p:cNvCxnSpPr/>
-          <p:nvPr/>
-        </p:nvCxnSpPr>
-        <p:spPr>
-          <a:xfrm flipH="1">
-            <a:off x="9945972" y="1793366"/>
-            <a:ext cx="28774" cy="4343600"/>
-          </a:xfrm>
-          <a:prstGeom prst="straightConnector1">
-            <a:avLst/>
-          </a:prstGeom>
-          <a:noFill/>
-          <a:ln w="38100" cap="flat" cmpd="sng">
-            <a:solidFill>
+      <p:grpSp>
+        <p:nvGrpSpPr>
+          <p:cNvPr id="81" name="Group 94">
+            <a:extLst>
+              <a:ext uri="{FF2B5EF4-FFF2-40B4-BE49-F238E27FC236}">
+                <a16:creationId xmlns:a16="http://schemas.microsoft.com/office/drawing/2014/main" id="{D98C208E-1FF2-4E3C-B31A-F19EBF36C598}"/>
+              </a:ext>
+            </a:extLst>
+          </p:cNvPr>
+          <p:cNvGrpSpPr/>
+          <p:nvPr/>
+        </p:nvGrpSpPr>
+        <p:grpSpPr>
+          <a:xfrm>
+            <a:off x="4443079" y="6161044"/>
+            <a:ext cx="484693" cy="265456"/>
+            <a:chOff x="614149" y="4401223"/>
+            <a:chExt cx="484693" cy="507248"/>
+          </a:xfrm>
+        </p:grpSpPr>
+        <p:cxnSp>
+          <p:nvCxnSpPr>
+            <p:cNvPr id="82" name="Straight Connector 99">
+              <a:extLst>
+                <a:ext uri="{FF2B5EF4-FFF2-40B4-BE49-F238E27FC236}">
+                  <a16:creationId xmlns:a16="http://schemas.microsoft.com/office/drawing/2014/main" id="{F8E7E7D4-C873-4178-8DF7-167CD0F0D309}"/>
+                </a:ext>
+              </a:extLst>
+            </p:cNvPr>
+            <p:cNvCxnSpPr/>
+            <p:nvPr/>
+          </p:nvCxnSpPr>
+          <p:spPr>
+            <a:xfrm flipH="1">
+              <a:off x="614149" y="4401223"/>
+              <a:ext cx="484693" cy="0"/>
+            </a:xfrm>
+            <a:prstGeom prst="line">
+              <a:avLst/>
+            </a:prstGeom>
+            <a:ln w="28575">
+              <a:solidFill>
+                <a:srgbClr val="0070C0"/>
+              </a:solidFill>
+            </a:ln>
+          </p:spPr>
+          <p:style>
+            <a:lnRef idx="1">
               <a:schemeClr val="accent1"/>
-            </a:solidFill>
-            <a:prstDash val="dot"/>
-            <a:round/>
-            <a:headEnd type="none" w="sm" len="sm"/>
-            <a:tailEnd type="none" w="sm" len="sm"/>
-          </a:ln>
-          <a:effectLst>
-            <a:outerShdw blurRad="40000" dist="23000" dir="5400000" rotWithShape="0">
-              <a:srgbClr val="000000">
-                <a:alpha val="34900"/>
-              </a:srgbClr>
-            </a:outerShdw>
-          </a:effectLst>
-        </p:spPr>
-      </p:cxnSp>
-      <p:sp>
-        <p:nvSpPr>
-          <p:cNvPr id="113" name="Google Shape;319;p38"/>
-          <p:cNvSpPr/>
-          <p:nvPr/>
-        </p:nvSpPr>
-        <p:spPr>
-          <a:xfrm>
-            <a:off x="9813709" y="3880131"/>
-            <a:ext cx="330200" cy="991199"/>
-          </a:xfrm>
-          <a:prstGeom prst="rect">
-            <a:avLst/>
-          </a:prstGeom>
-          <a:solidFill>
-            <a:schemeClr val="tx2">
-              <a:lumMod val="20000"/>
-              <a:lumOff val="80000"/>
-            </a:schemeClr>
-          </a:solidFill>
-          <a:ln w="25400" cap="flat" cmpd="sng">
-            <a:solidFill>
+            </a:lnRef>
+            <a:fillRef idx="0">
               <a:schemeClr val="accent1"/>
-            </a:solidFill>
-            <a:prstDash val="solid"/>
-            <a:round/>
-            <a:headEnd type="none" w="sm" len="sm"/>
-            <a:tailEnd type="none" w="sm" len="sm"/>
-          </a:ln>
-        </p:spPr>
-        <p:txBody>
-          <a:bodyPr spcFirstLastPara="1" wrap="square" lIns="107269" tIns="53620" rIns="107269" bIns="53620" anchor="ctr" anchorCtr="0">
-            <a:noAutofit/>
-          </a:bodyPr>
-          <a:lstStyle/>
-          <a:p>
-            <a:pPr algn="ctr"/>
-            <a:endParaRPr sz="2000">
+            </a:fillRef>
+            <a:effectRef idx="0">
+              <a:schemeClr val="accent1"/>
+            </a:effectRef>
+            <a:fontRef idx="minor">
+              <a:schemeClr val="tx1"/>
+            </a:fontRef>
+          </p:style>
+        </p:cxnSp>
+        <p:cxnSp>
+          <p:nvCxnSpPr>
+            <p:cNvPr id="85" name="Straight Connector 100">
+              <a:extLst>
+                <a:ext uri="{FF2B5EF4-FFF2-40B4-BE49-F238E27FC236}">
+                  <a16:creationId xmlns:a16="http://schemas.microsoft.com/office/drawing/2014/main" id="{3CDFB136-CAC4-4771-9BD0-42B37400A3D8}"/>
+                </a:ext>
+              </a:extLst>
+            </p:cNvPr>
+            <p:cNvCxnSpPr/>
+            <p:nvPr/>
+          </p:nvCxnSpPr>
+          <p:spPr>
+            <a:xfrm>
+              <a:off x="614149" y="4401223"/>
+              <a:ext cx="0" cy="505677"/>
+            </a:xfrm>
+            <a:prstGeom prst="line">
+              <a:avLst/>
+            </a:prstGeom>
+            <a:ln w="28575">
               <a:solidFill>
-                <a:schemeClr val="dk1"/>
+                <a:srgbClr val="0070C0"/>
               </a:solidFill>
-              <a:latin typeface="Calibri"/>
-              <a:ea typeface="Calibri"/>
-              <a:cs typeface="Calibri"/>
-              <a:sym typeface="Calibri"/>
-            </a:endParaRPr>
-          </a:p>
-        </p:txBody>
-      </p:sp>
-      <p:cxnSp>
-        <p:nvCxnSpPr>
-          <p:cNvPr id="114" name="Google Shape;382;p40"/>
-          <p:cNvCxnSpPr/>
-          <p:nvPr/>
-        </p:nvCxnSpPr>
-        <p:spPr>
-          <a:xfrm flipV="1">
-            <a:off x="7118839" y="4663346"/>
-            <a:ext cx="2694871" cy="1"/>
-          </a:xfrm>
-          <a:prstGeom prst="straightConnector1">
-            <a:avLst/>
-          </a:prstGeom>
-          <a:noFill/>
-          <a:ln w="25400" cap="flat" cmpd="sng">
-            <a:solidFill>
+            </a:ln>
+          </p:spPr>
+          <p:style>
+            <a:lnRef idx="1">
               <a:schemeClr val="accent1"/>
-            </a:solidFill>
-            <a:prstDash val="dash"/>
-            <a:round/>
-            <a:headEnd type="arrow" w="med" len="med"/>
-            <a:tailEnd type="none" w="med" len="med"/>
-          </a:ln>
-          <a:effectLst>
-            <a:outerShdw blurRad="40000" dist="20000" dir="5400000" rotWithShape="0">
-              <a:srgbClr val="000000">
-                <a:alpha val="37650"/>
-              </a:srgbClr>
-            </a:outerShdw>
-          </a:effectLst>
-        </p:spPr>
-      </p:cxnSp>
-      <p:sp>
-        <p:nvSpPr>
-          <p:cNvPr id="115" name="Google Shape;383;p40"/>
+            </a:lnRef>
+            <a:fillRef idx="0">
+              <a:schemeClr val="accent1"/>
+            </a:fillRef>
+            <a:effectRef idx="0">
+              <a:schemeClr val="accent1"/>
+            </a:effectRef>
+            <a:fontRef idx="minor">
+              <a:schemeClr val="tx1"/>
+            </a:fontRef>
+          </p:style>
+        </p:cxnSp>
+        <p:cxnSp>
+          <p:nvCxnSpPr>
+            <p:cNvPr id="86" name="Straight Arrow Connector 101">
+              <a:extLst>
+                <a:ext uri="{FF2B5EF4-FFF2-40B4-BE49-F238E27FC236}">
+                  <a16:creationId xmlns:a16="http://schemas.microsoft.com/office/drawing/2014/main" id="{1A12B6FD-F223-4B0C-806B-98D267776327}"/>
+                </a:ext>
+              </a:extLst>
+            </p:cNvPr>
+            <p:cNvCxnSpPr/>
+            <p:nvPr/>
+          </p:nvCxnSpPr>
+          <p:spPr>
+            <a:xfrm>
+              <a:off x="614149" y="4908471"/>
+              <a:ext cx="484693" cy="0"/>
+            </a:xfrm>
+            <a:prstGeom prst="straightConnector1">
+              <a:avLst/>
+            </a:prstGeom>
+            <a:ln w="28575">
+              <a:solidFill>
+                <a:srgbClr val="0070C0"/>
+              </a:solidFill>
+              <a:tailEnd type="arrow"/>
+            </a:ln>
+          </p:spPr>
+          <p:style>
+            <a:lnRef idx="1">
+              <a:schemeClr val="accent1"/>
+            </a:lnRef>
+            <a:fillRef idx="0">
+              <a:schemeClr val="accent1"/>
+            </a:fillRef>
+            <a:effectRef idx="0">
+              <a:schemeClr val="accent1"/>
+            </a:effectRef>
+            <a:fontRef idx="minor">
+              <a:schemeClr val="tx1"/>
+            </a:fontRef>
+          </p:style>
+        </p:cxnSp>
+      </p:grpSp>
+      <p:sp>
+        <p:nvSpPr>
+          <p:cNvPr id="87" name="Google Shape;318;p38">
+            <a:extLst>
+              <a:ext uri="{FF2B5EF4-FFF2-40B4-BE49-F238E27FC236}">
+                <a16:creationId xmlns:a16="http://schemas.microsoft.com/office/drawing/2014/main" id="{151FB217-9B29-4A90-867E-BA07EC719018}"/>
+              </a:ext>
+            </a:extLst>
+          </p:cNvPr>
           <p:cNvSpPr txBox="1"/>
           <p:nvPr/>
         </p:nvSpPr>
         <p:spPr>
           <a:xfrm>
-            <a:off x="7140600" y="4203813"/>
-            <a:ext cx="2503947" cy="360275"/>
+            <a:off x="3986508" y="5806904"/>
+            <a:ext cx="921069" cy="311632"/>
           </a:xfrm>
           <a:prstGeom prst="rect">
             <a:avLst/>
@@ -19158,9 +19803,8 @@
           </a:bodyPr>
           <a:lstStyle/>
           <a:p>
-            <a:pPr lvl="0"/>
-            <a:r>
-              <a:rPr lang="en-US" sz="1200" dirty="0" err="1">
+            <a:r>
+              <a:rPr lang="es-419" sz="1400" dirty="0">
                 <a:solidFill>
                   <a:schemeClr val="dk1"/>
                 </a:solidFill>
@@ -19169,258 +19813,9 @@
                 <a:cs typeface="Calibri"/>
                 <a:sym typeface="Calibri"/>
               </a:rPr>
-              <a:t>findExpensesForMission</a:t>
-            </a:r>
-            <a:r>
-              <a:rPr lang="es-419" sz="1200" dirty="0">
-                <a:solidFill>
-                  <a:schemeClr val="dk1"/>
-                </a:solidFill>
-                <a:latin typeface="Calibri"/>
-                <a:ea typeface="Calibri"/>
-                <a:cs typeface="Calibri"/>
-                <a:sym typeface="Calibri"/>
-              </a:rPr>
-              <a:t>(missionid)</a:t>
-            </a:r>
-            <a:endParaRPr sz="1200" dirty="0">
-              <a:solidFill>
-                <a:schemeClr val="dk1"/>
-              </a:solidFill>
-              <a:latin typeface="Calibri"/>
-              <a:ea typeface="Calibri"/>
-              <a:cs typeface="Calibri"/>
-              <a:sym typeface="Calibri"/>
-            </a:endParaRPr>
-          </a:p>
-        </p:txBody>
-      </p:sp>
-      <p:cxnSp>
-        <p:nvCxnSpPr>
-          <p:cNvPr id="116" name="Google Shape;384;p40"/>
-          <p:cNvCxnSpPr/>
-          <p:nvPr/>
-        </p:nvCxnSpPr>
-        <p:spPr>
-          <a:xfrm>
-            <a:off x="7118839" y="4151563"/>
-            <a:ext cx="2694871" cy="1"/>
-          </a:xfrm>
-          <a:prstGeom prst="straightConnector1">
-            <a:avLst/>
-          </a:prstGeom>
-          <a:noFill/>
-          <a:ln w="25400" cap="flat" cmpd="sng">
-            <a:solidFill>
-              <a:schemeClr val="accent1"/>
-            </a:solidFill>
-            <a:prstDash val="solid"/>
-            <a:round/>
-            <a:headEnd type="none" w="sm" len="sm"/>
-            <a:tailEnd type="stealth" w="med" len="med"/>
-          </a:ln>
-          <a:effectLst>
-            <a:outerShdw blurRad="40000" dist="20000" dir="5400000" rotWithShape="0">
-              <a:srgbClr val="000000">
-                <a:alpha val="37650"/>
-              </a:srgbClr>
-            </a:outerShdw>
-          </a:effectLst>
-        </p:spPr>
-      </p:cxnSp>
-      <p:sp>
-        <p:nvSpPr>
-          <p:cNvPr id="117" name="Google Shape;387;p40"/>
-          <p:cNvSpPr txBox="1"/>
-          <p:nvPr/>
-        </p:nvSpPr>
-        <p:spPr>
-          <a:xfrm>
-            <a:off x="7900796" y="4621904"/>
-            <a:ext cx="991900" cy="308000"/>
-          </a:xfrm>
-          <a:prstGeom prst="rect">
-            <a:avLst/>
-          </a:prstGeom>
-          <a:noFill/>
-          <a:ln>
-            <a:noFill/>
-          </a:ln>
-        </p:spPr>
-        <p:txBody>
-          <a:bodyPr spcFirstLastPara="1" wrap="square" lIns="107269" tIns="53620" rIns="107269" bIns="53620" anchor="t" anchorCtr="0">
-            <a:noAutofit/>
-          </a:bodyPr>
-          <a:lstStyle/>
-          <a:p>
-            <a:r>
-              <a:rPr lang="es-419" sz="1200">
-                <a:solidFill>
-                  <a:schemeClr val="dk1"/>
-                </a:solidFill>
-                <a:latin typeface="Calibri"/>
-                <a:ea typeface="Calibri"/>
-                <a:cs typeface="Calibri"/>
-                <a:sym typeface="Calibri"/>
-              </a:rPr>
-              <a:t>expenses</a:t>
-            </a:r>
-            <a:endParaRPr sz="1200">
-              <a:solidFill>
-                <a:schemeClr val="dk1"/>
-              </a:solidFill>
-              <a:latin typeface="Calibri"/>
-              <a:ea typeface="Calibri"/>
-              <a:cs typeface="Calibri"/>
-              <a:sym typeface="Calibri"/>
-            </a:endParaRPr>
-          </a:p>
-        </p:txBody>
-      </p:sp>
-      <p:sp>
-        <p:nvSpPr>
-          <p:cNvPr id="2" name="Google Shape;290;p37">
-            <a:extLst>
-              <a:ext uri="{FF2B5EF4-FFF2-40B4-BE49-F238E27FC236}">
-                <a16:creationId xmlns:a16="http://schemas.microsoft.com/office/drawing/2014/main" id="{02B5153D-A46F-4720-A82E-B1F36C24FFE6}"/>
-              </a:ext>
-            </a:extLst>
-          </p:cNvPr>
-          <p:cNvSpPr/>
-          <p:nvPr/>
-        </p:nvSpPr>
-        <p:spPr>
-          <a:xfrm>
-            <a:off x="5243847" y="1149042"/>
-            <a:ext cx="846161" cy="651379"/>
-          </a:xfrm>
-          <a:prstGeom prst="rect">
-            <a:avLst/>
-          </a:prstGeom>
-          <a:solidFill>
-            <a:schemeClr val="lt1"/>
-          </a:solidFill>
-          <a:ln w="25400" cap="flat" cmpd="sng">
-            <a:solidFill>
-              <a:schemeClr val="accent1"/>
-            </a:solidFill>
-            <a:prstDash val="solid"/>
-            <a:round/>
-            <a:headEnd type="none" w="sm" len="sm"/>
-            <a:tailEnd type="none" w="sm" len="sm"/>
-          </a:ln>
-        </p:spPr>
-        <p:txBody>
-          <a:bodyPr spcFirstLastPara="1" wrap="square" lIns="107269" tIns="53620" rIns="107269" bIns="53620" anchor="ctr" anchorCtr="0">
-            <a:noAutofit/>
-          </a:bodyPr>
-          <a:lstStyle/>
-          <a:p>
-            <a:pPr algn="ctr"/>
-            <a:r>
-              <a:rPr lang="es-419" sz="1200">
-                <a:solidFill>
-                  <a:schemeClr val="dk1"/>
-                </a:solidFill>
-                <a:latin typeface="Calibri"/>
-                <a:ea typeface="Calibri"/>
-                <a:cs typeface="Calibri"/>
-                <a:sym typeface="Calibri"/>
-              </a:rPr>
-              <a:t>Image Details</a:t>
-            </a:r>
-            <a:endParaRPr sz="1200" dirty="0">
-              <a:solidFill>
-                <a:schemeClr val="dk1"/>
-              </a:solidFill>
-              <a:latin typeface="Calibri"/>
-              <a:ea typeface="Calibri"/>
-              <a:cs typeface="Calibri"/>
-              <a:sym typeface="Calibri"/>
-            </a:endParaRPr>
-          </a:p>
-        </p:txBody>
-      </p:sp>
-      <p:cxnSp>
-        <p:nvCxnSpPr>
-          <p:cNvPr id="41" name="Straight Connector 52">
-            <a:extLst>
-              <a:ext uri="{FF2B5EF4-FFF2-40B4-BE49-F238E27FC236}">
-                <a16:creationId xmlns:a16="http://schemas.microsoft.com/office/drawing/2014/main" id="{928D1D6F-9098-47DF-8289-194D299E0C5F}"/>
-              </a:ext>
-            </a:extLst>
-          </p:cNvPr>
-          <p:cNvCxnSpPr/>
-          <p:nvPr/>
-        </p:nvCxnSpPr>
-        <p:spPr>
-          <a:xfrm flipH="1">
-            <a:off x="3364968" y="1742706"/>
-            <a:ext cx="10587" cy="4405636"/>
-          </a:xfrm>
-          <a:prstGeom prst="line">
-            <a:avLst/>
-          </a:prstGeom>
-          <a:noFill/>
-          <a:ln w="38100" cap="flat" cmpd="sng">
-            <a:solidFill>
-              <a:schemeClr val="accent1"/>
-            </a:solidFill>
-            <a:prstDash val="dot"/>
-            <a:round/>
-            <a:headEnd type="none" w="sm" len="sm"/>
-            <a:tailEnd type="none" w="sm" len="sm"/>
-          </a:ln>
-          <a:effectLst>
-            <a:outerShdw blurRad="40000" dist="23000" dir="5400000" rotWithShape="0">
-              <a:srgbClr val="000000">
-                <a:alpha val="34901"/>
-              </a:srgbClr>
-            </a:outerShdw>
-          </a:effectLst>
-        </p:spPr>
-      </p:cxnSp>
-      <p:sp>
-        <p:nvSpPr>
-          <p:cNvPr id="42" name="Google Shape;292;p37">
-            <a:extLst>
-              <a:ext uri="{FF2B5EF4-FFF2-40B4-BE49-F238E27FC236}">
-                <a16:creationId xmlns:a16="http://schemas.microsoft.com/office/drawing/2014/main" id="{EC2375AF-7438-4CBB-8A8B-3AE68559F82D}"/>
-              </a:ext>
-            </a:extLst>
-          </p:cNvPr>
-          <p:cNvSpPr/>
-          <p:nvPr/>
-        </p:nvSpPr>
-        <p:spPr>
-          <a:xfrm>
-            <a:off x="3204496" y="1967976"/>
-            <a:ext cx="342116" cy="3444478"/>
-          </a:xfrm>
-          <a:prstGeom prst="rect">
-            <a:avLst/>
-          </a:prstGeom>
-          <a:solidFill>
-            <a:schemeClr val="lt1"/>
-          </a:solidFill>
-          <a:ln w="25400" cap="flat" cmpd="sng">
-            <a:solidFill>
-              <a:schemeClr val="accent1"/>
-            </a:solidFill>
-            <a:prstDash val="solid"/>
-            <a:round/>
-            <a:headEnd type="none" w="sm" len="sm"/>
-            <a:tailEnd type="none" w="sm" len="sm"/>
-          </a:ln>
-        </p:spPr>
-        <p:txBody>
-          <a:bodyPr spcFirstLastPara="1" wrap="square" lIns="107269" tIns="53620" rIns="107269" bIns="53620" anchor="ctr" anchorCtr="0">
-            <a:noAutofit/>
-          </a:bodyPr>
-          <a:lstStyle/>
-          <a:p>
-            <a:pPr algn="ctr"/>
-            <a:endParaRPr sz="2100">
+              <a:t>update()</a:t>
+            </a:r>
+            <a:endParaRPr sz="1400" dirty="0">
               <a:solidFill>
                 <a:schemeClr val="dk1"/>
               </a:solidFill>

</xml_diff>

<commit_message>
Cleaning import, added index registration done, pptx
</commit_message>
<xml_diff>
--- a/Presentazioni Powerpoint/Progetto1_versione_RIA.pptx
+++ b/Presentazioni Powerpoint/Progetto1_versione_RIA.pptx
@@ -13,12 +13,12 @@
     <p:sldId id="263" r:id="rId4"/>
     <p:sldId id="352" r:id="rId5"/>
     <p:sldId id="353" r:id="rId6"/>
-    <p:sldId id="354" r:id="rId7"/>
-    <p:sldId id="355" r:id="rId8"/>
-    <p:sldId id="356" r:id="rId9"/>
-    <p:sldId id="357" r:id="rId10"/>
-    <p:sldId id="360" r:id="rId11"/>
-    <p:sldId id="359" r:id="rId12"/>
+    <p:sldId id="361" r:id="rId7"/>
+    <p:sldId id="362" r:id="rId8"/>
+    <p:sldId id="363" r:id="rId9"/>
+    <p:sldId id="365" r:id="rId10"/>
+    <p:sldId id="366" r:id="rId11"/>
+    <p:sldId id="367" r:id="rId12"/>
     <p:sldId id="283" r:id="rId13"/>
     <p:sldId id="284" r:id="rId14"/>
     <p:sldId id="258" r:id="rId15"/>
@@ -229,7 +229,7 @@
           <a:p>
             <a:fld id="{C25F5A86-D4B2-4CFB-9FC8-FAE097577B12}" type="datetimeFigureOut">
               <a:rPr lang="it-IT" smtClean="0"/>
-              <a:t>06/09/2020</a:t>
+              <a:t>07/09/2020</a:t>
             </a:fld>
             <a:endParaRPr lang="it-IT" dirty="0"/>
           </a:p>
@@ -547,7 +547,7 @@
               </a:spcAft>
               <a:buNone/>
             </a:pPr>
-            <a:endParaRPr/>
+            <a:endParaRPr dirty="0"/>
           </a:p>
         </p:txBody>
       </p:sp>
@@ -1245,7 +1245,7 @@
               </a:spcAft>
               <a:buNone/>
             </a:pPr>
-            <a:endParaRPr/>
+            <a:endParaRPr dirty="0"/>
           </a:p>
         </p:txBody>
       </p:sp>
@@ -1349,7 +1349,7 @@
               </a:spcAft>
               <a:buNone/>
             </a:pPr>
-            <a:endParaRPr/>
+            <a:endParaRPr dirty="0"/>
           </a:p>
         </p:txBody>
       </p:sp>
@@ -1762,7 +1762,7 @@
           <a:p>
             <a:fld id="{FE1EE28F-F736-456D-A3C7-4F5EC37410C2}" type="datetimeFigureOut">
               <a:rPr lang="it-IT" smtClean="0"/>
-              <a:t>06/09/2020</a:t>
+              <a:t>07/09/2020</a:t>
             </a:fld>
             <a:endParaRPr lang="it-IT" dirty="0"/>
           </a:p>
@@ -1960,7 +1960,7 @@
           <a:p>
             <a:fld id="{FE1EE28F-F736-456D-A3C7-4F5EC37410C2}" type="datetimeFigureOut">
               <a:rPr lang="it-IT" smtClean="0"/>
-              <a:t>06/09/2020</a:t>
+              <a:t>07/09/2020</a:t>
             </a:fld>
             <a:endParaRPr lang="it-IT" dirty="0"/>
           </a:p>
@@ -2168,7 +2168,7 @@
           <a:p>
             <a:fld id="{FE1EE28F-F736-456D-A3C7-4F5EC37410C2}" type="datetimeFigureOut">
               <a:rPr lang="it-IT" smtClean="0"/>
-              <a:t>06/09/2020</a:t>
+              <a:t>07/09/2020</a:t>
             </a:fld>
             <a:endParaRPr lang="it-IT" dirty="0"/>
           </a:p>
@@ -2366,7 +2366,7 @@
           <a:p>
             <a:fld id="{FE1EE28F-F736-456D-A3C7-4F5EC37410C2}" type="datetimeFigureOut">
               <a:rPr lang="it-IT" smtClean="0"/>
-              <a:t>06/09/2020</a:t>
+              <a:t>07/09/2020</a:t>
             </a:fld>
             <a:endParaRPr lang="it-IT" dirty="0"/>
           </a:p>
@@ -2641,7 +2641,7 @@
           <a:p>
             <a:fld id="{FE1EE28F-F736-456D-A3C7-4F5EC37410C2}" type="datetimeFigureOut">
               <a:rPr lang="it-IT" smtClean="0"/>
-              <a:t>06/09/2020</a:t>
+              <a:t>07/09/2020</a:t>
             </a:fld>
             <a:endParaRPr lang="it-IT" dirty="0"/>
           </a:p>
@@ -2906,7 +2906,7 @@
           <a:p>
             <a:fld id="{FE1EE28F-F736-456D-A3C7-4F5EC37410C2}" type="datetimeFigureOut">
               <a:rPr lang="it-IT" smtClean="0"/>
-              <a:t>06/09/2020</a:t>
+              <a:t>07/09/2020</a:t>
             </a:fld>
             <a:endParaRPr lang="it-IT" dirty="0"/>
           </a:p>
@@ -3318,7 +3318,7 @@
           <a:p>
             <a:fld id="{FE1EE28F-F736-456D-A3C7-4F5EC37410C2}" type="datetimeFigureOut">
               <a:rPr lang="it-IT" smtClean="0"/>
-              <a:t>06/09/2020</a:t>
+              <a:t>07/09/2020</a:t>
             </a:fld>
             <a:endParaRPr lang="it-IT" dirty="0"/>
           </a:p>
@@ -3459,7 +3459,7 @@
           <a:p>
             <a:fld id="{FE1EE28F-F736-456D-A3C7-4F5EC37410C2}" type="datetimeFigureOut">
               <a:rPr lang="it-IT" smtClean="0"/>
-              <a:t>06/09/2020</a:t>
+              <a:t>07/09/2020</a:t>
             </a:fld>
             <a:endParaRPr lang="it-IT" dirty="0"/>
           </a:p>
@@ -3572,7 +3572,7 @@
           <a:p>
             <a:fld id="{FE1EE28F-F736-456D-A3C7-4F5EC37410C2}" type="datetimeFigureOut">
               <a:rPr lang="it-IT" smtClean="0"/>
-              <a:t>06/09/2020</a:t>
+              <a:t>07/09/2020</a:t>
             </a:fld>
             <a:endParaRPr lang="it-IT" dirty="0"/>
           </a:p>
@@ -3883,7 +3883,7 @@
           <a:p>
             <a:fld id="{FE1EE28F-F736-456D-A3C7-4F5EC37410C2}" type="datetimeFigureOut">
               <a:rPr lang="it-IT" smtClean="0"/>
-              <a:t>06/09/2020</a:t>
+              <a:t>07/09/2020</a:t>
             </a:fld>
             <a:endParaRPr lang="it-IT" dirty="0"/>
           </a:p>
@@ -4171,7 +4171,7 @@
           <a:p>
             <a:fld id="{FE1EE28F-F736-456D-A3C7-4F5EC37410C2}" type="datetimeFigureOut">
               <a:rPr lang="it-IT" smtClean="0"/>
-              <a:t>06/09/2020</a:t>
+              <a:t>07/09/2020</a:t>
             </a:fld>
             <a:endParaRPr lang="it-IT" dirty="0"/>
           </a:p>
@@ -4412,7 +4412,7 @@
           <a:p>
             <a:fld id="{FE1EE28F-F736-456D-A3C7-4F5EC37410C2}" type="datetimeFigureOut">
               <a:rPr lang="it-IT" smtClean="0"/>
-              <a:t>06/09/2020</a:t>
+              <a:t>07/09/2020</a:t>
             </a:fld>
             <a:endParaRPr lang="it-IT" dirty="0"/>
           </a:p>
@@ -4893,7 +4893,7 @@
           <a:lstStyle/>
           <a:p>
             <a:pPr algn="ctr"/>
-            <a:endParaRPr lang="en-US"/>
+            <a:endParaRPr lang="en-US" dirty="0"/>
           </a:p>
         </p:txBody>
       </p:sp>
@@ -5033,10 +5033,10 @@
       </p:grpSpPr>
       <p:sp useBgFill="1">
         <p:nvSpPr>
-          <p:cNvPr id="16" name="Rectangle 15">
-            <a:extLst>
-              <a:ext uri="{FF2B5EF4-FFF2-40B4-BE49-F238E27FC236}">
-                <a16:creationId xmlns:a16="http://schemas.microsoft.com/office/drawing/2014/main" id="{53F29798-D584-4792-9B62-3F5F5C36D619}"/>
+          <p:cNvPr id="10" name="Rectangle 9">
+            <a:extLst>
+              <a:ext uri="{FF2B5EF4-FFF2-40B4-BE49-F238E27FC236}">
+                <a16:creationId xmlns:a16="http://schemas.microsoft.com/office/drawing/2014/main" id="{62542EEC-4F7C-4AE2-933E-EAC8EB3FA378}"/>
               </a:ext>
               <a:ext uri="{C183D7F6-B498-43B3-948B-1728B52AA6E4}">
                 <adec:decorative xmlns:adec="http://schemas.microsoft.com/office/drawing/2017/decorative" val="1"/>
@@ -5057,7 +5057,7 @@
         <p:spPr>
           <a:xfrm>
             <a:off x="0" y="0"/>
-            <a:ext cx="12188952" cy="6858000"/>
+            <a:ext cx="12191999" cy="6857365"/>
           </a:xfrm>
           <a:prstGeom prst="rect">
             <a:avLst/>
@@ -5087,147 +5087,16 @@
           <a:lstStyle/>
           <a:p>
             <a:pPr algn="ctr"/>
-            <a:endParaRPr lang="en-US"/>
+            <a:endParaRPr lang="en-US" dirty="0"/>
           </a:p>
         </p:txBody>
       </p:sp>
       <p:sp>
         <p:nvSpPr>
-          <p:cNvPr id="2" name="Titolo 1">
-            <a:extLst>
-              <a:ext uri="{FF2B5EF4-FFF2-40B4-BE49-F238E27FC236}">
-                <a16:creationId xmlns:a16="http://schemas.microsoft.com/office/drawing/2014/main" id="{921AEBED-73C8-4BA7-9CE1-752C570077E7}"/>
-              </a:ext>
-            </a:extLst>
-          </p:cNvPr>
-          <p:cNvSpPr>
-            <a:spLocks noGrp="1"/>
-          </p:cNvSpPr>
-          <p:nvPr>
-            <p:ph type="title"/>
-          </p:nvPr>
-        </p:nvSpPr>
-        <p:spPr>
-          <a:xfrm>
-            <a:off x="838200" y="184805"/>
-            <a:ext cx="10515600" cy="1505883"/>
-          </a:xfrm>
-        </p:spPr>
-        <p:txBody>
-          <a:bodyPr vert="horz" lIns="91440" tIns="45720" rIns="91440" bIns="45720" rtlCol="0" anchor="ctr">
-            <a:normAutofit/>
-          </a:bodyPr>
-          <a:lstStyle/>
-          <a:p>
-            <a:r>
-              <a:rPr lang="en-US" sz="3900" b="1" kern="1200" dirty="0">
-                <a:solidFill>
-                  <a:schemeClr val="tx1"/>
-                </a:solidFill>
-                <a:latin typeface="+mn-lt"/>
-                <a:ea typeface="+mj-ea"/>
-                <a:cs typeface="+mj-cs"/>
-              </a:rPr>
-              <a:t>OnePage.html</a:t>
-            </a:r>
-            <a:br>
-              <a:rPr lang="en-US" sz="3900" b="1" kern="1200" dirty="0">
-                <a:solidFill>
-                  <a:schemeClr val="tx1"/>
-                </a:solidFill>
-                <a:latin typeface="+mn-lt"/>
-                <a:ea typeface="+mj-ea"/>
-                <a:cs typeface="+mj-cs"/>
-              </a:rPr>
-            </a:br>
-            <a:r>
-              <a:rPr lang="en-US" sz="3900" b="1" kern="1200" dirty="0">
-                <a:solidFill>
-                  <a:srgbClr val="7030A0"/>
-                </a:solidFill>
-                <a:latin typeface="+mn-lt"/>
-                <a:ea typeface="+mj-ea"/>
-                <a:cs typeface="+mj-cs"/>
-              </a:rPr>
-              <a:t>User Logged</a:t>
-            </a:r>
-          </a:p>
-        </p:txBody>
-      </p:sp>
-      <p:pic>
-        <p:nvPicPr>
-          <p:cNvPr id="5" name="Immagine 4">
-            <a:extLst>
-              <a:ext uri="{FF2B5EF4-FFF2-40B4-BE49-F238E27FC236}">
-                <a16:creationId xmlns:a16="http://schemas.microsoft.com/office/drawing/2014/main" id="{D347EA58-D955-4F31-BED8-F346A43FEA7D}"/>
-              </a:ext>
-            </a:extLst>
-          </p:cNvPr>
-          <p:cNvPicPr>
-            <a:picLocks noChangeAspect="1"/>
-          </p:cNvPicPr>
-          <p:nvPr/>
-        </p:nvPicPr>
-        <p:blipFill>
-          <a:blip r:embed="rId2"/>
-          <a:stretch>
-            <a:fillRect/>
-          </a:stretch>
-        </p:blipFill>
-        <p:spPr>
-          <a:xfrm>
-            <a:off x="2133600" y="1509938"/>
-            <a:ext cx="7752080" cy="5019471"/>
-          </a:xfrm>
-          <a:prstGeom prst="rect">
-            <a:avLst/>
-          </a:prstGeom>
-        </p:spPr>
-      </p:pic>
-    </p:spTree>
-    <p:extLst>
-      <p:ext uri="{BB962C8B-B14F-4D97-AF65-F5344CB8AC3E}">
-        <p14:creationId xmlns:p14="http://schemas.microsoft.com/office/powerpoint/2010/main" val="3201285935"/>
-      </p:ext>
-    </p:extLst>
-  </p:cSld>
-  <p:clrMapOvr>
-    <a:masterClrMapping/>
-  </p:clrMapOvr>
-</p:sld>
-</file>
-
-<file path=ppt/slides/slide11.xml><?xml version="1.0" encoding="utf-8"?>
-<p:sld xmlns:a="http://schemas.openxmlformats.org/drawingml/2006/main" xmlns:r="http://schemas.openxmlformats.org/officeDocument/2006/relationships" xmlns:p="http://schemas.openxmlformats.org/presentationml/2006/main">
-  <p:cSld>
-    <p:bg>
-      <p:bgPr>
-        <a:solidFill>
-          <a:schemeClr val="bg1"/>
-        </a:solidFill>
-        <a:effectLst/>
-      </p:bgPr>
-    </p:bg>
-    <p:spTree>
-      <p:nvGrpSpPr>
-        <p:cNvPr id="1" name=""/>
-        <p:cNvGrpSpPr/>
-        <p:nvPr/>
-      </p:nvGrpSpPr>
-      <p:grpSpPr>
-        <a:xfrm>
-          <a:off x="0" y="0"/>
-          <a:ext cx="0" cy="0"/>
-          <a:chOff x="0" y="0"/>
-          <a:chExt cx="0" cy="0"/>
-        </a:xfrm>
-      </p:grpSpPr>
-      <p:sp useBgFill="1">
-        <p:nvSpPr>
-          <p:cNvPr id="10" name="Rectangle 9">
-            <a:extLst>
-              <a:ext uri="{FF2B5EF4-FFF2-40B4-BE49-F238E27FC236}">
-                <a16:creationId xmlns:a16="http://schemas.microsoft.com/office/drawing/2014/main" id="{62542EEC-4F7C-4AE2-933E-EAC8EB3FA378}"/>
+          <p:cNvPr id="12" name="Rectangle 11">
+            <a:extLst>
+              <a:ext uri="{FF2B5EF4-FFF2-40B4-BE49-F238E27FC236}">
+                <a16:creationId xmlns:a16="http://schemas.microsoft.com/office/drawing/2014/main" id="{B81933D1-5615-42C7-9C0B-4EB7105CCE2D}"/>
               </a:ext>
               <a:ext uri="{C183D7F6-B498-43B3-948B-1728B52AA6E4}">
                 <adec:decorative xmlns:adec="http://schemas.microsoft.com/office/drawing/2017/decorative" val="1"/>
@@ -5246,13 +5115,16 @@
           </p:nvPr>
         </p:nvSpPr>
         <p:spPr>
-          <a:xfrm>
+          <a:xfrm flipH="1">
             <a:off x="0" y="0"/>
-            <a:ext cx="12191999" cy="6857365"/>
+            <a:ext cx="1494330" cy="6858000"/>
           </a:xfrm>
           <a:prstGeom prst="rect">
             <a:avLst/>
           </a:prstGeom>
+          <a:solidFill>
+            <a:schemeClr val="accent4"/>
+          </a:solidFill>
           <a:ln>
             <a:noFill/>
           </a:ln>
@@ -5278,95 +5150,16 @@
           <a:lstStyle/>
           <a:p>
             <a:pPr algn="ctr"/>
-            <a:endParaRPr lang="en-US"/>
+            <a:endParaRPr lang="en-US" dirty="0"/>
           </a:p>
         </p:txBody>
       </p:sp>
       <p:sp>
         <p:nvSpPr>
-          <p:cNvPr id="2" name="Titolo 1">
-            <a:extLst>
-              <a:ext uri="{FF2B5EF4-FFF2-40B4-BE49-F238E27FC236}">
-                <a16:creationId xmlns:a16="http://schemas.microsoft.com/office/drawing/2014/main" id="{D01C3C1A-FE2C-461B-94A4-68E58C809BDC}"/>
-              </a:ext>
-            </a:extLst>
-          </p:cNvPr>
-          <p:cNvSpPr>
-            <a:spLocks noGrp="1"/>
-          </p:cNvSpPr>
-          <p:nvPr>
-            <p:ph type="title"/>
-          </p:nvPr>
-        </p:nvSpPr>
-        <p:spPr>
-          <a:xfrm>
-            <a:off x="7041856" y="3113415"/>
-            <a:ext cx="4036334" cy="2387600"/>
-          </a:xfrm>
-        </p:spPr>
-        <p:txBody>
-          <a:bodyPr vert="horz" lIns="91440" tIns="45720" rIns="91440" bIns="45720" rtlCol="0" anchor="t">
-            <a:normAutofit/>
-          </a:bodyPr>
-          <a:lstStyle/>
-          <a:p>
-            <a:r>
-              <a:rPr lang="en-US" sz="3900" dirty="0">
-                <a:latin typeface="+mn-lt"/>
-              </a:rPr>
-              <a:t>OnePage</a:t>
-            </a:r>
-            <a:r>
-              <a:rPr lang="en-US" sz="3900" kern="1200" dirty="0">
-                <a:solidFill>
-                  <a:schemeClr val="tx1"/>
-                </a:solidFill>
-                <a:latin typeface="+mn-lt"/>
-                <a:ea typeface="+mj-ea"/>
-                <a:cs typeface="+mj-cs"/>
-              </a:rPr>
-              <a:t>.html</a:t>
-            </a:r>
-            <a:br>
-              <a:rPr lang="en-US" sz="3900" kern="1200" dirty="0">
-                <a:solidFill>
-                  <a:schemeClr val="tx1"/>
-                </a:solidFill>
-                <a:latin typeface="+mn-lt"/>
-                <a:ea typeface="+mj-ea"/>
-                <a:cs typeface="+mj-cs"/>
-              </a:rPr>
-            </a:br>
-            <a:r>
-              <a:rPr lang="en-US" sz="3900" b="1" kern="1200" dirty="0">
-                <a:solidFill>
-                  <a:srgbClr val="7030A0"/>
-                </a:solidFill>
-                <a:latin typeface="+mn-lt"/>
-                <a:ea typeface="+mj-ea"/>
-                <a:cs typeface="+mj-cs"/>
-              </a:rPr>
-              <a:t>User </a:t>
-            </a:r>
-            <a:r>
-              <a:rPr lang="en-US" sz="3900" b="1" dirty="0">
-                <a:solidFill>
-                  <a:srgbClr val="7030A0"/>
-                </a:solidFill>
-                <a:latin typeface="+mn-lt"/>
-              </a:rPr>
-              <a:t>Logged</a:t>
-            </a:r>
-            <a:endParaRPr lang="en-US" sz="3900" b="1" dirty="0"/>
-          </a:p>
-        </p:txBody>
-      </p:sp>
-      <p:sp>
-        <p:nvSpPr>
-          <p:cNvPr id="12" name="Rectangle 11">
-            <a:extLst>
-              <a:ext uri="{FF2B5EF4-FFF2-40B4-BE49-F238E27FC236}">
-                <a16:creationId xmlns:a16="http://schemas.microsoft.com/office/drawing/2014/main" id="{B81933D1-5615-42C7-9C0B-4EB7105CCE2D}"/>
+          <p:cNvPr id="14" name="Rectangle 13">
+            <a:extLst>
+              <a:ext uri="{FF2B5EF4-FFF2-40B4-BE49-F238E27FC236}">
+                <a16:creationId xmlns:a16="http://schemas.microsoft.com/office/drawing/2014/main" id="{19C9EAEA-39D0-4B0E-A0EB-51E7B26740B1}"/>
               </a:ext>
               <a:ext uri="{C183D7F6-B498-43B3-948B-1728B52AA6E4}">
                 <adec:decorative xmlns:adec="http://schemas.microsoft.com/office/drawing/2017/decorative" val="1"/>
@@ -5385,19 +5178,26 @@
           </p:nvPr>
         </p:nvSpPr>
         <p:spPr>
-          <a:xfrm flipH="1">
-            <a:off x="0" y="0"/>
-            <a:ext cx="1494330" cy="6858000"/>
+          <a:xfrm>
+            <a:off x="496824" y="391886"/>
+            <a:ext cx="6009366" cy="6017078"/>
           </a:xfrm>
           <a:prstGeom prst="rect">
             <a:avLst/>
           </a:prstGeom>
           <a:solidFill>
-            <a:schemeClr val="accent4"/>
+            <a:schemeClr val="bg1"/>
           </a:solidFill>
           <a:ln>
             <a:noFill/>
           </a:ln>
+          <a:effectLst>
+            <a:outerShdw blurRad="139700" dist="127000" dir="5400000" algn="t" rotWithShape="0">
+              <a:prstClr val="black">
+                <a:alpha val="15000"/>
+              </a:prstClr>
+            </a:outerShdw>
+          </a:effectLst>
         </p:spPr>
         <p:style>
           <a:lnRef idx="2">
@@ -5420,77 +5220,7 @@
           <a:lstStyle/>
           <a:p>
             <a:pPr algn="ctr"/>
-            <a:endParaRPr lang="en-US"/>
-          </a:p>
-        </p:txBody>
-      </p:sp>
-      <p:sp>
-        <p:nvSpPr>
-          <p:cNvPr id="14" name="Rectangle 13">
-            <a:extLst>
-              <a:ext uri="{FF2B5EF4-FFF2-40B4-BE49-F238E27FC236}">
-                <a16:creationId xmlns:a16="http://schemas.microsoft.com/office/drawing/2014/main" id="{19C9EAEA-39D0-4B0E-A0EB-51E7B26740B1}"/>
-              </a:ext>
-              <a:ext uri="{C183D7F6-B498-43B3-948B-1728B52AA6E4}">
-                <adec:decorative xmlns:adec="http://schemas.microsoft.com/office/drawing/2017/decorative" val="1"/>
-              </a:ext>
-            </a:extLst>
-          </p:cNvPr>
-          <p:cNvSpPr>
-            <a:spLocks noGrp="1" noRot="1" noChangeAspect="1" noMove="1" noResize="1" noEditPoints="1" noAdjustHandles="1" noChangeArrowheads="1" noChangeShapeType="1" noTextEdit="1"/>
-          </p:cNvSpPr>
-          <p:nvPr>
-            <p:extLst>
-              <p:ext uri="{386F3935-93C4-4BCD-93E2-E3B085C9AB24}">
-                <p16:designElem xmlns:p16="http://schemas.microsoft.com/office/powerpoint/2015/main" val="1"/>
-              </p:ext>
-            </p:extLst>
-          </p:nvPr>
-        </p:nvSpPr>
-        <p:spPr>
-          <a:xfrm>
-            <a:off x="496824" y="391886"/>
-            <a:ext cx="6009366" cy="6017078"/>
-          </a:xfrm>
-          <a:prstGeom prst="rect">
-            <a:avLst/>
-          </a:prstGeom>
-          <a:solidFill>
-            <a:schemeClr val="bg1"/>
-          </a:solidFill>
-          <a:ln>
-            <a:noFill/>
-          </a:ln>
-          <a:effectLst>
-            <a:outerShdw blurRad="139700" dist="127000" dir="5400000" algn="t" rotWithShape="0">
-              <a:prstClr val="black">
-                <a:alpha val="15000"/>
-              </a:prstClr>
-            </a:outerShdw>
-          </a:effectLst>
-        </p:spPr>
-        <p:style>
-          <a:lnRef idx="2">
-            <a:schemeClr val="accent1">
-              <a:shade val="50000"/>
-            </a:schemeClr>
-          </a:lnRef>
-          <a:fillRef idx="1">
-            <a:schemeClr val="accent1"/>
-          </a:fillRef>
-          <a:effectRef idx="0">
-            <a:schemeClr val="accent1"/>
-          </a:effectRef>
-          <a:fontRef idx="minor">
-            <a:schemeClr val="lt1"/>
-          </a:fontRef>
-        </p:style>
-        <p:txBody>
-          <a:bodyPr rtlCol="0" anchor="ctr"/>
-          <a:lstStyle/>
-          <a:p>
-            <a:pPr algn="ctr"/>
-            <a:endParaRPr lang="en-US"/>
+            <a:endParaRPr lang="en-US" dirty="0"/>
           </a:p>
         </p:txBody>
       </p:sp>
@@ -5583,7 +5313,7 @@
             <a:lstStyle/>
             <a:p>
               <a:pPr algn="ctr"/>
-              <a:endParaRPr lang="en-US"/>
+              <a:endParaRPr lang="en-US" dirty="0"/>
             </a:p>
           </p:txBody>
         </p:sp>
@@ -5642,7 +5372,7 @@
             <a:lstStyle/>
             <a:p>
               <a:pPr algn="ctr"/>
-              <a:endParaRPr lang="en-US"/>
+              <a:endParaRPr lang="en-US" dirty="0"/>
             </a:p>
           </p:txBody>
         </p:sp>
@@ -5701,17 +5431,631 @@
             <a:lstStyle/>
             <a:p>
               <a:pPr algn="ctr"/>
-              <a:endParaRPr lang="en-US"/>
+              <a:endParaRPr lang="en-US" dirty="0"/>
             </a:p>
           </p:txBody>
         </p:sp>
       </p:grpSp>
+      <p:sp>
+        <p:nvSpPr>
+          <p:cNvPr id="20" name="Titolo 1">
+            <a:extLst>
+              <a:ext uri="{FF2B5EF4-FFF2-40B4-BE49-F238E27FC236}">
+                <a16:creationId xmlns:a16="http://schemas.microsoft.com/office/drawing/2014/main" id="{3209FF46-8E28-4D31-A897-D0EB67C2A0F1}"/>
+              </a:ext>
+            </a:extLst>
+          </p:cNvPr>
+          <p:cNvSpPr txBox="1">
+            <a:spLocks/>
+          </p:cNvSpPr>
+          <p:nvPr/>
+        </p:nvSpPr>
+        <p:spPr>
+          <a:xfrm>
+            <a:off x="8519504" y="3034646"/>
+            <a:ext cx="2868998" cy="1156654"/>
+          </a:xfrm>
+          <a:prstGeom prst="rect">
+            <a:avLst/>
+          </a:prstGeom>
+        </p:spPr>
+        <p:txBody>
+          <a:bodyPr vert="horz" lIns="91440" tIns="45720" rIns="91440" bIns="45720" rtlCol="0" anchor="t">
+            <a:normAutofit/>
+          </a:bodyPr>
+          <a:lstStyle>
+            <a:lvl1pPr algn="l" defTabSz="914400" rtl="0" eaLnBrk="1" latinLnBrk="0" hangingPunct="1">
+              <a:lnSpc>
+                <a:spcPct val="90000"/>
+              </a:lnSpc>
+              <a:spcBef>
+                <a:spcPct val="0"/>
+              </a:spcBef>
+              <a:buNone/>
+              <a:defRPr sz="4400" kern="1200">
+                <a:solidFill>
+                  <a:schemeClr val="tx1"/>
+                </a:solidFill>
+                <a:latin typeface="+mj-lt"/>
+                <a:ea typeface="+mj-ea"/>
+                <a:cs typeface="+mj-cs"/>
+              </a:defRPr>
+            </a:lvl1pPr>
+          </a:lstStyle>
+          <a:p>
+            <a:r>
+              <a:rPr lang="en-US" sz="3200" dirty="0">
+                <a:latin typeface="+mn-lt"/>
+              </a:rPr>
+              <a:t>OnePage.html</a:t>
+            </a:r>
+            <a:br>
+              <a:rPr lang="en-US" sz="3200" dirty="0">
+                <a:latin typeface="+mn-lt"/>
+              </a:rPr>
+            </a:br>
+            <a:r>
+              <a:rPr lang="en-US" sz="3200" b="1" dirty="0">
+                <a:solidFill>
+                  <a:srgbClr val="7030A0"/>
+                </a:solidFill>
+                <a:latin typeface="+mn-lt"/>
+              </a:rPr>
+              <a:t>User Logged</a:t>
+            </a:r>
+            <a:endParaRPr lang="en-US" sz="3200" b="1" dirty="0"/>
+          </a:p>
+        </p:txBody>
+      </p:sp>
+      <p:pic>
+        <p:nvPicPr>
+          <p:cNvPr id="2" name="Immagine 1">
+            <a:extLst>
+              <a:ext uri="{FF2B5EF4-FFF2-40B4-BE49-F238E27FC236}">
+                <a16:creationId xmlns:a16="http://schemas.microsoft.com/office/drawing/2014/main" id="{1053DB18-FCB6-45FE-9713-E1F6F00CB0B7}"/>
+              </a:ext>
+            </a:extLst>
+          </p:cNvPr>
+          <p:cNvPicPr>
+            <a:picLocks noChangeAspect="1"/>
+          </p:cNvPicPr>
+          <p:nvPr/>
+        </p:nvPicPr>
+        <p:blipFill rotWithShape="1">
+          <a:blip r:embed="rId2"/>
+          <a:srcRect l="1975" r="1"/>
+          <a:stretch/>
+        </p:blipFill>
+        <p:spPr>
+          <a:xfrm>
+            <a:off x="496824" y="1103237"/>
+            <a:ext cx="7560927" cy="5019471"/>
+          </a:xfrm>
+          <a:prstGeom prst="rect">
+            <a:avLst/>
+          </a:prstGeom>
+        </p:spPr>
+      </p:pic>
+    </p:spTree>
+    <p:extLst>
+      <p:ext uri="{BB962C8B-B14F-4D97-AF65-F5344CB8AC3E}">
+        <p14:creationId xmlns:p14="http://schemas.microsoft.com/office/powerpoint/2010/main" val="3104577912"/>
+      </p:ext>
+    </p:extLst>
+  </p:cSld>
+  <p:clrMapOvr>
+    <a:masterClrMapping/>
+  </p:clrMapOvr>
+</p:sld>
+</file>
+
+<file path=ppt/slides/slide11.xml><?xml version="1.0" encoding="utf-8"?>
+<p:sld xmlns:a="http://schemas.openxmlformats.org/drawingml/2006/main" xmlns:r="http://schemas.openxmlformats.org/officeDocument/2006/relationships" xmlns:p="http://schemas.openxmlformats.org/presentationml/2006/main">
+  <p:cSld>
+    <p:bg>
+      <p:bgPr>
+        <a:solidFill>
+          <a:schemeClr val="bg1"/>
+        </a:solidFill>
+        <a:effectLst/>
+      </p:bgPr>
+    </p:bg>
+    <p:spTree>
+      <p:nvGrpSpPr>
+        <p:cNvPr id="1" name=""/>
+        <p:cNvGrpSpPr/>
+        <p:nvPr/>
+      </p:nvGrpSpPr>
+      <p:grpSpPr>
+        <a:xfrm>
+          <a:off x="0" y="0"/>
+          <a:ext cx="0" cy="0"/>
+          <a:chOff x="0" y="0"/>
+          <a:chExt cx="0" cy="0"/>
+        </a:xfrm>
+      </p:grpSpPr>
+      <p:sp useBgFill="1">
+        <p:nvSpPr>
+          <p:cNvPr id="10" name="Rectangle 9">
+            <a:extLst>
+              <a:ext uri="{FF2B5EF4-FFF2-40B4-BE49-F238E27FC236}">
+                <a16:creationId xmlns:a16="http://schemas.microsoft.com/office/drawing/2014/main" id="{62542EEC-4F7C-4AE2-933E-EAC8EB3FA378}"/>
+              </a:ext>
+              <a:ext uri="{C183D7F6-B498-43B3-948B-1728B52AA6E4}">
+                <adec:decorative xmlns:adec="http://schemas.microsoft.com/office/drawing/2017/decorative" val="1"/>
+              </a:ext>
+            </a:extLst>
+          </p:cNvPr>
+          <p:cNvSpPr>
+            <a:spLocks noGrp="1" noRot="1" noChangeAspect="1" noMove="1" noResize="1" noEditPoints="1" noAdjustHandles="1" noChangeArrowheads="1" noChangeShapeType="1" noTextEdit="1"/>
+          </p:cNvSpPr>
+          <p:nvPr>
+            <p:extLst>
+              <p:ext uri="{386F3935-93C4-4BCD-93E2-E3B085C9AB24}">
+                <p16:designElem xmlns:p16="http://schemas.microsoft.com/office/powerpoint/2015/main" val="1"/>
+              </p:ext>
+            </p:extLst>
+          </p:nvPr>
+        </p:nvSpPr>
+        <p:spPr>
+          <a:xfrm>
+            <a:off x="0" y="0"/>
+            <a:ext cx="12191999" cy="6857365"/>
+          </a:xfrm>
+          <a:prstGeom prst="rect">
+            <a:avLst/>
+          </a:prstGeom>
+          <a:ln>
+            <a:noFill/>
+          </a:ln>
+        </p:spPr>
+        <p:style>
+          <a:lnRef idx="2">
+            <a:schemeClr val="accent1">
+              <a:shade val="50000"/>
+            </a:schemeClr>
+          </a:lnRef>
+          <a:fillRef idx="1">
+            <a:schemeClr val="accent1"/>
+          </a:fillRef>
+          <a:effectRef idx="0">
+            <a:schemeClr val="accent1"/>
+          </a:effectRef>
+          <a:fontRef idx="minor">
+            <a:schemeClr val="lt1"/>
+          </a:fontRef>
+        </p:style>
+        <p:txBody>
+          <a:bodyPr rtlCol="0" anchor="ctr"/>
+          <a:lstStyle/>
+          <a:p>
+            <a:pPr algn="ctr"/>
+            <a:endParaRPr lang="en-US" dirty="0"/>
+          </a:p>
+        </p:txBody>
+      </p:sp>
+      <p:sp>
+        <p:nvSpPr>
+          <p:cNvPr id="12" name="Rectangle 11">
+            <a:extLst>
+              <a:ext uri="{FF2B5EF4-FFF2-40B4-BE49-F238E27FC236}">
+                <a16:creationId xmlns:a16="http://schemas.microsoft.com/office/drawing/2014/main" id="{B81933D1-5615-42C7-9C0B-4EB7105CCE2D}"/>
+              </a:ext>
+              <a:ext uri="{C183D7F6-B498-43B3-948B-1728B52AA6E4}">
+                <adec:decorative xmlns:adec="http://schemas.microsoft.com/office/drawing/2017/decorative" val="1"/>
+              </a:ext>
+            </a:extLst>
+          </p:cNvPr>
+          <p:cNvSpPr>
+            <a:spLocks noGrp="1" noRot="1" noChangeAspect="1" noMove="1" noResize="1" noEditPoints="1" noAdjustHandles="1" noChangeArrowheads="1" noChangeShapeType="1" noTextEdit="1"/>
+          </p:cNvSpPr>
+          <p:nvPr>
+            <p:extLst>
+              <p:ext uri="{386F3935-93C4-4BCD-93E2-E3B085C9AB24}">
+                <p16:designElem xmlns:p16="http://schemas.microsoft.com/office/powerpoint/2015/main" val="1"/>
+              </p:ext>
+            </p:extLst>
+          </p:nvPr>
+        </p:nvSpPr>
+        <p:spPr>
+          <a:xfrm flipH="1">
+            <a:off x="0" y="0"/>
+            <a:ext cx="1494330" cy="6858000"/>
+          </a:xfrm>
+          <a:prstGeom prst="rect">
+            <a:avLst/>
+          </a:prstGeom>
+          <a:solidFill>
+            <a:schemeClr val="accent4"/>
+          </a:solidFill>
+          <a:ln>
+            <a:noFill/>
+          </a:ln>
+        </p:spPr>
+        <p:style>
+          <a:lnRef idx="2">
+            <a:schemeClr val="accent1">
+              <a:shade val="50000"/>
+            </a:schemeClr>
+          </a:lnRef>
+          <a:fillRef idx="1">
+            <a:schemeClr val="accent1"/>
+          </a:fillRef>
+          <a:effectRef idx="0">
+            <a:schemeClr val="accent1"/>
+          </a:effectRef>
+          <a:fontRef idx="minor">
+            <a:schemeClr val="lt1"/>
+          </a:fontRef>
+        </p:style>
+        <p:txBody>
+          <a:bodyPr rtlCol="0" anchor="ctr"/>
+          <a:lstStyle/>
+          <a:p>
+            <a:pPr algn="ctr"/>
+            <a:endParaRPr lang="en-US" dirty="0"/>
+          </a:p>
+        </p:txBody>
+      </p:sp>
+      <p:sp>
+        <p:nvSpPr>
+          <p:cNvPr id="14" name="Rectangle 13">
+            <a:extLst>
+              <a:ext uri="{FF2B5EF4-FFF2-40B4-BE49-F238E27FC236}">
+                <a16:creationId xmlns:a16="http://schemas.microsoft.com/office/drawing/2014/main" id="{19C9EAEA-39D0-4B0E-A0EB-51E7B26740B1}"/>
+              </a:ext>
+              <a:ext uri="{C183D7F6-B498-43B3-948B-1728B52AA6E4}">
+                <adec:decorative xmlns:adec="http://schemas.microsoft.com/office/drawing/2017/decorative" val="1"/>
+              </a:ext>
+            </a:extLst>
+          </p:cNvPr>
+          <p:cNvSpPr>
+            <a:spLocks noGrp="1" noRot="1" noChangeAspect="1" noMove="1" noResize="1" noEditPoints="1" noAdjustHandles="1" noChangeArrowheads="1" noChangeShapeType="1" noTextEdit="1"/>
+          </p:cNvSpPr>
+          <p:nvPr>
+            <p:extLst>
+              <p:ext uri="{386F3935-93C4-4BCD-93E2-E3B085C9AB24}">
+                <p16:designElem xmlns:p16="http://schemas.microsoft.com/office/powerpoint/2015/main" val="1"/>
+              </p:ext>
+            </p:extLst>
+          </p:nvPr>
+        </p:nvSpPr>
+        <p:spPr>
+          <a:xfrm>
+            <a:off x="496824" y="391886"/>
+            <a:ext cx="6009366" cy="6017078"/>
+          </a:xfrm>
+          <a:prstGeom prst="rect">
+            <a:avLst/>
+          </a:prstGeom>
+          <a:solidFill>
+            <a:schemeClr val="bg1"/>
+          </a:solidFill>
+          <a:ln>
+            <a:noFill/>
+          </a:ln>
+          <a:effectLst>
+            <a:outerShdw blurRad="139700" dist="127000" dir="5400000" algn="t" rotWithShape="0">
+              <a:prstClr val="black">
+                <a:alpha val="15000"/>
+              </a:prstClr>
+            </a:outerShdw>
+          </a:effectLst>
+        </p:spPr>
+        <p:style>
+          <a:lnRef idx="2">
+            <a:schemeClr val="accent1">
+              <a:shade val="50000"/>
+            </a:schemeClr>
+          </a:lnRef>
+          <a:fillRef idx="1">
+            <a:schemeClr val="accent1"/>
+          </a:fillRef>
+          <a:effectRef idx="0">
+            <a:schemeClr val="accent1"/>
+          </a:effectRef>
+          <a:fontRef idx="minor">
+            <a:schemeClr val="lt1"/>
+          </a:fontRef>
+        </p:style>
+        <p:txBody>
+          <a:bodyPr rtlCol="0" anchor="ctr"/>
+          <a:lstStyle/>
+          <a:p>
+            <a:pPr algn="ctr"/>
+            <a:endParaRPr lang="en-US" dirty="0"/>
+          </a:p>
+        </p:txBody>
+      </p:sp>
+      <p:grpSp>
+        <p:nvGrpSpPr>
+          <p:cNvPr id="16" name="Group 15">
+            <a:extLst>
+              <a:ext uri="{FF2B5EF4-FFF2-40B4-BE49-F238E27FC236}">
+                <a16:creationId xmlns:a16="http://schemas.microsoft.com/office/drawing/2014/main" id="{032D8612-31EB-44CF-A1D0-14FD4C705424}"/>
+              </a:ext>
+              <a:ext uri="{C183D7F6-B498-43B3-948B-1728B52AA6E4}">
+                <adec:decorative xmlns:adec="http://schemas.microsoft.com/office/drawing/2017/decorative" val="1"/>
+              </a:ext>
+            </a:extLst>
+          </p:cNvPr>
+          <p:cNvGrpSpPr>
+            <a:grpSpLocks noGrp="1" noUngrp="1" noRot="1" noChangeAspect="1" noMove="1" noResize="1"/>
+          </p:cNvGrpSpPr>
+          <p:nvPr>
+            <p:extLst>
+              <p:ext uri="{386F3935-93C4-4BCD-93E2-E3B085C9AB24}">
+                <p16:designElem xmlns:p16="http://schemas.microsoft.com/office/powerpoint/2015/main" val="1"/>
+              </p:ext>
+            </p:extLst>
+          </p:nvPr>
+        </p:nvGrpSpPr>
+        <p:grpSpPr>
+          <a:xfrm>
+            <a:off x="11460480" y="3154317"/>
+            <a:ext cx="731521" cy="673460"/>
+            <a:chOff x="3940602" y="308034"/>
+            <a:chExt cx="2116791" cy="3428999"/>
+          </a:xfrm>
+          <a:solidFill>
+            <a:schemeClr val="accent4"/>
+          </a:solidFill>
+        </p:grpSpPr>
+        <p:sp>
+          <p:nvSpPr>
+            <p:cNvPr id="17" name="Rectangle 16">
+              <a:extLst>
+                <a:ext uri="{FF2B5EF4-FFF2-40B4-BE49-F238E27FC236}">
+                  <a16:creationId xmlns:a16="http://schemas.microsoft.com/office/drawing/2014/main" id="{F19A4A0F-1B59-4DB0-9764-D10936E98770}"/>
+                </a:ext>
+                <a:ext uri="{C183D7F6-B498-43B3-948B-1728B52AA6E4}">
+                  <adec:decorative xmlns:adec="http://schemas.microsoft.com/office/drawing/2017/decorative" val="1"/>
+                </a:ext>
+              </a:extLst>
+            </p:cNvPr>
+            <p:cNvSpPr/>
+            <p:nvPr>
+              <p:extLst>
+                <p:ext uri="{386F3935-93C4-4BCD-93E2-E3B085C9AB24}">
+                  <p16:designElem xmlns:p16="http://schemas.microsoft.com/office/powerpoint/2015/main" val="1"/>
+                </p:ext>
+              </p:extLst>
+            </p:nvPr>
+          </p:nvSpPr>
+          <p:spPr>
+            <a:xfrm>
+              <a:off x="3940602" y="308034"/>
+              <a:ext cx="566743" cy="3428999"/>
+            </a:xfrm>
+            <a:prstGeom prst="rect">
+              <a:avLst/>
+            </a:prstGeom>
+            <a:grpFill/>
+            <a:ln>
+              <a:noFill/>
+            </a:ln>
+          </p:spPr>
+          <p:style>
+            <a:lnRef idx="2">
+              <a:schemeClr val="accent1">
+                <a:shade val="50000"/>
+              </a:schemeClr>
+            </a:lnRef>
+            <a:fillRef idx="1">
+              <a:schemeClr val="accent1"/>
+            </a:fillRef>
+            <a:effectRef idx="0">
+              <a:schemeClr val="accent1"/>
+            </a:effectRef>
+            <a:fontRef idx="minor">
+              <a:schemeClr val="lt1"/>
+            </a:fontRef>
+          </p:style>
+          <p:txBody>
+            <a:bodyPr rtlCol="0" anchor="ctr"/>
+            <a:lstStyle/>
+            <a:p>
+              <a:pPr algn="ctr"/>
+              <a:endParaRPr lang="en-US" dirty="0"/>
+            </a:p>
+          </p:txBody>
+        </p:sp>
+        <p:sp>
+          <p:nvSpPr>
+            <p:cNvPr id="18" name="Rectangle 17">
+              <a:extLst>
+                <a:ext uri="{FF2B5EF4-FFF2-40B4-BE49-F238E27FC236}">
+                  <a16:creationId xmlns:a16="http://schemas.microsoft.com/office/drawing/2014/main" id="{F399A70F-F8CD-4992-9EF5-6CF15472E73F}"/>
+                </a:ext>
+                <a:ext uri="{C183D7F6-B498-43B3-948B-1728B52AA6E4}">
+                  <adec:decorative xmlns:adec="http://schemas.microsoft.com/office/drawing/2017/decorative" val="1"/>
+                </a:ext>
+              </a:extLst>
+            </p:cNvPr>
+            <p:cNvSpPr/>
+            <p:nvPr>
+              <p:extLst>
+                <p:ext uri="{386F3935-93C4-4BCD-93E2-E3B085C9AB24}">
+                  <p16:designElem xmlns:p16="http://schemas.microsoft.com/office/powerpoint/2015/main" val="1"/>
+                </p:ext>
+              </p:extLst>
+            </p:nvPr>
+          </p:nvSpPr>
+          <p:spPr>
+            <a:xfrm>
+              <a:off x="4715626" y="308034"/>
+              <a:ext cx="566743" cy="3428999"/>
+            </a:xfrm>
+            <a:prstGeom prst="rect">
+              <a:avLst/>
+            </a:prstGeom>
+            <a:grpFill/>
+            <a:ln>
+              <a:noFill/>
+            </a:ln>
+          </p:spPr>
+          <p:style>
+            <a:lnRef idx="2">
+              <a:schemeClr val="accent1">
+                <a:shade val="50000"/>
+              </a:schemeClr>
+            </a:lnRef>
+            <a:fillRef idx="1">
+              <a:schemeClr val="accent1"/>
+            </a:fillRef>
+            <a:effectRef idx="0">
+              <a:schemeClr val="accent1"/>
+            </a:effectRef>
+            <a:fontRef idx="minor">
+              <a:schemeClr val="lt1"/>
+            </a:fontRef>
+          </p:style>
+          <p:txBody>
+            <a:bodyPr rtlCol="0" anchor="ctr"/>
+            <a:lstStyle/>
+            <a:p>
+              <a:pPr algn="ctr"/>
+              <a:endParaRPr lang="en-US" dirty="0"/>
+            </a:p>
+          </p:txBody>
+        </p:sp>
+        <p:sp>
+          <p:nvSpPr>
+            <p:cNvPr id="19" name="Rectangle 18">
+              <a:extLst>
+                <a:ext uri="{FF2B5EF4-FFF2-40B4-BE49-F238E27FC236}">
+                  <a16:creationId xmlns:a16="http://schemas.microsoft.com/office/drawing/2014/main" id="{48F4FEDC-6D80-458C-A665-075D9B9500FD}"/>
+                </a:ext>
+                <a:ext uri="{C183D7F6-B498-43B3-948B-1728B52AA6E4}">
+                  <adec:decorative xmlns:adec="http://schemas.microsoft.com/office/drawing/2017/decorative" val="1"/>
+                </a:ext>
+              </a:extLst>
+            </p:cNvPr>
+            <p:cNvSpPr/>
+            <p:nvPr>
+              <p:extLst>
+                <p:ext uri="{386F3935-93C4-4BCD-93E2-E3B085C9AB24}">
+                  <p16:designElem xmlns:p16="http://schemas.microsoft.com/office/powerpoint/2015/main" val="1"/>
+                </p:ext>
+              </p:extLst>
+            </p:nvPr>
+          </p:nvSpPr>
+          <p:spPr>
+            <a:xfrm>
+              <a:off x="5490650" y="308034"/>
+              <a:ext cx="566743" cy="3428999"/>
+            </a:xfrm>
+            <a:prstGeom prst="rect">
+              <a:avLst/>
+            </a:prstGeom>
+            <a:grpFill/>
+            <a:ln>
+              <a:noFill/>
+            </a:ln>
+          </p:spPr>
+          <p:style>
+            <a:lnRef idx="2">
+              <a:schemeClr val="accent1">
+                <a:shade val="50000"/>
+              </a:schemeClr>
+            </a:lnRef>
+            <a:fillRef idx="1">
+              <a:schemeClr val="accent1"/>
+            </a:fillRef>
+            <a:effectRef idx="0">
+              <a:schemeClr val="accent1"/>
+            </a:effectRef>
+            <a:fontRef idx="minor">
+              <a:schemeClr val="lt1"/>
+            </a:fontRef>
+          </p:style>
+          <p:txBody>
+            <a:bodyPr rtlCol="0" anchor="ctr"/>
+            <a:lstStyle/>
+            <a:p>
+              <a:pPr algn="ctr"/>
+              <a:endParaRPr lang="en-US" dirty="0"/>
+            </a:p>
+          </p:txBody>
+        </p:sp>
+      </p:grpSp>
+      <p:sp>
+        <p:nvSpPr>
+          <p:cNvPr id="20" name="Titolo 1">
+            <a:extLst>
+              <a:ext uri="{FF2B5EF4-FFF2-40B4-BE49-F238E27FC236}">
+                <a16:creationId xmlns:a16="http://schemas.microsoft.com/office/drawing/2014/main" id="{3209FF46-8E28-4D31-A897-D0EB67C2A0F1}"/>
+              </a:ext>
+            </a:extLst>
+          </p:cNvPr>
+          <p:cNvSpPr txBox="1">
+            <a:spLocks/>
+          </p:cNvSpPr>
+          <p:nvPr/>
+        </p:nvSpPr>
+        <p:spPr>
+          <a:xfrm>
+            <a:off x="8519504" y="3034646"/>
+            <a:ext cx="2868998" cy="1156654"/>
+          </a:xfrm>
+          <a:prstGeom prst="rect">
+            <a:avLst/>
+          </a:prstGeom>
+        </p:spPr>
+        <p:txBody>
+          <a:bodyPr vert="horz" lIns="91440" tIns="45720" rIns="91440" bIns="45720" rtlCol="0" anchor="t">
+            <a:normAutofit/>
+          </a:bodyPr>
+          <a:lstStyle>
+            <a:lvl1pPr algn="l" defTabSz="914400" rtl="0" eaLnBrk="1" latinLnBrk="0" hangingPunct="1">
+              <a:lnSpc>
+                <a:spcPct val="90000"/>
+              </a:lnSpc>
+              <a:spcBef>
+                <a:spcPct val="0"/>
+              </a:spcBef>
+              <a:buNone/>
+              <a:defRPr sz="4400" kern="1200">
+                <a:solidFill>
+                  <a:schemeClr val="tx1"/>
+                </a:solidFill>
+                <a:latin typeface="+mj-lt"/>
+                <a:ea typeface="+mj-ea"/>
+                <a:cs typeface="+mj-cs"/>
+              </a:defRPr>
+            </a:lvl1pPr>
+          </a:lstStyle>
+          <a:p>
+            <a:r>
+              <a:rPr lang="en-US" sz="3200" dirty="0">
+                <a:latin typeface="+mn-lt"/>
+              </a:rPr>
+              <a:t>OnePage.html</a:t>
+            </a:r>
+            <a:br>
+              <a:rPr lang="en-US" sz="3200" dirty="0">
+                <a:latin typeface="+mn-lt"/>
+              </a:rPr>
+            </a:br>
+            <a:r>
+              <a:rPr lang="en-US" sz="3200" b="1" dirty="0">
+                <a:solidFill>
+                  <a:srgbClr val="7030A0"/>
+                </a:solidFill>
+                <a:latin typeface="+mn-lt"/>
+              </a:rPr>
+              <a:t>User Logged</a:t>
+            </a:r>
+            <a:endParaRPr lang="en-US" sz="3200" b="1" dirty="0"/>
+          </a:p>
+        </p:txBody>
+      </p:sp>
       <p:pic>
         <p:nvPicPr>
           <p:cNvPr id="3" name="Immagine 2">
             <a:extLst>
               <a:ext uri="{FF2B5EF4-FFF2-40B4-BE49-F238E27FC236}">
-                <a16:creationId xmlns:a16="http://schemas.microsoft.com/office/drawing/2014/main" id="{CEAD2037-349B-41B9-AE55-22DCDBAB8ACB}"/>
+                <a16:creationId xmlns:a16="http://schemas.microsoft.com/office/drawing/2014/main" id="{4808D90A-4BAB-4C03-96E7-640D11141246}"/>
               </a:ext>
             </a:extLst>
           </p:cNvPr>
@@ -5727,8 +6071,8 @@
         </p:blipFill>
         <p:spPr>
           <a:xfrm>
-            <a:off x="835991" y="543560"/>
-            <a:ext cx="5080000" cy="5713730"/>
+            <a:off x="1494330" y="187959"/>
+            <a:ext cx="5762565" cy="6481445"/>
           </a:xfrm>
           <a:prstGeom prst="rect">
             <a:avLst/>
@@ -5738,7 +6082,7 @@
     </p:spTree>
     <p:extLst>
       <p:ext uri="{BB962C8B-B14F-4D97-AF65-F5344CB8AC3E}">
-        <p14:creationId xmlns:p14="http://schemas.microsoft.com/office/powerpoint/2010/main" val="162202557"/>
+        <p14:creationId xmlns:p14="http://schemas.microsoft.com/office/powerpoint/2010/main" val="2507424429"/>
       </p:ext>
     </p:extLst>
   </p:cSld>
@@ -5787,7 +6131,7 @@
           <a:p>
             <a:pPr algn="ctr"/>
             <a:r>
-              <a:rPr lang="en-US" dirty="0"/>
+              <a:rPr lang="en-US" b="1" dirty="0"/>
               <a:t>Server side: DAO &amp; model objects</a:t>
             </a:r>
           </a:p>
@@ -5805,7 +6149,7 @@
         </p:nvSpPr>
         <p:spPr>
           <a:xfrm>
-            <a:off x="279400" y="2388756"/>
+            <a:off x="279400" y="2118790"/>
             <a:ext cx="5816600" cy="3878694"/>
           </a:xfrm>
         </p:spPr>
@@ -6120,7 +6464,7 @@
         </p:nvSpPr>
         <p:spPr>
           <a:xfrm>
-            <a:off x="6096000" y="2656205"/>
+            <a:off x="6095999" y="2403657"/>
             <a:ext cx="5816601" cy="3908762"/>
           </a:xfrm>
           <a:prstGeom prst="rect">
@@ -6134,10 +6478,7 @@
           </a:bodyPr>
           <a:lstStyle/>
           <a:p>
-            <a:pPr marL="822183" lvl="1" indent="-285750">
-              <a:lnSpc>
-                <a:spcPct val="100000"/>
-              </a:lnSpc>
+            <a:pPr marL="364983" indent="-285750">
               <a:spcBef>
                 <a:spcPts val="352"/>
               </a:spcBef>
@@ -6151,10 +6492,7 @@
             </a:r>
           </a:p>
           <a:p>
-            <a:pPr marL="1418219" lvl="2" indent="-285750">
-              <a:lnSpc>
-                <a:spcPct val="100000"/>
-              </a:lnSpc>
+            <a:pPr marL="961019" lvl="1" indent="-285750">
               <a:spcBef>
                 <a:spcPts val="352"/>
               </a:spcBef>
@@ -6168,10 +6506,7 @@
             </a:r>
           </a:p>
           <a:p>
-            <a:pPr marL="1418219" lvl="2" indent="-285750">
-              <a:lnSpc>
-                <a:spcPct val="100000"/>
-              </a:lnSpc>
+            <a:pPr marL="961019" lvl="1" indent="-285750">
               <a:spcBef>
                 <a:spcPts val="352"/>
               </a:spcBef>
@@ -6185,10 +6520,7 @@
             </a:r>
           </a:p>
           <a:p>
-            <a:pPr marL="1418219" lvl="2" indent="-285750">
-              <a:lnSpc>
-                <a:spcPct val="100000"/>
-              </a:lnSpc>
+            <a:pPr marL="961019" lvl="1" indent="-285750">
               <a:spcBef>
                 <a:spcPts val="352"/>
               </a:spcBef>
@@ -6202,10 +6534,7 @@
             </a:r>
           </a:p>
           <a:p>
-            <a:pPr marL="822183" lvl="1" indent="-285750">
-              <a:lnSpc>
-                <a:spcPct val="100000"/>
-              </a:lnSpc>
+            <a:pPr marL="364983" indent="-285750">
               <a:spcBef>
                 <a:spcPts val="352"/>
               </a:spcBef>
@@ -6219,10 +6548,7 @@
             </a:r>
           </a:p>
           <a:p>
-            <a:pPr marL="1418219" lvl="2" indent="-285750">
-              <a:lnSpc>
-                <a:spcPct val="100000"/>
-              </a:lnSpc>
+            <a:pPr marL="961019" lvl="1" indent="-285750">
               <a:spcBef>
                 <a:spcPts val="352"/>
               </a:spcBef>
@@ -6236,10 +6562,7 @@
             </a:r>
           </a:p>
           <a:p>
-            <a:pPr marL="1418219" lvl="2" indent="-285750">
-              <a:lnSpc>
-                <a:spcPct val="100000"/>
-              </a:lnSpc>
+            <a:pPr marL="961019" lvl="1" indent="-285750">
               <a:spcBef>
                 <a:spcPts val="352"/>
               </a:spcBef>
@@ -6253,10 +6576,7 @@
             </a:r>
           </a:p>
           <a:p>
-            <a:pPr marL="1418219" lvl="2" indent="-285750">
-              <a:lnSpc>
-                <a:spcPct val="100000"/>
-              </a:lnSpc>
+            <a:pPr marL="961019" lvl="1" indent="-285750">
               <a:spcBef>
                 <a:spcPts val="352"/>
               </a:spcBef>
@@ -6270,10 +6590,7 @@
             </a:r>
           </a:p>
           <a:p>
-            <a:pPr marL="1418219" lvl="2" indent="-285750">
-              <a:lnSpc>
-                <a:spcPct val="100000"/>
-              </a:lnSpc>
+            <a:pPr marL="961019" lvl="1" indent="-285750">
               <a:spcBef>
                 <a:spcPts val="352"/>
               </a:spcBef>
@@ -6287,10 +6604,7 @@
             </a:r>
           </a:p>
           <a:p>
-            <a:pPr marL="1418219" lvl="2" indent="-285750">
-              <a:lnSpc>
-                <a:spcPct val="100000"/>
-              </a:lnSpc>
+            <a:pPr marL="961019" lvl="1" indent="-285750">
               <a:spcBef>
                 <a:spcPts val="352"/>
               </a:spcBef>
@@ -6304,10 +6618,7 @@
             </a:r>
           </a:p>
           <a:p>
-            <a:pPr marL="889237" lvl="1" indent="-285750">
-              <a:lnSpc>
-                <a:spcPct val="100000"/>
-              </a:lnSpc>
+            <a:pPr marL="432037" indent="-285750">
               <a:spcBef>
                 <a:spcPts val="352"/>
               </a:spcBef>
@@ -6321,10 +6632,7 @@
             </a:r>
           </a:p>
           <a:p>
-            <a:pPr marL="1418219" lvl="2" indent="-285750">
-              <a:lnSpc>
-                <a:spcPct val="100000"/>
-              </a:lnSpc>
+            <a:pPr marL="961019" lvl="1" indent="-285750">
               <a:spcBef>
                 <a:spcPts val="352"/>
               </a:spcBef>
@@ -6338,10 +6646,7 @@
             </a:r>
           </a:p>
           <a:p>
-            <a:pPr marL="1418219" lvl="2" indent="-285750">
-              <a:lnSpc>
-                <a:spcPct val="100000"/>
-              </a:lnSpc>
+            <a:pPr marL="961019" lvl="1" indent="-285750">
               <a:spcBef>
                 <a:spcPts val="352"/>
               </a:spcBef>
@@ -6400,7 +6705,7 @@
         </p:nvSpPr>
         <p:spPr>
           <a:xfrm>
-            <a:off x="574514" y="343912"/>
+            <a:off x="574514" y="566678"/>
             <a:ext cx="3970725" cy="2862322"/>
           </a:xfrm>
           <a:prstGeom prst="rect">
@@ -6600,7 +6905,7 @@
         </p:nvSpPr>
         <p:spPr>
           <a:xfrm>
-            <a:off x="5882730" y="343912"/>
+            <a:off x="5856604" y="566678"/>
             <a:ext cx="6096000" cy="5724644"/>
           </a:xfrm>
           <a:prstGeom prst="rect">
@@ -12691,7 +12996,7 @@
         </p:nvSpPr>
         <p:spPr>
           <a:xfrm>
-            <a:off x="0" y="338372"/>
+            <a:off x="0" y="34928"/>
             <a:ext cx="12192000" cy="695325"/>
           </a:xfrm>
         </p:spPr>
@@ -12721,8 +13026,8 @@
         </p:nvSpPr>
         <p:spPr>
           <a:xfrm>
-            <a:off x="312156" y="1910230"/>
-            <a:ext cx="11567687" cy="4462760"/>
+            <a:off x="197177" y="1379518"/>
+            <a:ext cx="11567687" cy="4955203"/>
           </a:xfrm>
           <a:prstGeom prst="rect">
             <a:avLst/>
@@ -12839,6 +13144,34 @@
             </a:r>
           </a:p>
           <a:p>
+            <a:pPr marL="1085850" lvl="2" indent="-171450">
+              <a:buFont typeface="Arial" panose="020B0604020202020204" pitchFamily="34" charset="0"/>
+              <a:buChar char="•"/>
+            </a:pPr>
+            <a:r>
+              <a:rPr lang="it-IT" sz="1600" b="1" dirty="0"/>
+              <a:t>ResetRegistrationDone</a:t>
+            </a:r>
+            <a:r>
+              <a:rPr lang="it-IT" sz="1600" dirty="0"/>
+              <a:t>(): nasconde la finestra della registrazione avvenuta</a:t>
+            </a:r>
+          </a:p>
+          <a:p>
+            <a:pPr marL="1085850" lvl="2" indent="-171450">
+              <a:buFont typeface="Arial" panose="020B0604020202020204" pitchFamily="34" charset="0"/>
+              <a:buChar char="•"/>
+            </a:pPr>
+            <a:r>
+              <a:rPr lang="it-IT" sz="1600" b="1" dirty="0"/>
+              <a:t>ShowRegistrationDone</a:t>
+            </a:r>
+            <a:r>
+              <a:rPr lang="it-IT" sz="1600" dirty="0"/>
+              <a:t>(): mostra la finestra della registrazione avvenuta</a:t>
+            </a:r>
+          </a:p>
+          <a:p>
             <a:pPr marL="742950" lvl="1" indent="-285750">
               <a:buFont typeface="Arial" panose="020B0604020202020204" pitchFamily="34" charset="0"/>
               <a:buChar char="•"/>
@@ -12975,7 +13308,7 @@
         </p:nvSpPr>
         <p:spPr>
           <a:xfrm>
-            <a:off x="-39070" y="1321134"/>
+            <a:off x="-1" y="730253"/>
             <a:ext cx="12192000" cy="461665"/>
           </a:xfrm>
           <a:prstGeom prst="rect">
@@ -13047,7 +13380,7 @@
         </p:nvSpPr>
         <p:spPr>
           <a:xfrm>
-            <a:off x="0" y="1408922"/>
+            <a:off x="0" y="1252168"/>
             <a:ext cx="12192000" cy="5449078"/>
           </a:xfrm>
           <a:prstGeom prst="rect">
@@ -13412,8 +13745,8 @@
         </p:nvSpPr>
         <p:spPr>
           <a:xfrm>
-            <a:off x="-104384" y="497424"/>
-            <a:ext cx="12192000" cy="461665"/>
+            <a:off x="87086" y="497424"/>
+            <a:ext cx="12000530" cy="461665"/>
           </a:xfrm>
           <a:prstGeom prst="rect">
             <a:avLst/>
@@ -13482,7 +13815,7 @@
         </p:nvSpPr>
         <p:spPr>
           <a:xfrm>
-            <a:off x="1" y="390122"/>
+            <a:off x="0" y="555585"/>
             <a:ext cx="12111134" cy="5614357"/>
           </a:xfrm>
           <a:prstGeom prst="rect">
@@ -14204,15 +14537,7 @@
             </a:r>
             <a:r>
               <a:rPr lang="it-IT" sz="1600" dirty="0"/>
-              <a:t>(): associa all’evento «click» la funzione che richiede al server il permesso di </a:t>
-            </a:r>
-            <a:r>
-              <a:rPr lang="it-IT" sz="1600" dirty="0" err="1"/>
-              <a:t>sloggare</a:t>
-            </a:r>
-            <a:r>
-              <a:rPr lang="it-IT" sz="1600" dirty="0"/>
-              <a:t> e di reindirizzare il sito alla pagina «index.html»</a:t>
+              <a:t>(): associa all’evento «click» la funzione che richiede al server il permesso di sloggare e di reindirizzare il sito alla pagina «index.html»</a:t>
             </a:r>
           </a:p>
           <a:p>
@@ -14459,7 +14784,7 @@
             <a:lstStyle/>
             <a:p>
               <a:pPr algn="ctr"/>
-              <a:endParaRPr lang="en-US"/>
+              <a:endParaRPr lang="en-US" dirty="0"/>
             </a:p>
           </p:txBody>
         </p:sp>
@@ -14558,7 +14883,7 @@
           <a:lstStyle/>
           <a:p>
             <a:r>
-              <a:rPr lang="en-US" sz="3600"/>
+              <a:rPr lang="en-US" sz="3600" dirty="0"/>
               <a:t>Application requirements analysis</a:t>
             </a:r>
           </a:p>
@@ -14790,7 +15115,7 @@
             <a:lstStyle/>
             <a:p>
               <a:pPr algn="ctr"/>
-              <a:endParaRPr lang="en-US"/>
+              <a:endParaRPr lang="en-US" dirty="0"/>
             </a:p>
           </p:txBody>
         </p:sp>
@@ -14853,7 +15178,7 @@
             <a:lstStyle/>
             <a:p>
               <a:pPr algn="ctr"/>
-              <a:endParaRPr lang="en-US"/>
+              <a:endParaRPr lang="en-US" dirty="0"/>
             </a:p>
           </p:txBody>
         </p:sp>
@@ -17794,15 +18119,7 @@
                       </a:r>
                       <a:r>
                         <a:rPr lang="it-IT" sz="1200" baseline="0" noProof="0" dirty="0"/>
-                        <a:t> </a:t>
-                      </a:r>
-                      <a:r>
-                        <a:rPr lang="it-IT" sz="1200" baseline="0" noProof="0" dirty="0" err="1"/>
-                        <a:t>Orchestrator.afterClickAlbum</a:t>
-                      </a:r>
-                      <a:r>
-                        <a:rPr lang="it-IT" sz="1200" baseline="0" noProof="0" dirty="0"/>
-                        <a:t> -&gt; Image List -&gt; </a:t>
+                        <a:t> Orchestrator.afterClickAlbum -&gt; Image List -&gt; </a:t>
                       </a:r>
                       <a:r>
                         <a:rPr lang="it-IT" sz="1200" noProof="0" dirty="0"/>
@@ -17891,13 +18208,8 @@
                     <a:p>
                       <a:r>
                         <a:rPr lang="it-IT" sz="1200" noProof="0" dirty="0"/>
-                        <a:t>Function </a:t>
+                        <a:t>Function setDraggable</a:t>
                       </a:r>
-                      <a:r>
-                        <a:rPr lang="it-IT" sz="1200" noProof="0" dirty="0" err="1"/>
-                        <a:t>setDraggable</a:t>
-                      </a:r>
-                      <a:endParaRPr lang="it-IT" sz="1200" noProof="0" dirty="0"/>
                     </a:p>
                   </a:txBody>
                   <a:tcPr marL="99060" marR="99060" marT="60960" marB="60960"/>
@@ -19079,8 +19391,8 @@
         </p:nvSpPr>
         <p:spPr>
           <a:xfrm>
-            <a:off x="5000083" y="35684"/>
-            <a:ext cx="5864581" cy="1008000"/>
+            <a:off x="22338" y="54284"/>
+            <a:ext cx="5864581" cy="474518"/>
           </a:xfrm>
           <a:prstGeom prst="rect">
             <a:avLst/>
@@ -19101,7 +19413,7 @@
             </a:pPr>
             <a:r>
               <a:rPr lang="es-419" dirty="0"/>
-              <a:t>Evento: login</a:t>
+              <a:t>Event: login</a:t>
             </a:r>
             <a:endParaRPr dirty="0"/>
           </a:p>
@@ -19414,7 +19726,7 @@
           <a:lstStyle/>
           <a:p>
             <a:pPr algn="ctr"/>
-            <a:endParaRPr sz="1400">
+            <a:endParaRPr sz="1400" dirty="0">
               <a:solidFill>
                 <a:schemeClr val="dk1"/>
               </a:solidFill>
@@ -19608,7 +19920,7 @@
           <a:lstStyle/>
           <a:p>
             <a:pPr algn="ctr"/>
-            <a:endParaRPr sz="1400">
+            <a:endParaRPr sz="1400" dirty="0">
               <a:solidFill>
                 <a:schemeClr val="dk1"/>
               </a:solidFill>
@@ -19905,7 +20217,7 @@
           <a:lstStyle/>
           <a:p>
             <a:pPr algn="ctr"/>
-            <a:endParaRPr sz="1400">
+            <a:endParaRPr sz="1400" dirty="0">
               <a:solidFill>
                 <a:schemeClr val="dk1"/>
               </a:solidFill>
@@ -20351,7 +20663,7 @@
           <a:lstStyle/>
           <a:p>
             <a:pPr algn="ctr"/>
-            <a:endParaRPr sz="1400">
+            <a:endParaRPr sz="1400" dirty="0">
               <a:solidFill>
                 <a:schemeClr val="dk1"/>
               </a:solidFill>
@@ -20481,7 +20793,7 @@
         </p:nvSpPr>
         <p:spPr>
           <a:xfrm>
-            <a:off x="584336" y="120557"/>
+            <a:off x="4710900" y="82850"/>
             <a:ext cx="330200" cy="628400"/>
           </a:xfrm>
           <a:prstGeom prst="rect">
@@ -20507,7 +20819,7 @@
           <a:lstStyle/>
           <a:p>
             <a:pPr algn="ctr"/>
-            <a:endParaRPr sz="2100">
+            <a:endParaRPr sz="2100" dirty="0">
               <a:solidFill>
                 <a:schemeClr val="dk1"/>
               </a:solidFill>
@@ -20527,7 +20839,7 @@
         </p:nvSpPr>
         <p:spPr>
           <a:xfrm>
-            <a:off x="875853" y="434757"/>
+            <a:off x="5002417" y="397050"/>
             <a:ext cx="1211678" cy="369332"/>
           </a:xfrm>
           <a:prstGeom prst="rect">
@@ -20556,7 +20868,7 @@
         </p:nvSpPr>
         <p:spPr>
           <a:xfrm>
-            <a:off x="2156128" y="122829"/>
+            <a:off x="6282692" y="85122"/>
             <a:ext cx="330200" cy="628400"/>
           </a:xfrm>
           <a:prstGeom prst="rect">
@@ -20585,7 +20897,7 @@
           <a:lstStyle/>
           <a:p>
             <a:pPr algn="ctr"/>
-            <a:endParaRPr sz="2100">
+            <a:endParaRPr sz="2100" dirty="0">
               <a:solidFill>
                 <a:schemeClr val="dk1"/>
               </a:solidFill>
@@ -20605,7 +20917,7 @@
         </p:nvSpPr>
         <p:spPr>
           <a:xfrm>
-            <a:off x="2447645" y="437029"/>
+            <a:off x="6574209" y="399322"/>
             <a:ext cx="1271374" cy="369332"/>
           </a:xfrm>
           <a:prstGeom prst="rect">
@@ -21150,7 +21462,7 @@
           <a:lstStyle/>
           <a:p>
             <a:pPr algn="ctr"/>
-            <a:endParaRPr sz="1400">
+            <a:endParaRPr sz="1400" dirty="0">
               <a:solidFill>
                 <a:schemeClr val="dk1"/>
               </a:solidFill>
@@ -21340,7 +21652,7 @@
           <a:lstStyle/>
           <a:p>
             <a:pPr algn="ctr"/>
-            <a:endParaRPr sz="1400">
+            <a:endParaRPr sz="1400" dirty="0">
               <a:solidFill>
                 <a:schemeClr val="dk1"/>
               </a:solidFill>
@@ -21538,6 +21850,66 @@
           </a:effectLst>
         </p:spPr>
       </p:cxnSp>
+      <p:sp>
+        <p:nvSpPr>
+          <p:cNvPr id="72" name="Google Shape;309;p38">
+            <a:extLst>
+              <a:ext uri="{FF2B5EF4-FFF2-40B4-BE49-F238E27FC236}">
+                <a16:creationId xmlns:a16="http://schemas.microsoft.com/office/drawing/2014/main" id="{E58B1DEF-AF70-4D66-B796-47D5B7D09CFF}"/>
+              </a:ext>
+            </a:extLst>
+          </p:cNvPr>
+          <p:cNvSpPr txBox="1">
+            <a:spLocks/>
+          </p:cNvSpPr>
+          <p:nvPr/>
+        </p:nvSpPr>
+        <p:spPr>
+          <a:xfrm>
+            <a:off x="4458789" y="28626"/>
+            <a:ext cx="3373026" cy="771224"/>
+          </a:xfrm>
+          <a:prstGeom prst="rect">
+            <a:avLst/>
+          </a:prstGeom>
+          <a:noFill/>
+          <a:ln w="38100">
+            <a:solidFill>
+              <a:srgbClr val="C00000"/>
+            </a:solidFill>
+          </a:ln>
+        </p:spPr>
+        <p:txBody>
+          <a:bodyPr spcFirstLastPara="1" vert="horz" wrap="square" lIns="107269" tIns="53620" rIns="107269" bIns="53620" rtlCol="0" anchor="ctr" anchorCtr="0">
+            <a:noAutofit/>
+          </a:bodyPr>
+          <a:lstStyle>
+            <a:lvl1pPr algn="l" defTabSz="914400" rtl="0" eaLnBrk="1" latinLnBrk="0" hangingPunct="1">
+              <a:lnSpc>
+                <a:spcPct val="90000"/>
+              </a:lnSpc>
+              <a:spcBef>
+                <a:spcPct val="0"/>
+              </a:spcBef>
+              <a:buNone/>
+              <a:defRPr sz="4400" kern="1200">
+                <a:solidFill>
+                  <a:schemeClr val="tx1"/>
+                </a:solidFill>
+                <a:latin typeface="+mj-lt"/>
+                <a:ea typeface="+mj-ea"/>
+                <a:cs typeface="+mj-cs"/>
+              </a:defRPr>
+            </a:lvl1pPr>
+          </a:lstStyle>
+          <a:p>
+            <a:pPr>
+              <a:buSzPts val="4400"/>
+            </a:pPr>
+            <a:endParaRPr lang="es-419" dirty="0"/>
+          </a:p>
+        </p:txBody>
+      </p:sp>
     </p:spTree>
   </p:cSld>
   <p:clrMapOvr>
@@ -21575,8 +21947,8 @@
         </p:nvSpPr>
         <p:spPr>
           <a:xfrm>
-            <a:off x="133350" y="27868"/>
-            <a:ext cx="8915400" cy="676781"/>
+            <a:off x="-6073" y="36902"/>
+            <a:ext cx="8915400" cy="519321"/>
           </a:xfrm>
           <a:prstGeom prst="rect">
             <a:avLst/>
@@ -21597,7 +21969,7 @@
             </a:pPr>
             <a:r>
               <a:rPr lang="es-419" dirty="0"/>
-              <a:t>Evento: User Registration</a:t>
+              <a:t>Event: User Registration</a:t>
             </a:r>
             <a:endParaRPr dirty="0"/>
           </a:p>
@@ -21988,7 +22360,7 @@
           <a:lstStyle/>
           <a:p>
             <a:pPr algn="ctr"/>
-            <a:endParaRPr sz="1200">
+            <a:endParaRPr sz="1200" dirty="0">
               <a:solidFill>
                 <a:schemeClr val="dk1"/>
               </a:solidFill>
@@ -22206,7 +22578,7 @@
           <a:lstStyle/>
           <a:p>
             <a:pPr algn="ctr"/>
-            <a:endParaRPr sz="1200">
+            <a:endParaRPr sz="1200" dirty="0">
               <a:solidFill>
                 <a:schemeClr val="dk1"/>
               </a:solidFill>
@@ -22345,7 +22717,7 @@
           <a:lstStyle/>
           <a:p>
             <a:pPr algn="ctr"/>
-            <a:endParaRPr sz="2100">
+            <a:endParaRPr sz="2100" dirty="0">
               <a:solidFill>
                 <a:schemeClr val="dk1"/>
               </a:solidFill>
@@ -22492,7 +22864,7 @@
           <a:lstStyle/>
           <a:p>
             <a:pPr algn="ctr"/>
-            <a:endParaRPr sz="1200">
+            <a:endParaRPr sz="1200" dirty="0">
               <a:solidFill>
                 <a:schemeClr val="dk1"/>
               </a:solidFill>
@@ -23816,8 +24188,8 @@
         </p:nvSpPr>
         <p:spPr>
           <a:xfrm>
-            <a:off x="227362" y="26556"/>
-            <a:ext cx="8915400" cy="771224"/>
+            <a:off x="0" y="17757"/>
+            <a:ext cx="8915400" cy="551634"/>
           </a:xfrm>
           <a:prstGeom prst="rect">
             <a:avLst/>
@@ -23838,7 +24210,7 @@
             </a:pPr>
             <a:r>
               <a:rPr lang="es-419" dirty="0"/>
-              <a:t>Evento: Load OnePage.html </a:t>
+              <a:t>Event: Load OnePage.html </a:t>
             </a:r>
             <a:endParaRPr dirty="0"/>
           </a:p>
@@ -24018,7 +24390,7 @@
           <a:lstStyle/>
           <a:p>
             <a:pPr algn="ctr"/>
-            <a:endParaRPr sz="2100">
+            <a:endParaRPr sz="2100" dirty="0">
               <a:solidFill>
                 <a:schemeClr val="dk1"/>
               </a:solidFill>
@@ -24180,7 +24552,7 @@
           <a:lstStyle/>
           <a:p>
             <a:pPr algn="ctr"/>
-            <a:endParaRPr sz="2100">
+            <a:endParaRPr sz="2100" dirty="0">
               <a:solidFill>
                 <a:schemeClr val="dk1"/>
               </a:solidFill>
@@ -24600,7 +24972,7 @@
           <a:lstStyle/>
           <a:p>
             <a:pPr algn="ctr"/>
-            <a:endParaRPr sz="2100">
+            <a:endParaRPr sz="2100" dirty="0">
               <a:solidFill>
                 <a:schemeClr val="dk1"/>
               </a:solidFill>
@@ -24755,7 +25127,7 @@
           <a:lstStyle/>
           <a:p>
             <a:pPr algn="ctr"/>
-            <a:endParaRPr sz="2100">
+            <a:endParaRPr sz="2100" dirty="0">
               <a:solidFill>
                 <a:schemeClr val="dk1"/>
               </a:solidFill>
@@ -24910,7 +25282,7 @@
           <a:lstStyle/>
           <a:p>
             <a:pPr algn="ctr"/>
-            <a:endParaRPr sz="2100">
+            <a:endParaRPr sz="2100" dirty="0">
               <a:solidFill>
                 <a:schemeClr val="dk1"/>
               </a:solidFill>
@@ -25065,7 +25437,7 @@
           <a:lstStyle/>
           <a:p>
             <a:pPr algn="ctr"/>
-            <a:endParaRPr sz="2100">
+            <a:endParaRPr sz="2100" dirty="0">
               <a:solidFill>
                 <a:schemeClr val="dk1"/>
               </a:solidFill>
@@ -25220,7 +25592,7 @@
           <a:lstStyle/>
           <a:p>
             <a:pPr algn="ctr"/>
-            <a:endParaRPr sz="2100">
+            <a:endParaRPr sz="2100" dirty="0">
               <a:solidFill>
                 <a:schemeClr val="dk1"/>
               </a:solidFill>
@@ -25375,7 +25747,7 @@
           <a:lstStyle/>
           <a:p>
             <a:pPr algn="ctr"/>
-            <a:endParaRPr sz="2100">
+            <a:endParaRPr sz="2100" dirty="0">
               <a:solidFill>
                 <a:schemeClr val="dk1"/>
               </a:solidFill>
@@ -25530,7 +25902,7 @@
           <a:lstStyle/>
           <a:p>
             <a:pPr algn="ctr"/>
-            <a:endParaRPr sz="2100">
+            <a:endParaRPr sz="2100" dirty="0">
               <a:solidFill>
                 <a:schemeClr val="dk1"/>
               </a:solidFill>
@@ -25685,7 +26057,7 @@
           <a:lstStyle/>
           <a:p>
             <a:pPr algn="ctr"/>
-            <a:endParaRPr sz="2100">
+            <a:endParaRPr sz="2100" dirty="0">
               <a:solidFill>
                 <a:schemeClr val="dk1"/>
               </a:solidFill>
@@ -25840,7 +26212,7 @@
           <a:lstStyle/>
           <a:p>
             <a:pPr algn="ctr"/>
-            <a:endParaRPr sz="2100">
+            <a:endParaRPr sz="2100" dirty="0">
               <a:solidFill>
                 <a:schemeClr val="dk1"/>
               </a:solidFill>
@@ -26914,7 +27286,7 @@
           <a:lstStyle/>
           <a:p>
             <a:pPr algn="ctr"/>
-            <a:endParaRPr sz="2100">
+            <a:endParaRPr sz="2100" dirty="0">
               <a:solidFill>
                 <a:schemeClr val="dk1"/>
               </a:solidFill>
@@ -27192,7 +27564,7 @@
           <a:lstStyle/>
           <a:p>
             <a:pPr algn="ctr"/>
-            <a:endParaRPr sz="2100">
+            <a:endParaRPr sz="2100" dirty="0">
               <a:solidFill>
                 <a:schemeClr val="dk1"/>
               </a:solidFill>
@@ -27288,7 +27660,7 @@
           <a:lstStyle/>
           <a:p>
             <a:pPr algn="ctr"/>
-            <a:endParaRPr sz="2000">
+            <a:endParaRPr sz="2000" dirty="0">
               <a:solidFill>
                 <a:schemeClr val="dk1"/>
               </a:solidFill>
@@ -27467,7 +27839,7 @@
           <a:lstStyle/>
           <a:p>
             <a:pPr algn="ctr"/>
-            <a:endParaRPr sz="2000">
+            <a:endParaRPr sz="2000" dirty="0">
               <a:solidFill>
                 <a:schemeClr val="dk1"/>
               </a:solidFill>
@@ -27984,7 +28356,7 @@
           <a:lstStyle/>
           <a:p>
             <a:pPr algn="ctr"/>
-            <a:endParaRPr sz="2000">
+            <a:endParaRPr sz="2000" dirty="0">
               <a:solidFill>
                 <a:schemeClr val="dk1"/>
               </a:solidFill>
@@ -28990,6 +29362,52 @@
           </a:p>
         </p:txBody>
       </p:sp>
+      <p:sp>
+        <p:nvSpPr>
+          <p:cNvPr id="45" name="Google Shape;309;p38">
+            <a:extLst>
+              <a:ext uri="{FF2B5EF4-FFF2-40B4-BE49-F238E27FC236}">
+                <a16:creationId xmlns:a16="http://schemas.microsoft.com/office/drawing/2014/main" id="{408CF69C-17D6-4B95-B656-779ACB644070}"/>
+              </a:ext>
+            </a:extLst>
+          </p:cNvPr>
+          <p:cNvSpPr txBox="1">
+            <a:spLocks noGrp="1"/>
+          </p:cNvSpPr>
+          <p:nvPr>
+            <p:ph type="title"/>
+          </p:nvPr>
+        </p:nvSpPr>
+        <p:spPr>
+          <a:xfrm>
+            <a:off x="0" y="18469"/>
+            <a:ext cx="3161850" cy="581781"/>
+          </a:xfrm>
+          <a:prstGeom prst="rect">
+            <a:avLst/>
+          </a:prstGeom>
+          <a:noFill/>
+          <a:ln>
+            <a:noFill/>
+          </a:ln>
+        </p:spPr>
+        <p:txBody>
+          <a:bodyPr spcFirstLastPara="1" vert="horz" wrap="square" lIns="107269" tIns="53620" rIns="107269" bIns="53620" rtlCol="0" anchor="ctr" anchorCtr="0">
+            <a:noAutofit/>
+          </a:bodyPr>
+          <a:lstStyle/>
+          <a:p>
+            <a:pPr>
+              <a:buSzPts val="4400"/>
+            </a:pPr>
+            <a:r>
+              <a:rPr lang="es-419" dirty="0"/>
+              <a:t>Continue....</a:t>
+            </a:r>
+            <a:endParaRPr dirty="0"/>
+          </a:p>
+        </p:txBody>
+      </p:sp>
     </p:spTree>
     <p:extLst>
       <p:ext uri="{BB962C8B-B14F-4D97-AF65-F5344CB8AC3E}">
@@ -29108,7 +29526,7 @@
         </p:nvSpPr>
         <p:spPr>
           <a:xfrm>
-            <a:off x="568685" y="25766"/>
+            <a:off x="12375" y="24586"/>
             <a:ext cx="7306524" cy="555655"/>
           </a:xfrm>
           <a:prstGeom prst="rect">
@@ -29130,7 +29548,7 @@
             </a:pPr>
             <a:r>
               <a:rPr lang="es-419" dirty="0"/>
-              <a:t>Evento: click album</a:t>
+              <a:t>Event: click album</a:t>
             </a:r>
             <a:endParaRPr dirty="0"/>
           </a:p>
@@ -29304,7 +29722,7 @@
           <a:lstStyle/>
           <a:p>
             <a:pPr algn="ctr"/>
-            <a:endParaRPr sz="2000">
+            <a:endParaRPr sz="2000" dirty="0">
               <a:solidFill>
                 <a:schemeClr val="dk1"/>
               </a:solidFill>
@@ -29464,7 +29882,7 @@
           <a:lstStyle/>
           <a:p>
             <a:pPr algn="ctr"/>
-            <a:endParaRPr sz="2000">
+            <a:endParaRPr sz="2000" dirty="0">
               <a:solidFill>
                 <a:schemeClr val="dk1"/>
               </a:solidFill>
@@ -29801,7 +30219,7 @@
           <a:lstStyle/>
           <a:p>
             <a:pPr algn="ctr"/>
-            <a:endParaRPr sz="2100">
+            <a:endParaRPr sz="2100" dirty="0">
               <a:solidFill>
                 <a:schemeClr val="dk1"/>
               </a:solidFill>
@@ -29976,7 +30394,7 @@
           <a:lstStyle/>
           <a:p>
             <a:pPr algn="ctr"/>
-            <a:endParaRPr sz="2100">
+            <a:endParaRPr sz="2100" dirty="0">
               <a:solidFill>
                 <a:schemeClr val="dk1"/>
               </a:solidFill>
@@ -30133,7 +30551,7 @@
           <a:lstStyle/>
           <a:p>
             <a:pPr algn="ctr"/>
-            <a:endParaRPr sz="2100">
+            <a:endParaRPr sz="2100" dirty="0">
               <a:solidFill>
                 <a:schemeClr val="dk1"/>
               </a:solidFill>
@@ -31329,7 +31747,7 @@
         </p:nvSpPr>
         <p:spPr>
           <a:xfrm>
-            <a:off x="407561" y="51140"/>
+            <a:off x="0" y="24794"/>
             <a:ext cx="9791189" cy="555655"/>
           </a:xfrm>
           <a:prstGeom prst="rect">
@@ -31351,7 +31769,7 @@
             </a:pPr>
             <a:r>
               <a:rPr lang="es-419" dirty="0"/>
-              <a:t>Evento: mouseenter on thumbnail image</a:t>
+              <a:t>Event: mouseenter on thumbnail image</a:t>
             </a:r>
             <a:endParaRPr dirty="0"/>
           </a:p>
@@ -31526,7 +31944,7 @@
           <a:lstStyle/>
           <a:p>
             <a:pPr algn="ctr"/>
-            <a:endParaRPr sz="2000">
+            <a:endParaRPr sz="2000" dirty="0">
               <a:solidFill>
                 <a:schemeClr val="dk1"/>
               </a:solidFill>
@@ -31687,7 +32105,7 @@
           <a:lstStyle/>
           <a:p>
             <a:pPr algn="ctr"/>
-            <a:endParaRPr sz="2000">
+            <a:endParaRPr sz="2000" dirty="0">
               <a:solidFill>
                 <a:schemeClr val="dk1"/>
               </a:solidFill>
@@ -31954,7 +32372,7 @@
           <a:lstStyle/>
           <a:p>
             <a:pPr algn="ctr"/>
-            <a:endParaRPr sz="2100">
+            <a:endParaRPr sz="2100" dirty="0">
               <a:solidFill>
                 <a:schemeClr val="dk1"/>
               </a:solidFill>
@@ -32130,7 +32548,7 @@
           <a:lstStyle/>
           <a:p>
             <a:pPr algn="ctr"/>
-            <a:endParaRPr sz="2100">
+            <a:endParaRPr sz="2100" dirty="0">
               <a:solidFill>
                 <a:schemeClr val="dk1"/>
               </a:solidFill>
@@ -32288,7 +32706,7 @@
           <a:lstStyle/>
           <a:p>
             <a:pPr algn="ctr"/>
-            <a:endParaRPr sz="2100">
+            <a:endParaRPr sz="2100" dirty="0">
               <a:solidFill>
                 <a:schemeClr val="dk1"/>
               </a:solidFill>
@@ -33281,7 +33699,7 @@
           <a:lstStyle/>
           <a:p>
             <a:pPr algn="ctr"/>
-            <a:endParaRPr sz="2000">
+            <a:endParaRPr sz="2000" dirty="0">
               <a:solidFill>
                 <a:schemeClr val="dk1"/>
               </a:solidFill>
@@ -33981,6 +34399,14 @@
 <file path=ppt/slides/slide3.xml><?xml version="1.0" encoding="utf-8"?>
 <p:sld xmlns:a="http://schemas.openxmlformats.org/drawingml/2006/main" xmlns:r="http://schemas.openxmlformats.org/officeDocument/2006/relationships" xmlns:p="http://schemas.openxmlformats.org/presentationml/2006/main">
   <p:cSld>
+    <p:bg>
+      <p:bgPr>
+        <a:solidFill>
+          <a:schemeClr val="bg1"/>
+        </a:solidFill>
+        <a:effectLst/>
+      </p:bgPr>
+    </p:bg>
     <p:spTree>
       <p:nvGrpSpPr>
         <p:cNvPr id="1" name="Shape 189"/>
@@ -34007,7 +34433,7 @@
         </p:nvSpPr>
         <p:spPr>
           <a:xfrm>
-            <a:off x="1667741" y="97992"/>
+            <a:off x="1667741" y="150244"/>
             <a:ext cx="8856518" cy="536001"/>
           </a:xfrm>
           <a:prstGeom prst="rect">
@@ -34042,7 +34468,7 @@
             <a:spLocks noGrp="1"/>
           </p:cNvSpPr>
           <p:nvPr>
-            <p:ph type="body" idx="1"/>
+            <p:ph idx="1"/>
           </p:nvPr>
         </p:nvSpPr>
         <p:spPr>
@@ -34406,7 +34832,7 @@
     </p:spTree>
   </p:cSld>
   <p:clrMapOvr>
-    <a:masterClrMapping/>
+    <a:overrideClrMapping bg1="lt1" tx1="dk1" bg2="lt2" tx2="dk2" accent1="accent1" accent2="accent2" accent3="accent3" accent4="accent4" accent5="accent5" accent6="accent6" hlink="hlink" folHlink="folHlink"/>
   </p:clrMapOvr>
 </p:sld>
 </file>
@@ -34524,8 +34950,8 @@
         </p:nvSpPr>
         <p:spPr>
           <a:xfrm>
-            <a:off x="568685" y="25766"/>
-            <a:ext cx="8621968" cy="555655"/>
+            <a:off x="36223" y="8544"/>
+            <a:ext cx="8060886" cy="555655"/>
           </a:xfrm>
           <a:prstGeom prst="rect">
             <a:avLst/>
@@ -34545,8 +34971,12 @@
               <a:buSzPts val="4400"/>
             </a:pPr>
             <a:r>
+              <a:rPr lang="en-US" dirty="0"/>
+              <a:t>Event </a:t>
+            </a:r>
+            <a:r>
               <a:rPr lang="es-419" dirty="0"/>
-              <a:t>Evento: creation of new comment</a:t>
+              <a:t>: creation of new comment</a:t>
             </a:r>
             <a:endParaRPr dirty="0"/>
           </a:p>
@@ -34650,7 +35080,7 @@
           <a:lstStyle/>
           <a:p>
             <a:pPr algn="ctr"/>
-            <a:endParaRPr sz="2000">
+            <a:endParaRPr sz="2000" dirty="0">
               <a:solidFill>
                 <a:schemeClr val="dk1"/>
               </a:solidFill>
@@ -34824,7 +35254,7 @@
           <a:lstStyle/>
           <a:p>
             <a:pPr algn="ctr"/>
-            <a:endParaRPr sz="2100">
+            <a:endParaRPr sz="2100" dirty="0">
               <a:solidFill>
                 <a:schemeClr val="dk1"/>
               </a:solidFill>
@@ -35111,7 +35541,7 @@
           <a:lstStyle/>
           <a:p>
             <a:pPr algn="ctr"/>
-            <a:endParaRPr sz="2000">
+            <a:endParaRPr sz="2000" dirty="0">
               <a:solidFill>
                 <a:schemeClr val="dk1"/>
               </a:solidFill>
@@ -36163,7 +36593,7 @@
           <a:lstStyle/>
           <a:p>
             <a:pPr algn="ctr"/>
-            <a:endParaRPr sz="2100">
+            <a:endParaRPr sz="2100" dirty="0">
               <a:solidFill>
                 <a:schemeClr val="dk1"/>
               </a:solidFill>
@@ -36381,7 +36811,7 @@
           <a:lstStyle/>
           <a:p>
             <a:pPr algn="ctr"/>
-            <a:endParaRPr sz="2100">
+            <a:endParaRPr sz="2100" dirty="0">
               <a:solidFill>
                 <a:schemeClr val="dk1"/>
               </a:solidFill>
@@ -36928,7 +37358,7 @@
           <a:lstStyle/>
           <a:p>
             <a:pPr algn="ctr"/>
-            <a:endParaRPr sz="2100">
+            <a:endParaRPr sz="2100" dirty="0">
               <a:solidFill>
                 <a:schemeClr val="dk1"/>
               </a:solidFill>
@@ -37215,7 +37645,7 @@
           <a:lstStyle/>
           <a:p>
             <a:pPr algn="ctr"/>
-            <a:endParaRPr sz="2000">
+            <a:endParaRPr sz="2000" dirty="0">
               <a:solidFill>
                 <a:schemeClr val="dk1"/>
               </a:solidFill>
@@ -37557,7 +37987,7 @@
         </p:nvSpPr>
         <p:spPr>
           <a:xfrm>
-            <a:off x="567084" y="95667"/>
+            <a:off x="103755" y="18810"/>
             <a:ext cx="8067315" cy="555655"/>
           </a:xfrm>
           <a:prstGeom prst="rect">
@@ -37578,8 +38008,12 @@
               <a:buSzPts val="4400"/>
             </a:pPr>
             <a:r>
+              <a:rPr lang="en-US" dirty="0"/>
+              <a:t>Event </a:t>
+            </a:r>
+            <a:r>
               <a:rPr lang="es-419" dirty="0"/>
-              <a:t>Evento: click “save order button”</a:t>
+              <a:t>: click “save order button”</a:t>
             </a:r>
             <a:endParaRPr dirty="0"/>
           </a:p>
@@ -38218,7 +38652,7 @@
         </p:nvSpPr>
         <p:spPr>
           <a:xfrm>
-            <a:off x="272021" y="218219"/>
+            <a:off x="0" y="0"/>
             <a:ext cx="10515600" cy="663684"/>
           </a:xfrm>
         </p:spPr>
@@ -38230,7 +38664,7 @@
           <a:p>
             <a:r>
               <a:rPr lang="en-US" dirty="0"/>
-              <a:t>Events: Click Next Button</a:t>
+              <a:t>Event: Click Next Button</a:t>
             </a:r>
           </a:p>
         </p:txBody>
@@ -38393,7 +38827,7 @@
           <a:lstStyle/>
           <a:p>
             <a:pPr algn="ctr"/>
-            <a:endParaRPr sz="1400">
+            <a:endParaRPr sz="1400" dirty="0">
               <a:solidFill>
                 <a:schemeClr val="dk1"/>
               </a:solidFill>
@@ -38551,7 +38985,7 @@
           <a:lstStyle/>
           <a:p>
             <a:pPr algn="ctr"/>
-            <a:endParaRPr sz="1400">
+            <a:endParaRPr sz="1400" dirty="0">
               <a:solidFill>
                 <a:schemeClr val="dk1"/>
               </a:solidFill>
@@ -38709,7 +39143,7 @@
           <a:lstStyle/>
           <a:p>
             <a:pPr algn="ctr"/>
-            <a:endParaRPr sz="1400">
+            <a:endParaRPr sz="1400" dirty="0">
               <a:solidFill>
                 <a:schemeClr val="dk1"/>
               </a:solidFill>
@@ -39182,7 +39616,7 @@
         </p:nvSpPr>
         <p:spPr>
           <a:xfrm>
-            <a:off x="272021" y="218219"/>
+            <a:off x="0" y="10305"/>
             <a:ext cx="10515600" cy="663684"/>
           </a:xfrm>
         </p:spPr>
@@ -39194,7 +39628,7 @@
           <a:p>
             <a:r>
               <a:rPr lang="en-US" dirty="0"/>
-              <a:t>Events: Click Previous Button</a:t>
+              <a:t>Event: Click Previous Button</a:t>
             </a:r>
           </a:p>
         </p:txBody>
@@ -39357,7 +39791,7 @@
           <a:lstStyle/>
           <a:p>
             <a:pPr algn="ctr"/>
-            <a:endParaRPr sz="1400">
+            <a:endParaRPr sz="1400" dirty="0">
               <a:solidFill>
                 <a:schemeClr val="dk1"/>
               </a:solidFill>
@@ -39515,7 +39949,7 @@
           <a:lstStyle/>
           <a:p>
             <a:pPr algn="ctr"/>
-            <a:endParaRPr sz="1400">
+            <a:endParaRPr sz="1400" dirty="0">
               <a:solidFill>
                 <a:schemeClr val="dk1"/>
               </a:solidFill>
@@ -39673,7 +40107,7 @@
           <a:lstStyle/>
           <a:p>
             <a:pPr algn="ctr"/>
-            <a:endParaRPr sz="1400">
+            <a:endParaRPr sz="1400" dirty="0">
               <a:solidFill>
                 <a:schemeClr val="dk1"/>
               </a:solidFill>
@@ -40198,7 +40632,7 @@
           <a:lstStyle/>
           <a:p>
             <a:pPr algn="ctr"/>
-            <a:endParaRPr lang="en-US"/>
+            <a:endParaRPr lang="en-US" dirty="0"/>
           </a:p>
         </p:txBody>
       </p:sp>
@@ -40216,7 +40650,7 @@
         </p:nvSpPr>
         <p:spPr>
           <a:xfrm>
-            <a:off x="1196656" y="148739"/>
+            <a:off x="806611" y="175082"/>
             <a:ext cx="9795638" cy="556719"/>
           </a:xfrm>
           <a:prstGeom prst="rect">
@@ -40272,7 +40706,7 @@
         </p:blipFill>
         <p:spPr>
           <a:xfrm>
-            <a:off x="7433833" y="1432560"/>
+            <a:off x="6641353" y="1432559"/>
             <a:ext cx="4298101" cy="4954586"/>
           </a:xfrm>
           <a:prstGeom prst="rect">
@@ -40302,8 +40736,8 @@
         </p:blipFill>
         <p:spPr>
           <a:xfrm>
-            <a:off x="157625" y="1920876"/>
-            <a:ext cx="6497698" cy="3687444"/>
+            <a:off x="471381" y="1487261"/>
+            <a:ext cx="4944548" cy="3546294"/>
           </a:xfrm>
           <a:prstGeom prst="rect">
             <a:avLst/>
@@ -40324,7 +40758,7 @@
         </p:nvCxnSpPr>
         <p:spPr>
           <a:xfrm>
-            <a:off x="6660573" y="1298864"/>
+            <a:off x="5704430" y="1169721"/>
             <a:ext cx="0" cy="5340927"/>
           </a:xfrm>
           <a:prstGeom prst="line">
@@ -40391,10 +40825,10 @@
       </p:grpSpPr>
       <p:sp useBgFill="1">
         <p:nvSpPr>
-          <p:cNvPr id="10" name="Rectangle 9">
-            <a:extLst>
-              <a:ext uri="{FF2B5EF4-FFF2-40B4-BE49-F238E27FC236}">
-                <a16:creationId xmlns:a16="http://schemas.microsoft.com/office/drawing/2014/main" id="{53F29798-D584-4792-9B62-3F5F5C36D619}"/>
+          <p:cNvPr id="15" name="Rectangle 14">
+            <a:extLst>
+              <a:ext uri="{FF2B5EF4-FFF2-40B4-BE49-F238E27FC236}">
+                <a16:creationId xmlns:a16="http://schemas.microsoft.com/office/drawing/2014/main" id="{E45B1D5C-0827-4AF0-8186-11FC5A8B8B92}"/>
               </a:ext>
               <a:ext uri="{C183D7F6-B498-43B3-948B-1728B52AA6E4}">
                 <adec:decorative xmlns:adec="http://schemas.microsoft.com/office/drawing/2017/decorative" val="1"/>
@@ -40415,7 +40849,7 @@
         <p:spPr>
           <a:xfrm>
             <a:off x="0" y="0"/>
-            <a:ext cx="12188952" cy="6858000"/>
+            <a:ext cx="12191999" cy="6857365"/>
           </a:xfrm>
           <a:prstGeom prst="rect">
             <a:avLst/>
@@ -40445,50 +40879,303 @@
           <a:lstStyle/>
           <a:p>
             <a:pPr algn="ctr"/>
-            <a:endParaRPr lang="en-US"/>
+            <a:endParaRPr lang="en-US" dirty="0"/>
           </a:p>
         </p:txBody>
       </p:sp>
       <p:sp>
         <p:nvSpPr>
-          <p:cNvPr id="5" name="CasellaDiTesto 4">
-            <a:extLst>
-              <a:ext uri="{FF2B5EF4-FFF2-40B4-BE49-F238E27FC236}">
-                <a16:creationId xmlns:a16="http://schemas.microsoft.com/office/drawing/2014/main" id="{86FEEE08-5069-4C77-A39A-8A351618842B}"/>
-              </a:ext>
-            </a:extLst>
-          </p:cNvPr>
-          <p:cNvSpPr txBox="1"/>
-          <p:nvPr/>
-        </p:nvSpPr>
-        <p:spPr>
-          <a:xfrm>
-            <a:off x="838200" y="184805"/>
-            <a:ext cx="10515600" cy="1505883"/>
+          <p:cNvPr id="17" name="Rectangle 16">
+            <a:extLst>
+              <a:ext uri="{FF2B5EF4-FFF2-40B4-BE49-F238E27FC236}">
+                <a16:creationId xmlns:a16="http://schemas.microsoft.com/office/drawing/2014/main" id="{99413ED5-9ED4-4772-BCE4-2BCAE6B12E35}"/>
+              </a:ext>
+              <a:ext uri="{C183D7F6-B498-43B3-948B-1728B52AA6E4}">
+                <adec:decorative xmlns:adec="http://schemas.microsoft.com/office/drawing/2017/decorative" val="1"/>
+              </a:ext>
+            </a:extLst>
+          </p:cNvPr>
+          <p:cNvSpPr>
+            <a:spLocks noGrp="1" noRot="1" noChangeAspect="1" noMove="1" noResize="1" noEditPoints="1" noAdjustHandles="1" noChangeArrowheads="1" noChangeShapeType="1" noTextEdit="1"/>
+          </p:cNvSpPr>
+          <p:nvPr>
+            <p:extLst>
+              <p:ext uri="{386F3935-93C4-4BCD-93E2-E3B085C9AB24}">
+                <p16:designElem xmlns:p16="http://schemas.microsoft.com/office/powerpoint/2015/main" val="1"/>
+              </p:ext>
+            </p:extLst>
+          </p:nvPr>
+        </p:nvSpPr>
+        <p:spPr>
+          <a:xfrm rot="16200000">
+            <a:off x="3433973" y="-827233"/>
+            <a:ext cx="1715478" cy="8583421"/>
           </a:xfrm>
           <a:prstGeom prst="rect">
             <a:avLst/>
           </a:prstGeom>
+          <a:solidFill>
+            <a:schemeClr val="accent4"/>
+          </a:solidFill>
+          <a:ln>
+            <a:noFill/>
+          </a:ln>
+        </p:spPr>
+        <p:style>
+          <a:lnRef idx="2">
+            <a:schemeClr val="accent1">
+              <a:shade val="50000"/>
+            </a:schemeClr>
+          </a:lnRef>
+          <a:fillRef idx="1">
+            <a:schemeClr val="accent1"/>
+          </a:fillRef>
+          <a:effectRef idx="0">
+            <a:schemeClr val="accent1"/>
+          </a:effectRef>
+          <a:fontRef idx="minor">
+            <a:schemeClr val="lt1"/>
+          </a:fontRef>
+        </p:style>
+        <p:txBody>
+          <a:bodyPr rtlCol="0" anchor="ctr"/>
+          <a:lstStyle/>
+          <a:p>
+            <a:pPr algn="ctr"/>
+            <a:endParaRPr lang="en-US" dirty="0"/>
+          </a:p>
+        </p:txBody>
+      </p:sp>
+      <p:sp>
+        <p:nvSpPr>
+          <p:cNvPr id="19" name="Rectangle 18">
+            <a:extLst>
+              <a:ext uri="{FF2B5EF4-FFF2-40B4-BE49-F238E27FC236}">
+                <a16:creationId xmlns:a16="http://schemas.microsoft.com/office/drawing/2014/main" id="{04357C93-F0CB-4A1C-8F77-4E9063789819}"/>
+              </a:ext>
+              <a:ext uri="{C183D7F6-B498-43B3-948B-1728B52AA6E4}">
+                <adec:decorative xmlns:adec="http://schemas.microsoft.com/office/drawing/2017/decorative" val="1"/>
+              </a:ext>
+            </a:extLst>
+          </p:cNvPr>
+          <p:cNvSpPr>
+            <a:spLocks noGrp="1" noRot="1" noChangeAspect="1" noMove="1" noResize="1" noEditPoints="1" noAdjustHandles="1" noChangeArrowheads="1" noChangeShapeType="1" noTextEdit="1"/>
+          </p:cNvSpPr>
+          <p:nvPr>
+            <p:extLst>
+              <p:ext uri="{386F3935-93C4-4BCD-93E2-E3B085C9AB24}">
+                <p16:designElem xmlns:p16="http://schemas.microsoft.com/office/powerpoint/2015/main" val="1"/>
+              </p:ext>
+            </p:extLst>
+          </p:nvPr>
+        </p:nvSpPr>
+        <p:spPr>
+          <a:xfrm>
+            <a:off x="302085" y="664308"/>
+            <a:ext cx="8082632" cy="5600340"/>
+          </a:xfrm>
+          <a:prstGeom prst="rect">
+            <a:avLst/>
+          </a:prstGeom>
+          <a:solidFill>
+            <a:schemeClr val="bg1"/>
+          </a:solidFill>
+          <a:ln>
+            <a:noFill/>
+          </a:ln>
+          <a:effectLst>
+            <a:outerShdw blurRad="139700" dist="127000" dir="5400000" algn="t" rotWithShape="0">
+              <a:prstClr val="black">
+                <a:alpha val="15000"/>
+              </a:prstClr>
+            </a:outerShdw>
+          </a:effectLst>
+        </p:spPr>
+        <p:style>
+          <a:lnRef idx="2">
+            <a:schemeClr val="accent1">
+              <a:shade val="50000"/>
+            </a:schemeClr>
+          </a:lnRef>
+          <a:fillRef idx="1">
+            <a:schemeClr val="accent1"/>
+          </a:fillRef>
+          <a:effectRef idx="0">
+            <a:schemeClr val="accent1"/>
+          </a:effectRef>
+          <a:fontRef idx="minor">
+            <a:schemeClr val="lt1"/>
+          </a:fontRef>
+        </p:style>
+        <p:txBody>
+          <a:bodyPr rtlCol="0" anchor="ctr"/>
+          <a:lstStyle/>
+          <a:p>
+            <a:pPr algn="ctr"/>
+            <a:endParaRPr lang="en-US" dirty="0"/>
+          </a:p>
+        </p:txBody>
+      </p:sp>
+      <p:pic>
+        <p:nvPicPr>
+          <p:cNvPr id="3" name="Immagine 2" descr="Immagine che contiene screenshot&#10;&#10;Descrizione generata automaticamente">
+            <a:extLst>
+              <a:ext uri="{FF2B5EF4-FFF2-40B4-BE49-F238E27FC236}">
+                <a16:creationId xmlns:a16="http://schemas.microsoft.com/office/drawing/2014/main" id="{61D1F282-C8E8-4F48-91F1-DAFFD8DB20A0}"/>
+              </a:ext>
+            </a:extLst>
+          </p:cNvPr>
+          <p:cNvPicPr>
+            <a:picLocks noChangeAspect="1"/>
+          </p:cNvPicPr>
+          <p:nvPr/>
+        </p:nvPicPr>
+        <p:blipFill rotWithShape="1">
+          <a:blip r:embed="rId2"/>
+          <a:srcRect l="3633" t="1" r="276" b="-1364"/>
+          <a:stretch/>
+        </p:blipFill>
+        <p:spPr>
+          <a:xfrm>
+            <a:off x="302085" y="1247004"/>
+            <a:ext cx="8082632" cy="4434946"/>
+          </a:xfrm>
+          <a:prstGeom prst="rect">
+            <a:avLst/>
+          </a:prstGeom>
+        </p:spPr>
+      </p:pic>
+      <p:sp>
+        <p:nvSpPr>
+          <p:cNvPr id="21" name="Rectangle 20">
+            <a:extLst>
+              <a:ext uri="{FF2B5EF4-FFF2-40B4-BE49-F238E27FC236}">
+                <a16:creationId xmlns:a16="http://schemas.microsoft.com/office/drawing/2014/main" id="{90F533E9-6690-41A8-A372-4C6C622D028D}"/>
+              </a:ext>
+              <a:ext uri="{C183D7F6-B498-43B3-948B-1728B52AA6E4}">
+                <adec:decorative xmlns:adec="http://schemas.microsoft.com/office/drawing/2017/decorative" val="1"/>
+              </a:ext>
+            </a:extLst>
+          </p:cNvPr>
+          <p:cNvSpPr>
+            <a:spLocks noGrp="1" noRot="1" noChangeAspect="1" noMove="1" noResize="1" noEditPoints="1" noAdjustHandles="1" noChangeArrowheads="1" noChangeShapeType="1" noTextEdit="1"/>
+          </p:cNvSpPr>
+          <p:nvPr>
+            <p:extLst>
+              <p:ext uri="{386F3935-93C4-4BCD-93E2-E3B085C9AB24}">
+                <p16:designElem xmlns:p16="http://schemas.microsoft.com/office/powerpoint/2015/main" val="1"/>
+              </p:ext>
+            </p:extLst>
+          </p:nvPr>
+        </p:nvSpPr>
+        <p:spPr>
+          <a:xfrm rot="5400000">
+            <a:off x="7950447" y="3392097"/>
+            <a:ext cx="1719072" cy="152382"/>
+          </a:xfrm>
+          <a:prstGeom prst="rect">
+            <a:avLst/>
+          </a:prstGeom>
+          <a:solidFill>
+            <a:schemeClr val="accent4"/>
+          </a:solidFill>
+          <a:ln>
+            <a:noFill/>
+          </a:ln>
+        </p:spPr>
+        <p:style>
+          <a:lnRef idx="2">
+            <a:schemeClr val="accent1">
+              <a:shade val="50000"/>
+            </a:schemeClr>
+          </a:lnRef>
+          <a:fillRef idx="1">
+            <a:schemeClr val="accent1"/>
+          </a:fillRef>
+          <a:effectRef idx="0">
+            <a:schemeClr val="accent1"/>
+          </a:effectRef>
+          <a:fontRef idx="minor">
+            <a:schemeClr val="lt1"/>
+          </a:fontRef>
+        </p:style>
+        <p:txBody>
+          <a:bodyPr rtlCol="0" anchor="ctr"/>
+          <a:lstStyle/>
+          <a:p>
+            <a:pPr algn="ctr"/>
+            <a:endParaRPr lang="en-US" dirty="0"/>
+          </a:p>
+        </p:txBody>
+      </p:sp>
+      <p:sp>
+        <p:nvSpPr>
+          <p:cNvPr id="9" name="Titolo 1">
+            <a:extLst>
+              <a:ext uri="{FF2B5EF4-FFF2-40B4-BE49-F238E27FC236}">
+                <a16:creationId xmlns:a16="http://schemas.microsoft.com/office/drawing/2014/main" id="{DDC649C9-A28D-451A-A651-2EC10BEB2AB3}"/>
+              </a:ext>
+            </a:extLst>
+          </p:cNvPr>
+          <p:cNvSpPr>
+            <a:spLocks noGrp="1"/>
+          </p:cNvSpPr>
+          <p:nvPr>
+            <p:ph type="title"/>
+          </p:nvPr>
+        </p:nvSpPr>
+        <p:spPr>
+          <a:xfrm>
+            <a:off x="9160095" y="2730790"/>
+            <a:ext cx="2653937" cy="1395784"/>
+          </a:xfrm>
         </p:spPr>
         <p:txBody>
           <a:bodyPr vert="horz" lIns="91440" tIns="45720" rIns="91440" bIns="45720" rtlCol="0" anchor="ctr">
-            <a:normAutofit/>
+            <a:normAutofit fontScale="90000"/>
           </a:bodyPr>
           <a:lstStyle/>
           <a:p>
-            <a:pPr>
-              <a:lnSpc>
-                <a:spcPct val="90000"/>
-              </a:lnSpc>
-              <a:spcBef>
-                <a:spcPct val="0"/>
-              </a:spcBef>
-              <a:spcAft>
-                <a:spcPts val="600"/>
-              </a:spcAft>
-            </a:pPr>
-            <a:r>
-              <a:rPr lang="en-US" sz="3900" b="1" kern="1200" dirty="0">
+            <a:r>
+              <a:rPr lang="en-US" sz="3300" dirty="0">
+                <a:latin typeface="+mn-lt"/>
+              </a:rPr>
+              <a:t>OnePage</a:t>
+            </a:r>
+            <a:r>
+              <a:rPr lang="en-US" sz="3300" kern="1200" dirty="0">
+                <a:solidFill>
+                  <a:schemeClr val="tx1"/>
+                </a:solidFill>
+                <a:latin typeface="+mn-lt"/>
+                <a:ea typeface="+mj-ea"/>
+                <a:cs typeface="+mj-cs"/>
+              </a:rPr>
+              <a:t>.html</a:t>
+            </a:r>
+            <a:br>
+              <a:rPr lang="en-US" sz="3300" kern="1200" dirty="0">
+                <a:solidFill>
+                  <a:schemeClr val="tx1"/>
+                </a:solidFill>
+                <a:latin typeface="+mn-lt"/>
+                <a:ea typeface="+mj-ea"/>
+                <a:cs typeface="+mj-cs"/>
+              </a:rPr>
+            </a:br>
+            <a:r>
+              <a:rPr lang="en-US" sz="3300" b="1" kern="1200" dirty="0">
+                <a:solidFill>
+                  <a:srgbClr val="7030A0"/>
+                </a:solidFill>
+                <a:latin typeface="+mn-lt"/>
+                <a:ea typeface="+mj-ea"/>
+                <a:cs typeface="+mj-cs"/>
+              </a:rPr>
+              <a:t>User Guest</a:t>
+            </a:r>
+            <a:br>
+              <a:rPr lang="en-US" sz="3300" b="1" kern="1200" dirty="0">
                 <a:solidFill>
                   <a:schemeClr val="tx1"/>
                 </a:solidFill>
@@ -40496,65 +41183,18 @@
                 <a:ea typeface="+mj-ea"/>
                 <a:cs typeface="+mj-cs"/>
               </a:rPr>
-              <a:t>OnePage.html</a:t>
-            </a:r>
-          </a:p>
-          <a:p>
-            <a:pPr>
-              <a:lnSpc>
-                <a:spcPct val="90000"/>
-              </a:lnSpc>
-              <a:spcBef>
-                <a:spcPct val="0"/>
-              </a:spcBef>
-              <a:spcAft>
-                <a:spcPts val="600"/>
-              </a:spcAft>
-            </a:pPr>
-            <a:r>
-              <a:rPr lang="en-US" sz="3900" b="1" kern="1200" dirty="0">
-                <a:solidFill>
-                  <a:srgbClr val="7030A0"/>
-                </a:solidFill>
-                <a:latin typeface="+mj-lt"/>
-                <a:ea typeface="+mj-ea"/>
-                <a:cs typeface="+mj-cs"/>
-              </a:rPr>
-              <a:t>User Guest</a:t>
-            </a:r>
+            </a:br>
+            <a:endParaRPr lang="en-US" sz="3300" kern="1200" dirty="0">
+              <a:solidFill>
+                <a:schemeClr val="tx1"/>
+              </a:solidFill>
+              <a:latin typeface="+mj-lt"/>
+              <a:ea typeface="+mj-ea"/>
+              <a:cs typeface="+mj-cs"/>
+            </a:endParaRPr>
           </a:p>
         </p:txBody>
       </p:sp>
-      <p:pic>
-        <p:nvPicPr>
-          <p:cNvPr id="3" name="Immagine 2" descr="Immagine che contiene screenshot&#10;&#10;Descrizione generata automaticamente">
-            <a:extLst>
-              <a:ext uri="{FF2B5EF4-FFF2-40B4-BE49-F238E27FC236}">
-                <a16:creationId xmlns:a16="http://schemas.microsoft.com/office/drawing/2014/main" id="{61D1F282-C8E8-4F48-91F1-DAFFD8DB20A0}"/>
-              </a:ext>
-            </a:extLst>
-          </p:cNvPr>
-          <p:cNvPicPr>
-            <a:picLocks noChangeAspect="1"/>
-          </p:cNvPicPr>
-          <p:nvPr/>
-        </p:nvPicPr>
-        <p:blipFill>
-          <a:blip r:embed="rId2"/>
-          <a:stretch>
-            <a:fillRect/>
-          </a:stretch>
-        </p:blipFill>
-        <p:spPr>
-          <a:xfrm>
-            <a:off x="1506532" y="1845426"/>
-            <a:ext cx="9175882" cy="4450303"/>
-          </a:xfrm>
-          <a:prstGeom prst="rect">
-            <a:avLst/>
-          </a:prstGeom>
-        </p:spPr>
-      </p:pic>
     </p:spTree>
     <p:extLst>
       <p:ext uri="{BB962C8B-B14F-4D97-AF65-F5344CB8AC3E}">
@@ -40595,10 +41235,10 @@
       </p:grpSpPr>
       <p:sp useBgFill="1">
         <p:nvSpPr>
-          <p:cNvPr id="9" name="Rectangle 8">
-            <a:extLst>
-              <a:ext uri="{FF2B5EF4-FFF2-40B4-BE49-F238E27FC236}">
-                <a16:creationId xmlns:a16="http://schemas.microsoft.com/office/drawing/2014/main" id="{53F29798-D584-4792-9B62-3F5F5C36D619}"/>
+          <p:cNvPr id="15" name="Rectangle 14">
+            <a:extLst>
+              <a:ext uri="{FF2B5EF4-FFF2-40B4-BE49-F238E27FC236}">
+                <a16:creationId xmlns:a16="http://schemas.microsoft.com/office/drawing/2014/main" id="{E45B1D5C-0827-4AF0-8186-11FC5A8B8B92}"/>
               </a:ext>
               <a:ext uri="{C183D7F6-B498-43B3-948B-1728B52AA6E4}">
                 <adec:decorative xmlns:adec="http://schemas.microsoft.com/office/drawing/2017/decorative" val="1"/>
@@ -40619,7 +41259,7 @@
         <p:spPr>
           <a:xfrm>
             <a:off x="0" y="0"/>
-            <a:ext cx="12188952" cy="6858000"/>
+            <a:ext cx="12191999" cy="6857365"/>
           </a:xfrm>
           <a:prstGeom prst="rect">
             <a:avLst/>
@@ -40649,16 +41289,212 @@
           <a:lstStyle/>
           <a:p>
             <a:pPr algn="ctr"/>
-            <a:endParaRPr lang="en-US"/>
+            <a:endParaRPr lang="en-US" dirty="0"/>
           </a:p>
         </p:txBody>
       </p:sp>
       <p:sp>
         <p:nvSpPr>
-          <p:cNvPr id="2" name="Titolo 1">
-            <a:extLst>
-              <a:ext uri="{FF2B5EF4-FFF2-40B4-BE49-F238E27FC236}">
-                <a16:creationId xmlns:a16="http://schemas.microsoft.com/office/drawing/2014/main" id="{3C3A7970-E91D-40AD-8584-B7F74FA384C0}"/>
+          <p:cNvPr id="17" name="Rectangle 16">
+            <a:extLst>
+              <a:ext uri="{FF2B5EF4-FFF2-40B4-BE49-F238E27FC236}">
+                <a16:creationId xmlns:a16="http://schemas.microsoft.com/office/drawing/2014/main" id="{99413ED5-9ED4-4772-BCE4-2BCAE6B12E35}"/>
+              </a:ext>
+              <a:ext uri="{C183D7F6-B498-43B3-948B-1728B52AA6E4}">
+                <adec:decorative xmlns:adec="http://schemas.microsoft.com/office/drawing/2017/decorative" val="1"/>
+              </a:ext>
+            </a:extLst>
+          </p:cNvPr>
+          <p:cNvSpPr>
+            <a:spLocks noGrp="1" noRot="1" noChangeAspect="1" noMove="1" noResize="1" noEditPoints="1" noAdjustHandles="1" noChangeArrowheads="1" noChangeShapeType="1" noTextEdit="1"/>
+          </p:cNvSpPr>
+          <p:nvPr>
+            <p:extLst>
+              <p:ext uri="{386F3935-93C4-4BCD-93E2-E3B085C9AB24}">
+                <p16:designElem xmlns:p16="http://schemas.microsoft.com/office/powerpoint/2015/main" val="1"/>
+              </p:ext>
+            </p:extLst>
+          </p:nvPr>
+        </p:nvSpPr>
+        <p:spPr>
+          <a:xfrm rot="16200000">
+            <a:off x="3433973" y="-827233"/>
+            <a:ext cx="1715478" cy="8583421"/>
+          </a:xfrm>
+          <a:prstGeom prst="rect">
+            <a:avLst/>
+          </a:prstGeom>
+          <a:solidFill>
+            <a:schemeClr val="accent4"/>
+          </a:solidFill>
+          <a:ln>
+            <a:noFill/>
+          </a:ln>
+        </p:spPr>
+        <p:style>
+          <a:lnRef idx="2">
+            <a:schemeClr val="accent1">
+              <a:shade val="50000"/>
+            </a:schemeClr>
+          </a:lnRef>
+          <a:fillRef idx="1">
+            <a:schemeClr val="accent1"/>
+          </a:fillRef>
+          <a:effectRef idx="0">
+            <a:schemeClr val="accent1"/>
+          </a:effectRef>
+          <a:fontRef idx="minor">
+            <a:schemeClr val="lt1"/>
+          </a:fontRef>
+        </p:style>
+        <p:txBody>
+          <a:bodyPr rtlCol="0" anchor="ctr"/>
+          <a:lstStyle/>
+          <a:p>
+            <a:pPr algn="ctr"/>
+            <a:endParaRPr lang="en-US" dirty="0"/>
+          </a:p>
+        </p:txBody>
+      </p:sp>
+      <p:sp>
+        <p:nvSpPr>
+          <p:cNvPr id="19" name="Rectangle 18">
+            <a:extLst>
+              <a:ext uri="{FF2B5EF4-FFF2-40B4-BE49-F238E27FC236}">
+                <a16:creationId xmlns:a16="http://schemas.microsoft.com/office/drawing/2014/main" id="{04357C93-F0CB-4A1C-8F77-4E9063789819}"/>
+              </a:ext>
+              <a:ext uri="{C183D7F6-B498-43B3-948B-1728B52AA6E4}">
+                <adec:decorative xmlns:adec="http://schemas.microsoft.com/office/drawing/2017/decorative" val="1"/>
+              </a:ext>
+            </a:extLst>
+          </p:cNvPr>
+          <p:cNvSpPr>
+            <a:spLocks noGrp="1" noRot="1" noChangeAspect="1" noMove="1" noResize="1" noEditPoints="1" noAdjustHandles="1" noChangeArrowheads="1" noChangeShapeType="1" noTextEdit="1"/>
+          </p:cNvSpPr>
+          <p:nvPr>
+            <p:extLst>
+              <p:ext uri="{386F3935-93C4-4BCD-93E2-E3B085C9AB24}">
+                <p16:designElem xmlns:p16="http://schemas.microsoft.com/office/powerpoint/2015/main" val="1"/>
+              </p:ext>
+            </p:extLst>
+          </p:nvPr>
+        </p:nvSpPr>
+        <p:spPr>
+          <a:xfrm>
+            <a:off x="302085" y="664308"/>
+            <a:ext cx="8082632" cy="5600340"/>
+          </a:xfrm>
+          <a:prstGeom prst="rect">
+            <a:avLst/>
+          </a:prstGeom>
+          <a:solidFill>
+            <a:schemeClr val="bg1"/>
+          </a:solidFill>
+          <a:ln>
+            <a:noFill/>
+          </a:ln>
+          <a:effectLst>
+            <a:outerShdw blurRad="139700" dist="127000" dir="5400000" algn="t" rotWithShape="0">
+              <a:prstClr val="black">
+                <a:alpha val="15000"/>
+              </a:prstClr>
+            </a:outerShdw>
+          </a:effectLst>
+        </p:spPr>
+        <p:style>
+          <a:lnRef idx="2">
+            <a:schemeClr val="accent1">
+              <a:shade val="50000"/>
+            </a:schemeClr>
+          </a:lnRef>
+          <a:fillRef idx="1">
+            <a:schemeClr val="accent1"/>
+          </a:fillRef>
+          <a:effectRef idx="0">
+            <a:schemeClr val="accent1"/>
+          </a:effectRef>
+          <a:fontRef idx="minor">
+            <a:schemeClr val="lt1"/>
+          </a:fontRef>
+        </p:style>
+        <p:txBody>
+          <a:bodyPr rtlCol="0" anchor="ctr"/>
+          <a:lstStyle/>
+          <a:p>
+            <a:pPr algn="ctr"/>
+            <a:endParaRPr lang="en-US" dirty="0"/>
+          </a:p>
+        </p:txBody>
+      </p:sp>
+      <p:sp>
+        <p:nvSpPr>
+          <p:cNvPr id="21" name="Rectangle 20">
+            <a:extLst>
+              <a:ext uri="{FF2B5EF4-FFF2-40B4-BE49-F238E27FC236}">
+                <a16:creationId xmlns:a16="http://schemas.microsoft.com/office/drawing/2014/main" id="{90F533E9-6690-41A8-A372-4C6C622D028D}"/>
+              </a:ext>
+              <a:ext uri="{C183D7F6-B498-43B3-948B-1728B52AA6E4}">
+                <adec:decorative xmlns:adec="http://schemas.microsoft.com/office/drawing/2017/decorative" val="1"/>
+              </a:ext>
+            </a:extLst>
+          </p:cNvPr>
+          <p:cNvSpPr>
+            <a:spLocks noGrp="1" noRot="1" noChangeAspect="1" noMove="1" noResize="1" noEditPoints="1" noAdjustHandles="1" noChangeArrowheads="1" noChangeShapeType="1" noTextEdit="1"/>
+          </p:cNvSpPr>
+          <p:nvPr>
+            <p:extLst>
+              <p:ext uri="{386F3935-93C4-4BCD-93E2-E3B085C9AB24}">
+                <p16:designElem xmlns:p16="http://schemas.microsoft.com/office/powerpoint/2015/main" val="1"/>
+              </p:ext>
+            </p:extLst>
+          </p:nvPr>
+        </p:nvSpPr>
+        <p:spPr>
+          <a:xfrm rot="5400000">
+            <a:off x="7950447" y="3392097"/>
+            <a:ext cx="1719072" cy="152382"/>
+          </a:xfrm>
+          <a:prstGeom prst="rect">
+            <a:avLst/>
+          </a:prstGeom>
+          <a:solidFill>
+            <a:schemeClr val="accent4"/>
+          </a:solidFill>
+          <a:ln>
+            <a:noFill/>
+          </a:ln>
+        </p:spPr>
+        <p:style>
+          <a:lnRef idx="2">
+            <a:schemeClr val="accent1">
+              <a:shade val="50000"/>
+            </a:schemeClr>
+          </a:lnRef>
+          <a:fillRef idx="1">
+            <a:schemeClr val="accent1"/>
+          </a:fillRef>
+          <a:effectRef idx="0">
+            <a:schemeClr val="accent1"/>
+          </a:effectRef>
+          <a:fontRef idx="minor">
+            <a:schemeClr val="lt1"/>
+          </a:fontRef>
+        </p:style>
+        <p:txBody>
+          <a:bodyPr rtlCol="0" anchor="ctr"/>
+          <a:lstStyle/>
+          <a:p>
+            <a:pPr algn="ctr"/>
+            <a:endParaRPr lang="en-US" dirty="0"/>
+          </a:p>
+        </p:txBody>
+      </p:sp>
+      <p:sp>
+        <p:nvSpPr>
+          <p:cNvPr id="9" name="Titolo 1">
+            <a:extLst>
+              <a:ext uri="{FF2B5EF4-FFF2-40B4-BE49-F238E27FC236}">
+                <a16:creationId xmlns:a16="http://schemas.microsoft.com/office/drawing/2014/main" id="{DDC649C9-A28D-451A-A651-2EC10BEB2AB3}"/>
               </a:ext>
             </a:extLst>
           </p:cNvPr>
@@ -40671,13 +41507,13 @@
         </p:nvSpPr>
         <p:spPr>
           <a:xfrm>
-            <a:off x="838200" y="184805"/>
-            <a:ext cx="10515600" cy="1505883"/>
+            <a:off x="9160095" y="2730790"/>
+            <a:ext cx="2653937" cy="1395784"/>
           </a:xfrm>
         </p:spPr>
         <p:txBody>
           <a:bodyPr vert="horz" lIns="91440" tIns="45720" rIns="91440" bIns="45720" rtlCol="0" anchor="ctr">
-            <a:normAutofit/>
+            <a:normAutofit fontScale="90000"/>
           </a:bodyPr>
           <a:lstStyle/>
           <a:p>
@@ -40742,10 +41578,10 @@
       </p:sp>
       <p:pic>
         <p:nvPicPr>
-          <p:cNvPr id="4" name="Immagine 3" descr="Immagine che contiene screenshot&#10;&#10;Descrizione generata automaticamente">
-            <a:extLst>
-              <a:ext uri="{FF2B5EF4-FFF2-40B4-BE49-F238E27FC236}">
-                <a16:creationId xmlns:a16="http://schemas.microsoft.com/office/drawing/2014/main" id="{92FF707B-9040-4BC0-B9ED-B777A10B1C15}"/>
+          <p:cNvPr id="2" name="Immagine 1" descr="Immagine che contiene screenshot&#10;&#10;Descrizione generata automaticamente">
+            <a:extLst>
+              <a:ext uri="{FF2B5EF4-FFF2-40B4-BE49-F238E27FC236}">
+                <a16:creationId xmlns:a16="http://schemas.microsoft.com/office/drawing/2014/main" id="{81F28D91-7DD7-4899-80AC-8CF526A8F726}"/>
               </a:ext>
             </a:extLst>
           </p:cNvPr>
@@ -40762,8 +41598,8 @@
         </p:blipFill>
         <p:spPr>
           <a:xfrm>
-            <a:off x="2431675" y="1601586"/>
-            <a:ext cx="7325602" cy="4450303"/>
+            <a:off x="302084" y="887484"/>
+            <a:ext cx="8053741" cy="4892647"/>
           </a:xfrm>
           <a:prstGeom prst="rect">
             <a:avLst/>
@@ -40773,7 +41609,7 @@
     </p:spTree>
     <p:extLst>
       <p:ext uri="{BB962C8B-B14F-4D97-AF65-F5344CB8AC3E}">
-        <p14:creationId xmlns:p14="http://schemas.microsoft.com/office/powerpoint/2010/main" val="3458706185"/>
+        <p14:creationId xmlns:p14="http://schemas.microsoft.com/office/powerpoint/2010/main" val="3528185790"/>
       </p:ext>
     </p:extLst>
   </p:cSld>
@@ -40810,10 +41646,10 @@
       </p:grpSpPr>
       <p:sp useBgFill="1">
         <p:nvSpPr>
-          <p:cNvPr id="10" name="Rectangle 9">
-            <a:extLst>
-              <a:ext uri="{FF2B5EF4-FFF2-40B4-BE49-F238E27FC236}">
-                <a16:creationId xmlns:a16="http://schemas.microsoft.com/office/drawing/2014/main" id="{62542EEC-4F7C-4AE2-933E-EAC8EB3FA378}"/>
+          <p:cNvPr id="15" name="Rectangle 14">
+            <a:extLst>
+              <a:ext uri="{FF2B5EF4-FFF2-40B4-BE49-F238E27FC236}">
+                <a16:creationId xmlns:a16="http://schemas.microsoft.com/office/drawing/2014/main" id="{E45B1D5C-0827-4AF0-8186-11FC5A8B8B92}"/>
               </a:ext>
               <a:ext uri="{C183D7F6-B498-43B3-948B-1728B52AA6E4}">
                 <adec:decorative xmlns:adec="http://schemas.microsoft.com/office/drawing/2017/decorative" val="1"/>
@@ -40864,86 +41700,16 @@
           <a:lstStyle/>
           <a:p>
             <a:pPr algn="ctr"/>
-            <a:endParaRPr lang="en-US"/>
+            <a:endParaRPr lang="en-US" dirty="0"/>
           </a:p>
         </p:txBody>
       </p:sp>
       <p:sp>
         <p:nvSpPr>
-          <p:cNvPr id="2" name="Titolo 1">
-            <a:extLst>
-              <a:ext uri="{FF2B5EF4-FFF2-40B4-BE49-F238E27FC236}">
-                <a16:creationId xmlns:a16="http://schemas.microsoft.com/office/drawing/2014/main" id="{D01C3C1A-FE2C-461B-94A4-68E58C809BDC}"/>
-              </a:ext>
-            </a:extLst>
-          </p:cNvPr>
-          <p:cNvSpPr>
-            <a:spLocks noGrp="1"/>
-          </p:cNvSpPr>
-          <p:nvPr>
-            <p:ph type="title"/>
-          </p:nvPr>
-        </p:nvSpPr>
-        <p:spPr>
-          <a:xfrm>
-            <a:off x="7041856" y="3113415"/>
-            <a:ext cx="4036334" cy="2387600"/>
-          </a:xfrm>
-        </p:spPr>
-        <p:txBody>
-          <a:bodyPr vert="horz" lIns="91440" tIns="45720" rIns="91440" bIns="45720" rtlCol="0" anchor="t">
-            <a:normAutofit/>
-          </a:bodyPr>
-          <a:lstStyle/>
-          <a:p>
-            <a:r>
-              <a:rPr lang="en-US" sz="3900" dirty="0">
-                <a:latin typeface="+mn-lt"/>
-              </a:rPr>
-              <a:t>OnePage</a:t>
-            </a:r>
-            <a:r>
-              <a:rPr lang="en-US" sz="3900" kern="1200" dirty="0">
-                <a:solidFill>
-                  <a:schemeClr val="tx1"/>
-                </a:solidFill>
-                <a:latin typeface="+mn-lt"/>
-                <a:ea typeface="+mj-ea"/>
-                <a:cs typeface="+mj-cs"/>
-              </a:rPr>
-              <a:t>.html</a:t>
-            </a:r>
-            <a:br>
-              <a:rPr lang="en-US" sz="3900" kern="1200" dirty="0">
-                <a:solidFill>
-                  <a:schemeClr val="tx1"/>
-                </a:solidFill>
-                <a:latin typeface="+mn-lt"/>
-                <a:ea typeface="+mj-ea"/>
-                <a:cs typeface="+mj-cs"/>
-              </a:rPr>
-            </a:br>
-            <a:r>
-              <a:rPr lang="en-US" sz="3900" b="1" kern="1200" dirty="0">
-                <a:solidFill>
-                  <a:srgbClr val="7030A0"/>
-                </a:solidFill>
-                <a:latin typeface="+mn-lt"/>
-                <a:ea typeface="+mj-ea"/>
-                <a:cs typeface="+mj-cs"/>
-              </a:rPr>
-              <a:t>User Guest</a:t>
-            </a:r>
-            <a:endParaRPr lang="en-US" sz="3900" b="1" dirty="0"/>
-          </a:p>
-        </p:txBody>
-      </p:sp>
-      <p:sp>
-        <p:nvSpPr>
-          <p:cNvPr id="12" name="Rectangle 11">
-            <a:extLst>
-              <a:ext uri="{FF2B5EF4-FFF2-40B4-BE49-F238E27FC236}">
-                <a16:creationId xmlns:a16="http://schemas.microsoft.com/office/drawing/2014/main" id="{B81933D1-5615-42C7-9C0B-4EB7105CCE2D}"/>
+          <p:cNvPr id="17" name="Rectangle 16">
+            <a:extLst>
+              <a:ext uri="{FF2B5EF4-FFF2-40B4-BE49-F238E27FC236}">
+                <a16:creationId xmlns:a16="http://schemas.microsoft.com/office/drawing/2014/main" id="{99413ED5-9ED4-4772-BCE4-2BCAE6B12E35}"/>
               </a:ext>
               <a:ext uri="{C183D7F6-B498-43B3-948B-1728B52AA6E4}">
                 <adec:decorative xmlns:adec="http://schemas.microsoft.com/office/drawing/2017/decorative" val="1"/>
@@ -40962,9 +41728,9 @@
           </p:nvPr>
         </p:nvSpPr>
         <p:spPr>
-          <a:xfrm flipH="1">
-            <a:off x="0" y="0"/>
-            <a:ext cx="1494330" cy="6858000"/>
+          <a:xfrm rot="16200000">
+            <a:off x="3433973" y="-827233"/>
+            <a:ext cx="1715478" cy="8583421"/>
           </a:xfrm>
           <a:prstGeom prst="rect">
             <a:avLst/>
@@ -40997,16 +41763,16 @@
           <a:lstStyle/>
           <a:p>
             <a:pPr algn="ctr"/>
-            <a:endParaRPr lang="en-US"/>
+            <a:endParaRPr lang="en-US" dirty="0"/>
           </a:p>
         </p:txBody>
       </p:sp>
       <p:sp>
         <p:nvSpPr>
-          <p:cNvPr id="14" name="Rectangle 13">
-            <a:extLst>
-              <a:ext uri="{FF2B5EF4-FFF2-40B4-BE49-F238E27FC236}">
-                <a16:creationId xmlns:a16="http://schemas.microsoft.com/office/drawing/2014/main" id="{19C9EAEA-39D0-4B0E-A0EB-51E7B26740B1}"/>
+          <p:cNvPr id="19" name="Rectangle 18">
+            <a:extLst>
+              <a:ext uri="{FF2B5EF4-FFF2-40B4-BE49-F238E27FC236}">
+                <a16:creationId xmlns:a16="http://schemas.microsoft.com/office/drawing/2014/main" id="{04357C93-F0CB-4A1C-8F77-4E9063789819}"/>
               </a:ext>
               <a:ext uri="{C183D7F6-B498-43B3-948B-1728B52AA6E4}">
                 <adec:decorative xmlns:adec="http://schemas.microsoft.com/office/drawing/2017/decorative" val="1"/>
@@ -41026,8 +41792,8 @@
         </p:nvSpPr>
         <p:spPr>
           <a:xfrm>
-            <a:off x="496824" y="391886"/>
-            <a:ext cx="6009366" cy="6017078"/>
+            <a:off x="302085" y="664308"/>
+            <a:ext cx="8082632" cy="5600340"/>
           </a:xfrm>
           <a:prstGeom prst="rect">
             <a:avLst/>
@@ -41067,7 +41833,496 @@
           <a:lstStyle/>
           <a:p>
             <a:pPr algn="ctr"/>
-            <a:endParaRPr lang="en-US"/>
+            <a:endParaRPr lang="en-US" dirty="0"/>
+          </a:p>
+        </p:txBody>
+      </p:sp>
+      <p:sp>
+        <p:nvSpPr>
+          <p:cNvPr id="21" name="Rectangle 20">
+            <a:extLst>
+              <a:ext uri="{FF2B5EF4-FFF2-40B4-BE49-F238E27FC236}">
+                <a16:creationId xmlns:a16="http://schemas.microsoft.com/office/drawing/2014/main" id="{90F533E9-6690-41A8-A372-4C6C622D028D}"/>
+              </a:ext>
+              <a:ext uri="{C183D7F6-B498-43B3-948B-1728B52AA6E4}">
+                <adec:decorative xmlns:adec="http://schemas.microsoft.com/office/drawing/2017/decorative" val="1"/>
+              </a:ext>
+            </a:extLst>
+          </p:cNvPr>
+          <p:cNvSpPr>
+            <a:spLocks noGrp="1" noRot="1" noChangeAspect="1" noMove="1" noResize="1" noEditPoints="1" noAdjustHandles="1" noChangeArrowheads="1" noChangeShapeType="1" noTextEdit="1"/>
+          </p:cNvSpPr>
+          <p:nvPr>
+            <p:extLst>
+              <p:ext uri="{386F3935-93C4-4BCD-93E2-E3B085C9AB24}">
+                <p16:designElem xmlns:p16="http://schemas.microsoft.com/office/powerpoint/2015/main" val="1"/>
+              </p:ext>
+            </p:extLst>
+          </p:nvPr>
+        </p:nvSpPr>
+        <p:spPr>
+          <a:xfrm rot="5400000">
+            <a:off x="7950447" y="3392097"/>
+            <a:ext cx="1719072" cy="152382"/>
+          </a:xfrm>
+          <a:prstGeom prst="rect">
+            <a:avLst/>
+          </a:prstGeom>
+          <a:solidFill>
+            <a:schemeClr val="accent4"/>
+          </a:solidFill>
+          <a:ln>
+            <a:noFill/>
+          </a:ln>
+        </p:spPr>
+        <p:style>
+          <a:lnRef idx="2">
+            <a:schemeClr val="accent1">
+              <a:shade val="50000"/>
+            </a:schemeClr>
+          </a:lnRef>
+          <a:fillRef idx="1">
+            <a:schemeClr val="accent1"/>
+          </a:fillRef>
+          <a:effectRef idx="0">
+            <a:schemeClr val="accent1"/>
+          </a:effectRef>
+          <a:fontRef idx="minor">
+            <a:schemeClr val="lt1"/>
+          </a:fontRef>
+        </p:style>
+        <p:txBody>
+          <a:bodyPr rtlCol="0" anchor="ctr"/>
+          <a:lstStyle/>
+          <a:p>
+            <a:pPr algn="ctr"/>
+            <a:endParaRPr lang="en-US" dirty="0"/>
+          </a:p>
+        </p:txBody>
+      </p:sp>
+      <p:sp>
+        <p:nvSpPr>
+          <p:cNvPr id="9" name="Titolo 1">
+            <a:extLst>
+              <a:ext uri="{FF2B5EF4-FFF2-40B4-BE49-F238E27FC236}">
+                <a16:creationId xmlns:a16="http://schemas.microsoft.com/office/drawing/2014/main" id="{DDC649C9-A28D-451A-A651-2EC10BEB2AB3}"/>
+              </a:ext>
+            </a:extLst>
+          </p:cNvPr>
+          <p:cNvSpPr>
+            <a:spLocks noGrp="1"/>
+          </p:cNvSpPr>
+          <p:nvPr>
+            <p:ph type="title"/>
+          </p:nvPr>
+        </p:nvSpPr>
+        <p:spPr>
+          <a:xfrm>
+            <a:off x="9160095" y="2730790"/>
+            <a:ext cx="2653937" cy="1395784"/>
+          </a:xfrm>
+        </p:spPr>
+        <p:txBody>
+          <a:bodyPr vert="horz" lIns="91440" tIns="45720" rIns="91440" bIns="45720" rtlCol="0" anchor="ctr">
+            <a:normAutofit fontScale="90000"/>
+          </a:bodyPr>
+          <a:lstStyle/>
+          <a:p>
+            <a:r>
+              <a:rPr lang="en-US" sz="3300" dirty="0">
+                <a:latin typeface="+mn-lt"/>
+              </a:rPr>
+              <a:t>OnePage</a:t>
+            </a:r>
+            <a:r>
+              <a:rPr lang="en-US" sz="3300" kern="1200" dirty="0">
+                <a:solidFill>
+                  <a:schemeClr val="tx1"/>
+                </a:solidFill>
+                <a:latin typeface="+mn-lt"/>
+                <a:ea typeface="+mj-ea"/>
+                <a:cs typeface="+mj-cs"/>
+              </a:rPr>
+              <a:t>.html</a:t>
+            </a:r>
+            <a:br>
+              <a:rPr lang="en-US" sz="3300" kern="1200" dirty="0">
+                <a:solidFill>
+                  <a:schemeClr val="tx1"/>
+                </a:solidFill>
+                <a:latin typeface="+mn-lt"/>
+                <a:ea typeface="+mj-ea"/>
+                <a:cs typeface="+mj-cs"/>
+              </a:rPr>
+            </a:br>
+            <a:r>
+              <a:rPr lang="en-US" sz="3300" b="1" kern="1200" dirty="0">
+                <a:solidFill>
+                  <a:srgbClr val="7030A0"/>
+                </a:solidFill>
+                <a:latin typeface="+mn-lt"/>
+                <a:ea typeface="+mj-ea"/>
+                <a:cs typeface="+mj-cs"/>
+              </a:rPr>
+              <a:t>User Guest</a:t>
+            </a:r>
+            <a:br>
+              <a:rPr lang="en-US" sz="3300" b="1" kern="1200" dirty="0">
+                <a:solidFill>
+                  <a:schemeClr val="tx1"/>
+                </a:solidFill>
+                <a:latin typeface="+mj-lt"/>
+                <a:ea typeface="+mj-ea"/>
+                <a:cs typeface="+mj-cs"/>
+              </a:rPr>
+            </a:br>
+            <a:endParaRPr lang="en-US" sz="3300" kern="1200" dirty="0">
+              <a:solidFill>
+                <a:schemeClr val="tx1"/>
+              </a:solidFill>
+              <a:latin typeface="+mj-lt"/>
+              <a:ea typeface="+mj-ea"/>
+              <a:cs typeface="+mj-cs"/>
+            </a:endParaRPr>
+          </a:p>
+        </p:txBody>
+      </p:sp>
+      <p:pic>
+        <p:nvPicPr>
+          <p:cNvPr id="3" name="Immagine 2">
+            <a:extLst>
+              <a:ext uri="{FF2B5EF4-FFF2-40B4-BE49-F238E27FC236}">
+                <a16:creationId xmlns:a16="http://schemas.microsoft.com/office/drawing/2014/main" id="{D7E0E7CD-DFAE-4A3C-94A2-B8BFB2B045FE}"/>
+              </a:ext>
+            </a:extLst>
+          </p:cNvPr>
+          <p:cNvPicPr>
+            <a:picLocks noChangeAspect="1"/>
+          </p:cNvPicPr>
+          <p:nvPr/>
+        </p:nvPicPr>
+        <p:blipFill rotWithShape="1">
+          <a:blip r:embed="rId2"/>
+          <a:srcRect l="29333" t="12485" r="29834" b="4528"/>
+          <a:stretch/>
+        </p:blipFill>
+        <p:spPr>
+          <a:xfrm>
+            <a:off x="1418680" y="154045"/>
+            <a:ext cx="5849442" cy="6377383"/>
+          </a:xfrm>
+          <a:prstGeom prst="rect">
+            <a:avLst/>
+          </a:prstGeom>
+        </p:spPr>
+      </p:pic>
+    </p:spTree>
+    <p:extLst>
+      <p:ext uri="{BB962C8B-B14F-4D97-AF65-F5344CB8AC3E}">
+        <p14:creationId xmlns:p14="http://schemas.microsoft.com/office/powerpoint/2010/main" val="1911822817"/>
+      </p:ext>
+    </p:extLst>
+  </p:cSld>
+  <p:clrMapOvr>
+    <a:masterClrMapping/>
+  </p:clrMapOvr>
+</p:sld>
+</file>
+
+<file path=ppt/slides/slide8.xml><?xml version="1.0" encoding="utf-8"?>
+<p:sld xmlns:a="http://schemas.openxmlformats.org/drawingml/2006/main" xmlns:r="http://schemas.openxmlformats.org/officeDocument/2006/relationships" xmlns:p="http://schemas.openxmlformats.org/presentationml/2006/main">
+  <p:cSld>
+    <p:bg>
+      <p:bgPr>
+        <a:solidFill>
+          <a:schemeClr val="bg1"/>
+        </a:solidFill>
+        <a:effectLst/>
+      </p:bgPr>
+    </p:bg>
+    <p:spTree>
+      <p:nvGrpSpPr>
+        <p:cNvPr id="1" name=""/>
+        <p:cNvGrpSpPr/>
+        <p:nvPr/>
+      </p:nvGrpSpPr>
+      <p:grpSpPr>
+        <a:xfrm>
+          <a:off x="0" y="0"/>
+          <a:ext cx="0" cy="0"/>
+          <a:chOff x="0" y="0"/>
+          <a:chExt cx="0" cy="0"/>
+        </a:xfrm>
+      </p:grpSpPr>
+      <p:sp useBgFill="1">
+        <p:nvSpPr>
+          <p:cNvPr id="10" name="Rectangle 9">
+            <a:extLst>
+              <a:ext uri="{FF2B5EF4-FFF2-40B4-BE49-F238E27FC236}">
+                <a16:creationId xmlns:a16="http://schemas.microsoft.com/office/drawing/2014/main" id="{62542EEC-4F7C-4AE2-933E-EAC8EB3FA378}"/>
+              </a:ext>
+              <a:ext uri="{C183D7F6-B498-43B3-948B-1728B52AA6E4}">
+                <adec:decorative xmlns:adec="http://schemas.microsoft.com/office/drawing/2017/decorative" val="1"/>
+              </a:ext>
+            </a:extLst>
+          </p:cNvPr>
+          <p:cNvSpPr>
+            <a:spLocks noGrp="1" noRot="1" noChangeAspect="1" noMove="1" noResize="1" noEditPoints="1" noAdjustHandles="1" noChangeArrowheads="1" noChangeShapeType="1" noTextEdit="1"/>
+          </p:cNvSpPr>
+          <p:nvPr>
+            <p:extLst>
+              <p:ext uri="{386F3935-93C4-4BCD-93E2-E3B085C9AB24}">
+                <p16:designElem xmlns:p16="http://schemas.microsoft.com/office/powerpoint/2015/main" val="1"/>
+              </p:ext>
+            </p:extLst>
+          </p:nvPr>
+        </p:nvSpPr>
+        <p:spPr>
+          <a:xfrm>
+            <a:off x="0" y="0"/>
+            <a:ext cx="12191999" cy="6857365"/>
+          </a:xfrm>
+          <a:prstGeom prst="rect">
+            <a:avLst/>
+          </a:prstGeom>
+          <a:ln>
+            <a:noFill/>
+          </a:ln>
+        </p:spPr>
+        <p:style>
+          <a:lnRef idx="2">
+            <a:schemeClr val="accent1">
+              <a:shade val="50000"/>
+            </a:schemeClr>
+          </a:lnRef>
+          <a:fillRef idx="1">
+            <a:schemeClr val="accent1"/>
+          </a:fillRef>
+          <a:effectRef idx="0">
+            <a:schemeClr val="accent1"/>
+          </a:effectRef>
+          <a:fontRef idx="minor">
+            <a:schemeClr val="lt1"/>
+          </a:fontRef>
+        </p:style>
+        <p:txBody>
+          <a:bodyPr rtlCol="0" anchor="ctr"/>
+          <a:lstStyle/>
+          <a:p>
+            <a:pPr algn="ctr"/>
+            <a:endParaRPr lang="en-US" dirty="0"/>
+          </a:p>
+        </p:txBody>
+      </p:sp>
+      <p:sp>
+        <p:nvSpPr>
+          <p:cNvPr id="2" name="Titolo 1">
+            <a:extLst>
+              <a:ext uri="{FF2B5EF4-FFF2-40B4-BE49-F238E27FC236}">
+                <a16:creationId xmlns:a16="http://schemas.microsoft.com/office/drawing/2014/main" id="{D01C3C1A-FE2C-461B-94A4-68E58C809BDC}"/>
+              </a:ext>
+            </a:extLst>
+          </p:cNvPr>
+          <p:cNvSpPr>
+            <a:spLocks noGrp="1"/>
+          </p:cNvSpPr>
+          <p:nvPr>
+            <p:ph type="title"/>
+          </p:nvPr>
+        </p:nvSpPr>
+        <p:spPr>
+          <a:xfrm>
+            <a:off x="8519504" y="3034646"/>
+            <a:ext cx="2868998" cy="1156654"/>
+          </a:xfrm>
+        </p:spPr>
+        <p:txBody>
+          <a:bodyPr vert="horz" lIns="91440" tIns="45720" rIns="91440" bIns="45720" rtlCol="0" anchor="t">
+            <a:normAutofit/>
+          </a:bodyPr>
+          <a:lstStyle/>
+          <a:p>
+            <a:r>
+              <a:rPr lang="en-US" sz="3200" dirty="0">
+                <a:latin typeface="+mn-lt"/>
+              </a:rPr>
+              <a:t>OnePage</a:t>
+            </a:r>
+            <a:r>
+              <a:rPr lang="en-US" sz="3200" kern="1200" dirty="0">
+                <a:solidFill>
+                  <a:schemeClr val="tx1"/>
+                </a:solidFill>
+                <a:latin typeface="+mn-lt"/>
+                <a:ea typeface="+mj-ea"/>
+                <a:cs typeface="+mj-cs"/>
+              </a:rPr>
+              <a:t>.html</a:t>
+            </a:r>
+            <a:br>
+              <a:rPr lang="en-US" sz="3200" kern="1200" dirty="0">
+                <a:solidFill>
+                  <a:schemeClr val="tx1"/>
+                </a:solidFill>
+                <a:latin typeface="+mn-lt"/>
+                <a:ea typeface="+mj-ea"/>
+                <a:cs typeface="+mj-cs"/>
+              </a:rPr>
+            </a:br>
+            <a:r>
+              <a:rPr lang="en-US" sz="3200" b="1" kern="1200" dirty="0">
+                <a:solidFill>
+                  <a:srgbClr val="7030A0"/>
+                </a:solidFill>
+                <a:latin typeface="+mn-lt"/>
+                <a:ea typeface="+mj-ea"/>
+                <a:cs typeface="+mj-cs"/>
+              </a:rPr>
+              <a:t>User </a:t>
+            </a:r>
+            <a:r>
+              <a:rPr lang="en-US" sz="3200" b="1" dirty="0">
+                <a:solidFill>
+                  <a:srgbClr val="7030A0"/>
+                </a:solidFill>
+                <a:latin typeface="+mn-lt"/>
+              </a:rPr>
+              <a:t>Logged</a:t>
+            </a:r>
+            <a:endParaRPr lang="en-US" sz="3200" b="1" dirty="0"/>
+          </a:p>
+        </p:txBody>
+      </p:sp>
+      <p:sp>
+        <p:nvSpPr>
+          <p:cNvPr id="12" name="Rectangle 11">
+            <a:extLst>
+              <a:ext uri="{FF2B5EF4-FFF2-40B4-BE49-F238E27FC236}">
+                <a16:creationId xmlns:a16="http://schemas.microsoft.com/office/drawing/2014/main" id="{B81933D1-5615-42C7-9C0B-4EB7105CCE2D}"/>
+              </a:ext>
+              <a:ext uri="{C183D7F6-B498-43B3-948B-1728B52AA6E4}">
+                <adec:decorative xmlns:adec="http://schemas.microsoft.com/office/drawing/2017/decorative" val="1"/>
+              </a:ext>
+            </a:extLst>
+          </p:cNvPr>
+          <p:cNvSpPr>
+            <a:spLocks noGrp="1" noRot="1" noChangeAspect="1" noMove="1" noResize="1" noEditPoints="1" noAdjustHandles="1" noChangeArrowheads="1" noChangeShapeType="1" noTextEdit="1"/>
+          </p:cNvSpPr>
+          <p:nvPr>
+            <p:extLst>
+              <p:ext uri="{386F3935-93C4-4BCD-93E2-E3B085C9AB24}">
+                <p16:designElem xmlns:p16="http://schemas.microsoft.com/office/powerpoint/2015/main" val="1"/>
+              </p:ext>
+            </p:extLst>
+          </p:nvPr>
+        </p:nvSpPr>
+        <p:spPr>
+          <a:xfrm flipH="1">
+            <a:off x="0" y="0"/>
+            <a:ext cx="1494330" cy="6858000"/>
+          </a:xfrm>
+          <a:prstGeom prst="rect">
+            <a:avLst/>
+          </a:prstGeom>
+          <a:solidFill>
+            <a:schemeClr val="accent4"/>
+          </a:solidFill>
+          <a:ln>
+            <a:noFill/>
+          </a:ln>
+        </p:spPr>
+        <p:style>
+          <a:lnRef idx="2">
+            <a:schemeClr val="accent1">
+              <a:shade val="50000"/>
+            </a:schemeClr>
+          </a:lnRef>
+          <a:fillRef idx="1">
+            <a:schemeClr val="accent1"/>
+          </a:fillRef>
+          <a:effectRef idx="0">
+            <a:schemeClr val="accent1"/>
+          </a:effectRef>
+          <a:fontRef idx="minor">
+            <a:schemeClr val="lt1"/>
+          </a:fontRef>
+        </p:style>
+        <p:txBody>
+          <a:bodyPr rtlCol="0" anchor="ctr"/>
+          <a:lstStyle/>
+          <a:p>
+            <a:pPr algn="ctr"/>
+            <a:endParaRPr lang="en-US" dirty="0"/>
+          </a:p>
+        </p:txBody>
+      </p:sp>
+      <p:sp>
+        <p:nvSpPr>
+          <p:cNvPr id="14" name="Rectangle 13">
+            <a:extLst>
+              <a:ext uri="{FF2B5EF4-FFF2-40B4-BE49-F238E27FC236}">
+                <a16:creationId xmlns:a16="http://schemas.microsoft.com/office/drawing/2014/main" id="{19C9EAEA-39D0-4B0E-A0EB-51E7B26740B1}"/>
+              </a:ext>
+              <a:ext uri="{C183D7F6-B498-43B3-948B-1728B52AA6E4}">
+                <adec:decorative xmlns:adec="http://schemas.microsoft.com/office/drawing/2017/decorative" val="1"/>
+              </a:ext>
+            </a:extLst>
+          </p:cNvPr>
+          <p:cNvSpPr>
+            <a:spLocks noGrp="1" noRot="1" noChangeAspect="1" noMove="1" noResize="1" noEditPoints="1" noAdjustHandles="1" noChangeArrowheads="1" noChangeShapeType="1" noTextEdit="1"/>
+          </p:cNvSpPr>
+          <p:nvPr>
+            <p:extLst>
+              <p:ext uri="{386F3935-93C4-4BCD-93E2-E3B085C9AB24}">
+                <p16:designElem xmlns:p16="http://schemas.microsoft.com/office/powerpoint/2015/main" val="1"/>
+              </p:ext>
+            </p:extLst>
+          </p:nvPr>
+        </p:nvSpPr>
+        <p:spPr>
+          <a:xfrm>
+            <a:off x="496824" y="391886"/>
+            <a:ext cx="6009366" cy="6017078"/>
+          </a:xfrm>
+          <a:prstGeom prst="rect">
+            <a:avLst/>
+          </a:prstGeom>
+          <a:solidFill>
+            <a:schemeClr val="bg1"/>
+          </a:solidFill>
+          <a:ln>
+            <a:noFill/>
+          </a:ln>
+          <a:effectLst>
+            <a:outerShdw blurRad="139700" dist="127000" dir="5400000" algn="t" rotWithShape="0">
+              <a:prstClr val="black">
+                <a:alpha val="15000"/>
+              </a:prstClr>
+            </a:outerShdw>
+          </a:effectLst>
+        </p:spPr>
+        <p:style>
+          <a:lnRef idx="2">
+            <a:schemeClr val="accent1">
+              <a:shade val="50000"/>
+            </a:schemeClr>
+          </a:lnRef>
+          <a:fillRef idx="1">
+            <a:schemeClr val="accent1"/>
+          </a:fillRef>
+          <a:effectRef idx="0">
+            <a:schemeClr val="accent1"/>
+          </a:effectRef>
+          <a:fontRef idx="minor">
+            <a:schemeClr val="lt1"/>
+          </a:fontRef>
+        </p:style>
+        <p:txBody>
+          <a:bodyPr rtlCol="0" anchor="ctr"/>
+          <a:lstStyle/>
+          <a:p>
+            <a:pPr algn="ctr"/>
+            <a:endParaRPr lang="en-US" dirty="0"/>
           </a:p>
         </p:txBody>
       </p:sp>
@@ -41160,7 +42415,7 @@
             <a:lstStyle/>
             <a:p>
               <a:pPr algn="ctr"/>
-              <a:endParaRPr lang="en-US"/>
+              <a:endParaRPr lang="en-US" dirty="0"/>
             </a:p>
           </p:txBody>
         </p:sp>
@@ -41219,7 +42474,7 @@
             <a:lstStyle/>
             <a:p>
               <a:pPr algn="ctr"/>
-              <a:endParaRPr lang="en-US"/>
+              <a:endParaRPr lang="en-US" dirty="0"/>
             </a:p>
           </p:txBody>
         </p:sp>
@@ -41278,17 +42533,17 @@
             <a:lstStyle/>
             <a:p>
               <a:pPr algn="ctr"/>
-              <a:endParaRPr lang="en-US"/>
+              <a:endParaRPr lang="en-US" dirty="0"/>
             </a:p>
           </p:txBody>
         </p:sp>
       </p:grpSp>
       <p:pic>
         <p:nvPicPr>
-          <p:cNvPr id="6" name="Immagine 5">
-            <a:extLst>
-              <a:ext uri="{FF2B5EF4-FFF2-40B4-BE49-F238E27FC236}">
-                <a16:creationId xmlns:a16="http://schemas.microsoft.com/office/drawing/2014/main" id="{35773ED5-9C37-40F9-B25B-2D3A8D3F816B}"/>
+          <p:cNvPr id="4" name="Immagine 3" descr="Immagine che contiene screenshot&#10;&#10;Descrizione generata automaticamente">
+            <a:extLst>
+              <a:ext uri="{FF2B5EF4-FFF2-40B4-BE49-F238E27FC236}">
+                <a16:creationId xmlns:a16="http://schemas.microsoft.com/office/drawing/2014/main" id="{BA5D0E71-6904-4F43-9815-FAA2CDB6D5AF}"/>
               </a:ext>
             </a:extLst>
           </p:cNvPr>
@@ -41299,13 +42554,13 @@
         </p:nvPicPr>
         <p:blipFill rotWithShape="1">
           <a:blip r:embed="rId2"/>
-          <a:srcRect l="29333" t="12485" r="29834"/>
+          <a:srcRect l="2227" r="2798"/>
           <a:stretch/>
         </p:blipFill>
         <p:spPr>
           <a:xfrm>
-            <a:off x="1012307" y="566737"/>
-            <a:ext cx="4978400" cy="5723890"/>
+            <a:off x="535664" y="1171032"/>
+            <a:ext cx="7798723" cy="4176031"/>
           </a:xfrm>
           <a:prstGeom prst="rect">
             <a:avLst/>
@@ -41315,204 +42570,7 @@
     </p:spTree>
     <p:extLst>
       <p:ext uri="{BB962C8B-B14F-4D97-AF65-F5344CB8AC3E}">
-        <p14:creationId xmlns:p14="http://schemas.microsoft.com/office/powerpoint/2010/main" val="469061766"/>
-      </p:ext>
-    </p:extLst>
-  </p:cSld>
-  <p:clrMapOvr>
-    <a:masterClrMapping/>
-  </p:clrMapOvr>
-</p:sld>
-</file>
-
-<file path=ppt/slides/slide8.xml><?xml version="1.0" encoding="utf-8"?>
-<p:sld xmlns:a="http://schemas.openxmlformats.org/drawingml/2006/main" xmlns:r="http://schemas.openxmlformats.org/officeDocument/2006/relationships" xmlns:p="http://schemas.openxmlformats.org/presentationml/2006/main">
-  <p:cSld>
-    <p:bg>
-      <p:bgPr>
-        <a:solidFill>
-          <a:schemeClr val="bg1"/>
-        </a:solidFill>
-        <a:effectLst/>
-      </p:bgPr>
-    </p:bg>
-    <p:spTree>
-      <p:nvGrpSpPr>
-        <p:cNvPr id="1" name=""/>
-        <p:cNvGrpSpPr/>
-        <p:nvPr/>
-      </p:nvGrpSpPr>
-      <p:grpSpPr>
-        <a:xfrm>
-          <a:off x="0" y="0"/>
-          <a:ext cx="0" cy="0"/>
-          <a:chOff x="0" y="0"/>
-          <a:chExt cx="0" cy="0"/>
-        </a:xfrm>
-      </p:grpSpPr>
-      <p:sp useBgFill="1">
-        <p:nvSpPr>
-          <p:cNvPr id="11" name="Rectangle 8">
-            <a:extLst>
-              <a:ext uri="{FF2B5EF4-FFF2-40B4-BE49-F238E27FC236}">
-                <a16:creationId xmlns:a16="http://schemas.microsoft.com/office/drawing/2014/main" id="{53F29798-D584-4792-9B62-3F5F5C36D619}"/>
-              </a:ext>
-              <a:ext uri="{C183D7F6-B498-43B3-948B-1728B52AA6E4}">
-                <adec:decorative xmlns:adec="http://schemas.microsoft.com/office/drawing/2017/decorative" val="1"/>
-              </a:ext>
-            </a:extLst>
-          </p:cNvPr>
-          <p:cNvSpPr>
-            <a:spLocks noGrp="1" noRot="1" noChangeAspect="1" noMove="1" noResize="1" noEditPoints="1" noAdjustHandles="1" noChangeArrowheads="1" noChangeShapeType="1" noTextEdit="1"/>
-          </p:cNvSpPr>
-          <p:nvPr>
-            <p:extLst>
-              <p:ext uri="{386F3935-93C4-4BCD-93E2-E3B085C9AB24}">
-                <p16:designElem xmlns:p16="http://schemas.microsoft.com/office/powerpoint/2015/main" val="1"/>
-              </p:ext>
-            </p:extLst>
-          </p:nvPr>
-        </p:nvSpPr>
-        <p:spPr>
-          <a:xfrm>
-            <a:off x="0" y="0"/>
-            <a:ext cx="12188952" cy="6858000"/>
-          </a:xfrm>
-          <a:prstGeom prst="rect">
-            <a:avLst/>
-          </a:prstGeom>
-          <a:ln>
-            <a:noFill/>
-          </a:ln>
-        </p:spPr>
-        <p:style>
-          <a:lnRef idx="2">
-            <a:schemeClr val="accent1">
-              <a:shade val="50000"/>
-            </a:schemeClr>
-          </a:lnRef>
-          <a:fillRef idx="1">
-            <a:schemeClr val="accent1"/>
-          </a:fillRef>
-          <a:effectRef idx="0">
-            <a:schemeClr val="accent1"/>
-          </a:effectRef>
-          <a:fontRef idx="minor">
-            <a:schemeClr val="lt1"/>
-          </a:fontRef>
-        </p:style>
-        <p:txBody>
-          <a:bodyPr rtlCol="0" anchor="ctr"/>
-          <a:lstStyle/>
-          <a:p>
-            <a:pPr algn="ctr"/>
-            <a:endParaRPr lang="en-US"/>
-          </a:p>
-        </p:txBody>
-      </p:sp>
-      <p:sp>
-        <p:nvSpPr>
-          <p:cNvPr id="2" name="Titolo 1">
-            <a:extLst>
-              <a:ext uri="{FF2B5EF4-FFF2-40B4-BE49-F238E27FC236}">
-                <a16:creationId xmlns:a16="http://schemas.microsoft.com/office/drawing/2014/main" id="{921AEBED-73C8-4BA7-9CE1-752C570077E7}"/>
-              </a:ext>
-            </a:extLst>
-          </p:cNvPr>
-          <p:cNvSpPr>
-            <a:spLocks noGrp="1"/>
-          </p:cNvSpPr>
-          <p:nvPr>
-            <p:ph type="title"/>
-          </p:nvPr>
-        </p:nvSpPr>
-        <p:spPr>
-          <a:xfrm>
-            <a:off x="838200" y="184805"/>
-            <a:ext cx="10515600" cy="1505883"/>
-          </a:xfrm>
-        </p:spPr>
-        <p:txBody>
-          <a:bodyPr vert="horz" lIns="91440" tIns="45720" rIns="91440" bIns="45720" rtlCol="0" anchor="ctr">
-            <a:normAutofit/>
-          </a:bodyPr>
-          <a:lstStyle/>
-          <a:p>
-            <a:r>
-              <a:rPr lang="en-US" sz="3900" b="1" dirty="0">
-                <a:latin typeface="+mn-lt"/>
-              </a:rPr>
-              <a:t>OnePage</a:t>
-            </a:r>
-            <a:r>
-              <a:rPr lang="en-US" sz="3900" b="1" kern="1200" dirty="0">
-                <a:solidFill>
-                  <a:schemeClr val="tx1"/>
-                </a:solidFill>
-                <a:latin typeface="+mn-lt"/>
-                <a:ea typeface="+mj-ea"/>
-                <a:cs typeface="+mj-cs"/>
-              </a:rPr>
-              <a:t>.html</a:t>
-            </a:r>
-            <a:br>
-              <a:rPr lang="en-US" sz="3900" b="1" kern="1200" dirty="0">
-                <a:solidFill>
-                  <a:schemeClr val="tx1"/>
-                </a:solidFill>
-                <a:latin typeface="+mn-lt"/>
-                <a:ea typeface="+mj-ea"/>
-                <a:cs typeface="+mj-cs"/>
-              </a:rPr>
-            </a:br>
-            <a:r>
-              <a:rPr lang="en-US" sz="3900" b="1" kern="1200" dirty="0">
-                <a:solidFill>
-                  <a:srgbClr val="7030A0"/>
-                </a:solidFill>
-                <a:latin typeface="+mn-lt"/>
-                <a:ea typeface="+mj-ea"/>
-                <a:cs typeface="+mj-cs"/>
-              </a:rPr>
-              <a:t>User Logged</a:t>
-            </a:r>
-          </a:p>
-        </p:txBody>
-      </p:sp>
-      <p:pic>
-        <p:nvPicPr>
-          <p:cNvPr id="4" name="Immagine 3" descr="Immagine che contiene screenshot&#10;&#10;Descrizione generata automaticamente">
-            <a:extLst>
-              <a:ext uri="{FF2B5EF4-FFF2-40B4-BE49-F238E27FC236}">
-                <a16:creationId xmlns:a16="http://schemas.microsoft.com/office/drawing/2014/main" id="{CAF496D0-28CA-4EF5-A87B-38E071C1BBE3}"/>
-              </a:ext>
-            </a:extLst>
-          </p:cNvPr>
-          <p:cNvPicPr>
-            <a:picLocks noChangeAspect="1"/>
-          </p:cNvPicPr>
-          <p:nvPr/>
-        </p:nvPicPr>
-        <p:blipFill>
-          <a:blip r:embed="rId2"/>
-          <a:stretch>
-            <a:fillRect/>
-          </a:stretch>
-        </p:blipFill>
-        <p:spPr>
-          <a:xfrm>
-            <a:off x="1458740" y="1845426"/>
-            <a:ext cx="9271466" cy="4450303"/>
-          </a:xfrm>
-          <a:prstGeom prst="rect">
-            <a:avLst/>
-          </a:prstGeom>
-        </p:spPr>
-      </p:pic>
-    </p:spTree>
-    <p:extLst>
-      <p:ext uri="{BB962C8B-B14F-4D97-AF65-F5344CB8AC3E}">
-        <p14:creationId xmlns:p14="http://schemas.microsoft.com/office/powerpoint/2010/main" val="1313681356"/>
+        <p14:creationId xmlns:p14="http://schemas.microsoft.com/office/powerpoint/2010/main" val="426129041"/>
       </p:ext>
     </p:extLst>
   </p:cSld>
@@ -41549,10 +42607,10 @@
       </p:grpSpPr>
       <p:sp useBgFill="1">
         <p:nvSpPr>
-          <p:cNvPr id="16" name="Rectangle 15">
-            <a:extLst>
-              <a:ext uri="{FF2B5EF4-FFF2-40B4-BE49-F238E27FC236}">
-                <a16:creationId xmlns:a16="http://schemas.microsoft.com/office/drawing/2014/main" id="{53F29798-D584-4792-9B62-3F5F5C36D619}"/>
+          <p:cNvPr id="10" name="Rectangle 9">
+            <a:extLst>
+              <a:ext uri="{FF2B5EF4-FFF2-40B4-BE49-F238E27FC236}">
+                <a16:creationId xmlns:a16="http://schemas.microsoft.com/office/drawing/2014/main" id="{62542EEC-4F7C-4AE2-933E-EAC8EB3FA378}"/>
               </a:ext>
               <a:ext uri="{C183D7F6-B498-43B3-948B-1728B52AA6E4}">
                 <adec:decorative xmlns:adec="http://schemas.microsoft.com/office/drawing/2017/decorative" val="1"/>
@@ -41573,7 +42631,7 @@
         <p:spPr>
           <a:xfrm>
             <a:off x="0" y="0"/>
-            <a:ext cx="12188952" cy="6858000"/>
+            <a:ext cx="12191999" cy="6857365"/>
           </a:xfrm>
           <a:prstGeom prst="rect">
             <a:avLst/>
@@ -41603,61 +42661,486 @@
           <a:lstStyle/>
           <a:p>
             <a:pPr algn="ctr"/>
-            <a:endParaRPr lang="en-US"/>
+            <a:endParaRPr lang="en-US" dirty="0"/>
           </a:p>
         </p:txBody>
       </p:sp>
       <p:sp>
         <p:nvSpPr>
-          <p:cNvPr id="2" name="Titolo 1">
-            <a:extLst>
-              <a:ext uri="{FF2B5EF4-FFF2-40B4-BE49-F238E27FC236}">
-                <a16:creationId xmlns:a16="http://schemas.microsoft.com/office/drawing/2014/main" id="{921AEBED-73C8-4BA7-9CE1-752C570077E7}"/>
+          <p:cNvPr id="12" name="Rectangle 11">
+            <a:extLst>
+              <a:ext uri="{FF2B5EF4-FFF2-40B4-BE49-F238E27FC236}">
+                <a16:creationId xmlns:a16="http://schemas.microsoft.com/office/drawing/2014/main" id="{B81933D1-5615-42C7-9C0B-4EB7105CCE2D}"/>
+              </a:ext>
+              <a:ext uri="{C183D7F6-B498-43B3-948B-1728B52AA6E4}">
+                <adec:decorative xmlns:adec="http://schemas.microsoft.com/office/drawing/2017/decorative" val="1"/>
               </a:ext>
             </a:extLst>
           </p:cNvPr>
           <p:cNvSpPr>
-            <a:spLocks noGrp="1"/>
+            <a:spLocks noGrp="1" noRot="1" noChangeAspect="1" noMove="1" noResize="1" noEditPoints="1" noAdjustHandles="1" noChangeArrowheads="1" noChangeShapeType="1" noTextEdit="1"/>
           </p:cNvSpPr>
           <p:nvPr>
-            <p:ph type="title"/>
+            <p:extLst>
+              <p:ext uri="{386F3935-93C4-4BCD-93E2-E3B085C9AB24}">
+                <p16:designElem xmlns:p16="http://schemas.microsoft.com/office/powerpoint/2015/main" val="1"/>
+              </p:ext>
+            </p:extLst>
           </p:nvPr>
         </p:nvSpPr>
         <p:spPr>
-          <a:xfrm>
-            <a:off x="477520" y="184805"/>
-            <a:ext cx="11074400" cy="1505883"/>
-          </a:xfrm>
-        </p:spPr>
+          <a:xfrm flipH="1">
+            <a:off x="0" y="0"/>
+            <a:ext cx="1494330" cy="6858000"/>
+          </a:xfrm>
+          <a:prstGeom prst="rect">
+            <a:avLst/>
+          </a:prstGeom>
+          <a:solidFill>
+            <a:schemeClr val="accent4"/>
+          </a:solidFill>
+          <a:ln>
+            <a:noFill/>
+          </a:ln>
+        </p:spPr>
+        <p:style>
+          <a:lnRef idx="2">
+            <a:schemeClr val="accent1">
+              <a:shade val="50000"/>
+            </a:schemeClr>
+          </a:lnRef>
+          <a:fillRef idx="1">
+            <a:schemeClr val="accent1"/>
+          </a:fillRef>
+          <a:effectRef idx="0">
+            <a:schemeClr val="accent1"/>
+          </a:effectRef>
+          <a:fontRef idx="minor">
+            <a:schemeClr val="lt1"/>
+          </a:fontRef>
+        </p:style>
         <p:txBody>
-          <a:bodyPr vert="horz" lIns="91440" tIns="45720" rIns="91440" bIns="45720" rtlCol="0" anchor="ctr">
-            <a:normAutofit fontScale="90000"/>
+          <a:bodyPr rtlCol="0" anchor="ctr"/>
+          <a:lstStyle/>
+          <a:p>
+            <a:pPr algn="ctr"/>
+            <a:endParaRPr lang="en-US" dirty="0"/>
+          </a:p>
+        </p:txBody>
+      </p:sp>
+      <p:sp>
+        <p:nvSpPr>
+          <p:cNvPr id="14" name="Rectangle 13">
+            <a:extLst>
+              <a:ext uri="{FF2B5EF4-FFF2-40B4-BE49-F238E27FC236}">
+                <a16:creationId xmlns:a16="http://schemas.microsoft.com/office/drawing/2014/main" id="{19C9EAEA-39D0-4B0E-A0EB-51E7B26740B1}"/>
+              </a:ext>
+              <a:ext uri="{C183D7F6-B498-43B3-948B-1728B52AA6E4}">
+                <adec:decorative xmlns:adec="http://schemas.microsoft.com/office/drawing/2017/decorative" val="1"/>
+              </a:ext>
+            </a:extLst>
+          </p:cNvPr>
+          <p:cNvSpPr>
+            <a:spLocks noGrp="1" noRot="1" noChangeAspect="1" noMove="1" noResize="1" noEditPoints="1" noAdjustHandles="1" noChangeArrowheads="1" noChangeShapeType="1" noTextEdit="1"/>
+          </p:cNvSpPr>
+          <p:nvPr>
+            <p:extLst>
+              <p:ext uri="{386F3935-93C4-4BCD-93E2-E3B085C9AB24}">
+                <p16:designElem xmlns:p16="http://schemas.microsoft.com/office/powerpoint/2015/main" val="1"/>
+              </p:ext>
+            </p:extLst>
+          </p:nvPr>
+        </p:nvSpPr>
+        <p:spPr>
+          <a:xfrm>
+            <a:off x="496824" y="391886"/>
+            <a:ext cx="6009366" cy="6017078"/>
+          </a:xfrm>
+          <a:prstGeom prst="rect">
+            <a:avLst/>
+          </a:prstGeom>
+          <a:solidFill>
+            <a:schemeClr val="bg1"/>
+          </a:solidFill>
+          <a:ln>
+            <a:noFill/>
+          </a:ln>
+          <a:effectLst>
+            <a:outerShdw blurRad="139700" dist="127000" dir="5400000" algn="t" rotWithShape="0">
+              <a:prstClr val="black">
+                <a:alpha val="15000"/>
+              </a:prstClr>
+            </a:outerShdw>
+          </a:effectLst>
+        </p:spPr>
+        <p:style>
+          <a:lnRef idx="2">
+            <a:schemeClr val="accent1">
+              <a:shade val="50000"/>
+            </a:schemeClr>
+          </a:lnRef>
+          <a:fillRef idx="1">
+            <a:schemeClr val="accent1"/>
+          </a:fillRef>
+          <a:effectRef idx="0">
+            <a:schemeClr val="accent1"/>
+          </a:effectRef>
+          <a:fontRef idx="minor">
+            <a:schemeClr val="lt1"/>
+          </a:fontRef>
+        </p:style>
+        <p:txBody>
+          <a:bodyPr rtlCol="0" anchor="ctr"/>
+          <a:lstStyle/>
+          <a:p>
+            <a:pPr algn="ctr"/>
+            <a:endParaRPr lang="en-US" dirty="0"/>
+          </a:p>
+        </p:txBody>
+      </p:sp>
+      <p:grpSp>
+        <p:nvGrpSpPr>
+          <p:cNvPr id="16" name="Group 15">
+            <a:extLst>
+              <a:ext uri="{FF2B5EF4-FFF2-40B4-BE49-F238E27FC236}">
+                <a16:creationId xmlns:a16="http://schemas.microsoft.com/office/drawing/2014/main" id="{032D8612-31EB-44CF-A1D0-14FD4C705424}"/>
+              </a:ext>
+              <a:ext uri="{C183D7F6-B498-43B3-948B-1728B52AA6E4}">
+                <adec:decorative xmlns:adec="http://schemas.microsoft.com/office/drawing/2017/decorative" val="1"/>
+              </a:ext>
+            </a:extLst>
+          </p:cNvPr>
+          <p:cNvGrpSpPr>
+            <a:grpSpLocks noGrp="1" noUngrp="1" noRot="1" noChangeAspect="1" noMove="1" noResize="1"/>
+          </p:cNvGrpSpPr>
+          <p:nvPr>
+            <p:extLst>
+              <p:ext uri="{386F3935-93C4-4BCD-93E2-E3B085C9AB24}">
+                <p16:designElem xmlns:p16="http://schemas.microsoft.com/office/powerpoint/2015/main" val="1"/>
+              </p:ext>
+            </p:extLst>
+          </p:nvPr>
+        </p:nvGrpSpPr>
+        <p:grpSpPr>
+          <a:xfrm>
+            <a:off x="11460480" y="3154317"/>
+            <a:ext cx="731521" cy="673460"/>
+            <a:chOff x="3940602" y="308034"/>
+            <a:chExt cx="2116791" cy="3428999"/>
+          </a:xfrm>
+          <a:solidFill>
+            <a:schemeClr val="accent4"/>
+          </a:solidFill>
+        </p:grpSpPr>
+        <p:sp>
+          <p:nvSpPr>
+            <p:cNvPr id="17" name="Rectangle 16">
+              <a:extLst>
+                <a:ext uri="{FF2B5EF4-FFF2-40B4-BE49-F238E27FC236}">
+                  <a16:creationId xmlns:a16="http://schemas.microsoft.com/office/drawing/2014/main" id="{F19A4A0F-1B59-4DB0-9764-D10936E98770}"/>
+                </a:ext>
+                <a:ext uri="{C183D7F6-B498-43B3-948B-1728B52AA6E4}">
+                  <adec:decorative xmlns:adec="http://schemas.microsoft.com/office/drawing/2017/decorative" val="1"/>
+                </a:ext>
+              </a:extLst>
+            </p:cNvPr>
+            <p:cNvSpPr/>
+            <p:nvPr>
+              <p:extLst>
+                <p:ext uri="{386F3935-93C4-4BCD-93E2-E3B085C9AB24}">
+                  <p16:designElem xmlns:p16="http://schemas.microsoft.com/office/powerpoint/2015/main" val="1"/>
+                </p:ext>
+              </p:extLst>
+            </p:nvPr>
+          </p:nvSpPr>
+          <p:spPr>
+            <a:xfrm>
+              <a:off x="3940602" y="308034"/>
+              <a:ext cx="566743" cy="3428999"/>
+            </a:xfrm>
+            <a:prstGeom prst="rect">
+              <a:avLst/>
+            </a:prstGeom>
+            <a:grpFill/>
+            <a:ln>
+              <a:noFill/>
+            </a:ln>
+          </p:spPr>
+          <p:style>
+            <a:lnRef idx="2">
+              <a:schemeClr val="accent1">
+                <a:shade val="50000"/>
+              </a:schemeClr>
+            </a:lnRef>
+            <a:fillRef idx="1">
+              <a:schemeClr val="accent1"/>
+            </a:fillRef>
+            <a:effectRef idx="0">
+              <a:schemeClr val="accent1"/>
+            </a:effectRef>
+            <a:fontRef idx="minor">
+              <a:schemeClr val="lt1"/>
+            </a:fontRef>
+          </p:style>
+          <p:txBody>
+            <a:bodyPr rtlCol="0" anchor="ctr"/>
+            <a:lstStyle/>
+            <a:p>
+              <a:pPr algn="ctr"/>
+              <a:endParaRPr lang="en-US" dirty="0"/>
+            </a:p>
+          </p:txBody>
+        </p:sp>
+        <p:sp>
+          <p:nvSpPr>
+            <p:cNvPr id="18" name="Rectangle 17">
+              <a:extLst>
+                <a:ext uri="{FF2B5EF4-FFF2-40B4-BE49-F238E27FC236}">
+                  <a16:creationId xmlns:a16="http://schemas.microsoft.com/office/drawing/2014/main" id="{F399A70F-F8CD-4992-9EF5-6CF15472E73F}"/>
+                </a:ext>
+                <a:ext uri="{C183D7F6-B498-43B3-948B-1728B52AA6E4}">
+                  <adec:decorative xmlns:adec="http://schemas.microsoft.com/office/drawing/2017/decorative" val="1"/>
+                </a:ext>
+              </a:extLst>
+            </p:cNvPr>
+            <p:cNvSpPr/>
+            <p:nvPr>
+              <p:extLst>
+                <p:ext uri="{386F3935-93C4-4BCD-93E2-E3B085C9AB24}">
+                  <p16:designElem xmlns:p16="http://schemas.microsoft.com/office/powerpoint/2015/main" val="1"/>
+                </p:ext>
+              </p:extLst>
+            </p:nvPr>
+          </p:nvSpPr>
+          <p:spPr>
+            <a:xfrm>
+              <a:off x="4715626" y="308034"/>
+              <a:ext cx="566743" cy="3428999"/>
+            </a:xfrm>
+            <a:prstGeom prst="rect">
+              <a:avLst/>
+            </a:prstGeom>
+            <a:grpFill/>
+            <a:ln>
+              <a:noFill/>
+            </a:ln>
+          </p:spPr>
+          <p:style>
+            <a:lnRef idx="2">
+              <a:schemeClr val="accent1">
+                <a:shade val="50000"/>
+              </a:schemeClr>
+            </a:lnRef>
+            <a:fillRef idx="1">
+              <a:schemeClr val="accent1"/>
+            </a:fillRef>
+            <a:effectRef idx="0">
+              <a:schemeClr val="accent1"/>
+            </a:effectRef>
+            <a:fontRef idx="minor">
+              <a:schemeClr val="lt1"/>
+            </a:fontRef>
+          </p:style>
+          <p:txBody>
+            <a:bodyPr rtlCol="0" anchor="ctr"/>
+            <a:lstStyle/>
+            <a:p>
+              <a:pPr algn="ctr"/>
+              <a:endParaRPr lang="en-US" dirty="0"/>
+            </a:p>
+          </p:txBody>
+        </p:sp>
+        <p:sp>
+          <p:nvSpPr>
+            <p:cNvPr id="19" name="Rectangle 18">
+              <a:extLst>
+                <a:ext uri="{FF2B5EF4-FFF2-40B4-BE49-F238E27FC236}">
+                  <a16:creationId xmlns:a16="http://schemas.microsoft.com/office/drawing/2014/main" id="{48F4FEDC-6D80-458C-A665-075D9B9500FD}"/>
+                </a:ext>
+                <a:ext uri="{C183D7F6-B498-43B3-948B-1728B52AA6E4}">
+                  <adec:decorative xmlns:adec="http://schemas.microsoft.com/office/drawing/2017/decorative" val="1"/>
+                </a:ext>
+              </a:extLst>
+            </p:cNvPr>
+            <p:cNvSpPr/>
+            <p:nvPr>
+              <p:extLst>
+                <p:ext uri="{386F3935-93C4-4BCD-93E2-E3B085C9AB24}">
+                  <p16:designElem xmlns:p16="http://schemas.microsoft.com/office/powerpoint/2015/main" val="1"/>
+                </p:ext>
+              </p:extLst>
+            </p:nvPr>
+          </p:nvSpPr>
+          <p:spPr>
+            <a:xfrm>
+              <a:off x="5490650" y="308034"/>
+              <a:ext cx="566743" cy="3428999"/>
+            </a:xfrm>
+            <a:prstGeom prst="rect">
+              <a:avLst/>
+            </a:prstGeom>
+            <a:grpFill/>
+            <a:ln>
+              <a:noFill/>
+            </a:ln>
+          </p:spPr>
+          <p:style>
+            <a:lnRef idx="2">
+              <a:schemeClr val="accent1">
+                <a:shade val="50000"/>
+              </a:schemeClr>
+            </a:lnRef>
+            <a:fillRef idx="1">
+              <a:schemeClr val="accent1"/>
+            </a:fillRef>
+            <a:effectRef idx="0">
+              <a:schemeClr val="accent1"/>
+            </a:effectRef>
+            <a:fontRef idx="minor">
+              <a:schemeClr val="lt1"/>
+            </a:fontRef>
+          </p:style>
+          <p:txBody>
+            <a:bodyPr rtlCol="0" anchor="ctr"/>
+            <a:lstStyle/>
+            <a:p>
+              <a:pPr algn="ctr"/>
+              <a:endParaRPr lang="en-US" dirty="0"/>
+            </a:p>
+          </p:txBody>
+        </p:sp>
+      </p:grpSp>
+      <p:pic>
+        <p:nvPicPr>
+          <p:cNvPr id="3" name="Immagine 2">
+            <a:extLst>
+              <a:ext uri="{FF2B5EF4-FFF2-40B4-BE49-F238E27FC236}">
+                <a16:creationId xmlns:a16="http://schemas.microsoft.com/office/drawing/2014/main" id="{7842A6E9-8C3B-4802-8B50-B78E69C5AF09}"/>
+              </a:ext>
+            </a:extLst>
+          </p:cNvPr>
+          <p:cNvPicPr>
+            <a:picLocks noChangeAspect="1"/>
+          </p:cNvPicPr>
+          <p:nvPr/>
+        </p:nvPicPr>
+        <p:blipFill>
+          <a:blip r:embed="rId2"/>
+          <a:stretch>
+            <a:fillRect/>
+          </a:stretch>
+        </p:blipFill>
+        <p:spPr>
+          <a:xfrm>
+            <a:off x="496825" y="1206471"/>
+            <a:ext cx="7889530" cy="4440564"/>
+          </a:xfrm>
+          <a:prstGeom prst="rect">
+            <a:avLst/>
+          </a:prstGeom>
+        </p:spPr>
+      </p:pic>
+      <p:sp>
+        <p:nvSpPr>
+          <p:cNvPr id="20" name="Titolo 1">
+            <a:extLst>
+              <a:ext uri="{FF2B5EF4-FFF2-40B4-BE49-F238E27FC236}">
+                <a16:creationId xmlns:a16="http://schemas.microsoft.com/office/drawing/2014/main" id="{3209FF46-8E28-4D31-A897-D0EB67C2A0F1}"/>
+              </a:ext>
+            </a:extLst>
+          </p:cNvPr>
+          <p:cNvSpPr txBox="1">
+            <a:spLocks/>
+          </p:cNvSpPr>
+          <p:nvPr/>
+        </p:nvSpPr>
+        <p:spPr>
+          <a:xfrm>
+            <a:off x="8519504" y="3034646"/>
+            <a:ext cx="2868998" cy="1156654"/>
+          </a:xfrm>
+          <a:prstGeom prst="rect">
+            <a:avLst/>
+          </a:prstGeom>
+        </p:spPr>
+        <p:txBody>
+          <a:bodyPr vert="horz" lIns="91440" tIns="45720" rIns="91440" bIns="45720" rtlCol="0" anchor="t">
+            <a:normAutofit/>
           </a:bodyPr>
-          <a:lstStyle/>
-          <a:p>
-            <a:r>
-              <a:rPr lang="en-US" sz="3900" b="1" kern="1200" dirty="0">
+          <a:lstStyle>
+            <a:lvl1pPr algn="l" defTabSz="914400" rtl="0" eaLnBrk="1" latinLnBrk="0" hangingPunct="1">
+              <a:lnSpc>
+                <a:spcPct val="90000"/>
+              </a:lnSpc>
+              <a:spcBef>
+                <a:spcPct val="0"/>
+              </a:spcBef>
+              <a:buNone/>
+              <a:defRPr sz="4400" kern="1200">
                 <a:solidFill>
                   <a:schemeClr val="tx1"/>
                 </a:solidFill>
-                <a:latin typeface="+mn-lt"/>
+                <a:latin typeface="+mj-lt"/>
                 <a:ea typeface="+mj-ea"/>
                 <a:cs typeface="+mj-cs"/>
+              </a:defRPr>
+            </a:lvl1pPr>
+          </a:lstStyle>
+          <a:p>
+            <a:r>
+              <a:rPr lang="en-US" sz="3200" dirty="0">
+                <a:latin typeface="+mn-lt"/>
               </a:rPr>
               <a:t>OnePage.html</a:t>
             </a:r>
             <a:br>
-              <a:rPr lang="en-US" sz="3900" b="1" kern="1200" dirty="0">
+              <a:rPr lang="en-US" sz="3200" dirty="0">
+                <a:latin typeface="+mn-lt"/>
+              </a:rPr>
+            </a:br>
+            <a:r>
+              <a:rPr lang="en-US" sz="3200" b="1" dirty="0">
                 <a:solidFill>
-                  <a:schemeClr val="tx1"/>
+                  <a:srgbClr val="7030A0"/>
                 </a:solidFill>
                 <a:latin typeface="+mn-lt"/>
-                <a:ea typeface="+mj-ea"/>
-                <a:cs typeface="+mj-cs"/>
               </a:rPr>
-            </a:br>
-            <a:r>
-              <a:rPr lang="en-US" sz="3900" b="1" kern="1200" dirty="0">
+              <a:t>User Logged</a:t>
+            </a:r>
+            <a:endParaRPr lang="en-US" sz="3200" b="1" dirty="0"/>
+          </a:p>
+        </p:txBody>
+      </p:sp>
+      <p:sp>
+        <p:nvSpPr>
+          <p:cNvPr id="21" name="CasellaDiTesto 20">
+            <a:extLst>
+              <a:ext uri="{FF2B5EF4-FFF2-40B4-BE49-F238E27FC236}">
+                <a16:creationId xmlns:a16="http://schemas.microsoft.com/office/drawing/2014/main" id="{CD7AB8BF-D636-4CE2-859F-5DAD2F59E9C6}"/>
+              </a:ext>
+            </a:extLst>
+          </p:cNvPr>
+          <p:cNvSpPr txBox="1"/>
+          <p:nvPr/>
+        </p:nvSpPr>
+        <p:spPr>
+          <a:xfrm>
+            <a:off x="7600165" y="3970170"/>
+            <a:ext cx="4654981" cy="400110"/>
+          </a:xfrm>
+          <a:prstGeom prst="rect">
+            <a:avLst/>
+          </a:prstGeom>
+          <a:noFill/>
+        </p:spPr>
+        <p:txBody>
+          <a:bodyPr wrap="square">
+            <a:spAutoFit/>
+          </a:bodyPr>
+          <a:lstStyle/>
+          <a:p>
+            <a:r>
+              <a:rPr lang="en-US" sz="2000" b="1" kern="1200" dirty="0">
                 <a:solidFill>
                   <a:srgbClr val="7030A0"/>
                 </a:solidFill>
@@ -41665,45 +43148,16 @@
                 <a:ea typeface="+mj-ea"/>
                 <a:cs typeface="+mj-cs"/>
               </a:rPr>
-              <a:t>User Logged -&gt; drag &amp; drop -&gt; “save album order” button</a:t>
-            </a:r>
+              <a:t>drag &amp; drop -&gt; “save album order” button</a:t>
+            </a:r>
+            <a:endParaRPr lang="en-US" sz="2000" dirty="0"/>
           </a:p>
         </p:txBody>
       </p:sp>
-      <p:pic>
-        <p:nvPicPr>
-          <p:cNvPr id="5" name="Immagine 4">
-            <a:extLst>
-              <a:ext uri="{FF2B5EF4-FFF2-40B4-BE49-F238E27FC236}">
-                <a16:creationId xmlns:a16="http://schemas.microsoft.com/office/drawing/2014/main" id="{9E8DECFC-E204-4B7D-90F3-3A5C37411F37}"/>
-              </a:ext>
-            </a:extLst>
-          </p:cNvPr>
-          <p:cNvPicPr>
-            <a:picLocks noChangeAspect="1"/>
-          </p:cNvPicPr>
-          <p:nvPr/>
-        </p:nvPicPr>
-        <p:blipFill>
-          <a:blip r:embed="rId2"/>
-          <a:stretch>
-            <a:fillRect/>
-          </a:stretch>
-        </p:blipFill>
-        <p:spPr>
-          <a:xfrm>
-            <a:off x="1973822" y="1845426"/>
-            <a:ext cx="8241302" cy="4450303"/>
-          </a:xfrm>
-          <a:prstGeom prst="rect">
-            <a:avLst/>
-          </a:prstGeom>
-        </p:spPr>
-      </p:pic>
     </p:spTree>
     <p:extLst>
       <p:ext uri="{BB962C8B-B14F-4D97-AF65-F5344CB8AC3E}">
-        <p14:creationId xmlns:p14="http://schemas.microsoft.com/office/powerpoint/2010/main" val="2021523980"/>
+        <p14:creationId xmlns:p14="http://schemas.microsoft.com/office/powerpoint/2010/main" val="2606049287"/>
       </p:ext>
     </p:extLst>
   </p:cSld>
@@ -42301,4 +43755,47 @@
     </a:ext>
   </a:extLst>
 </a:theme>
+</file>
+
+<file path=ppt/theme/themeOverride1.xml><?xml version="1.0" encoding="utf-8"?>
+<a:themeOverride xmlns:a="http://schemas.openxmlformats.org/drawingml/2006/main">
+  <a:clrScheme name="Office">
+    <a:dk1>
+      <a:sysClr val="windowText" lastClr="000000"/>
+    </a:dk1>
+    <a:lt1>
+      <a:sysClr val="window" lastClr="FFFFFF"/>
+    </a:lt1>
+    <a:dk2>
+      <a:srgbClr val="44546A"/>
+    </a:dk2>
+    <a:lt2>
+      <a:srgbClr val="E7E6E6"/>
+    </a:lt2>
+    <a:accent1>
+      <a:srgbClr val="4472C4"/>
+    </a:accent1>
+    <a:accent2>
+      <a:srgbClr val="ED7D31"/>
+    </a:accent2>
+    <a:accent3>
+      <a:srgbClr val="A5A5A5"/>
+    </a:accent3>
+    <a:accent4>
+      <a:srgbClr val="FFC000"/>
+    </a:accent4>
+    <a:accent5>
+      <a:srgbClr val="5B9BD5"/>
+    </a:accent5>
+    <a:accent6>
+      <a:srgbClr val="70AD47"/>
+    </a:accent6>
+    <a:hlink>
+      <a:srgbClr val="0563C1"/>
+    </a:hlink>
+    <a:folHlink>
+      <a:srgbClr val="954F72"/>
+    </a:folHlink>
+  </a:clrScheme>
+</a:themeOverride>
 </file>
</xml_diff>